<commit_message>
Agregando posibles temas a tratar para la presentacion tecnica
</commit_message>
<xml_diff>
--- a/Presentacion/Tecnica/Presentacion Tecnica.pptx
+++ b/Presentacion/Tecnica/Presentacion Tecnica.pptx
@@ -5,13 +5,17 @@
     <p:sldMasterId id="2147484416" r:id="rId1"/>
   </p:sldMasterIdLst>
   <p:notesMasterIdLst>
-    <p:notesMasterId r:id="rId6"/>
+    <p:notesMasterId r:id="rId10"/>
   </p:notesMasterIdLst>
   <p:sldIdLst>
     <p:sldId id="256" r:id="rId2"/>
     <p:sldId id="257" r:id="rId3"/>
     <p:sldId id="259" r:id="rId4"/>
     <p:sldId id="264" r:id="rId5"/>
+    <p:sldId id="265" r:id="rId6"/>
+    <p:sldId id="267" r:id="rId7"/>
+    <p:sldId id="266" r:id="rId8"/>
+    <p:sldId id="268" r:id="rId9"/>
   </p:sldIdLst>
   <p:sldSz cx="9144000" cy="6858000" type="screen4x3"/>
   <p:notesSz cx="6858000" cy="9144000"/>
@@ -4943,7 +4947,6 @@
               <a:rPr lang="es-AR" sz="5400" b="1" u="sng" dirty="0" smtClean="0"/>
               <a:t> Usos</a:t>
             </a:r>
-            <a:endParaRPr lang="es-AR" sz="5400" b="1" u="sng" dirty="0" smtClean="0"/>
           </a:p>
           <a:p>
             <a:pPr algn="ctr"/>
@@ -7340,6 +7343,4351 @@
 </p:sld>
 </file>
 
+<file path=ppt/slides/slide5.xml><?xml version="1.0" encoding="utf-8"?>
+<p:sld xmlns:a="http://schemas.openxmlformats.org/drawingml/2006/main" xmlns:r="http://schemas.openxmlformats.org/officeDocument/2006/relationships" xmlns:p="http://schemas.openxmlformats.org/presentationml/2006/main">
+  <p:cSld>
+    <p:spTree>
+      <p:nvGrpSpPr>
+        <p:cNvPr id="1" name=""/>
+        <p:cNvGrpSpPr/>
+        <p:nvPr/>
+      </p:nvGrpSpPr>
+      <p:grpSpPr>
+        <a:xfrm>
+          <a:off x="0" y="0"/>
+          <a:ext cx="0" cy="0"/>
+          <a:chOff x="0" y="0"/>
+          <a:chExt cx="0" cy="0"/>
+        </a:xfrm>
+      </p:grpSpPr>
+      <p:grpSp>
+        <p:nvGrpSpPr>
+          <p:cNvPr id="2" name="Group 22"/>
+          <p:cNvGrpSpPr/>
+          <p:nvPr/>
+        </p:nvGrpSpPr>
+        <p:grpSpPr>
+          <a:xfrm>
+            <a:off x="304800" y="304800"/>
+            <a:ext cx="8534400" cy="6248400"/>
+            <a:chOff x="304800" y="304800"/>
+            <a:chExt cx="8534400" cy="6248400"/>
+          </a:xfrm>
+          <a:solidFill>
+            <a:schemeClr val="bg1">
+              <a:lumMod val="85000"/>
+            </a:schemeClr>
+          </a:solidFill>
+        </p:grpSpPr>
+        <p:sp>
+          <p:nvSpPr>
+            <p:cNvPr id="18" name="Rounded Rectangle 17"/>
+            <p:cNvSpPr/>
+            <p:nvPr/>
+          </p:nvSpPr>
+          <p:spPr>
+            <a:xfrm>
+              <a:off x="304800" y="304800"/>
+              <a:ext cx="8534400" cy="6248400"/>
+            </a:xfrm>
+            <a:prstGeom prst="roundRect">
+              <a:avLst/>
+            </a:prstGeom>
+            <a:grpFill/>
+            <a:ln>
+              <a:noFill/>
+            </a:ln>
+          </p:spPr>
+          <p:style>
+            <a:lnRef idx="2">
+              <a:schemeClr val="accent1">
+                <a:shade val="50000"/>
+              </a:schemeClr>
+            </a:lnRef>
+            <a:fillRef idx="1">
+              <a:schemeClr val="accent1"/>
+            </a:fillRef>
+            <a:effectRef idx="0">
+              <a:schemeClr val="accent1"/>
+            </a:effectRef>
+            <a:fontRef idx="minor">
+              <a:schemeClr val="lt1"/>
+            </a:fontRef>
+          </p:style>
+          <p:txBody>
+            <a:bodyPr rtlCol="0" anchor="ctr"/>
+            <a:lstStyle/>
+            <a:p>
+              <a:pPr algn="ctr"/>
+              <a:endParaRPr lang="es-AR"/>
+            </a:p>
+          </p:txBody>
+        </p:sp>
+        <p:sp>
+          <p:nvSpPr>
+            <p:cNvPr id="22" name="Rounded Rectangle 21"/>
+            <p:cNvSpPr/>
+            <p:nvPr/>
+          </p:nvSpPr>
+          <p:spPr>
+            <a:xfrm>
+              <a:off x="7086600" y="304800"/>
+              <a:ext cx="1752600" cy="1752600"/>
+            </a:xfrm>
+            <a:prstGeom prst="roundRect">
+              <a:avLst/>
+            </a:prstGeom>
+            <a:grpFill/>
+            <a:ln>
+              <a:noFill/>
+            </a:ln>
+          </p:spPr>
+          <p:style>
+            <a:lnRef idx="2">
+              <a:schemeClr val="accent1">
+                <a:shade val="50000"/>
+              </a:schemeClr>
+            </a:lnRef>
+            <a:fillRef idx="1">
+              <a:schemeClr val="accent1"/>
+            </a:fillRef>
+            <a:effectRef idx="0">
+              <a:schemeClr val="accent1"/>
+            </a:effectRef>
+            <a:fontRef idx="minor">
+              <a:schemeClr val="lt1"/>
+            </a:fontRef>
+          </p:style>
+          <p:txBody>
+            <a:bodyPr rtlCol="0" anchor="ctr"/>
+            <a:lstStyle/>
+            <a:p>
+              <a:pPr algn="ctr"/>
+              <a:endParaRPr lang="es-AR"/>
+            </a:p>
+          </p:txBody>
+        </p:sp>
+        <p:sp>
+          <p:nvSpPr>
+            <p:cNvPr id="21" name="Rounded Rectangle 20"/>
+            <p:cNvSpPr/>
+            <p:nvPr/>
+          </p:nvSpPr>
+          <p:spPr>
+            <a:xfrm>
+              <a:off x="304800" y="304800"/>
+              <a:ext cx="1752600" cy="1752600"/>
+            </a:xfrm>
+            <a:prstGeom prst="roundRect">
+              <a:avLst/>
+            </a:prstGeom>
+            <a:grpFill/>
+            <a:ln>
+              <a:noFill/>
+            </a:ln>
+          </p:spPr>
+          <p:style>
+            <a:lnRef idx="2">
+              <a:schemeClr val="accent1">
+                <a:shade val="50000"/>
+              </a:schemeClr>
+            </a:lnRef>
+            <a:fillRef idx="1">
+              <a:schemeClr val="accent1"/>
+            </a:fillRef>
+            <a:effectRef idx="0">
+              <a:schemeClr val="accent1"/>
+            </a:effectRef>
+            <a:fontRef idx="minor">
+              <a:schemeClr val="lt1"/>
+            </a:fontRef>
+          </p:style>
+          <p:txBody>
+            <a:bodyPr rtlCol="0" anchor="ctr"/>
+            <a:lstStyle/>
+            <a:p>
+              <a:pPr algn="ctr"/>
+              <a:endParaRPr lang="es-AR"/>
+            </a:p>
+          </p:txBody>
+        </p:sp>
+        <p:sp>
+          <p:nvSpPr>
+            <p:cNvPr id="17" name="Rounded Rectangle 16"/>
+            <p:cNvSpPr/>
+            <p:nvPr/>
+          </p:nvSpPr>
+          <p:spPr>
+            <a:xfrm>
+              <a:off x="304800" y="4800600"/>
+              <a:ext cx="1752600" cy="1752600"/>
+            </a:xfrm>
+            <a:prstGeom prst="roundRect">
+              <a:avLst/>
+            </a:prstGeom>
+            <a:grpFill/>
+            <a:ln>
+              <a:noFill/>
+            </a:ln>
+          </p:spPr>
+          <p:style>
+            <a:lnRef idx="2">
+              <a:schemeClr val="accent1">
+                <a:shade val="50000"/>
+              </a:schemeClr>
+            </a:lnRef>
+            <a:fillRef idx="1">
+              <a:schemeClr val="accent1"/>
+            </a:fillRef>
+            <a:effectRef idx="0">
+              <a:schemeClr val="accent1"/>
+            </a:effectRef>
+            <a:fontRef idx="minor">
+              <a:schemeClr val="lt1"/>
+            </a:fontRef>
+          </p:style>
+          <p:txBody>
+            <a:bodyPr rtlCol="0" anchor="ctr"/>
+            <a:lstStyle/>
+            <a:p>
+              <a:pPr algn="ctr"/>
+              <a:endParaRPr lang="es-AR"/>
+            </a:p>
+          </p:txBody>
+        </p:sp>
+        <p:sp>
+          <p:nvSpPr>
+            <p:cNvPr id="19" name="Rounded Rectangle 18"/>
+            <p:cNvSpPr/>
+            <p:nvPr/>
+          </p:nvSpPr>
+          <p:spPr>
+            <a:xfrm>
+              <a:off x="7086600" y="4800600"/>
+              <a:ext cx="1752600" cy="1752600"/>
+            </a:xfrm>
+            <a:prstGeom prst="roundRect">
+              <a:avLst/>
+            </a:prstGeom>
+            <a:grpFill/>
+            <a:ln>
+              <a:noFill/>
+            </a:ln>
+          </p:spPr>
+          <p:style>
+            <a:lnRef idx="2">
+              <a:schemeClr val="accent1">
+                <a:shade val="50000"/>
+              </a:schemeClr>
+            </a:lnRef>
+            <a:fillRef idx="1">
+              <a:schemeClr val="accent1"/>
+            </a:fillRef>
+            <a:effectRef idx="0">
+              <a:schemeClr val="accent1"/>
+            </a:effectRef>
+            <a:fontRef idx="minor">
+              <a:schemeClr val="lt1"/>
+            </a:fontRef>
+          </p:style>
+          <p:txBody>
+            <a:bodyPr rtlCol="0" anchor="ctr"/>
+            <a:lstStyle/>
+            <a:p>
+              <a:pPr algn="ctr"/>
+              <a:endParaRPr lang="es-AR"/>
+            </a:p>
+          </p:txBody>
+        </p:sp>
+      </p:grpSp>
+      <p:sp>
+        <p:nvSpPr>
+          <p:cNvPr id="40" name="Freeform 39"/>
+          <p:cNvSpPr/>
+          <p:nvPr/>
+        </p:nvSpPr>
+        <p:spPr>
+          <a:xfrm>
+            <a:off x="457200" y="457200"/>
+            <a:ext cx="8229600" cy="5803900"/>
+          </a:xfrm>
+          <a:custGeom>
+            <a:avLst/>
+            <a:gdLst>
+              <a:gd name="connsiteX0" fmla="*/ 0 w 8077200"/>
+              <a:gd name="connsiteY0" fmla="*/ 965219 h 5791200"/>
+              <a:gd name="connsiteX1" fmla="*/ 282707 w 8077200"/>
+              <a:gd name="connsiteY1" fmla="*/ 282706 h 5791200"/>
+              <a:gd name="connsiteX2" fmla="*/ 965221 w 8077200"/>
+              <a:gd name="connsiteY2" fmla="*/ 1 h 5791200"/>
+              <a:gd name="connsiteX3" fmla="*/ 7111981 w 8077200"/>
+              <a:gd name="connsiteY3" fmla="*/ 0 h 5791200"/>
+              <a:gd name="connsiteX4" fmla="*/ 7794494 w 8077200"/>
+              <a:gd name="connsiteY4" fmla="*/ 282707 h 5791200"/>
+              <a:gd name="connsiteX5" fmla="*/ 8077199 w 8077200"/>
+              <a:gd name="connsiteY5" fmla="*/ 965221 h 5791200"/>
+              <a:gd name="connsiteX6" fmla="*/ 8077200 w 8077200"/>
+              <a:gd name="connsiteY6" fmla="*/ 4825981 h 5791200"/>
+              <a:gd name="connsiteX7" fmla="*/ 7794494 w 8077200"/>
+              <a:gd name="connsiteY7" fmla="*/ 5508494 h 5791200"/>
+              <a:gd name="connsiteX8" fmla="*/ 7111981 w 8077200"/>
+              <a:gd name="connsiteY8" fmla="*/ 5791200 h 5791200"/>
+              <a:gd name="connsiteX9" fmla="*/ 965219 w 8077200"/>
+              <a:gd name="connsiteY9" fmla="*/ 5791200 h 5791200"/>
+              <a:gd name="connsiteX10" fmla="*/ 282706 w 8077200"/>
+              <a:gd name="connsiteY10" fmla="*/ 5508493 h 5791200"/>
+              <a:gd name="connsiteX11" fmla="*/ 0 w 8077200"/>
+              <a:gd name="connsiteY11" fmla="*/ 4825980 h 5791200"/>
+              <a:gd name="connsiteX12" fmla="*/ 0 w 8077200"/>
+              <a:gd name="connsiteY12" fmla="*/ 965219 h 5791200"/>
+              <a:gd name="connsiteX0" fmla="*/ 0 w 8077200"/>
+              <a:gd name="connsiteY0" fmla="*/ 609600 h 5791200"/>
+              <a:gd name="connsiteX1" fmla="*/ 282707 w 8077200"/>
+              <a:gd name="connsiteY1" fmla="*/ 282706 h 5791200"/>
+              <a:gd name="connsiteX2" fmla="*/ 965221 w 8077200"/>
+              <a:gd name="connsiteY2" fmla="*/ 1 h 5791200"/>
+              <a:gd name="connsiteX3" fmla="*/ 7111981 w 8077200"/>
+              <a:gd name="connsiteY3" fmla="*/ 0 h 5791200"/>
+              <a:gd name="connsiteX4" fmla="*/ 7794494 w 8077200"/>
+              <a:gd name="connsiteY4" fmla="*/ 282707 h 5791200"/>
+              <a:gd name="connsiteX5" fmla="*/ 8077199 w 8077200"/>
+              <a:gd name="connsiteY5" fmla="*/ 965221 h 5791200"/>
+              <a:gd name="connsiteX6" fmla="*/ 8077200 w 8077200"/>
+              <a:gd name="connsiteY6" fmla="*/ 4825981 h 5791200"/>
+              <a:gd name="connsiteX7" fmla="*/ 7794494 w 8077200"/>
+              <a:gd name="connsiteY7" fmla="*/ 5508494 h 5791200"/>
+              <a:gd name="connsiteX8" fmla="*/ 7111981 w 8077200"/>
+              <a:gd name="connsiteY8" fmla="*/ 5791200 h 5791200"/>
+              <a:gd name="connsiteX9" fmla="*/ 965219 w 8077200"/>
+              <a:gd name="connsiteY9" fmla="*/ 5791200 h 5791200"/>
+              <a:gd name="connsiteX10" fmla="*/ 282706 w 8077200"/>
+              <a:gd name="connsiteY10" fmla="*/ 5508493 h 5791200"/>
+              <a:gd name="connsiteX11" fmla="*/ 0 w 8077200"/>
+              <a:gd name="connsiteY11" fmla="*/ 4825980 h 5791200"/>
+              <a:gd name="connsiteX12" fmla="*/ 0 w 8077200"/>
+              <a:gd name="connsiteY12" fmla="*/ 609600 h 5791200"/>
+              <a:gd name="connsiteX0" fmla="*/ 0 w 8077200"/>
+              <a:gd name="connsiteY0" fmla="*/ 609601 h 5791201"/>
+              <a:gd name="connsiteX1" fmla="*/ 282707 w 8077200"/>
+              <a:gd name="connsiteY1" fmla="*/ 282707 h 5791201"/>
+              <a:gd name="connsiteX2" fmla="*/ 609600 w 8077200"/>
+              <a:gd name="connsiteY2" fmla="*/ 1 h 5791201"/>
+              <a:gd name="connsiteX3" fmla="*/ 7111981 w 8077200"/>
+              <a:gd name="connsiteY3" fmla="*/ 1 h 5791201"/>
+              <a:gd name="connsiteX4" fmla="*/ 7794494 w 8077200"/>
+              <a:gd name="connsiteY4" fmla="*/ 282708 h 5791201"/>
+              <a:gd name="connsiteX5" fmla="*/ 8077199 w 8077200"/>
+              <a:gd name="connsiteY5" fmla="*/ 965222 h 5791201"/>
+              <a:gd name="connsiteX6" fmla="*/ 8077200 w 8077200"/>
+              <a:gd name="connsiteY6" fmla="*/ 4825982 h 5791201"/>
+              <a:gd name="connsiteX7" fmla="*/ 7794494 w 8077200"/>
+              <a:gd name="connsiteY7" fmla="*/ 5508495 h 5791201"/>
+              <a:gd name="connsiteX8" fmla="*/ 7111981 w 8077200"/>
+              <a:gd name="connsiteY8" fmla="*/ 5791201 h 5791201"/>
+              <a:gd name="connsiteX9" fmla="*/ 965219 w 8077200"/>
+              <a:gd name="connsiteY9" fmla="*/ 5791201 h 5791201"/>
+              <a:gd name="connsiteX10" fmla="*/ 282706 w 8077200"/>
+              <a:gd name="connsiteY10" fmla="*/ 5508494 h 5791201"/>
+              <a:gd name="connsiteX11" fmla="*/ 0 w 8077200"/>
+              <a:gd name="connsiteY11" fmla="*/ 4825981 h 5791201"/>
+              <a:gd name="connsiteX12" fmla="*/ 0 w 8077200"/>
+              <a:gd name="connsiteY12" fmla="*/ 609601 h 5791201"/>
+              <a:gd name="connsiteX0" fmla="*/ 0 w 8077200"/>
+              <a:gd name="connsiteY0" fmla="*/ 609601 h 5791201"/>
+              <a:gd name="connsiteX1" fmla="*/ 152400 w 8077200"/>
+              <a:gd name="connsiteY1" fmla="*/ 152402 h 5791201"/>
+              <a:gd name="connsiteX2" fmla="*/ 609600 w 8077200"/>
+              <a:gd name="connsiteY2" fmla="*/ 1 h 5791201"/>
+              <a:gd name="connsiteX3" fmla="*/ 7111981 w 8077200"/>
+              <a:gd name="connsiteY3" fmla="*/ 1 h 5791201"/>
+              <a:gd name="connsiteX4" fmla="*/ 7794494 w 8077200"/>
+              <a:gd name="connsiteY4" fmla="*/ 282708 h 5791201"/>
+              <a:gd name="connsiteX5" fmla="*/ 8077199 w 8077200"/>
+              <a:gd name="connsiteY5" fmla="*/ 965222 h 5791201"/>
+              <a:gd name="connsiteX6" fmla="*/ 8077200 w 8077200"/>
+              <a:gd name="connsiteY6" fmla="*/ 4825982 h 5791201"/>
+              <a:gd name="connsiteX7" fmla="*/ 7794494 w 8077200"/>
+              <a:gd name="connsiteY7" fmla="*/ 5508495 h 5791201"/>
+              <a:gd name="connsiteX8" fmla="*/ 7111981 w 8077200"/>
+              <a:gd name="connsiteY8" fmla="*/ 5791201 h 5791201"/>
+              <a:gd name="connsiteX9" fmla="*/ 965219 w 8077200"/>
+              <a:gd name="connsiteY9" fmla="*/ 5791201 h 5791201"/>
+              <a:gd name="connsiteX10" fmla="*/ 282706 w 8077200"/>
+              <a:gd name="connsiteY10" fmla="*/ 5508494 h 5791201"/>
+              <a:gd name="connsiteX11" fmla="*/ 0 w 8077200"/>
+              <a:gd name="connsiteY11" fmla="*/ 4825981 h 5791201"/>
+              <a:gd name="connsiteX12" fmla="*/ 0 w 8077200"/>
+              <a:gd name="connsiteY12" fmla="*/ 609601 h 5791201"/>
+              <a:gd name="connsiteX0" fmla="*/ 0 w 8077200"/>
+              <a:gd name="connsiteY0" fmla="*/ 609600 h 5791200"/>
+              <a:gd name="connsiteX1" fmla="*/ 152400 w 8077200"/>
+              <a:gd name="connsiteY1" fmla="*/ 152401 h 5791200"/>
+              <a:gd name="connsiteX2" fmla="*/ 533400 w 8077200"/>
+              <a:gd name="connsiteY2" fmla="*/ 1 h 5791200"/>
+              <a:gd name="connsiteX3" fmla="*/ 7111981 w 8077200"/>
+              <a:gd name="connsiteY3" fmla="*/ 0 h 5791200"/>
+              <a:gd name="connsiteX4" fmla="*/ 7794494 w 8077200"/>
+              <a:gd name="connsiteY4" fmla="*/ 282707 h 5791200"/>
+              <a:gd name="connsiteX5" fmla="*/ 8077199 w 8077200"/>
+              <a:gd name="connsiteY5" fmla="*/ 965221 h 5791200"/>
+              <a:gd name="connsiteX6" fmla="*/ 8077200 w 8077200"/>
+              <a:gd name="connsiteY6" fmla="*/ 4825981 h 5791200"/>
+              <a:gd name="connsiteX7" fmla="*/ 7794494 w 8077200"/>
+              <a:gd name="connsiteY7" fmla="*/ 5508494 h 5791200"/>
+              <a:gd name="connsiteX8" fmla="*/ 7111981 w 8077200"/>
+              <a:gd name="connsiteY8" fmla="*/ 5791200 h 5791200"/>
+              <a:gd name="connsiteX9" fmla="*/ 965219 w 8077200"/>
+              <a:gd name="connsiteY9" fmla="*/ 5791200 h 5791200"/>
+              <a:gd name="connsiteX10" fmla="*/ 282706 w 8077200"/>
+              <a:gd name="connsiteY10" fmla="*/ 5508493 h 5791200"/>
+              <a:gd name="connsiteX11" fmla="*/ 0 w 8077200"/>
+              <a:gd name="connsiteY11" fmla="*/ 4825980 h 5791200"/>
+              <a:gd name="connsiteX12" fmla="*/ 0 w 8077200"/>
+              <a:gd name="connsiteY12" fmla="*/ 609600 h 5791200"/>
+              <a:gd name="connsiteX0" fmla="*/ 0 w 8077200"/>
+              <a:gd name="connsiteY0" fmla="*/ 533400 h 5791200"/>
+              <a:gd name="connsiteX1" fmla="*/ 152400 w 8077200"/>
+              <a:gd name="connsiteY1" fmla="*/ 152401 h 5791200"/>
+              <a:gd name="connsiteX2" fmla="*/ 533400 w 8077200"/>
+              <a:gd name="connsiteY2" fmla="*/ 1 h 5791200"/>
+              <a:gd name="connsiteX3" fmla="*/ 7111981 w 8077200"/>
+              <a:gd name="connsiteY3" fmla="*/ 0 h 5791200"/>
+              <a:gd name="connsiteX4" fmla="*/ 7794494 w 8077200"/>
+              <a:gd name="connsiteY4" fmla="*/ 282707 h 5791200"/>
+              <a:gd name="connsiteX5" fmla="*/ 8077199 w 8077200"/>
+              <a:gd name="connsiteY5" fmla="*/ 965221 h 5791200"/>
+              <a:gd name="connsiteX6" fmla="*/ 8077200 w 8077200"/>
+              <a:gd name="connsiteY6" fmla="*/ 4825981 h 5791200"/>
+              <a:gd name="connsiteX7" fmla="*/ 7794494 w 8077200"/>
+              <a:gd name="connsiteY7" fmla="*/ 5508494 h 5791200"/>
+              <a:gd name="connsiteX8" fmla="*/ 7111981 w 8077200"/>
+              <a:gd name="connsiteY8" fmla="*/ 5791200 h 5791200"/>
+              <a:gd name="connsiteX9" fmla="*/ 965219 w 8077200"/>
+              <a:gd name="connsiteY9" fmla="*/ 5791200 h 5791200"/>
+              <a:gd name="connsiteX10" fmla="*/ 282706 w 8077200"/>
+              <a:gd name="connsiteY10" fmla="*/ 5508493 h 5791200"/>
+              <a:gd name="connsiteX11" fmla="*/ 0 w 8077200"/>
+              <a:gd name="connsiteY11" fmla="*/ 4825980 h 5791200"/>
+              <a:gd name="connsiteX12" fmla="*/ 0 w 8077200"/>
+              <a:gd name="connsiteY12" fmla="*/ 533400 h 5791200"/>
+              <a:gd name="connsiteX0" fmla="*/ 12700 w 8089900"/>
+              <a:gd name="connsiteY0" fmla="*/ 546100 h 5803900"/>
+              <a:gd name="connsiteX1" fmla="*/ 88900 w 8089900"/>
+              <a:gd name="connsiteY1" fmla="*/ 88900 h 5803900"/>
+              <a:gd name="connsiteX2" fmla="*/ 546100 w 8089900"/>
+              <a:gd name="connsiteY2" fmla="*/ 12701 h 5803900"/>
+              <a:gd name="connsiteX3" fmla="*/ 7124681 w 8089900"/>
+              <a:gd name="connsiteY3" fmla="*/ 12700 h 5803900"/>
+              <a:gd name="connsiteX4" fmla="*/ 7807194 w 8089900"/>
+              <a:gd name="connsiteY4" fmla="*/ 295407 h 5803900"/>
+              <a:gd name="connsiteX5" fmla="*/ 8089899 w 8089900"/>
+              <a:gd name="connsiteY5" fmla="*/ 977921 h 5803900"/>
+              <a:gd name="connsiteX6" fmla="*/ 8089900 w 8089900"/>
+              <a:gd name="connsiteY6" fmla="*/ 4838681 h 5803900"/>
+              <a:gd name="connsiteX7" fmla="*/ 7807194 w 8089900"/>
+              <a:gd name="connsiteY7" fmla="*/ 5521194 h 5803900"/>
+              <a:gd name="connsiteX8" fmla="*/ 7124681 w 8089900"/>
+              <a:gd name="connsiteY8" fmla="*/ 5803900 h 5803900"/>
+              <a:gd name="connsiteX9" fmla="*/ 977919 w 8089900"/>
+              <a:gd name="connsiteY9" fmla="*/ 5803900 h 5803900"/>
+              <a:gd name="connsiteX10" fmla="*/ 295406 w 8089900"/>
+              <a:gd name="connsiteY10" fmla="*/ 5521193 h 5803900"/>
+              <a:gd name="connsiteX11" fmla="*/ 12700 w 8089900"/>
+              <a:gd name="connsiteY11" fmla="*/ 4838680 h 5803900"/>
+              <a:gd name="connsiteX12" fmla="*/ 12700 w 8089900"/>
+              <a:gd name="connsiteY12" fmla="*/ 546100 h 5803900"/>
+              <a:gd name="connsiteX0" fmla="*/ 12700 w 8089900"/>
+              <a:gd name="connsiteY0" fmla="*/ 546100 h 5803900"/>
+              <a:gd name="connsiteX1" fmla="*/ 88900 w 8089900"/>
+              <a:gd name="connsiteY1" fmla="*/ 88900 h 5803900"/>
+              <a:gd name="connsiteX2" fmla="*/ 546100 w 8089900"/>
+              <a:gd name="connsiteY2" fmla="*/ 12701 h 5803900"/>
+              <a:gd name="connsiteX3" fmla="*/ 7124681 w 8089900"/>
+              <a:gd name="connsiteY3" fmla="*/ 12700 h 5803900"/>
+              <a:gd name="connsiteX4" fmla="*/ 7807194 w 8089900"/>
+              <a:gd name="connsiteY4" fmla="*/ 295407 h 5803900"/>
+              <a:gd name="connsiteX5" fmla="*/ 8089899 w 8089900"/>
+              <a:gd name="connsiteY5" fmla="*/ 977921 h 5803900"/>
+              <a:gd name="connsiteX6" fmla="*/ 8089900 w 8089900"/>
+              <a:gd name="connsiteY6" fmla="*/ 4838681 h 5803900"/>
+              <a:gd name="connsiteX7" fmla="*/ 7807194 w 8089900"/>
+              <a:gd name="connsiteY7" fmla="*/ 5521194 h 5803900"/>
+              <a:gd name="connsiteX8" fmla="*/ 7124681 w 8089900"/>
+              <a:gd name="connsiteY8" fmla="*/ 5803900 h 5803900"/>
+              <a:gd name="connsiteX9" fmla="*/ 977919 w 8089900"/>
+              <a:gd name="connsiteY9" fmla="*/ 5803900 h 5803900"/>
+              <a:gd name="connsiteX10" fmla="*/ 295406 w 8089900"/>
+              <a:gd name="connsiteY10" fmla="*/ 5521193 h 5803900"/>
+              <a:gd name="connsiteX11" fmla="*/ 12700 w 8089900"/>
+              <a:gd name="connsiteY11" fmla="*/ 5346700 h 5803900"/>
+              <a:gd name="connsiteX12" fmla="*/ 12700 w 8089900"/>
+              <a:gd name="connsiteY12" fmla="*/ 546100 h 5803900"/>
+              <a:gd name="connsiteX0" fmla="*/ 12700 w 8089900"/>
+              <a:gd name="connsiteY0" fmla="*/ 546100 h 5803900"/>
+              <a:gd name="connsiteX1" fmla="*/ 88900 w 8089900"/>
+              <a:gd name="connsiteY1" fmla="*/ 88900 h 5803900"/>
+              <a:gd name="connsiteX2" fmla="*/ 546100 w 8089900"/>
+              <a:gd name="connsiteY2" fmla="*/ 12701 h 5803900"/>
+              <a:gd name="connsiteX3" fmla="*/ 7124681 w 8089900"/>
+              <a:gd name="connsiteY3" fmla="*/ 12700 h 5803900"/>
+              <a:gd name="connsiteX4" fmla="*/ 7807194 w 8089900"/>
+              <a:gd name="connsiteY4" fmla="*/ 295407 h 5803900"/>
+              <a:gd name="connsiteX5" fmla="*/ 8089899 w 8089900"/>
+              <a:gd name="connsiteY5" fmla="*/ 977921 h 5803900"/>
+              <a:gd name="connsiteX6" fmla="*/ 8089900 w 8089900"/>
+              <a:gd name="connsiteY6" fmla="*/ 4838681 h 5803900"/>
+              <a:gd name="connsiteX7" fmla="*/ 7807194 w 8089900"/>
+              <a:gd name="connsiteY7" fmla="*/ 5521194 h 5803900"/>
+              <a:gd name="connsiteX8" fmla="*/ 7124681 w 8089900"/>
+              <a:gd name="connsiteY8" fmla="*/ 5803900 h 5803900"/>
+              <a:gd name="connsiteX9" fmla="*/ 546100 w 8089900"/>
+              <a:gd name="connsiteY9" fmla="*/ 5803900 h 5803900"/>
+              <a:gd name="connsiteX10" fmla="*/ 295406 w 8089900"/>
+              <a:gd name="connsiteY10" fmla="*/ 5521193 h 5803900"/>
+              <a:gd name="connsiteX11" fmla="*/ 12700 w 8089900"/>
+              <a:gd name="connsiteY11" fmla="*/ 5346700 h 5803900"/>
+              <a:gd name="connsiteX12" fmla="*/ 12700 w 8089900"/>
+              <a:gd name="connsiteY12" fmla="*/ 546100 h 5803900"/>
+              <a:gd name="connsiteX0" fmla="*/ 12700 w 8089900"/>
+              <a:gd name="connsiteY0" fmla="*/ 546100 h 5803900"/>
+              <a:gd name="connsiteX1" fmla="*/ 88900 w 8089900"/>
+              <a:gd name="connsiteY1" fmla="*/ 88900 h 5803900"/>
+              <a:gd name="connsiteX2" fmla="*/ 546100 w 8089900"/>
+              <a:gd name="connsiteY2" fmla="*/ 12701 h 5803900"/>
+              <a:gd name="connsiteX3" fmla="*/ 7124681 w 8089900"/>
+              <a:gd name="connsiteY3" fmla="*/ 12700 h 5803900"/>
+              <a:gd name="connsiteX4" fmla="*/ 7807194 w 8089900"/>
+              <a:gd name="connsiteY4" fmla="*/ 295407 h 5803900"/>
+              <a:gd name="connsiteX5" fmla="*/ 8089899 w 8089900"/>
+              <a:gd name="connsiteY5" fmla="*/ 977921 h 5803900"/>
+              <a:gd name="connsiteX6" fmla="*/ 8089900 w 8089900"/>
+              <a:gd name="connsiteY6" fmla="*/ 4838681 h 5803900"/>
+              <a:gd name="connsiteX7" fmla="*/ 7807194 w 8089900"/>
+              <a:gd name="connsiteY7" fmla="*/ 5521194 h 5803900"/>
+              <a:gd name="connsiteX8" fmla="*/ 7124681 w 8089900"/>
+              <a:gd name="connsiteY8" fmla="*/ 5803900 h 5803900"/>
+              <a:gd name="connsiteX9" fmla="*/ 546100 w 8089900"/>
+              <a:gd name="connsiteY9" fmla="*/ 5803900 h 5803900"/>
+              <a:gd name="connsiteX10" fmla="*/ 88900 w 8089900"/>
+              <a:gd name="connsiteY10" fmla="*/ 5727700 h 5803900"/>
+              <a:gd name="connsiteX11" fmla="*/ 12700 w 8089900"/>
+              <a:gd name="connsiteY11" fmla="*/ 5346700 h 5803900"/>
+              <a:gd name="connsiteX12" fmla="*/ 12700 w 8089900"/>
+              <a:gd name="connsiteY12" fmla="*/ 546100 h 5803900"/>
+              <a:gd name="connsiteX0" fmla="*/ 12700 w 8089900"/>
+              <a:gd name="connsiteY0" fmla="*/ 546100 h 5803900"/>
+              <a:gd name="connsiteX1" fmla="*/ 88900 w 8089900"/>
+              <a:gd name="connsiteY1" fmla="*/ 88900 h 5803900"/>
+              <a:gd name="connsiteX2" fmla="*/ 546100 w 8089900"/>
+              <a:gd name="connsiteY2" fmla="*/ 12701 h 5803900"/>
+              <a:gd name="connsiteX3" fmla="*/ 7556500 w 8089900"/>
+              <a:gd name="connsiteY3" fmla="*/ 12700 h 5803900"/>
+              <a:gd name="connsiteX4" fmla="*/ 7807194 w 8089900"/>
+              <a:gd name="connsiteY4" fmla="*/ 295407 h 5803900"/>
+              <a:gd name="connsiteX5" fmla="*/ 8089899 w 8089900"/>
+              <a:gd name="connsiteY5" fmla="*/ 977921 h 5803900"/>
+              <a:gd name="connsiteX6" fmla="*/ 8089900 w 8089900"/>
+              <a:gd name="connsiteY6" fmla="*/ 4838681 h 5803900"/>
+              <a:gd name="connsiteX7" fmla="*/ 7807194 w 8089900"/>
+              <a:gd name="connsiteY7" fmla="*/ 5521194 h 5803900"/>
+              <a:gd name="connsiteX8" fmla="*/ 7124681 w 8089900"/>
+              <a:gd name="connsiteY8" fmla="*/ 5803900 h 5803900"/>
+              <a:gd name="connsiteX9" fmla="*/ 546100 w 8089900"/>
+              <a:gd name="connsiteY9" fmla="*/ 5803900 h 5803900"/>
+              <a:gd name="connsiteX10" fmla="*/ 88900 w 8089900"/>
+              <a:gd name="connsiteY10" fmla="*/ 5727700 h 5803900"/>
+              <a:gd name="connsiteX11" fmla="*/ 12700 w 8089900"/>
+              <a:gd name="connsiteY11" fmla="*/ 5346700 h 5803900"/>
+              <a:gd name="connsiteX12" fmla="*/ 12700 w 8089900"/>
+              <a:gd name="connsiteY12" fmla="*/ 546100 h 5803900"/>
+              <a:gd name="connsiteX0" fmla="*/ 12700 w 8089901"/>
+              <a:gd name="connsiteY0" fmla="*/ 546100 h 5803900"/>
+              <a:gd name="connsiteX1" fmla="*/ 88900 w 8089901"/>
+              <a:gd name="connsiteY1" fmla="*/ 88900 h 5803900"/>
+              <a:gd name="connsiteX2" fmla="*/ 546100 w 8089901"/>
+              <a:gd name="connsiteY2" fmla="*/ 12701 h 5803900"/>
+              <a:gd name="connsiteX3" fmla="*/ 7556500 w 8089901"/>
+              <a:gd name="connsiteY3" fmla="*/ 12700 h 5803900"/>
+              <a:gd name="connsiteX4" fmla="*/ 7807194 w 8089901"/>
+              <a:gd name="connsiteY4" fmla="*/ 295407 h 5803900"/>
+              <a:gd name="connsiteX5" fmla="*/ 8089900 w 8089901"/>
+              <a:gd name="connsiteY5" fmla="*/ 469900 h 5803900"/>
+              <a:gd name="connsiteX6" fmla="*/ 8089900 w 8089901"/>
+              <a:gd name="connsiteY6" fmla="*/ 4838681 h 5803900"/>
+              <a:gd name="connsiteX7" fmla="*/ 7807194 w 8089901"/>
+              <a:gd name="connsiteY7" fmla="*/ 5521194 h 5803900"/>
+              <a:gd name="connsiteX8" fmla="*/ 7124681 w 8089901"/>
+              <a:gd name="connsiteY8" fmla="*/ 5803900 h 5803900"/>
+              <a:gd name="connsiteX9" fmla="*/ 546100 w 8089901"/>
+              <a:gd name="connsiteY9" fmla="*/ 5803900 h 5803900"/>
+              <a:gd name="connsiteX10" fmla="*/ 88900 w 8089901"/>
+              <a:gd name="connsiteY10" fmla="*/ 5727700 h 5803900"/>
+              <a:gd name="connsiteX11" fmla="*/ 12700 w 8089901"/>
+              <a:gd name="connsiteY11" fmla="*/ 5346700 h 5803900"/>
+              <a:gd name="connsiteX12" fmla="*/ 12700 w 8089901"/>
+              <a:gd name="connsiteY12" fmla="*/ 546100 h 5803900"/>
+              <a:gd name="connsiteX0" fmla="*/ 12700 w 8102600"/>
+              <a:gd name="connsiteY0" fmla="*/ 546100 h 5803900"/>
+              <a:gd name="connsiteX1" fmla="*/ 88900 w 8102600"/>
+              <a:gd name="connsiteY1" fmla="*/ 88900 h 5803900"/>
+              <a:gd name="connsiteX2" fmla="*/ 546100 w 8102600"/>
+              <a:gd name="connsiteY2" fmla="*/ 12701 h 5803900"/>
+              <a:gd name="connsiteX3" fmla="*/ 7556500 w 8102600"/>
+              <a:gd name="connsiteY3" fmla="*/ 12700 h 5803900"/>
+              <a:gd name="connsiteX4" fmla="*/ 8013700 w 8102600"/>
+              <a:gd name="connsiteY4" fmla="*/ 88900 h 5803900"/>
+              <a:gd name="connsiteX5" fmla="*/ 8089900 w 8102600"/>
+              <a:gd name="connsiteY5" fmla="*/ 469900 h 5803900"/>
+              <a:gd name="connsiteX6" fmla="*/ 8089900 w 8102600"/>
+              <a:gd name="connsiteY6" fmla="*/ 4838681 h 5803900"/>
+              <a:gd name="connsiteX7" fmla="*/ 7807194 w 8102600"/>
+              <a:gd name="connsiteY7" fmla="*/ 5521194 h 5803900"/>
+              <a:gd name="connsiteX8" fmla="*/ 7124681 w 8102600"/>
+              <a:gd name="connsiteY8" fmla="*/ 5803900 h 5803900"/>
+              <a:gd name="connsiteX9" fmla="*/ 546100 w 8102600"/>
+              <a:gd name="connsiteY9" fmla="*/ 5803900 h 5803900"/>
+              <a:gd name="connsiteX10" fmla="*/ 88900 w 8102600"/>
+              <a:gd name="connsiteY10" fmla="*/ 5727700 h 5803900"/>
+              <a:gd name="connsiteX11" fmla="*/ 12700 w 8102600"/>
+              <a:gd name="connsiteY11" fmla="*/ 5346700 h 5803900"/>
+              <a:gd name="connsiteX12" fmla="*/ 12700 w 8102600"/>
+              <a:gd name="connsiteY12" fmla="*/ 546100 h 5803900"/>
+              <a:gd name="connsiteX0" fmla="*/ 12700 w 8102600"/>
+              <a:gd name="connsiteY0" fmla="*/ 546100 h 5803900"/>
+              <a:gd name="connsiteX1" fmla="*/ 88900 w 8102600"/>
+              <a:gd name="connsiteY1" fmla="*/ 88900 h 5803900"/>
+              <a:gd name="connsiteX2" fmla="*/ 546100 w 8102600"/>
+              <a:gd name="connsiteY2" fmla="*/ 12701 h 5803900"/>
+              <a:gd name="connsiteX3" fmla="*/ 7556500 w 8102600"/>
+              <a:gd name="connsiteY3" fmla="*/ 12700 h 5803900"/>
+              <a:gd name="connsiteX4" fmla="*/ 8013700 w 8102600"/>
+              <a:gd name="connsiteY4" fmla="*/ 88900 h 5803900"/>
+              <a:gd name="connsiteX5" fmla="*/ 8089899 w 8102600"/>
+              <a:gd name="connsiteY5" fmla="*/ 469900 h 5803900"/>
+              <a:gd name="connsiteX6" fmla="*/ 8089900 w 8102600"/>
+              <a:gd name="connsiteY6" fmla="*/ 4838681 h 5803900"/>
+              <a:gd name="connsiteX7" fmla="*/ 7807194 w 8102600"/>
+              <a:gd name="connsiteY7" fmla="*/ 5521194 h 5803900"/>
+              <a:gd name="connsiteX8" fmla="*/ 7124681 w 8102600"/>
+              <a:gd name="connsiteY8" fmla="*/ 5803900 h 5803900"/>
+              <a:gd name="connsiteX9" fmla="*/ 546100 w 8102600"/>
+              <a:gd name="connsiteY9" fmla="*/ 5803900 h 5803900"/>
+              <a:gd name="connsiteX10" fmla="*/ 88900 w 8102600"/>
+              <a:gd name="connsiteY10" fmla="*/ 5727700 h 5803900"/>
+              <a:gd name="connsiteX11" fmla="*/ 12700 w 8102600"/>
+              <a:gd name="connsiteY11" fmla="*/ 5346700 h 5803900"/>
+              <a:gd name="connsiteX12" fmla="*/ 12700 w 8102600"/>
+              <a:gd name="connsiteY12" fmla="*/ 546100 h 5803900"/>
+              <a:gd name="connsiteX0" fmla="*/ 12700 w 8102599"/>
+              <a:gd name="connsiteY0" fmla="*/ 546100 h 5803900"/>
+              <a:gd name="connsiteX1" fmla="*/ 88900 w 8102599"/>
+              <a:gd name="connsiteY1" fmla="*/ 88900 h 5803900"/>
+              <a:gd name="connsiteX2" fmla="*/ 546100 w 8102599"/>
+              <a:gd name="connsiteY2" fmla="*/ 12701 h 5803900"/>
+              <a:gd name="connsiteX3" fmla="*/ 7556500 w 8102599"/>
+              <a:gd name="connsiteY3" fmla="*/ 12700 h 5803900"/>
+              <a:gd name="connsiteX4" fmla="*/ 8013699 w 8102599"/>
+              <a:gd name="connsiteY4" fmla="*/ 88900 h 5803900"/>
+              <a:gd name="connsiteX5" fmla="*/ 8089899 w 8102599"/>
+              <a:gd name="connsiteY5" fmla="*/ 469900 h 5803900"/>
+              <a:gd name="connsiteX6" fmla="*/ 8089900 w 8102599"/>
+              <a:gd name="connsiteY6" fmla="*/ 4838681 h 5803900"/>
+              <a:gd name="connsiteX7" fmla="*/ 7807194 w 8102599"/>
+              <a:gd name="connsiteY7" fmla="*/ 5521194 h 5803900"/>
+              <a:gd name="connsiteX8" fmla="*/ 7124681 w 8102599"/>
+              <a:gd name="connsiteY8" fmla="*/ 5803900 h 5803900"/>
+              <a:gd name="connsiteX9" fmla="*/ 546100 w 8102599"/>
+              <a:gd name="connsiteY9" fmla="*/ 5803900 h 5803900"/>
+              <a:gd name="connsiteX10" fmla="*/ 88900 w 8102599"/>
+              <a:gd name="connsiteY10" fmla="*/ 5727700 h 5803900"/>
+              <a:gd name="connsiteX11" fmla="*/ 12700 w 8102599"/>
+              <a:gd name="connsiteY11" fmla="*/ 5346700 h 5803900"/>
+              <a:gd name="connsiteX12" fmla="*/ 12700 w 8102599"/>
+              <a:gd name="connsiteY12" fmla="*/ 546100 h 5803900"/>
+              <a:gd name="connsiteX0" fmla="*/ 12700 w 8102599"/>
+              <a:gd name="connsiteY0" fmla="*/ 546100 h 5803900"/>
+              <a:gd name="connsiteX1" fmla="*/ 88900 w 8102599"/>
+              <a:gd name="connsiteY1" fmla="*/ 88900 h 5803900"/>
+              <a:gd name="connsiteX2" fmla="*/ 546100 w 8102599"/>
+              <a:gd name="connsiteY2" fmla="*/ 12701 h 5803900"/>
+              <a:gd name="connsiteX3" fmla="*/ 7556500 w 8102599"/>
+              <a:gd name="connsiteY3" fmla="*/ 12700 h 5803900"/>
+              <a:gd name="connsiteX4" fmla="*/ 8013699 w 8102599"/>
+              <a:gd name="connsiteY4" fmla="*/ 88900 h 5803900"/>
+              <a:gd name="connsiteX5" fmla="*/ 8089899 w 8102599"/>
+              <a:gd name="connsiteY5" fmla="*/ 469900 h 5803900"/>
+              <a:gd name="connsiteX6" fmla="*/ 8089900 w 8102599"/>
+              <a:gd name="connsiteY6" fmla="*/ 5346700 h 5803900"/>
+              <a:gd name="connsiteX7" fmla="*/ 7807194 w 8102599"/>
+              <a:gd name="connsiteY7" fmla="*/ 5521194 h 5803900"/>
+              <a:gd name="connsiteX8" fmla="*/ 7124681 w 8102599"/>
+              <a:gd name="connsiteY8" fmla="*/ 5803900 h 5803900"/>
+              <a:gd name="connsiteX9" fmla="*/ 546100 w 8102599"/>
+              <a:gd name="connsiteY9" fmla="*/ 5803900 h 5803900"/>
+              <a:gd name="connsiteX10" fmla="*/ 88900 w 8102599"/>
+              <a:gd name="connsiteY10" fmla="*/ 5727700 h 5803900"/>
+              <a:gd name="connsiteX11" fmla="*/ 12700 w 8102599"/>
+              <a:gd name="connsiteY11" fmla="*/ 5346700 h 5803900"/>
+              <a:gd name="connsiteX12" fmla="*/ 12700 w 8102599"/>
+              <a:gd name="connsiteY12" fmla="*/ 546100 h 5803900"/>
+              <a:gd name="connsiteX0" fmla="*/ 12700 w 8102599"/>
+              <a:gd name="connsiteY0" fmla="*/ 546100 h 5803900"/>
+              <a:gd name="connsiteX1" fmla="*/ 88900 w 8102599"/>
+              <a:gd name="connsiteY1" fmla="*/ 88900 h 5803900"/>
+              <a:gd name="connsiteX2" fmla="*/ 546100 w 8102599"/>
+              <a:gd name="connsiteY2" fmla="*/ 12701 h 5803900"/>
+              <a:gd name="connsiteX3" fmla="*/ 7556500 w 8102599"/>
+              <a:gd name="connsiteY3" fmla="*/ 12700 h 5803900"/>
+              <a:gd name="connsiteX4" fmla="*/ 8013699 w 8102599"/>
+              <a:gd name="connsiteY4" fmla="*/ 88900 h 5803900"/>
+              <a:gd name="connsiteX5" fmla="*/ 8089899 w 8102599"/>
+              <a:gd name="connsiteY5" fmla="*/ 469900 h 5803900"/>
+              <a:gd name="connsiteX6" fmla="*/ 8089900 w 8102599"/>
+              <a:gd name="connsiteY6" fmla="*/ 5346700 h 5803900"/>
+              <a:gd name="connsiteX7" fmla="*/ 7807194 w 8102599"/>
+              <a:gd name="connsiteY7" fmla="*/ 5521194 h 5803900"/>
+              <a:gd name="connsiteX8" fmla="*/ 7632700 w 8102599"/>
+              <a:gd name="connsiteY8" fmla="*/ 5803900 h 5803900"/>
+              <a:gd name="connsiteX9" fmla="*/ 546100 w 8102599"/>
+              <a:gd name="connsiteY9" fmla="*/ 5803900 h 5803900"/>
+              <a:gd name="connsiteX10" fmla="*/ 88900 w 8102599"/>
+              <a:gd name="connsiteY10" fmla="*/ 5727700 h 5803900"/>
+              <a:gd name="connsiteX11" fmla="*/ 12700 w 8102599"/>
+              <a:gd name="connsiteY11" fmla="*/ 5346700 h 5803900"/>
+              <a:gd name="connsiteX12" fmla="*/ 12700 w 8102599"/>
+              <a:gd name="connsiteY12" fmla="*/ 546100 h 5803900"/>
+              <a:gd name="connsiteX0" fmla="*/ 12700 w 8102599"/>
+              <a:gd name="connsiteY0" fmla="*/ 546100 h 5803900"/>
+              <a:gd name="connsiteX1" fmla="*/ 88900 w 8102599"/>
+              <a:gd name="connsiteY1" fmla="*/ 88900 h 5803900"/>
+              <a:gd name="connsiteX2" fmla="*/ 546100 w 8102599"/>
+              <a:gd name="connsiteY2" fmla="*/ 12701 h 5803900"/>
+              <a:gd name="connsiteX3" fmla="*/ 7556500 w 8102599"/>
+              <a:gd name="connsiteY3" fmla="*/ 12700 h 5803900"/>
+              <a:gd name="connsiteX4" fmla="*/ 8013699 w 8102599"/>
+              <a:gd name="connsiteY4" fmla="*/ 88900 h 5803900"/>
+              <a:gd name="connsiteX5" fmla="*/ 8089899 w 8102599"/>
+              <a:gd name="connsiteY5" fmla="*/ 469900 h 5803900"/>
+              <a:gd name="connsiteX6" fmla="*/ 8089900 w 8102599"/>
+              <a:gd name="connsiteY6" fmla="*/ 5346700 h 5803900"/>
+              <a:gd name="connsiteX7" fmla="*/ 8013700 w 8102599"/>
+              <a:gd name="connsiteY7" fmla="*/ 5727700 h 5803900"/>
+              <a:gd name="connsiteX8" fmla="*/ 7632700 w 8102599"/>
+              <a:gd name="connsiteY8" fmla="*/ 5803900 h 5803900"/>
+              <a:gd name="connsiteX9" fmla="*/ 546100 w 8102599"/>
+              <a:gd name="connsiteY9" fmla="*/ 5803900 h 5803900"/>
+              <a:gd name="connsiteX10" fmla="*/ 88900 w 8102599"/>
+              <a:gd name="connsiteY10" fmla="*/ 5727700 h 5803900"/>
+              <a:gd name="connsiteX11" fmla="*/ 12700 w 8102599"/>
+              <a:gd name="connsiteY11" fmla="*/ 5346700 h 5803900"/>
+              <a:gd name="connsiteX12" fmla="*/ 12700 w 8102599"/>
+              <a:gd name="connsiteY12" fmla="*/ 546100 h 5803900"/>
+            </a:gdLst>
+            <a:ahLst/>
+            <a:cxnLst>
+              <a:cxn ang="0">
+                <a:pos x="connsiteX0" y="connsiteY0"/>
+              </a:cxn>
+              <a:cxn ang="0">
+                <a:pos x="connsiteX1" y="connsiteY1"/>
+              </a:cxn>
+              <a:cxn ang="0">
+                <a:pos x="connsiteX2" y="connsiteY2"/>
+              </a:cxn>
+              <a:cxn ang="0">
+                <a:pos x="connsiteX3" y="connsiteY3"/>
+              </a:cxn>
+              <a:cxn ang="0">
+                <a:pos x="connsiteX4" y="connsiteY4"/>
+              </a:cxn>
+              <a:cxn ang="0">
+                <a:pos x="connsiteX5" y="connsiteY5"/>
+              </a:cxn>
+              <a:cxn ang="0">
+                <a:pos x="connsiteX6" y="connsiteY6"/>
+              </a:cxn>
+              <a:cxn ang="0">
+                <a:pos x="connsiteX7" y="connsiteY7"/>
+              </a:cxn>
+              <a:cxn ang="0">
+                <a:pos x="connsiteX8" y="connsiteY8"/>
+              </a:cxn>
+              <a:cxn ang="0">
+                <a:pos x="connsiteX9" y="connsiteY9"/>
+              </a:cxn>
+              <a:cxn ang="0">
+                <a:pos x="connsiteX10" y="connsiteY10"/>
+              </a:cxn>
+              <a:cxn ang="0">
+                <a:pos x="connsiteX11" y="connsiteY11"/>
+              </a:cxn>
+              <a:cxn ang="0">
+                <a:pos x="connsiteX12" y="connsiteY12"/>
+              </a:cxn>
+            </a:cxnLst>
+            <a:rect l="l" t="t" r="r" b="b"/>
+            <a:pathLst>
+              <a:path w="8102599" h="5803900">
+                <a:moveTo>
+                  <a:pt x="12700" y="546100"/>
+                </a:moveTo>
+                <a:cubicBezTo>
+                  <a:pt x="12700" y="290108"/>
+                  <a:pt x="0" y="177800"/>
+                  <a:pt x="88900" y="88900"/>
+                </a:cubicBezTo>
+                <a:cubicBezTo>
+                  <a:pt x="177800" y="0"/>
+                  <a:pt x="290107" y="12700"/>
+                  <a:pt x="546100" y="12701"/>
+                </a:cubicBezTo>
+                <a:lnTo>
+                  <a:pt x="7556500" y="12700"/>
+                </a:lnTo>
+                <a:cubicBezTo>
+                  <a:pt x="7812492" y="12700"/>
+                  <a:pt x="7924799" y="12700"/>
+                  <a:pt x="8013699" y="88900"/>
+                </a:cubicBezTo>
+                <a:cubicBezTo>
+                  <a:pt x="8102599" y="165100"/>
+                  <a:pt x="8089900" y="213907"/>
+                  <a:pt x="8089899" y="469900"/>
+                </a:cubicBezTo>
+                <a:cubicBezTo>
+                  <a:pt x="8089899" y="1926160"/>
+                  <a:pt x="8089900" y="3890440"/>
+                  <a:pt x="8089900" y="5346700"/>
+                </a:cubicBezTo>
+                <a:cubicBezTo>
+                  <a:pt x="8089900" y="5602692"/>
+                  <a:pt x="8089900" y="5651500"/>
+                  <a:pt x="8013700" y="5727700"/>
+                </a:cubicBezTo>
+                <a:cubicBezTo>
+                  <a:pt x="7937500" y="5803900"/>
+                  <a:pt x="7888692" y="5803900"/>
+                  <a:pt x="7632700" y="5803900"/>
+                </a:cubicBezTo>
+                <a:lnTo>
+                  <a:pt x="546100" y="5803900"/>
+                </a:lnTo>
+                <a:cubicBezTo>
+                  <a:pt x="290108" y="5803900"/>
+                  <a:pt x="177800" y="5803900"/>
+                  <a:pt x="88900" y="5727700"/>
+                </a:cubicBezTo>
+                <a:cubicBezTo>
+                  <a:pt x="0" y="5651500"/>
+                  <a:pt x="12700" y="5602692"/>
+                  <a:pt x="12700" y="5346700"/>
+                </a:cubicBezTo>
+                <a:lnTo>
+                  <a:pt x="12700" y="546100"/>
+                </a:lnTo>
+                <a:close/>
+              </a:path>
+            </a:pathLst>
+          </a:custGeom>
+          <a:gradFill>
+            <a:gsLst>
+              <a:gs pos="0">
+                <a:schemeClr val="bg1">
+                  <a:lumMod val="50000"/>
+                </a:schemeClr>
+              </a:gs>
+              <a:gs pos="39999">
+                <a:schemeClr val="bg1">
+                  <a:lumMod val="65000"/>
+                </a:schemeClr>
+              </a:gs>
+              <a:gs pos="70000">
+                <a:schemeClr val="bg1">
+                  <a:lumMod val="50000"/>
+                  <a:alpha val="73000"/>
+                </a:schemeClr>
+              </a:gs>
+            </a:gsLst>
+            <a:lin ang="5400000" scaled="0"/>
+          </a:gradFill>
+          <a:ln>
+            <a:solidFill>
+              <a:schemeClr val="bg1">
+                <a:lumMod val="75000"/>
+              </a:schemeClr>
+            </a:solidFill>
+          </a:ln>
+        </p:spPr>
+        <p:style>
+          <a:lnRef idx="2">
+            <a:schemeClr val="accent1">
+              <a:shade val="50000"/>
+            </a:schemeClr>
+          </a:lnRef>
+          <a:fillRef idx="1">
+            <a:schemeClr val="accent1"/>
+          </a:fillRef>
+          <a:effectRef idx="0">
+            <a:schemeClr val="accent1"/>
+          </a:effectRef>
+          <a:fontRef idx="minor">
+            <a:schemeClr val="lt1"/>
+          </a:fontRef>
+        </p:style>
+        <p:txBody>
+          <a:bodyPr rtlCol="0" anchor="ctr"/>
+          <a:lstStyle/>
+          <a:p>
+            <a:pPr fontAlgn="t"/>
+            <a:endParaRPr lang="es-AR" b="1" dirty="0" smtClean="0"/>
+          </a:p>
+          <a:p>
+            <a:pPr algn="ctr"/>
+            <a:endParaRPr lang="es-AR" dirty="0"/>
+          </a:p>
+        </p:txBody>
+      </p:sp>
+      <p:sp>
+        <p:nvSpPr>
+          <p:cNvPr id="14" name="Rectangle 13"/>
+          <p:cNvSpPr/>
+          <p:nvPr/>
+        </p:nvSpPr>
+        <p:spPr>
+          <a:xfrm>
+            <a:off x="381000" y="1295400"/>
+            <a:ext cx="8458200" cy="1066800"/>
+          </a:xfrm>
+          <a:prstGeom prst="rect">
+            <a:avLst/>
+          </a:prstGeom>
+          <a:noFill/>
+          <a:ln>
+            <a:noFill/>
+          </a:ln>
+        </p:spPr>
+        <p:style>
+          <a:lnRef idx="2">
+            <a:schemeClr val="accent1">
+              <a:shade val="50000"/>
+            </a:schemeClr>
+          </a:lnRef>
+          <a:fillRef idx="1">
+            <a:schemeClr val="accent1"/>
+          </a:fillRef>
+          <a:effectRef idx="0">
+            <a:schemeClr val="accent1"/>
+          </a:effectRef>
+          <a:fontRef idx="minor">
+            <a:schemeClr val="lt1"/>
+          </a:fontRef>
+        </p:style>
+        <p:txBody>
+          <a:bodyPr rtlCol="0" anchor="ctr"/>
+          <a:lstStyle/>
+          <a:p>
+            <a:pPr algn="ctr"/>
+            <a:r>
+              <a:rPr lang="es-AR" sz="4800" b="1" dirty="0" smtClean="0"/>
+              <a:t>Modelo de Datos</a:t>
+            </a:r>
+          </a:p>
+          <a:p>
+            <a:pPr algn="ctr"/>
+            <a:endParaRPr lang="es-AR" sz="1200" dirty="0"/>
+          </a:p>
+        </p:txBody>
+      </p:sp>
+      <p:grpSp>
+        <p:nvGrpSpPr>
+          <p:cNvPr id="3" name="Group 14"/>
+          <p:cNvGrpSpPr/>
+          <p:nvPr/>
+        </p:nvGrpSpPr>
+        <p:grpSpPr>
+          <a:xfrm>
+            <a:off x="1295400" y="544415"/>
+            <a:ext cx="6553200" cy="903384"/>
+            <a:chOff x="1295400" y="544415"/>
+            <a:chExt cx="6553200" cy="903384"/>
+          </a:xfrm>
+        </p:grpSpPr>
+        <p:sp>
+          <p:nvSpPr>
+            <p:cNvPr id="16" name="Round Same Side Corner Rectangle 15"/>
+            <p:cNvSpPr/>
+            <p:nvPr/>
+          </p:nvSpPr>
+          <p:spPr>
+            <a:xfrm rot="10800000">
+              <a:off x="1295400" y="544415"/>
+              <a:ext cx="6553200" cy="903384"/>
+            </a:xfrm>
+            <a:prstGeom prst="round2SameRect">
+              <a:avLst/>
+            </a:prstGeom>
+          </p:spPr>
+          <p:style>
+            <a:lnRef idx="2">
+              <a:schemeClr val="dk1">
+                <a:shade val="50000"/>
+              </a:schemeClr>
+            </a:lnRef>
+            <a:fillRef idx="1">
+              <a:schemeClr val="dk1"/>
+            </a:fillRef>
+            <a:effectRef idx="0">
+              <a:schemeClr val="dk1"/>
+            </a:effectRef>
+            <a:fontRef idx="minor">
+              <a:schemeClr val="lt1"/>
+            </a:fontRef>
+          </p:style>
+          <p:txBody>
+            <a:bodyPr rtlCol="0" anchor="ctr"/>
+            <a:lstStyle/>
+            <a:p>
+              <a:pPr algn="ctr"/>
+              <a:endParaRPr lang="es-AR" dirty="0"/>
+            </a:p>
+          </p:txBody>
+        </p:sp>
+        <p:pic>
+          <p:nvPicPr>
+            <p:cNvPr id="20" name="Picture 2" descr="E:\U.B.A.Files\Materias\75.45 Taller de Desarrollo de Proyectos I\TP\Trunk\Proyecto\web\site\images\logo.png"/>
+            <p:cNvPicPr>
+              <a:picLocks noChangeAspect="1" noChangeArrowheads="1"/>
+            </p:cNvPicPr>
+            <p:nvPr/>
+          </p:nvPicPr>
+          <p:blipFill>
+            <a:blip r:embed="rId2" cstate="print"/>
+            <a:srcRect/>
+            <a:stretch>
+              <a:fillRect/>
+            </a:stretch>
+          </p:blipFill>
+          <p:spPr bwMode="auto">
+            <a:xfrm>
+              <a:off x="1600200" y="609600"/>
+              <a:ext cx="2640904" cy="762000"/>
+            </a:xfrm>
+            <a:prstGeom prst="rect">
+              <a:avLst/>
+            </a:prstGeom>
+            <a:noFill/>
+          </p:spPr>
+        </p:pic>
+        <p:sp>
+          <p:nvSpPr>
+            <p:cNvPr id="23" name="TextBox 22"/>
+            <p:cNvSpPr txBox="1"/>
+            <p:nvPr/>
+          </p:nvSpPr>
+          <p:spPr>
+            <a:xfrm>
+              <a:off x="4515457" y="685800"/>
+              <a:ext cx="3180743" cy="307777"/>
+            </a:xfrm>
+            <a:prstGeom prst="rect">
+              <a:avLst/>
+            </a:prstGeom>
+            <a:noFill/>
+          </p:spPr>
+          <p:txBody>
+            <a:bodyPr wrap="none" rtlCol="0">
+              <a:spAutoFit/>
+            </a:bodyPr>
+            <a:lstStyle/>
+            <a:p>
+              <a:r>
+                <a:rPr lang="es-AR" sz="1400" dirty="0" smtClean="0">
+                  <a:solidFill>
+                    <a:schemeClr val="bg1">
+                      <a:lumMod val="50000"/>
+                    </a:schemeClr>
+                  </a:solidFill>
+                </a:rPr>
+                <a:t>Centralización y análisis de datos</a:t>
+              </a:r>
+              <a:endParaRPr lang="es-AR" sz="1400" dirty="0">
+                <a:solidFill>
+                  <a:schemeClr val="bg1">
+                    <a:lumMod val="50000"/>
+                  </a:schemeClr>
+                </a:solidFill>
+              </a:endParaRPr>
+            </a:p>
+          </p:txBody>
+        </p:sp>
+      </p:grpSp>
+    </p:spTree>
+  </p:cSld>
+  <p:clrMapOvr>
+    <a:masterClrMapping/>
+  </p:clrMapOvr>
+</p:sld>
+</file>
+
+<file path=ppt/slides/slide6.xml><?xml version="1.0" encoding="utf-8"?>
+<p:sld xmlns:a="http://schemas.openxmlformats.org/drawingml/2006/main" xmlns:r="http://schemas.openxmlformats.org/officeDocument/2006/relationships" xmlns:p="http://schemas.openxmlformats.org/presentationml/2006/main">
+  <p:cSld>
+    <p:spTree>
+      <p:nvGrpSpPr>
+        <p:cNvPr id="1" name=""/>
+        <p:cNvGrpSpPr/>
+        <p:nvPr/>
+      </p:nvGrpSpPr>
+      <p:grpSpPr>
+        <a:xfrm>
+          <a:off x="0" y="0"/>
+          <a:ext cx="0" cy="0"/>
+          <a:chOff x="0" y="0"/>
+          <a:chExt cx="0" cy="0"/>
+        </a:xfrm>
+      </p:grpSpPr>
+      <p:grpSp>
+        <p:nvGrpSpPr>
+          <p:cNvPr id="2" name="Group 22"/>
+          <p:cNvGrpSpPr/>
+          <p:nvPr/>
+        </p:nvGrpSpPr>
+        <p:grpSpPr>
+          <a:xfrm>
+            <a:off x="304800" y="304800"/>
+            <a:ext cx="8534400" cy="6248400"/>
+            <a:chOff x="304800" y="304800"/>
+            <a:chExt cx="8534400" cy="6248400"/>
+          </a:xfrm>
+          <a:solidFill>
+            <a:schemeClr val="bg1">
+              <a:lumMod val="85000"/>
+            </a:schemeClr>
+          </a:solidFill>
+        </p:grpSpPr>
+        <p:sp>
+          <p:nvSpPr>
+            <p:cNvPr id="18" name="Rounded Rectangle 17"/>
+            <p:cNvSpPr/>
+            <p:nvPr/>
+          </p:nvSpPr>
+          <p:spPr>
+            <a:xfrm>
+              <a:off x="304800" y="304800"/>
+              <a:ext cx="8534400" cy="6248400"/>
+            </a:xfrm>
+            <a:prstGeom prst="roundRect">
+              <a:avLst/>
+            </a:prstGeom>
+            <a:grpFill/>
+            <a:ln>
+              <a:noFill/>
+            </a:ln>
+          </p:spPr>
+          <p:style>
+            <a:lnRef idx="2">
+              <a:schemeClr val="accent1">
+                <a:shade val="50000"/>
+              </a:schemeClr>
+            </a:lnRef>
+            <a:fillRef idx="1">
+              <a:schemeClr val="accent1"/>
+            </a:fillRef>
+            <a:effectRef idx="0">
+              <a:schemeClr val="accent1"/>
+            </a:effectRef>
+            <a:fontRef idx="minor">
+              <a:schemeClr val="lt1"/>
+            </a:fontRef>
+          </p:style>
+          <p:txBody>
+            <a:bodyPr rtlCol="0" anchor="ctr"/>
+            <a:lstStyle/>
+            <a:p>
+              <a:pPr algn="ctr"/>
+              <a:endParaRPr lang="es-AR"/>
+            </a:p>
+          </p:txBody>
+        </p:sp>
+        <p:sp>
+          <p:nvSpPr>
+            <p:cNvPr id="22" name="Rounded Rectangle 21"/>
+            <p:cNvSpPr/>
+            <p:nvPr/>
+          </p:nvSpPr>
+          <p:spPr>
+            <a:xfrm>
+              <a:off x="7086600" y="304800"/>
+              <a:ext cx="1752600" cy="1752600"/>
+            </a:xfrm>
+            <a:prstGeom prst="roundRect">
+              <a:avLst/>
+            </a:prstGeom>
+            <a:grpFill/>
+            <a:ln>
+              <a:noFill/>
+            </a:ln>
+          </p:spPr>
+          <p:style>
+            <a:lnRef idx="2">
+              <a:schemeClr val="accent1">
+                <a:shade val="50000"/>
+              </a:schemeClr>
+            </a:lnRef>
+            <a:fillRef idx="1">
+              <a:schemeClr val="accent1"/>
+            </a:fillRef>
+            <a:effectRef idx="0">
+              <a:schemeClr val="accent1"/>
+            </a:effectRef>
+            <a:fontRef idx="minor">
+              <a:schemeClr val="lt1"/>
+            </a:fontRef>
+          </p:style>
+          <p:txBody>
+            <a:bodyPr rtlCol="0" anchor="ctr"/>
+            <a:lstStyle/>
+            <a:p>
+              <a:pPr algn="ctr"/>
+              <a:endParaRPr lang="es-AR"/>
+            </a:p>
+          </p:txBody>
+        </p:sp>
+        <p:sp>
+          <p:nvSpPr>
+            <p:cNvPr id="21" name="Rounded Rectangle 20"/>
+            <p:cNvSpPr/>
+            <p:nvPr/>
+          </p:nvSpPr>
+          <p:spPr>
+            <a:xfrm>
+              <a:off x="304800" y="304800"/>
+              <a:ext cx="1752600" cy="1752600"/>
+            </a:xfrm>
+            <a:prstGeom prst="roundRect">
+              <a:avLst/>
+            </a:prstGeom>
+            <a:grpFill/>
+            <a:ln>
+              <a:noFill/>
+            </a:ln>
+          </p:spPr>
+          <p:style>
+            <a:lnRef idx="2">
+              <a:schemeClr val="accent1">
+                <a:shade val="50000"/>
+              </a:schemeClr>
+            </a:lnRef>
+            <a:fillRef idx="1">
+              <a:schemeClr val="accent1"/>
+            </a:fillRef>
+            <a:effectRef idx="0">
+              <a:schemeClr val="accent1"/>
+            </a:effectRef>
+            <a:fontRef idx="minor">
+              <a:schemeClr val="lt1"/>
+            </a:fontRef>
+          </p:style>
+          <p:txBody>
+            <a:bodyPr rtlCol="0" anchor="ctr"/>
+            <a:lstStyle/>
+            <a:p>
+              <a:pPr algn="ctr"/>
+              <a:endParaRPr lang="es-AR"/>
+            </a:p>
+          </p:txBody>
+        </p:sp>
+        <p:sp>
+          <p:nvSpPr>
+            <p:cNvPr id="17" name="Rounded Rectangle 16"/>
+            <p:cNvSpPr/>
+            <p:nvPr/>
+          </p:nvSpPr>
+          <p:spPr>
+            <a:xfrm>
+              <a:off x="304800" y="4800600"/>
+              <a:ext cx="1752600" cy="1752600"/>
+            </a:xfrm>
+            <a:prstGeom prst="roundRect">
+              <a:avLst/>
+            </a:prstGeom>
+            <a:grpFill/>
+            <a:ln>
+              <a:noFill/>
+            </a:ln>
+          </p:spPr>
+          <p:style>
+            <a:lnRef idx="2">
+              <a:schemeClr val="accent1">
+                <a:shade val="50000"/>
+              </a:schemeClr>
+            </a:lnRef>
+            <a:fillRef idx="1">
+              <a:schemeClr val="accent1"/>
+            </a:fillRef>
+            <a:effectRef idx="0">
+              <a:schemeClr val="accent1"/>
+            </a:effectRef>
+            <a:fontRef idx="minor">
+              <a:schemeClr val="lt1"/>
+            </a:fontRef>
+          </p:style>
+          <p:txBody>
+            <a:bodyPr rtlCol="0" anchor="ctr"/>
+            <a:lstStyle/>
+            <a:p>
+              <a:pPr algn="ctr"/>
+              <a:endParaRPr lang="es-AR"/>
+            </a:p>
+          </p:txBody>
+        </p:sp>
+        <p:sp>
+          <p:nvSpPr>
+            <p:cNvPr id="19" name="Rounded Rectangle 18"/>
+            <p:cNvSpPr/>
+            <p:nvPr/>
+          </p:nvSpPr>
+          <p:spPr>
+            <a:xfrm>
+              <a:off x="7086600" y="4800600"/>
+              <a:ext cx="1752600" cy="1752600"/>
+            </a:xfrm>
+            <a:prstGeom prst="roundRect">
+              <a:avLst/>
+            </a:prstGeom>
+            <a:grpFill/>
+            <a:ln>
+              <a:noFill/>
+            </a:ln>
+          </p:spPr>
+          <p:style>
+            <a:lnRef idx="2">
+              <a:schemeClr val="accent1">
+                <a:shade val="50000"/>
+              </a:schemeClr>
+            </a:lnRef>
+            <a:fillRef idx="1">
+              <a:schemeClr val="accent1"/>
+            </a:fillRef>
+            <a:effectRef idx="0">
+              <a:schemeClr val="accent1"/>
+            </a:effectRef>
+            <a:fontRef idx="minor">
+              <a:schemeClr val="lt1"/>
+            </a:fontRef>
+          </p:style>
+          <p:txBody>
+            <a:bodyPr rtlCol="0" anchor="ctr"/>
+            <a:lstStyle/>
+            <a:p>
+              <a:pPr algn="ctr"/>
+              <a:endParaRPr lang="es-AR"/>
+            </a:p>
+          </p:txBody>
+        </p:sp>
+      </p:grpSp>
+      <p:sp>
+        <p:nvSpPr>
+          <p:cNvPr id="40" name="Freeform 39"/>
+          <p:cNvSpPr/>
+          <p:nvPr/>
+        </p:nvSpPr>
+        <p:spPr>
+          <a:xfrm>
+            <a:off x="457200" y="457200"/>
+            <a:ext cx="8229600" cy="5803900"/>
+          </a:xfrm>
+          <a:custGeom>
+            <a:avLst/>
+            <a:gdLst>
+              <a:gd name="connsiteX0" fmla="*/ 0 w 8077200"/>
+              <a:gd name="connsiteY0" fmla="*/ 965219 h 5791200"/>
+              <a:gd name="connsiteX1" fmla="*/ 282707 w 8077200"/>
+              <a:gd name="connsiteY1" fmla="*/ 282706 h 5791200"/>
+              <a:gd name="connsiteX2" fmla="*/ 965221 w 8077200"/>
+              <a:gd name="connsiteY2" fmla="*/ 1 h 5791200"/>
+              <a:gd name="connsiteX3" fmla="*/ 7111981 w 8077200"/>
+              <a:gd name="connsiteY3" fmla="*/ 0 h 5791200"/>
+              <a:gd name="connsiteX4" fmla="*/ 7794494 w 8077200"/>
+              <a:gd name="connsiteY4" fmla="*/ 282707 h 5791200"/>
+              <a:gd name="connsiteX5" fmla="*/ 8077199 w 8077200"/>
+              <a:gd name="connsiteY5" fmla="*/ 965221 h 5791200"/>
+              <a:gd name="connsiteX6" fmla="*/ 8077200 w 8077200"/>
+              <a:gd name="connsiteY6" fmla="*/ 4825981 h 5791200"/>
+              <a:gd name="connsiteX7" fmla="*/ 7794494 w 8077200"/>
+              <a:gd name="connsiteY7" fmla="*/ 5508494 h 5791200"/>
+              <a:gd name="connsiteX8" fmla="*/ 7111981 w 8077200"/>
+              <a:gd name="connsiteY8" fmla="*/ 5791200 h 5791200"/>
+              <a:gd name="connsiteX9" fmla="*/ 965219 w 8077200"/>
+              <a:gd name="connsiteY9" fmla="*/ 5791200 h 5791200"/>
+              <a:gd name="connsiteX10" fmla="*/ 282706 w 8077200"/>
+              <a:gd name="connsiteY10" fmla="*/ 5508493 h 5791200"/>
+              <a:gd name="connsiteX11" fmla="*/ 0 w 8077200"/>
+              <a:gd name="connsiteY11" fmla="*/ 4825980 h 5791200"/>
+              <a:gd name="connsiteX12" fmla="*/ 0 w 8077200"/>
+              <a:gd name="connsiteY12" fmla="*/ 965219 h 5791200"/>
+              <a:gd name="connsiteX0" fmla="*/ 0 w 8077200"/>
+              <a:gd name="connsiteY0" fmla="*/ 609600 h 5791200"/>
+              <a:gd name="connsiteX1" fmla="*/ 282707 w 8077200"/>
+              <a:gd name="connsiteY1" fmla="*/ 282706 h 5791200"/>
+              <a:gd name="connsiteX2" fmla="*/ 965221 w 8077200"/>
+              <a:gd name="connsiteY2" fmla="*/ 1 h 5791200"/>
+              <a:gd name="connsiteX3" fmla="*/ 7111981 w 8077200"/>
+              <a:gd name="connsiteY3" fmla="*/ 0 h 5791200"/>
+              <a:gd name="connsiteX4" fmla="*/ 7794494 w 8077200"/>
+              <a:gd name="connsiteY4" fmla="*/ 282707 h 5791200"/>
+              <a:gd name="connsiteX5" fmla="*/ 8077199 w 8077200"/>
+              <a:gd name="connsiteY5" fmla="*/ 965221 h 5791200"/>
+              <a:gd name="connsiteX6" fmla="*/ 8077200 w 8077200"/>
+              <a:gd name="connsiteY6" fmla="*/ 4825981 h 5791200"/>
+              <a:gd name="connsiteX7" fmla="*/ 7794494 w 8077200"/>
+              <a:gd name="connsiteY7" fmla="*/ 5508494 h 5791200"/>
+              <a:gd name="connsiteX8" fmla="*/ 7111981 w 8077200"/>
+              <a:gd name="connsiteY8" fmla="*/ 5791200 h 5791200"/>
+              <a:gd name="connsiteX9" fmla="*/ 965219 w 8077200"/>
+              <a:gd name="connsiteY9" fmla="*/ 5791200 h 5791200"/>
+              <a:gd name="connsiteX10" fmla="*/ 282706 w 8077200"/>
+              <a:gd name="connsiteY10" fmla="*/ 5508493 h 5791200"/>
+              <a:gd name="connsiteX11" fmla="*/ 0 w 8077200"/>
+              <a:gd name="connsiteY11" fmla="*/ 4825980 h 5791200"/>
+              <a:gd name="connsiteX12" fmla="*/ 0 w 8077200"/>
+              <a:gd name="connsiteY12" fmla="*/ 609600 h 5791200"/>
+              <a:gd name="connsiteX0" fmla="*/ 0 w 8077200"/>
+              <a:gd name="connsiteY0" fmla="*/ 609601 h 5791201"/>
+              <a:gd name="connsiteX1" fmla="*/ 282707 w 8077200"/>
+              <a:gd name="connsiteY1" fmla="*/ 282707 h 5791201"/>
+              <a:gd name="connsiteX2" fmla="*/ 609600 w 8077200"/>
+              <a:gd name="connsiteY2" fmla="*/ 1 h 5791201"/>
+              <a:gd name="connsiteX3" fmla="*/ 7111981 w 8077200"/>
+              <a:gd name="connsiteY3" fmla="*/ 1 h 5791201"/>
+              <a:gd name="connsiteX4" fmla="*/ 7794494 w 8077200"/>
+              <a:gd name="connsiteY4" fmla="*/ 282708 h 5791201"/>
+              <a:gd name="connsiteX5" fmla="*/ 8077199 w 8077200"/>
+              <a:gd name="connsiteY5" fmla="*/ 965222 h 5791201"/>
+              <a:gd name="connsiteX6" fmla="*/ 8077200 w 8077200"/>
+              <a:gd name="connsiteY6" fmla="*/ 4825982 h 5791201"/>
+              <a:gd name="connsiteX7" fmla="*/ 7794494 w 8077200"/>
+              <a:gd name="connsiteY7" fmla="*/ 5508495 h 5791201"/>
+              <a:gd name="connsiteX8" fmla="*/ 7111981 w 8077200"/>
+              <a:gd name="connsiteY8" fmla="*/ 5791201 h 5791201"/>
+              <a:gd name="connsiteX9" fmla="*/ 965219 w 8077200"/>
+              <a:gd name="connsiteY9" fmla="*/ 5791201 h 5791201"/>
+              <a:gd name="connsiteX10" fmla="*/ 282706 w 8077200"/>
+              <a:gd name="connsiteY10" fmla="*/ 5508494 h 5791201"/>
+              <a:gd name="connsiteX11" fmla="*/ 0 w 8077200"/>
+              <a:gd name="connsiteY11" fmla="*/ 4825981 h 5791201"/>
+              <a:gd name="connsiteX12" fmla="*/ 0 w 8077200"/>
+              <a:gd name="connsiteY12" fmla="*/ 609601 h 5791201"/>
+              <a:gd name="connsiteX0" fmla="*/ 0 w 8077200"/>
+              <a:gd name="connsiteY0" fmla="*/ 609601 h 5791201"/>
+              <a:gd name="connsiteX1" fmla="*/ 152400 w 8077200"/>
+              <a:gd name="connsiteY1" fmla="*/ 152402 h 5791201"/>
+              <a:gd name="connsiteX2" fmla="*/ 609600 w 8077200"/>
+              <a:gd name="connsiteY2" fmla="*/ 1 h 5791201"/>
+              <a:gd name="connsiteX3" fmla="*/ 7111981 w 8077200"/>
+              <a:gd name="connsiteY3" fmla="*/ 1 h 5791201"/>
+              <a:gd name="connsiteX4" fmla="*/ 7794494 w 8077200"/>
+              <a:gd name="connsiteY4" fmla="*/ 282708 h 5791201"/>
+              <a:gd name="connsiteX5" fmla="*/ 8077199 w 8077200"/>
+              <a:gd name="connsiteY5" fmla="*/ 965222 h 5791201"/>
+              <a:gd name="connsiteX6" fmla="*/ 8077200 w 8077200"/>
+              <a:gd name="connsiteY6" fmla="*/ 4825982 h 5791201"/>
+              <a:gd name="connsiteX7" fmla="*/ 7794494 w 8077200"/>
+              <a:gd name="connsiteY7" fmla="*/ 5508495 h 5791201"/>
+              <a:gd name="connsiteX8" fmla="*/ 7111981 w 8077200"/>
+              <a:gd name="connsiteY8" fmla="*/ 5791201 h 5791201"/>
+              <a:gd name="connsiteX9" fmla="*/ 965219 w 8077200"/>
+              <a:gd name="connsiteY9" fmla="*/ 5791201 h 5791201"/>
+              <a:gd name="connsiteX10" fmla="*/ 282706 w 8077200"/>
+              <a:gd name="connsiteY10" fmla="*/ 5508494 h 5791201"/>
+              <a:gd name="connsiteX11" fmla="*/ 0 w 8077200"/>
+              <a:gd name="connsiteY11" fmla="*/ 4825981 h 5791201"/>
+              <a:gd name="connsiteX12" fmla="*/ 0 w 8077200"/>
+              <a:gd name="connsiteY12" fmla="*/ 609601 h 5791201"/>
+              <a:gd name="connsiteX0" fmla="*/ 0 w 8077200"/>
+              <a:gd name="connsiteY0" fmla="*/ 609600 h 5791200"/>
+              <a:gd name="connsiteX1" fmla="*/ 152400 w 8077200"/>
+              <a:gd name="connsiteY1" fmla="*/ 152401 h 5791200"/>
+              <a:gd name="connsiteX2" fmla="*/ 533400 w 8077200"/>
+              <a:gd name="connsiteY2" fmla="*/ 1 h 5791200"/>
+              <a:gd name="connsiteX3" fmla="*/ 7111981 w 8077200"/>
+              <a:gd name="connsiteY3" fmla="*/ 0 h 5791200"/>
+              <a:gd name="connsiteX4" fmla="*/ 7794494 w 8077200"/>
+              <a:gd name="connsiteY4" fmla="*/ 282707 h 5791200"/>
+              <a:gd name="connsiteX5" fmla="*/ 8077199 w 8077200"/>
+              <a:gd name="connsiteY5" fmla="*/ 965221 h 5791200"/>
+              <a:gd name="connsiteX6" fmla="*/ 8077200 w 8077200"/>
+              <a:gd name="connsiteY6" fmla="*/ 4825981 h 5791200"/>
+              <a:gd name="connsiteX7" fmla="*/ 7794494 w 8077200"/>
+              <a:gd name="connsiteY7" fmla="*/ 5508494 h 5791200"/>
+              <a:gd name="connsiteX8" fmla="*/ 7111981 w 8077200"/>
+              <a:gd name="connsiteY8" fmla="*/ 5791200 h 5791200"/>
+              <a:gd name="connsiteX9" fmla="*/ 965219 w 8077200"/>
+              <a:gd name="connsiteY9" fmla="*/ 5791200 h 5791200"/>
+              <a:gd name="connsiteX10" fmla="*/ 282706 w 8077200"/>
+              <a:gd name="connsiteY10" fmla="*/ 5508493 h 5791200"/>
+              <a:gd name="connsiteX11" fmla="*/ 0 w 8077200"/>
+              <a:gd name="connsiteY11" fmla="*/ 4825980 h 5791200"/>
+              <a:gd name="connsiteX12" fmla="*/ 0 w 8077200"/>
+              <a:gd name="connsiteY12" fmla="*/ 609600 h 5791200"/>
+              <a:gd name="connsiteX0" fmla="*/ 0 w 8077200"/>
+              <a:gd name="connsiteY0" fmla="*/ 533400 h 5791200"/>
+              <a:gd name="connsiteX1" fmla="*/ 152400 w 8077200"/>
+              <a:gd name="connsiteY1" fmla="*/ 152401 h 5791200"/>
+              <a:gd name="connsiteX2" fmla="*/ 533400 w 8077200"/>
+              <a:gd name="connsiteY2" fmla="*/ 1 h 5791200"/>
+              <a:gd name="connsiteX3" fmla="*/ 7111981 w 8077200"/>
+              <a:gd name="connsiteY3" fmla="*/ 0 h 5791200"/>
+              <a:gd name="connsiteX4" fmla="*/ 7794494 w 8077200"/>
+              <a:gd name="connsiteY4" fmla="*/ 282707 h 5791200"/>
+              <a:gd name="connsiteX5" fmla="*/ 8077199 w 8077200"/>
+              <a:gd name="connsiteY5" fmla="*/ 965221 h 5791200"/>
+              <a:gd name="connsiteX6" fmla="*/ 8077200 w 8077200"/>
+              <a:gd name="connsiteY6" fmla="*/ 4825981 h 5791200"/>
+              <a:gd name="connsiteX7" fmla="*/ 7794494 w 8077200"/>
+              <a:gd name="connsiteY7" fmla="*/ 5508494 h 5791200"/>
+              <a:gd name="connsiteX8" fmla="*/ 7111981 w 8077200"/>
+              <a:gd name="connsiteY8" fmla="*/ 5791200 h 5791200"/>
+              <a:gd name="connsiteX9" fmla="*/ 965219 w 8077200"/>
+              <a:gd name="connsiteY9" fmla="*/ 5791200 h 5791200"/>
+              <a:gd name="connsiteX10" fmla="*/ 282706 w 8077200"/>
+              <a:gd name="connsiteY10" fmla="*/ 5508493 h 5791200"/>
+              <a:gd name="connsiteX11" fmla="*/ 0 w 8077200"/>
+              <a:gd name="connsiteY11" fmla="*/ 4825980 h 5791200"/>
+              <a:gd name="connsiteX12" fmla="*/ 0 w 8077200"/>
+              <a:gd name="connsiteY12" fmla="*/ 533400 h 5791200"/>
+              <a:gd name="connsiteX0" fmla="*/ 12700 w 8089900"/>
+              <a:gd name="connsiteY0" fmla="*/ 546100 h 5803900"/>
+              <a:gd name="connsiteX1" fmla="*/ 88900 w 8089900"/>
+              <a:gd name="connsiteY1" fmla="*/ 88900 h 5803900"/>
+              <a:gd name="connsiteX2" fmla="*/ 546100 w 8089900"/>
+              <a:gd name="connsiteY2" fmla="*/ 12701 h 5803900"/>
+              <a:gd name="connsiteX3" fmla="*/ 7124681 w 8089900"/>
+              <a:gd name="connsiteY3" fmla="*/ 12700 h 5803900"/>
+              <a:gd name="connsiteX4" fmla="*/ 7807194 w 8089900"/>
+              <a:gd name="connsiteY4" fmla="*/ 295407 h 5803900"/>
+              <a:gd name="connsiteX5" fmla="*/ 8089899 w 8089900"/>
+              <a:gd name="connsiteY5" fmla="*/ 977921 h 5803900"/>
+              <a:gd name="connsiteX6" fmla="*/ 8089900 w 8089900"/>
+              <a:gd name="connsiteY6" fmla="*/ 4838681 h 5803900"/>
+              <a:gd name="connsiteX7" fmla="*/ 7807194 w 8089900"/>
+              <a:gd name="connsiteY7" fmla="*/ 5521194 h 5803900"/>
+              <a:gd name="connsiteX8" fmla="*/ 7124681 w 8089900"/>
+              <a:gd name="connsiteY8" fmla="*/ 5803900 h 5803900"/>
+              <a:gd name="connsiteX9" fmla="*/ 977919 w 8089900"/>
+              <a:gd name="connsiteY9" fmla="*/ 5803900 h 5803900"/>
+              <a:gd name="connsiteX10" fmla="*/ 295406 w 8089900"/>
+              <a:gd name="connsiteY10" fmla="*/ 5521193 h 5803900"/>
+              <a:gd name="connsiteX11" fmla="*/ 12700 w 8089900"/>
+              <a:gd name="connsiteY11" fmla="*/ 4838680 h 5803900"/>
+              <a:gd name="connsiteX12" fmla="*/ 12700 w 8089900"/>
+              <a:gd name="connsiteY12" fmla="*/ 546100 h 5803900"/>
+              <a:gd name="connsiteX0" fmla="*/ 12700 w 8089900"/>
+              <a:gd name="connsiteY0" fmla="*/ 546100 h 5803900"/>
+              <a:gd name="connsiteX1" fmla="*/ 88900 w 8089900"/>
+              <a:gd name="connsiteY1" fmla="*/ 88900 h 5803900"/>
+              <a:gd name="connsiteX2" fmla="*/ 546100 w 8089900"/>
+              <a:gd name="connsiteY2" fmla="*/ 12701 h 5803900"/>
+              <a:gd name="connsiteX3" fmla="*/ 7124681 w 8089900"/>
+              <a:gd name="connsiteY3" fmla="*/ 12700 h 5803900"/>
+              <a:gd name="connsiteX4" fmla="*/ 7807194 w 8089900"/>
+              <a:gd name="connsiteY4" fmla="*/ 295407 h 5803900"/>
+              <a:gd name="connsiteX5" fmla="*/ 8089899 w 8089900"/>
+              <a:gd name="connsiteY5" fmla="*/ 977921 h 5803900"/>
+              <a:gd name="connsiteX6" fmla="*/ 8089900 w 8089900"/>
+              <a:gd name="connsiteY6" fmla="*/ 4838681 h 5803900"/>
+              <a:gd name="connsiteX7" fmla="*/ 7807194 w 8089900"/>
+              <a:gd name="connsiteY7" fmla="*/ 5521194 h 5803900"/>
+              <a:gd name="connsiteX8" fmla="*/ 7124681 w 8089900"/>
+              <a:gd name="connsiteY8" fmla="*/ 5803900 h 5803900"/>
+              <a:gd name="connsiteX9" fmla="*/ 977919 w 8089900"/>
+              <a:gd name="connsiteY9" fmla="*/ 5803900 h 5803900"/>
+              <a:gd name="connsiteX10" fmla="*/ 295406 w 8089900"/>
+              <a:gd name="connsiteY10" fmla="*/ 5521193 h 5803900"/>
+              <a:gd name="connsiteX11" fmla="*/ 12700 w 8089900"/>
+              <a:gd name="connsiteY11" fmla="*/ 5346700 h 5803900"/>
+              <a:gd name="connsiteX12" fmla="*/ 12700 w 8089900"/>
+              <a:gd name="connsiteY12" fmla="*/ 546100 h 5803900"/>
+              <a:gd name="connsiteX0" fmla="*/ 12700 w 8089900"/>
+              <a:gd name="connsiteY0" fmla="*/ 546100 h 5803900"/>
+              <a:gd name="connsiteX1" fmla="*/ 88900 w 8089900"/>
+              <a:gd name="connsiteY1" fmla="*/ 88900 h 5803900"/>
+              <a:gd name="connsiteX2" fmla="*/ 546100 w 8089900"/>
+              <a:gd name="connsiteY2" fmla="*/ 12701 h 5803900"/>
+              <a:gd name="connsiteX3" fmla="*/ 7124681 w 8089900"/>
+              <a:gd name="connsiteY3" fmla="*/ 12700 h 5803900"/>
+              <a:gd name="connsiteX4" fmla="*/ 7807194 w 8089900"/>
+              <a:gd name="connsiteY4" fmla="*/ 295407 h 5803900"/>
+              <a:gd name="connsiteX5" fmla="*/ 8089899 w 8089900"/>
+              <a:gd name="connsiteY5" fmla="*/ 977921 h 5803900"/>
+              <a:gd name="connsiteX6" fmla="*/ 8089900 w 8089900"/>
+              <a:gd name="connsiteY6" fmla="*/ 4838681 h 5803900"/>
+              <a:gd name="connsiteX7" fmla="*/ 7807194 w 8089900"/>
+              <a:gd name="connsiteY7" fmla="*/ 5521194 h 5803900"/>
+              <a:gd name="connsiteX8" fmla="*/ 7124681 w 8089900"/>
+              <a:gd name="connsiteY8" fmla="*/ 5803900 h 5803900"/>
+              <a:gd name="connsiteX9" fmla="*/ 546100 w 8089900"/>
+              <a:gd name="connsiteY9" fmla="*/ 5803900 h 5803900"/>
+              <a:gd name="connsiteX10" fmla="*/ 295406 w 8089900"/>
+              <a:gd name="connsiteY10" fmla="*/ 5521193 h 5803900"/>
+              <a:gd name="connsiteX11" fmla="*/ 12700 w 8089900"/>
+              <a:gd name="connsiteY11" fmla="*/ 5346700 h 5803900"/>
+              <a:gd name="connsiteX12" fmla="*/ 12700 w 8089900"/>
+              <a:gd name="connsiteY12" fmla="*/ 546100 h 5803900"/>
+              <a:gd name="connsiteX0" fmla="*/ 12700 w 8089900"/>
+              <a:gd name="connsiteY0" fmla="*/ 546100 h 5803900"/>
+              <a:gd name="connsiteX1" fmla="*/ 88900 w 8089900"/>
+              <a:gd name="connsiteY1" fmla="*/ 88900 h 5803900"/>
+              <a:gd name="connsiteX2" fmla="*/ 546100 w 8089900"/>
+              <a:gd name="connsiteY2" fmla="*/ 12701 h 5803900"/>
+              <a:gd name="connsiteX3" fmla="*/ 7124681 w 8089900"/>
+              <a:gd name="connsiteY3" fmla="*/ 12700 h 5803900"/>
+              <a:gd name="connsiteX4" fmla="*/ 7807194 w 8089900"/>
+              <a:gd name="connsiteY4" fmla="*/ 295407 h 5803900"/>
+              <a:gd name="connsiteX5" fmla="*/ 8089899 w 8089900"/>
+              <a:gd name="connsiteY5" fmla="*/ 977921 h 5803900"/>
+              <a:gd name="connsiteX6" fmla="*/ 8089900 w 8089900"/>
+              <a:gd name="connsiteY6" fmla="*/ 4838681 h 5803900"/>
+              <a:gd name="connsiteX7" fmla="*/ 7807194 w 8089900"/>
+              <a:gd name="connsiteY7" fmla="*/ 5521194 h 5803900"/>
+              <a:gd name="connsiteX8" fmla="*/ 7124681 w 8089900"/>
+              <a:gd name="connsiteY8" fmla="*/ 5803900 h 5803900"/>
+              <a:gd name="connsiteX9" fmla="*/ 546100 w 8089900"/>
+              <a:gd name="connsiteY9" fmla="*/ 5803900 h 5803900"/>
+              <a:gd name="connsiteX10" fmla="*/ 88900 w 8089900"/>
+              <a:gd name="connsiteY10" fmla="*/ 5727700 h 5803900"/>
+              <a:gd name="connsiteX11" fmla="*/ 12700 w 8089900"/>
+              <a:gd name="connsiteY11" fmla="*/ 5346700 h 5803900"/>
+              <a:gd name="connsiteX12" fmla="*/ 12700 w 8089900"/>
+              <a:gd name="connsiteY12" fmla="*/ 546100 h 5803900"/>
+              <a:gd name="connsiteX0" fmla="*/ 12700 w 8089900"/>
+              <a:gd name="connsiteY0" fmla="*/ 546100 h 5803900"/>
+              <a:gd name="connsiteX1" fmla="*/ 88900 w 8089900"/>
+              <a:gd name="connsiteY1" fmla="*/ 88900 h 5803900"/>
+              <a:gd name="connsiteX2" fmla="*/ 546100 w 8089900"/>
+              <a:gd name="connsiteY2" fmla="*/ 12701 h 5803900"/>
+              <a:gd name="connsiteX3" fmla="*/ 7556500 w 8089900"/>
+              <a:gd name="connsiteY3" fmla="*/ 12700 h 5803900"/>
+              <a:gd name="connsiteX4" fmla="*/ 7807194 w 8089900"/>
+              <a:gd name="connsiteY4" fmla="*/ 295407 h 5803900"/>
+              <a:gd name="connsiteX5" fmla="*/ 8089899 w 8089900"/>
+              <a:gd name="connsiteY5" fmla="*/ 977921 h 5803900"/>
+              <a:gd name="connsiteX6" fmla="*/ 8089900 w 8089900"/>
+              <a:gd name="connsiteY6" fmla="*/ 4838681 h 5803900"/>
+              <a:gd name="connsiteX7" fmla="*/ 7807194 w 8089900"/>
+              <a:gd name="connsiteY7" fmla="*/ 5521194 h 5803900"/>
+              <a:gd name="connsiteX8" fmla="*/ 7124681 w 8089900"/>
+              <a:gd name="connsiteY8" fmla="*/ 5803900 h 5803900"/>
+              <a:gd name="connsiteX9" fmla="*/ 546100 w 8089900"/>
+              <a:gd name="connsiteY9" fmla="*/ 5803900 h 5803900"/>
+              <a:gd name="connsiteX10" fmla="*/ 88900 w 8089900"/>
+              <a:gd name="connsiteY10" fmla="*/ 5727700 h 5803900"/>
+              <a:gd name="connsiteX11" fmla="*/ 12700 w 8089900"/>
+              <a:gd name="connsiteY11" fmla="*/ 5346700 h 5803900"/>
+              <a:gd name="connsiteX12" fmla="*/ 12700 w 8089900"/>
+              <a:gd name="connsiteY12" fmla="*/ 546100 h 5803900"/>
+              <a:gd name="connsiteX0" fmla="*/ 12700 w 8089901"/>
+              <a:gd name="connsiteY0" fmla="*/ 546100 h 5803900"/>
+              <a:gd name="connsiteX1" fmla="*/ 88900 w 8089901"/>
+              <a:gd name="connsiteY1" fmla="*/ 88900 h 5803900"/>
+              <a:gd name="connsiteX2" fmla="*/ 546100 w 8089901"/>
+              <a:gd name="connsiteY2" fmla="*/ 12701 h 5803900"/>
+              <a:gd name="connsiteX3" fmla="*/ 7556500 w 8089901"/>
+              <a:gd name="connsiteY3" fmla="*/ 12700 h 5803900"/>
+              <a:gd name="connsiteX4" fmla="*/ 7807194 w 8089901"/>
+              <a:gd name="connsiteY4" fmla="*/ 295407 h 5803900"/>
+              <a:gd name="connsiteX5" fmla="*/ 8089900 w 8089901"/>
+              <a:gd name="connsiteY5" fmla="*/ 469900 h 5803900"/>
+              <a:gd name="connsiteX6" fmla="*/ 8089900 w 8089901"/>
+              <a:gd name="connsiteY6" fmla="*/ 4838681 h 5803900"/>
+              <a:gd name="connsiteX7" fmla="*/ 7807194 w 8089901"/>
+              <a:gd name="connsiteY7" fmla="*/ 5521194 h 5803900"/>
+              <a:gd name="connsiteX8" fmla="*/ 7124681 w 8089901"/>
+              <a:gd name="connsiteY8" fmla="*/ 5803900 h 5803900"/>
+              <a:gd name="connsiteX9" fmla="*/ 546100 w 8089901"/>
+              <a:gd name="connsiteY9" fmla="*/ 5803900 h 5803900"/>
+              <a:gd name="connsiteX10" fmla="*/ 88900 w 8089901"/>
+              <a:gd name="connsiteY10" fmla="*/ 5727700 h 5803900"/>
+              <a:gd name="connsiteX11" fmla="*/ 12700 w 8089901"/>
+              <a:gd name="connsiteY11" fmla="*/ 5346700 h 5803900"/>
+              <a:gd name="connsiteX12" fmla="*/ 12700 w 8089901"/>
+              <a:gd name="connsiteY12" fmla="*/ 546100 h 5803900"/>
+              <a:gd name="connsiteX0" fmla="*/ 12700 w 8102600"/>
+              <a:gd name="connsiteY0" fmla="*/ 546100 h 5803900"/>
+              <a:gd name="connsiteX1" fmla="*/ 88900 w 8102600"/>
+              <a:gd name="connsiteY1" fmla="*/ 88900 h 5803900"/>
+              <a:gd name="connsiteX2" fmla="*/ 546100 w 8102600"/>
+              <a:gd name="connsiteY2" fmla="*/ 12701 h 5803900"/>
+              <a:gd name="connsiteX3" fmla="*/ 7556500 w 8102600"/>
+              <a:gd name="connsiteY3" fmla="*/ 12700 h 5803900"/>
+              <a:gd name="connsiteX4" fmla="*/ 8013700 w 8102600"/>
+              <a:gd name="connsiteY4" fmla="*/ 88900 h 5803900"/>
+              <a:gd name="connsiteX5" fmla="*/ 8089900 w 8102600"/>
+              <a:gd name="connsiteY5" fmla="*/ 469900 h 5803900"/>
+              <a:gd name="connsiteX6" fmla="*/ 8089900 w 8102600"/>
+              <a:gd name="connsiteY6" fmla="*/ 4838681 h 5803900"/>
+              <a:gd name="connsiteX7" fmla="*/ 7807194 w 8102600"/>
+              <a:gd name="connsiteY7" fmla="*/ 5521194 h 5803900"/>
+              <a:gd name="connsiteX8" fmla="*/ 7124681 w 8102600"/>
+              <a:gd name="connsiteY8" fmla="*/ 5803900 h 5803900"/>
+              <a:gd name="connsiteX9" fmla="*/ 546100 w 8102600"/>
+              <a:gd name="connsiteY9" fmla="*/ 5803900 h 5803900"/>
+              <a:gd name="connsiteX10" fmla="*/ 88900 w 8102600"/>
+              <a:gd name="connsiteY10" fmla="*/ 5727700 h 5803900"/>
+              <a:gd name="connsiteX11" fmla="*/ 12700 w 8102600"/>
+              <a:gd name="connsiteY11" fmla="*/ 5346700 h 5803900"/>
+              <a:gd name="connsiteX12" fmla="*/ 12700 w 8102600"/>
+              <a:gd name="connsiteY12" fmla="*/ 546100 h 5803900"/>
+              <a:gd name="connsiteX0" fmla="*/ 12700 w 8102600"/>
+              <a:gd name="connsiteY0" fmla="*/ 546100 h 5803900"/>
+              <a:gd name="connsiteX1" fmla="*/ 88900 w 8102600"/>
+              <a:gd name="connsiteY1" fmla="*/ 88900 h 5803900"/>
+              <a:gd name="connsiteX2" fmla="*/ 546100 w 8102600"/>
+              <a:gd name="connsiteY2" fmla="*/ 12701 h 5803900"/>
+              <a:gd name="connsiteX3" fmla="*/ 7556500 w 8102600"/>
+              <a:gd name="connsiteY3" fmla="*/ 12700 h 5803900"/>
+              <a:gd name="connsiteX4" fmla="*/ 8013700 w 8102600"/>
+              <a:gd name="connsiteY4" fmla="*/ 88900 h 5803900"/>
+              <a:gd name="connsiteX5" fmla="*/ 8089899 w 8102600"/>
+              <a:gd name="connsiteY5" fmla="*/ 469900 h 5803900"/>
+              <a:gd name="connsiteX6" fmla="*/ 8089900 w 8102600"/>
+              <a:gd name="connsiteY6" fmla="*/ 4838681 h 5803900"/>
+              <a:gd name="connsiteX7" fmla="*/ 7807194 w 8102600"/>
+              <a:gd name="connsiteY7" fmla="*/ 5521194 h 5803900"/>
+              <a:gd name="connsiteX8" fmla="*/ 7124681 w 8102600"/>
+              <a:gd name="connsiteY8" fmla="*/ 5803900 h 5803900"/>
+              <a:gd name="connsiteX9" fmla="*/ 546100 w 8102600"/>
+              <a:gd name="connsiteY9" fmla="*/ 5803900 h 5803900"/>
+              <a:gd name="connsiteX10" fmla="*/ 88900 w 8102600"/>
+              <a:gd name="connsiteY10" fmla="*/ 5727700 h 5803900"/>
+              <a:gd name="connsiteX11" fmla="*/ 12700 w 8102600"/>
+              <a:gd name="connsiteY11" fmla="*/ 5346700 h 5803900"/>
+              <a:gd name="connsiteX12" fmla="*/ 12700 w 8102600"/>
+              <a:gd name="connsiteY12" fmla="*/ 546100 h 5803900"/>
+              <a:gd name="connsiteX0" fmla="*/ 12700 w 8102599"/>
+              <a:gd name="connsiteY0" fmla="*/ 546100 h 5803900"/>
+              <a:gd name="connsiteX1" fmla="*/ 88900 w 8102599"/>
+              <a:gd name="connsiteY1" fmla="*/ 88900 h 5803900"/>
+              <a:gd name="connsiteX2" fmla="*/ 546100 w 8102599"/>
+              <a:gd name="connsiteY2" fmla="*/ 12701 h 5803900"/>
+              <a:gd name="connsiteX3" fmla="*/ 7556500 w 8102599"/>
+              <a:gd name="connsiteY3" fmla="*/ 12700 h 5803900"/>
+              <a:gd name="connsiteX4" fmla="*/ 8013699 w 8102599"/>
+              <a:gd name="connsiteY4" fmla="*/ 88900 h 5803900"/>
+              <a:gd name="connsiteX5" fmla="*/ 8089899 w 8102599"/>
+              <a:gd name="connsiteY5" fmla="*/ 469900 h 5803900"/>
+              <a:gd name="connsiteX6" fmla="*/ 8089900 w 8102599"/>
+              <a:gd name="connsiteY6" fmla="*/ 4838681 h 5803900"/>
+              <a:gd name="connsiteX7" fmla="*/ 7807194 w 8102599"/>
+              <a:gd name="connsiteY7" fmla="*/ 5521194 h 5803900"/>
+              <a:gd name="connsiteX8" fmla="*/ 7124681 w 8102599"/>
+              <a:gd name="connsiteY8" fmla="*/ 5803900 h 5803900"/>
+              <a:gd name="connsiteX9" fmla="*/ 546100 w 8102599"/>
+              <a:gd name="connsiteY9" fmla="*/ 5803900 h 5803900"/>
+              <a:gd name="connsiteX10" fmla="*/ 88900 w 8102599"/>
+              <a:gd name="connsiteY10" fmla="*/ 5727700 h 5803900"/>
+              <a:gd name="connsiteX11" fmla="*/ 12700 w 8102599"/>
+              <a:gd name="connsiteY11" fmla="*/ 5346700 h 5803900"/>
+              <a:gd name="connsiteX12" fmla="*/ 12700 w 8102599"/>
+              <a:gd name="connsiteY12" fmla="*/ 546100 h 5803900"/>
+              <a:gd name="connsiteX0" fmla="*/ 12700 w 8102599"/>
+              <a:gd name="connsiteY0" fmla="*/ 546100 h 5803900"/>
+              <a:gd name="connsiteX1" fmla="*/ 88900 w 8102599"/>
+              <a:gd name="connsiteY1" fmla="*/ 88900 h 5803900"/>
+              <a:gd name="connsiteX2" fmla="*/ 546100 w 8102599"/>
+              <a:gd name="connsiteY2" fmla="*/ 12701 h 5803900"/>
+              <a:gd name="connsiteX3" fmla="*/ 7556500 w 8102599"/>
+              <a:gd name="connsiteY3" fmla="*/ 12700 h 5803900"/>
+              <a:gd name="connsiteX4" fmla="*/ 8013699 w 8102599"/>
+              <a:gd name="connsiteY4" fmla="*/ 88900 h 5803900"/>
+              <a:gd name="connsiteX5" fmla="*/ 8089899 w 8102599"/>
+              <a:gd name="connsiteY5" fmla="*/ 469900 h 5803900"/>
+              <a:gd name="connsiteX6" fmla="*/ 8089900 w 8102599"/>
+              <a:gd name="connsiteY6" fmla="*/ 5346700 h 5803900"/>
+              <a:gd name="connsiteX7" fmla="*/ 7807194 w 8102599"/>
+              <a:gd name="connsiteY7" fmla="*/ 5521194 h 5803900"/>
+              <a:gd name="connsiteX8" fmla="*/ 7124681 w 8102599"/>
+              <a:gd name="connsiteY8" fmla="*/ 5803900 h 5803900"/>
+              <a:gd name="connsiteX9" fmla="*/ 546100 w 8102599"/>
+              <a:gd name="connsiteY9" fmla="*/ 5803900 h 5803900"/>
+              <a:gd name="connsiteX10" fmla="*/ 88900 w 8102599"/>
+              <a:gd name="connsiteY10" fmla="*/ 5727700 h 5803900"/>
+              <a:gd name="connsiteX11" fmla="*/ 12700 w 8102599"/>
+              <a:gd name="connsiteY11" fmla="*/ 5346700 h 5803900"/>
+              <a:gd name="connsiteX12" fmla="*/ 12700 w 8102599"/>
+              <a:gd name="connsiteY12" fmla="*/ 546100 h 5803900"/>
+              <a:gd name="connsiteX0" fmla="*/ 12700 w 8102599"/>
+              <a:gd name="connsiteY0" fmla="*/ 546100 h 5803900"/>
+              <a:gd name="connsiteX1" fmla="*/ 88900 w 8102599"/>
+              <a:gd name="connsiteY1" fmla="*/ 88900 h 5803900"/>
+              <a:gd name="connsiteX2" fmla="*/ 546100 w 8102599"/>
+              <a:gd name="connsiteY2" fmla="*/ 12701 h 5803900"/>
+              <a:gd name="connsiteX3" fmla="*/ 7556500 w 8102599"/>
+              <a:gd name="connsiteY3" fmla="*/ 12700 h 5803900"/>
+              <a:gd name="connsiteX4" fmla="*/ 8013699 w 8102599"/>
+              <a:gd name="connsiteY4" fmla="*/ 88900 h 5803900"/>
+              <a:gd name="connsiteX5" fmla="*/ 8089899 w 8102599"/>
+              <a:gd name="connsiteY5" fmla="*/ 469900 h 5803900"/>
+              <a:gd name="connsiteX6" fmla="*/ 8089900 w 8102599"/>
+              <a:gd name="connsiteY6" fmla="*/ 5346700 h 5803900"/>
+              <a:gd name="connsiteX7" fmla="*/ 7807194 w 8102599"/>
+              <a:gd name="connsiteY7" fmla="*/ 5521194 h 5803900"/>
+              <a:gd name="connsiteX8" fmla="*/ 7632700 w 8102599"/>
+              <a:gd name="connsiteY8" fmla="*/ 5803900 h 5803900"/>
+              <a:gd name="connsiteX9" fmla="*/ 546100 w 8102599"/>
+              <a:gd name="connsiteY9" fmla="*/ 5803900 h 5803900"/>
+              <a:gd name="connsiteX10" fmla="*/ 88900 w 8102599"/>
+              <a:gd name="connsiteY10" fmla="*/ 5727700 h 5803900"/>
+              <a:gd name="connsiteX11" fmla="*/ 12700 w 8102599"/>
+              <a:gd name="connsiteY11" fmla="*/ 5346700 h 5803900"/>
+              <a:gd name="connsiteX12" fmla="*/ 12700 w 8102599"/>
+              <a:gd name="connsiteY12" fmla="*/ 546100 h 5803900"/>
+              <a:gd name="connsiteX0" fmla="*/ 12700 w 8102599"/>
+              <a:gd name="connsiteY0" fmla="*/ 546100 h 5803900"/>
+              <a:gd name="connsiteX1" fmla="*/ 88900 w 8102599"/>
+              <a:gd name="connsiteY1" fmla="*/ 88900 h 5803900"/>
+              <a:gd name="connsiteX2" fmla="*/ 546100 w 8102599"/>
+              <a:gd name="connsiteY2" fmla="*/ 12701 h 5803900"/>
+              <a:gd name="connsiteX3" fmla="*/ 7556500 w 8102599"/>
+              <a:gd name="connsiteY3" fmla="*/ 12700 h 5803900"/>
+              <a:gd name="connsiteX4" fmla="*/ 8013699 w 8102599"/>
+              <a:gd name="connsiteY4" fmla="*/ 88900 h 5803900"/>
+              <a:gd name="connsiteX5" fmla="*/ 8089899 w 8102599"/>
+              <a:gd name="connsiteY5" fmla="*/ 469900 h 5803900"/>
+              <a:gd name="connsiteX6" fmla="*/ 8089900 w 8102599"/>
+              <a:gd name="connsiteY6" fmla="*/ 5346700 h 5803900"/>
+              <a:gd name="connsiteX7" fmla="*/ 8013700 w 8102599"/>
+              <a:gd name="connsiteY7" fmla="*/ 5727700 h 5803900"/>
+              <a:gd name="connsiteX8" fmla="*/ 7632700 w 8102599"/>
+              <a:gd name="connsiteY8" fmla="*/ 5803900 h 5803900"/>
+              <a:gd name="connsiteX9" fmla="*/ 546100 w 8102599"/>
+              <a:gd name="connsiteY9" fmla="*/ 5803900 h 5803900"/>
+              <a:gd name="connsiteX10" fmla="*/ 88900 w 8102599"/>
+              <a:gd name="connsiteY10" fmla="*/ 5727700 h 5803900"/>
+              <a:gd name="connsiteX11" fmla="*/ 12700 w 8102599"/>
+              <a:gd name="connsiteY11" fmla="*/ 5346700 h 5803900"/>
+              <a:gd name="connsiteX12" fmla="*/ 12700 w 8102599"/>
+              <a:gd name="connsiteY12" fmla="*/ 546100 h 5803900"/>
+            </a:gdLst>
+            <a:ahLst/>
+            <a:cxnLst>
+              <a:cxn ang="0">
+                <a:pos x="connsiteX0" y="connsiteY0"/>
+              </a:cxn>
+              <a:cxn ang="0">
+                <a:pos x="connsiteX1" y="connsiteY1"/>
+              </a:cxn>
+              <a:cxn ang="0">
+                <a:pos x="connsiteX2" y="connsiteY2"/>
+              </a:cxn>
+              <a:cxn ang="0">
+                <a:pos x="connsiteX3" y="connsiteY3"/>
+              </a:cxn>
+              <a:cxn ang="0">
+                <a:pos x="connsiteX4" y="connsiteY4"/>
+              </a:cxn>
+              <a:cxn ang="0">
+                <a:pos x="connsiteX5" y="connsiteY5"/>
+              </a:cxn>
+              <a:cxn ang="0">
+                <a:pos x="connsiteX6" y="connsiteY6"/>
+              </a:cxn>
+              <a:cxn ang="0">
+                <a:pos x="connsiteX7" y="connsiteY7"/>
+              </a:cxn>
+              <a:cxn ang="0">
+                <a:pos x="connsiteX8" y="connsiteY8"/>
+              </a:cxn>
+              <a:cxn ang="0">
+                <a:pos x="connsiteX9" y="connsiteY9"/>
+              </a:cxn>
+              <a:cxn ang="0">
+                <a:pos x="connsiteX10" y="connsiteY10"/>
+              </a:cxn>
+              <a:cxn ang="0">
+                <a:pos x="connsiteX11" y="connsiteY11"/>
+              </a:cxn>
+              <a:cxn ang="0">
+                <a:pos x="connsiteX12" y="connsiteY12"/>
+              </a:cxn>
+            </a:cxnLst>
+            <a:rect l="l" t="t" r="r" b="b"/>
+            <a:pathLst>
+              <a:path w="8102599" h="5803900">
+                <a:moveTo>
+                  <a:pt x="12700" y="546100"/>
+                </a:moveTo>
+                <a:cubicBezTo>
+                  <a:pt x="12700" y="290108"/>
+                  <a:pt x="0" y="177800"/>
+                  <a:pt x="88900" y="88900"/>
+                </a:cubicBezTo>
+                <a:cubicBezTo>
+                  <a:pt x="177800" y="0"/>
+                  <a:pt x="290107" y="12700"/>
+                  <a:pt x="546100" y="12701"/>
+                </a:cubicBezTo>
+                <a:lnTo>
+                  <a:pt x="7556500" y="12700"/>
+                </a:lnTo>
+                <a:cubicBezTo>
+                  <a:pt x="7812492" y="12700"/>
+                  <a:pt x="7924799" y="12700"/>
+                  <a:pt x="8013699" y="88900"/>
+                </a:cubicBezTo>
+                <a:cubicBezTo>
+                  <a:pt x="8102599" y="165100"/>
+                  <a:pt x="8089900" y="213907"/>
+                  <a:pt x="8089899" y="469900"/>
+                </a:cubicBezTo>
+                <a:cubicBezTo>
+                  <a:pt x="8089899" y="1926160"/>
+                  <a:pt x="8089900" y="3890440"/>
+                  <a:pt x="8089900" y="5346700"/>
+                </a:cubicBezTo>
+                <a:cubicBezTo>
+                  <a:pt x="8089900" y="5602692"/>
+                  <a:pt x="8089900" y="5651500"/>
+                  <a:pt x="8013700" y="5727700"/>
+                </a:cubicBezTo>
+                <a:cubicBezTo>
+                  <a:pt x="7937500" y="5803900"/>
+                  <a:pt x="7888692" y="5803900"/>
+                  <a:pt x="7632700" y="5803900"/>
+                </a:cubicBezTo>
+                <a:lnTo>
+                  <a:pt x="546100" y="5803900"/>
+                </a:lnTo>
+                <a:cubicBezTo>
+                  <a:pt x="290108" y="5803900"/>
+                  <a:pt x="177800" y="5803900"/>
+                  <a:pt x="88900" y="5727700"/>
+                </a:cubicBezTo>
+                <a:cubicBezTo>
+                  <a:pt x="0" y="5651500"/>
+                  <a:pt x="12700" y="5602692"/>
+                  <a:pt x="12700" y="5346700"/>
+                </a:cubicBezTo>
+                <a:lnTo>
+                  <a:pt x="12700" y="546100"/>
+                </a:lnTo>
+                <a:close/>
+              </a:path>
+            </a:pathLst>
+          </a:custGeom>
+          <a:gradFill>
+            <a:gsLst>
+              <a:gs pos="0">
+                <a:schemeClr val="bg1">
+                  <a:lumMod val="50000"/>
+                </a:schemeClr>
+              </a:gs>
+              <a:gs pos="39999">
+                <a:schemeClr val="bg1">
+                  <a:lumMod val="65000"/>
+                </a:schemeClr>
+              </a:gs>
+              <a:gs pos="70000">
+                <a:schemeClr val="bg1">
+                  <a:lumMod val="50000"/>
+                  <a:alpha val="73000"/>
+                </a:schemeClr>
+              </a:gs>
+            </a:gsLst>
+            <a:lin ang="5400000" scaled="0"/>
+          </a:gradFill>
+          <a:ln>
+            <a:solidFill>
+              <a:schemeClr val="bg1">
+                <a:lumMod val="75000"/>
+              </a:schemeClr>
+            </a:solidFill>
+          </a:ln>
+        </p:spPr>
+        <p:style>
+          <a:lnRef idx="2">
+            <a:schemeClr val="accent1">
+              <a:shade val="50000"/>
+            </a:schemeClr>
+          </a:lnRef>
+          <a:fillRef idx="1">
+            <a:schemeClr val="accent1"/>
+          </a:fillRef>
+          <a:effectRef idx="0">
+            <a:schemeClr val="accent1"/>
+          </a:effectRef>
+          <a:fontRef idx="minor">
+            <a:schemeClr val="lt1"/>
+          </a:fontRef>
+        </p:style>
+        <p:txBody>
+          <a:bodyPr rtlCol="0" anchor="ctr"/>
+          <a:lstStyle/>
+          <a:p>
+            <a:pPr fontAlgn="t"/>
+            <a:endParaRPr lang="es-AR" b="1" dirty="0" smtClean="0"/>
+          </a:p>
+          <a:p>
+            <a:pPr algn="ctr"/>
+            <a:endParaRPr lang="es-AR" dirty="0"/>
+          </a:p>
+        </p:txBody>
+      </p:sp>
+      <p:sp>
+        <p:nvSpPr>
+          <p:cNvPr id="14" name="Rectangle 13"/>
+          <p:cNvSpPr/>
+          <p:nvPr/>
+        </p:nvSpPr>
+        <p:spPr>
+          <a:xfrm>
+            <a:off x="381000" y="1295400"/>
+            <a:ext cx="8458200" cy="1066800"/>
+          </a:xfrm>
+          <a:prstGeom prst="rect">
+            <a:avLst/>
+          </a:prstGeom>
+          <a:noFill/>
+          <a:ln>
+            <a:noFill/>
+          </a:ln>
+        </p:spPr>
+        <p:style>
+          <a:lnRef idx="2">
+            <a:schemeClr val="accent1">
+              <a:shade val="50000"/>
+            </a:schemeClr>
+          </a:lnRef>
+          <a:fillRef idx="1">
+            <a:schemeClr val="accent1"/>
+          </a:fillRef>
+          <a:effectRef idx="0">
+            <a:schemeClr val="accent1"/>
+          </a:effectRef>
+          <a:fontRef idx="minor">
+            <a:schemeClr val="lt1"/>
+          </a:fontRef>
+        </p:style>
+        <p:txBody>
+          <a:bodyPr rtlCol="0" anchor="ctr"/>
+          <a:lstStyle/>
+          <a:p>
+            <a:pPr algn="ctr"/>
+            <a:r>
+              <a:rPr lang="es-AR" sz="4800" b="1" dirty="0" err="1" smtClean="0"/>
+              <a:t>Frameworks</a:t>
+            </a:r>
+            <a:endParaRPr lang="es-AR" sz="4800" b="1" dirty="0" smtClean="0"/>
+          </a:p>
+          <a:p>
+            <a:pPr algn="ctr"/>
+            <a:endParaRPr lang="es-AR" sz="1200" dirty="0"/>
+          </a:p>
+        </p:txBody>
+      </p:sp>
+      <p:grpSp>
+        <p:nvGrpSpPr>
+          <p:cNvPr id="3" name="Group 14"/>
+          <p:cNvGrpSpPr/>
+          <p:nvPr/>
+        </p:nvGrpSpPr>
+        <p:grpSpPr>
+          <a:xfrm>
+            <a:off x="1295400" y="544415"/>
+            <a:ext cx="6553200" cy="903384"/>
+            <a:chOff x="1295400" y="544415"/>
+            <a:chExt cx="6553200" cy="903384"/>
+          </a:xfrm>
+        </p:grpSpPr>
+        <p:sp>
+          <p:nvSpPr>
+            <p:cNvPr id="16" name="Round Same Side Corner Rectangle 15"/>
+            <p:cNvSpPr/>
+            <p:nvPr/>
+          </p:nvSpPr>
+          <p:spPr>
+            <a:xfrm rot="10800000">
+              <a:off x="1295400" y="544415"/>
+              <a:ext cx="6553200" cy="903384"/>
+            </a:xfrm>
+            <a:prstGeom prst="round2SameRect">
+              <a:avLst/>
+            </a:prstGeom>
+          </p:spPr>
+          <p:style>
+            <a:lnRef idx="2">
+              <a:schemeClr val="dk1">
+                <a:shade val="50000"/>
+              </a:schemeClr>
+            </a:lnRef>
+            <a:fillRef idx="1">
+              <a:schemeClr val="dk1"/>
+            </a:fillRef>
+            <a:effectRef idx="0">
+              <a:schemeClr val="dk1"/>
+            </a:effectRef>
+            <a:fontRef idx="minor">
+              <a:schemeClr val="lt1"/>
+            </a:fontRef>
+          </p:style>
+          <p:txBody>
+            <a:bodyPr rtlCol="0" anchor="ctr"/>
+            <a:lstStyle/>
+            <a:p>
+              <a:pPr algn="ctr"/>
+              <a:endParaRPr lang="es-AR" dirty="0"/>
+            </a:p>
+          </p:txBody>
+        </p:sp>
+        <p:pic>
+          <p:nvPicPr>
+            <p:cNvPr id="20" name="Picture 2" descr="E:\U.B.A.Files\Materias\75.45 Taller de Desarrollo de Proyectos I\TP\Trunk\Proyecto\web\site\images\logo.png"/>
+            <p:cNvPicPr>
+              <a:picLocks noChangeAspect="1" noChangeArrowheads="1"/>
+            </p:cNvPicPr>
+            <p:nvPr/>
+          </p:nvPicPr>
+          <p:blipFill>
+            <a:blip r:embed="rId2" cstate="print"/>
+            <a:srcRect/>
+            <a:stretch>
+              <a:fillRect/>
+            </a:stretch>
+          </p:blipFill>
+          <p:spPr bwMode="auto">
+            <a:xfrm>
+              <a:off x="1600200" y="609600"/>
+              <a:ext cx="2640904" cy="762000"/>
+            </a:xfrm>
+            <a:prstGeom prst="rect">
+              <a:avLst/>
+            </a:prstGeom>
+            <a:noFill/>
+          </p:spPr>
+        </p:pic>
+        <p:sp>
+          <p:nvSpPr>
+            <p:cNvPr id="23" name="TextBox 22"/>
+            <p:cNvSpPr txBox="1"/>
+            <p:nvPr/>
+          </p:nvSpPr>
+          <p:spPr>
+            <a:xfrm>
+              <a:off x="4515457" y="685800"/>
+              <a:ext cx="3180743" cy="307777"/>
+            </a:xfrm>
+            <a:prstGeom prst="rect">
+              <a:avLst/>
+            </a:prstGeom>
+            <a:noFill/>
+          </p:spPr>
+          <p:txBody>
+            <a:bodyPr wrap="none" rtlCol="0">
+              <a:spAutoFit/>
+            </a:bodyPr>
+            <a:lstStyle/>
+            <a:p>
+              <a:r>
+                <a:rPr lang="es-AR" sz="1400" dirty="0" smtClean="0">
+                  <a:solidFill>
+                    <a:schemeClr val="bg1">
+                      <a:lumMod val="50000"/>
+                    </a:schemeClr>
+                  </a:solidFill>
+                </a:rPr>
+                <a:t>Centralización y análisis de datos</a:t>
+              </a:r>
+              <a:endParaRPr lang="es-AR" sz="1400" dirty="0">
+                <a:solidFill>
+                  <a:schemeClr val="bg1">
+                    <a:lumMod val="50000"/>
+                  </a:schemeClr>
+                </a:solidFill>
+              </a:endParaRPr>
+            </a:p>
+          </p:txBody>
+        </p:sp>
+      </p:grpSp>
+    </p:spTree>
+  </p:cSld>
+  <p:clrMapOvr>
+    <a:masterClrMapping/>
+  </p:clrMapOvr>
+</p:sld>
+</file>
+
+<file path=ppt/slides/slide7.xml><?xml version="1.0" encoding="utf-8"?>
+<p:sld xmlns:a="http://schemas.openxmlformats.org/drawingml/2006/main" xmlns:r="http://schemas.openxmlformats.org/officeDocument/2006/relationships" xmlns:p="http://schemas.openxmlformats.org/presentationml/2006/main">
+  <p:cSld>
+    <p:spTree>
+      <p:nvGrpSpPr>
+        <p:cNvPr id="1" name=""/>
+        <p:cNvGrpSpPr/>
+        <p:nvPr/>
+      </p:nvGrpSpPr>
+      <p:grpSpPr>
+        <a:xfrm>
+          <a:off x="0" y="0"/>
+          <a:ext cx="0" cy="0"/>
+          <a:chOff x="0" y="0"/>
+          <a:chExt cx="0" cy="0"/>
+        </a:xfrm>
+      </p:grpSpPr>
+      <p:grpSp>
+        <p:nvGrpSpPr>
+          <p:cNvPr id="2" name="Group 22"/>
+          <p:cNvGrpSpPr/>
+          <p:nvPr/>
+        </p:nvGrpSpPr>
+        <p:grpSpPr>
+          <a:xfrm>
+            <a:off x="304800" y="304800"/>
+            <a:ext cx="8534400" cy="6248400"/>
+            <a:chOff x="304800" y="304800"/>
+            <a:chExt cx="8534400" cy="6248400"/>
+          </a:xfrm>
+          <a:solidFill>
+            <a:schemeClr val="bg1">
+              <a:lumMod val="85000"/>
+            </a:schemeClr>
+          </a:solidFill>
+        </p:grpSpPr>
+        <p:sp>
+          <p:nvSpPr>
+            <p:cNvPr id="18" name="Rounded Rectangle 17"/>
+            <p:cNvSpPr/>
+            <p:nvPr/>
+          </p:nvSpPr>
+          <p:spPr>
+            <a:xfrm>
+              <a:off x="304800" y="304800"/>
+              <a:ext cx="8534400" cy="6248400"/>
+            </a:xfrm>
+            <a:prstGeom prst="roundRect">
+              <a:avLst/>
+            </a:prstGeom>
+            <a:grpFill/>
+            <a:ln>
+              <a:noFill/>
+            </a:ln>
+          </p:spPr>
+          <p:style>
+            <a:lnRef idx="2">
+              <a:schemeClr val="accent1">
+                <a:shade val="50000"/>
+              </a:schemeClr>
+            </a:lnRef>
+            <a:fillRef idx="1">
+              <a:schemeClr val="accent1"/>
+            </a:fillRef>
+            <a:effectRef idx="0">
+              <a:schemeClr val="accent1"/>
+            </a:effectRef>
+            <a:fontRef idx="minor">
+              <a:schemeClr val="lt1"/>
+            </a:fontRef>
+          </p:style>
+          <p:txBody>
+            <a:bodyPr rtlCol="0" anchor="ctr"/>
+            <a:lstStyle/>
+            <a:p>
+              <a:pPr algn="ctr"/>
+              <a:endParaRPr lang="es-AR"/>
+            </a:p>
+          </p:txBody>
+        </p:sp>
+        <p:sp>
+          <p:nvSpPr>
+            <p:cNvPr id="22" name="Rounded Rectangle 21"/>
+            <p:cNvSpPr/>
+            <p:nvPr/>
+          </p:nvSpPr>
+          <p:spPr>
+            <a:xfrm>
+              <a:off x="7086600" y="304800"/>
+              <a:ext cx="1752600" cy="1752600"/>
+            </a:xfrm>
+            <a:prstGeom prst="roundRect">
+              <a:avLst/>
+            </a:prstGeom>
+            <a:grpFill/>
+            <a:ln>
+              <a:noFill/>
+            </a:ln>
+          </p:spPr>
+          <p:style>
+            <a:lnRef idx="2">
+              <a:schemeClr val="accent1">
+                <a:shade val="50000"/>
+              </a:schemeClr>
+            </a:lnRef>
+            <a:fillRef idx="1">
+              <a:schemeClr val="accent1"/>
+            </a:fillRef>
+            <a:effectRef idx="0">
+              <a:schemeClr val="accent1"/>
+            </a:effectRef>
+            <a:fontRef idx="minor">
+              <a:schemeClr val="lt1"/>
+            </a:fontRef>
+          </p:style>
+          <p:txBody>
+            <a:bodyPr rtlCol="0" anchor="ctr"/>
+            <a:lstStyle/>
+            <a:p>
+              <a:pPr algn="ctr"/>
+              <a:endParaRPr lang="es-AR"/>
+            </a:p>
+          </p:txBody>
+        </p:sp>
+        <p:sp>
+          <p:nvSpPr>
+            <p:cNvPr id="21" name="Rounded Rectangle 20"/>
+            <p:cNvSpPr/>
+            <p:nvPr/>
+          </p:nvSpPr>
+          <p:spPr>
+            <a:xfrm>
+              <a:off x="304800" y="304800"/>
+              <a:ext cx="1752600" cy="1752600"/>
+            </a:xfrm>
+            <a:prstGeom prst="roundRect">
+              <a:avLst/>
+            </a:prstGeom>
+            <a:grpFill/>
+            <a:ln>
+              <a:noFill/>
+            </a:ln>
+          </p:spPr>
+          <p:style>
+            <a:lnRef idx="2">
+              <a:schemeClr val="accent1">
+                <a:shade val="50000"/>
+              </a:schemeClr>
+            </a:lnRef>
+            <a:fillRef idx="1">
+              <a:schemeClr val="accent1"/>
+            </a:fillRef>
+            <a:effectRef idx="0">
+              <a:schemeClr val="accent1"/>
+            </a:effectRef>
+            <a:fontRef idx="minor">
+              <a:schemeClr val="lt1"/>
+            </a:fontRef>
+          </p:style>
+          <p:txBody>
+            <a:bodyPr rtlCol="0" anchor="ctr"/>
+            <a:lstStyle/>
+            <a:p>
+              <a:pPr algn="ctr"/>
+              <a:endParaRPr lang="es-AR"/>
+            </a:p>
+          </p:txBody>
+        </p:sp>
+        <p:sp>
+          <p:nvSpPr>
+            <p:cNvPr id="17" name="Rounded Rectangle 16"/>
+            <p:cNvSpPr/>
+            <p:nvPr/>
+          </p:nvSpPr>
+          <p:spPr>
+            <a:xfrm>
+              <a:off x="304800" y="4800600"/>
+              <a:ext cx="1752600" cy="1752600"/>
+            </a:xfrm>
+            <a:prstGeom prst="roundRect">
+              <a:avLst/>
+            </a:prstGeom>
+            <a:grpFill/>
+            <a:ln>
+              <a:noFill/>
+            </a:ln>
+          </p:spPr>
+          <p:style>
+            <a:lnRef idx="2">
+              <a:schemeClr val="accent1">
+                <a:shade val="50000"/>
+              </a:schemeClr>
+            </a:lnRef>
+            <a:fillRef idx="1">
+              <a:schemeClr val="accent1"/>
+            </a:fillRef>
+            <a:effectRef idx="0">
+              <a:schemeClr val="accent1"/>
+            </a:effectRef>
+            <a:fontRef idx="minor">
+              <a:schemeClr val="lt1"/>
+            </a:fontRef>
+          </p:style>
+          <p:txBody>
+            <a:bodyPr rtlCol="0" anchor="ctr"/>
+            <a:lstStyle/>
+            <a:p>
+              <a:pPr algn="ctr"/>
+              <a:endParaRPr lang="es-AR"/>
+            </a:p>
+          </p:txBody>
+        </p:sp>
+        <p:sp>
+          <p:nvSpPr>
+            <p:cNvPr id="19" name="Rounded Rectangle 18"/>
+            <p:cNvSpPr/>
+            <p:nvPr/>
+          </p:nvSpPr>
+          <p:spPr>
+            <a:xfrm>
+              <a:off x="7086600" y="4800600"/>
+              <a:ext cx="1752600" cy="1752600"/>
+            </a:xfrm>
+            <a:prstGeom prst="roundRect">
+              <a:avLst/>
+            </a:prstGeom>
+            <a:grpFill/>
+            <a:ln>
+              <a:noFill/>
+            </a:ln>
+          </p:spPr>
+          <p:style>
+            <a:lnRef idx="2">
+              <a:schemeClr val="accent1">
+                <a:shade val="50000"/>
+              </a:schemeClr>
+            </a:lnRef>
+            <a:fillRef idx="1">
+              <a:schemeClr val="accent1"/>
+            </a:fillRef>
+            <a:effectRef idx="0">
+              <a:schemeClr val="accent1"/>
+            </a:effectRef>
+            <a:fontRef idx="minor">
+              <a:schemeClr val="lt1"/>
+            </a:fontRef>
+          </p:style>
+          <p:txBody>
+            <a:bodyPr rtlCol="0" anchor="ctr"/>
+            <a:lstStyle/>
+            <a:p>
+              <a:pPr algn="ctr"/>
+              <a:endParaRPr lang="es-AR"/>
+            </a:p>
+          </p:txBody>
+        </p:sp>
+      </p:grpSp>
+      <p:sp>
+        <p:nvSpPr>
+          <p:cNvPr id="40" name="Freeform 39"/>
+          <p:cNvSpPr/>
+          <p:nvPr/>
+        </p:nvSpPr>
+        <p:spPr>
+          <a:xfrm>
+            <a:off x="457200" y="457200"/>
+            <a:ext cx="8229600" cy="5803900"/>
+          </a:xfrm>
+          <a:custGeom>
+            <a:avLst/>
+            <a:gdLst>
+              <a:gd name="connsiteX0" fmla="*/ 0 w 8077200"/>
+              <a:gd name="connsiteY0" fmla="*/ 965219 h 5791200"/>
+              <a:gd name="connsiteX1" fmla="*/ 282707 w 8077200"/>
+              <a:gd name="connsiteY1" fmla="*/ 282706 h 5791200"/>
+              <a:gd name="connsiteX2" fmla="*/ 965221 w 8077200"/>
+              <a:gd name="connsiteY2" fmla="*/ 1 h 5791200"/>
+              <a:gd name="connsiteX3" fmla="*/ 7111981 w 8077200"/>
+              <a:gd name="connsiteY3" fmla="*/ 0 h 5791200"/>
+              <a:gd name="connsiteX4" fmla="*/ 7794494 w 8077200"/>
+              <a:gd name="connsiteY4" fmla="*/ 282707 h 5791200"/>
+              <a:gd name="connsiteX5" fmla="*/ 8077199 w 8077200"/>
+              <a:gd name="connsiteY5" fmla="*/ 965221 h 5791200"/>
+              <a:gd name="connsiteX6" fmla="*/ 8077200 w 8077200"/>
+              <a:gd name="connsiteY6" fmla="*/ 4825981 h 5791200"/>
+              <a:gd name="connsiteX7" fmla="*/ 7794494 w 8077200"/>
+              <a:gd name="connsiteY7" fmla="*/ 5508494 h 5791200"/>
+              <a:gd name="connsiteX8" fmla="*/ 7111981 w 8077200"/>
+              <a:gd name="connsiteY8" fmla="*/ 5791200 h 5791200"/>
+              <a:gd name="connsiteX9" fmla="*/ 965219 w 8077200"/>
+              <a:gd name="connsiteY9" fmla="*/ 5791200 h 5791200"/>
+              <a:gd name="connsiteX10" fmla="*/ 282706 w 8077200"/>
+              <a:gd name="connsiteY10" fmla="*/ 5508493 h 5791200"/>
+              <a:gd name="connsiteX11" fmla="*/ 0 w 8077200"/>
+              <a:gd name="connsiteY11" fmla="*/ 4825980 h 5791200"/>
+              <a:gd name="connsiteX12" fmla="*/ 0 w 8077200"/>
+              <a:gd name="connsiteY12" fmla="*/ 965219 h 5791200"/>
+              <a:gd name="connsiteX0" fmla="*/ 0 w 8077200"/>
+              <a:gd name="connsiteY0" fmla="*/ 609600 h 5791200"/>
+              <a:gd name="connsiteX1" fmla="*/ 282707 w 8077200"/>
+              <a:gd name="connsiteY1" fmla="*/ 282706 h 5791200"/>
+              <a:gd name="connsiteX2" fmla="*/ 965221 w 8077200"/>
+              <a:gd name="connsiteY2" fmla="*/ 1 h 5791200"/>
+              <a:gd name="connsiteX3" fmla="*/ 7111981 w 8077200"/>
+              <a:gd name="connsiteY3" fmla="*/ 0 h 5791200"/>
+              <a:gd name="connsiteX4" fmla="*/ 7794494 w 8077200"/>
+              <a:gd name="connsiteY4" fmla="*/ 282707 h 5791200"/>
+              <a:gd name="connsiteX5" fmla="*/ 8077199 w 8077200"/>
+              <a:gd name="connsiteY5" fmla="*/ 965221 h 5791200"/>
+              <a:gd name="connsiteX6" fmla="*/ 8077200 w 8077200"/>
+              <a:gd name="connsiteY6" fmla="*/ 4825981 h 5791200"/>
+              <a:gd name="connsiteX7" fmla="*/ 7794494 w 8077200"/>
+              <a:gd name="connsiteY7" fmla="*/ 5508494 h 5791200"/>
+              <a:gd name="connsiteX8" fmla="*/ 7111981 w 8077200"/>
+              <a:gd name="connsiteY8" fmla="*/ 5791200 h 5791200"/>
+              <a:gd name="connsiteX9" fmla="*/ 965219 w 8077200"/>
+              <a:gd name="connsiteY9" fmla="*/ 5791200 h 5791200"/>
+              <a:gd name="connsiteX10" fmla="*/ 282706 w 8077200"/>
+              <a:gd name="connsiteY10" fmla="*/ 5508493 h 5791200"/>
+              <a:gd name="connsiteX11" fmla="*/ 0 w 8077200"/>
+              <a:gd name="connsiteY11" fmla="*/ 4825980 h 5791200"/>
+              <a:gd name="connsiteX12" fmla="*/ 0 w 8077200"/>
+              <a:gd name="connsiteY12" fmla="*/ 609600 h 5791200"/>
+              <a:gd name="connsiteX0" fmla="*/ 0 w 8077200"/>
+              <a:gd name="connsiteY0" fmla="*/ 609601 h 5791201"/>
+              <a:gd name="connsiteX1" fmla="*/ 282707 w 8077200"/>
+              <a:gd name="connsiteY1" fmla="*/ 282707 h 5791201"/>
+              <a:gd name="connsiteX2" fmla="*/ 609600 w 8077200"/>
+              <a:gd name="connsiteY2" fmla="*/ 1 h 5791201"/>
+              <a:gd name="connsiteX3" fmla="*/ 7111981 w 8077200"/>
+              <a:gd name="connsiteY3" fmla="*/ 1 h 5791201"/>
+              <a:gd name="connsiteX4" fmla="*/ 7794494 w 8077200"/>
+              <a:gd name="connsiteY4" fmla="*/ 282708 h 5791201"/>
+              <a:gd name="connsiteX5" fmla="*/ 8077199 w 8077200"/>
+              <a:gd name="connsiteY5" fmla="*/ 965222 h 5791201"/>
+              <a:gd name="connsiteX6" fmla="*/ 8077200 w 8077200"/>
+              <a:gd name="connsiteY6" fmla="*/ 4825982 h 5791201"/>
+              <a:gd name="connsiteX7" fmla="*/ 7794494 w 8077200"/>
+              <a:gd name="connsiteY7" fmla="*/ 5508495 h 5791201"/>
+              <a:gd name="connsiteX8" fmla="*/ 7111981 w 8077200"/>
+              <a:gd name="connsiteY8" fmla="*/ 5791201 h 5791201"/>
+              <a:gd name="connsiteX9" fmla="*/ 965219 w 8077200"/>
+              <a:gd name="connsiteY9" fmla="*/ 5791201 h 5791201"/>
+              <a:gd name="connsiteX10" fmla="*/ 282706 w 8077200"/>
+              <a:gd name="connsiteY10" fmla="*/ 5508494 h 5791201"/>
+              <a:gd name="connsiteX11" fmla="*/ 0 w 8077200"/>
+              <a:gd name="connsiteY11" fmla="*/ 4825981 h 5791201"/>
+              <a:gd name="connsiteX12" fmla="*/ 0 w 8077200"/>
+              <a:gd name="connsiteY12" fmla="*/ 609601 h 5791201"/>
+              <a:gd name="connsiteX0" fmla="*/ 0 w 8077200"/>
+              <a:gd name="connsiteY0" fmla="*/ 609601 h 5791201"/>
+              <a:gd name="connsiteX1" fmla="*/ 152400 w 8077200"/>
+              <a:gd name="connsiteY1" fmla="*/ 152402 h 5791201"/>
+              <a:gd name="connsiteX2" fmla="*/ 609600 w 8077200"/>
+              <a:gd name="connsiteY2" fmla="*/ 1 h 5791201"/>
+              <a:gd name="connsiteX3" fmla="*/ 7111981 w 8077200"/>
+              <a:gd name="connsiteY3" fmla="*/ 1 h 5791201"/>
+              <a:gd name="connsiteX4" fmla="*/ 7794494 w 8077200"/>
+              <a:gd name="connsiteY4" fmla="*/ 282708 h 5791201"/>
+              <a:gd name="connsiteX5" fmla="*/ 8077199 w 8077200"/>
+              <a:gd name="connsiteY5" fmla="*/ 965222 h 5791201"/>
+              <a:gd name="connsiteX6" fmla="*/ 8077200 w 8077200"/>
+              <a:gd name="connsiteY6" fmla="*/ 4825982 h 5791201"/>
+              <a:gd name="connsiteX7" fmla="*/ 7794494 w 8077200"/>
+              <a:gd name="connsiteY7" fmla="*/ 5508495 h 5791201"/>
+              <a:gd name="connsiteX8" fmla="*/ 7111981 w 8077200"/>
+              <a:gd name="connsiteY8" fmla="*/ 5791201 h 5791201"/>
+              <a:gd name="connsiteX9" fmla="*/ 965219 w 8077200"/>
+              <a:gd name="connsiteY9" fmla="*/ 5791201 h 5791201"/>
+              <a:gd name="connsiteX10" fmla="*/ 282706 w 8077200"/>
+              <a:gd name="connsiteY10" fmla="*/ 5508494 h 5791201"/>
+              <a:gd name="connsiteX11" fmla="*/ 0 w 8077200"/>
+              <a:gd name="connsiteY11" fmla="*/ 4825981 h 5791201"/>
+              <a:gd name="connsiteX12" fmla="*/ 0 w 8077200"/>
+              <a:gd name="connsiteY12" fmla="*/ 609601 h 5791201"/>
+              <a:gd name="connsiteX0" fmla="*/ 0 w 8077200"/>
+              <a:gd name="connsiteY0" fmla="*/ 609600 h 5791200"/>
+              <a:gd name="connsiteX1" fmla="*/ 152400 w 8077200"/>
+              <a:gd name="connsiteY1" fmla="*/ 152401 h 5791200"/>
+              <a:gd name="connsiteX2" fmla="*/ 533400 w 8077200"/>
+              <a:gd name="connsiteY2" fmla="*/ 1 h 5791200"/>
+              <a:gd name="connsiteX3" fmla="*/ 7111981 w 8077200"/>
+              <a:gd name="connsiteY3" fmla="*/ 0 h 5791200"/>
+              <a:gd name="connsiteX4" fmla="*/ 7794494 w 8077200"/>
+              <a:gd name="connsiteY4" fmla="*/ 282707 h 5791200"/>
+              <a:gd name="connsiteX5" fmla="*/ 8077199 w 8077200"/>
+              <a:gd name="connsiteY5" fmla="*/ 965221 h 5791200"/>
+              <a:gd name="connsiteX6" fmla="*/ 8077200 w 8077200"/>
+              <a:gd name="connsiteY6" fmla="*/ 4825981 h 5791200"/>
+              <a:gd name="connsiteX7" fmla="*/ 7794494 w 8077200"/>
+              <a:gd name="connsiteY7" fmla="*/ 5508494 h 5791200"/>
+              <a:gd name="connsiteX8" fmla="*/ 7111981 w 8077200"/>
+              <a:gd name="connsiteY8" fmla="*/ 5791200 h 5791200"/>
+              <a:gd name="connsiteX9" fmla="*/ 965219 w 8077200"/>
+              <a:gd name="connsiteY9" fmla="*/ 5791200 h 5791200"/>
+              <a:gd name="connsiteX10" fmla="*/ 282706 w 8077200"/>
+              <a:gd name="connsiteY10" fmla="*/ 5508493 h 5791200"/>
+              <a:gd name="connsiteX11" fmla="*/ 0 w 8077200"/>
+              <a:gd name="connsiteY11" fmla="*/ 4825980 h 5791200"/>
+              <a:gd name="connsiteX12" fmla="*/ 0 w 8077200"/>
+              <a:gd name="connsiteY12" fmla="*/ 609600 h 5791200"/>
+              <a:gd name="connsiteX0" fmla="*/ 0 w 8077200"/>
+              <a:gd name="connsiteY0" fmla="*/ 533400 h 5791200"/>
+              <a:gd name="connsiteX1" fmla="*/ 152400 w 8077200"/>
+              <a:gd name="connsiteY1" fmla="*/ 152401 h 5791200"/>
+              <a:gd name="connsiteX2" fmla="*/ 533400 w 8077200"/>
+              <a:gd name="connsiteY2" fmla="*/ 1 h 5791200"/>
+              <a:gd name="connsiteX3" fmla="*/ 7111981 w 8077200"/>
+              <a:gd name="connsiteY3" fmla="*/ 0 h 5791200"/>
+              <a:gd name="connsiteX4" fmla="*/ 7794494 w 8077200"/>
+              <a:gd name="connsiteY4" fmla="*/ 282707 h 5791200"/>
+              <a:gd name="connsiteX5" fmla="*/ 8077199 w 8077200"/>
+              <a:gd name="connsiteY5" fmla="*/ 965221 h 5791200"/>
+              <a:gd name="connsiteX6" fmla="*/ 8077200 w 8077200"/>
+              <a:gd name="connsiteY6" fmla="*/ 4825981 h 5791200"/>
+              <a:gd name="connsiteX7" fmla="*/ 7794494 w 8077200"/>
+              <a:gd name="connsiteY7" fmla="*/ 5508494 h 5791200"/>
+              <a:gd name="connsiteX8" fmla="*/ 7111981 w 8077200"/>
+              <a:gd name="connsiteY8" fmla="*/ 5791200 h 5791200"/>
+              <a:gd name="connsiteX9" fmla="*/ 965219 w 8077200"/>
+              <a:gd name="connsiteY9" fmla="*/ 5791200 h 5791200"/>
+              <a:gd name="connsiteX10" fmla="*/ 282706 w 8077200"/>
+              <a:gd name="connsiteY10" fmla="*/ 5508493 h 5791200"/>
+              <a:gd name="connsiteX11" fmla="*/ 0 w 8077200"/>
+              <a:gd name="connsiteY11" fmla="*/ 4825980 h 5791200"/>
+              <a:gd name="connsiteX12" fmla="*/ 0 w 8077200"/>
+              <a:gd name="connsiteY12" fmla="*/ 533400 h 5791200"/>
+              <a:gd name="connsiteX0" fmla="*/ 12700 w 8089900"/>
+              <a:gd name="connsiteY0" fmla="*/ 546100 h 5803900"/>
+              <a:gd name="connsiteX1" fmla="*/ 88900 w 8089900"/>
+              <a:gd name="connsiteY1" fmla="*/ 88900 h 5803900"/>
+              <a:gd name="connsiteX2" fmla="*/ 546100 w 8089900"/>
+              <a:gd name="connsiteY2" fmla="*/ 12701 h 5803900"/>
+              <a:gd name="connsiteX3" fmla="*/ 7124681 w 8089900"/>
+              <a:gd name="connsiteY3" fmla="*/ 12700 h 5803900"/>
+              <a:gd name="connsiteX4" fmla="*/ 7807194 w 8089900"/>
+              <a:gd name="connsiteY4" fmla="*/ 295407 h 5803900"/>
+              <a:gd name="connsiteX5" fmla="*/ 8089899 w 8089900"/>
+              <a:gd name="connsiteY5" fmla="*/ 977921 h 5803900"/>
+              <a:gd name="connsiteX6" fmla="*/ 8089900 w 8089900"/>
+              <a:gd name="connsiteY6" fmla="*/ 4838681 h 5803900"/>
+              <a:gd name="connsiteX7" fmla="*/ 7807194 w 8089900"/>
+              <a:gd name="connsiteY7" fmla="*/ 5521194 h 5803900"/>
+              <a:gd name="connsiteX8" fmla="*/ 7124681 w 8089900"/>
+              <a:gd name="connsiteY8" fmla="*/ 5803900 h 5803900"/>
+              <a:gd name="connsiteX9" fmla="*/ 977919 w 8089900"/>
+              <a:gd name="connsiteY9" fmla="*/ 5803900 h 5803900"/>
+              <a:gd name="connsiteX10" fmla="*/ 295406 w 8089900"/>
+              <a:gd name="connsiteY10" fmla="*/ 5521193 h 5803900"/>
+              <a:gd name="connsiteX11" fmla="*/ 12700 w 8089900"/>
+              <a:gd name="connsiteY11" fmla="*/ 4838680 h 5803900"/>
+              <a:gd name="connsiteX12" fmla="*/ 12700 w 8089900"/>
+              <a:gd name="connsiteY12" fmla="*/ 546100 h 5803900"/>
+              <a:gd name="connsiteX0" fmla="*/ 12700 w 8089900"/>
+              <a:gd name="connsiteY0" fmla="*/ 546100 h 5803900"/>
+              <a:gd name="connsiteX1" fmla="*/ 88900 w 8089900"/>
+              <a:gd name="connsiteY1" fmla="*/ 88900 h 5803900"/>
+              <a:gd name="connsiteX2" fmla="*/ 546100 w 8089900"/>
+              <a:gd name="connsiteY2" fmla="*/ 12701 h 5803900"/>
+              <a:gd name="connsiteX3" fmla="*/ 7124681 w 8089900"/>
+              <a:gd name="connsiteY3" fmla="*/ 12700 h 5803900"/>
+              <a:gd name="connsiteX4" fmla="*/ 7807194 w 8089900"/>
+              <a:gd name="connsiteY4" fmla="*/ 295407 h 5803900"/>
+              <a:gd name="connsiteX5" fmla="*/ 8089899 w 8089900"/>
+              <a:gd name="connsiteY5" fmla="*/ 977921 h 5803900"/>
+              <a:gd name="connsiteX6" fmla="*/ 8089900 w 8089900"/>
+              <a:gd name="connsiteY6" fmla="*/ 4838681 h 5803900"/>
+              <a:gd name="connsiteX7" fmla="*/ 7807194 w 8089900"/>
+              <a:gd name="connsiteY7" fmla="*/ 5521194 h 5803900"/>
+              <a:gd name="connsiteX8" fmla="*/ 7124681 w 8089900"/>
+              <a:gd name="connsiteY8" fmla="*/ 5803900 h 5803900"/>
+              <a:gd name="connsiteX9" fmla="*/ 977919 w 8089900"/>
+              <a:gd name="connsiteY9" fmla="*/ 5803900 h 5803900"/>
+              <a:gd name="connsiteX10" fmla="*/ 295406 w 8089900"/>
+              <a:gd name="connsiteY10" fmla="*/ 5521193 h 5803900"/>
+              <a:gd name="connsiteX11" fmla="*/ 12700 w 8089900"/>
+              <a:gd name="connsiteY11" fmla="*/ 5346700 h 5803900"/>
+              <a:gd name="connsiteX12" fmla="*/ 12700 w 8089900"/>
+              <a:gd name="connsiteY12" fmla="*/ 546100 h 5803900"/>
+              <a:gd name="connsiteX0" fmla="*/ 12700 w 8089900"/>
+              <a:gd name="connsiteY0" fmla="*/ 546100 h 5803900"/>
+              <a:gd name="connsiteX1" fmla="*/ 88900 w 8089900"/>
+              <a:gd name="connsiteY1" fmla="*/ 88900 h 5803900"/>
+              <a:gd name="connsiteX2" fmla="*/ 546100 w 8089900"/>
+              <a:gd name="connsiteY2" fmla="*/ 12701 h 5803900"/>
+              <a:gd name="connsiteX3" fmla="*/ 7124681 w 8089900"/>
+              <a:gd name="connsiteY3" fmla="*/ 12700 h 5803900"/>
+              <a:gd name="connsiteX4" fmla="*/ 7807194 w 8089900"/>
+              <a:gd name="connsiteY4" fmla="*/ 295407 h 5803900"/>
+              <a:gd name="connsiteX5" fmla="*/ 8089899 w 8089900"/>
+              <a:gd name="connsiteY5" fmla="*/ 977921 h 5803900"/>
+              <a:gd name="connsiteX6" fmla="*/ 8089900 w 8089900"/>
+              <a:gd name="connsiteY6" fmla="*/ 4838681 h 5803900"/>
+              <a:gd name="connsiteX7" fmla="*/ 7807194 w 8089900"/>
+              <a:gd name="connsiteY7" fmla="*/ 5521194 h 5803900"/>
+              <a:gd name="connsiteX8" fmla="*/ 7124681 w 8089900"/>
+              <a:gd name="connsiteY8" fmla="*/ 5803900 h 5803900"/>
+              <a:gd name="connsiteX9" fmla="*/ 546100 w 8089900"/>
+              <a:gd name="connsiteY9" fmla="*/ 5803900 h 5803900"/>
+              <a:gd name="connsiteX10" fmla="*/ 295406 w 8089900"/>
+              <a:gd name="connsiteY10" fmla="*/ 5521193 h 5803900"/>
+              <a:gd name="connsiteX11" fmla="*/ 12700 w 8089900"/>
+              <a:gd name="connsiteY11" fmla="*/ 5346700 h 5803900"/>
+              <a:gd name="connsiteX12" fmla="*/ 12700 w 8089900"/>
+              <a:gd name="connsiteY12" fmla="*/ 546100 h 5803900"/>
+              <a:gd name="connsiteX0" fmla="*/ 12700 w 8089900"/>
+              <a:gd name="connsiteY0" fmla="*/ 546100 h 5803900"/>
+              <a:gd name="connsiteX1" fmla="*/ 88900 w 8089900"/>
+              <a:gd name="connsiteY1" fmla="*/ 88900 h 5803900"/>
+              <a:gd name="connsiteX2" fmla="*/ 546100 w 8089900"/>
+              <a:gd name="connsiteY2" fmla="*/ 12701 h 5803900"/>
+              <a:gd name="connsiteX3" fmla="*/ 7124681 w 8089900"/>
+              <a:gd name="connsiteY3" fmla="*/ 12700 h 5803900"/>
+              <a:gd name="connsiteX4" fmla="*/ 7807194 w 8089900"/>
+              <a:gd name="connsiteY4" fmla="*/ 295407 h 5803900"/>
+              <a:gd name="connsiteX5" fmla="*/ 8089899 w 8089900"/>
+              <a:gd name="connsiteY5" fmla="*/ 977921 h 5803900"/>
+              <a:gd name="connsiteX6" fmla="*/ 8089900 w 8089900"/>
+              <a:gd name="connsiteY6" fmla="*/ 4838681 h 5803900"/>
+              <a:gd name="connsiteX7" fmla="*/ 7807194 w 8089900"/>
+              <a:gd name="connsiteY7" fmla="*/ 5521194 h 5803900"/>
+              <a:gd name="connsiteX8" fmla="*/ 7124681 w 8089900"/>
+              <a:gd name="connsiteY8" fmla="*/ 5803900 h 5803900"/>
+              <a:gd name="connsiteX9" fmla="*/ 546100 w 8089900"/>
+              <a:gd name="connsiteY9" fmla="*/ 5803900 h 5803900"/>
+              <a:gd name="connsiteX10" fmla="*/ 88900 w 8089900"/>
+              <a:gd name="connsiteY10" fmla="*/ 5727700 h 5803900"/>
+              <a:gd name="connsiteX11" fmla="*/ 12700 w 8089900"/>
+              <a:gd name="connsiteY11" fmla="*/ 5346700 h 5803900"/>
+              <a:gd name="connsiteX12" fmla="*/ 12700 w 8089900"/>
+              <a:gd name="connsiteY12" fmla="*/ 546100 h 5803900"/>
+              <a:gd name="connsiteX0" fmla="*/ 12700 w 8089900"/>
+              <a:gd name="connsiteY0" fmla="*/ 546100 h 5803900"/>
+              <a:gd name="connsiteX1" fmla="*/ 88900 w 8089900"/>
+              <a:gd name="connsiteY1" fmla="*/ 88900 h 5803900"/>
+              <a:gd name="connsiteX2" fmla="*/ 546100 w 8089900"/>
+              <a:gd name="connsiteY2" fmla="*/ 12701 h 5803900"/>
+              <a:gd name="connsiteX3" fmla="*/ 7556500 w 8089900"/>
+              <a:gd name="connsiteY3" fmla="*/ 12700 h 5803900"/>
+              <a:gd name="connsiteX4" fmla="*/ 7807194 w 8089900"/>
+              <a:gd name="connsiteY4" fmla="*/ 295407 h 5803900"/>
+              <a:gd name="connsiteX5" fmla="*/ 8089899 w 8089900"/>
+              <a:gd name="connsiteY5" fmla="*/ 977921 h 5803900"/>
+              <a:gd name="connsiteX6" fmla="*/ 8089900 w 8089900"/>
+              <a:gd name="connsiteY6" fmla="*/ 4838681 h 5803900"/>
+              <a:gd name="connsiteX7" fmla="*/ 7807194 w 8089900"/>
+              <a:gd name="connsiteY7" fmla="*/ 5521194 h 5803900"/>
+              <a:gd name="connsiteX8" fmla="*/ 7124681 w 8089900"/>
+              <a:gd name="connsiteY8" fmla="*/ 5803900 h 5803900"/>
+              <a:gd name="connsiteX9" fmla="*/ 546100 w 8089900"/>
+              <a:gd name="connsiteY9" fmla="*/ 5803900 h 5803900"/>
+              <a:gd name="connsiteX10" fmla="*/ 88900 w 8089900"/>
+              <a:gd name="connsiteY10" fmla="*/ 5727700 h 5803900"/>
+              <a:gd name="connsiteX11" fmla="*/ 12700 w 8089900"/>
+              <a:gd name="connsiteY11" fmla="*/ 5346700 h 5803900"/>
+              <a:gd name="connsiteX12" fmla="*/ 12700 w 8089900"/>
+              <a:gd name="connsiteY12" fmla="*/ 546100 h 5803900"/>
+              <a:gd name="connsiteX0" fmla="*/ 12700 w 8089901"/>
+              <a:gd name="connsiteY0" fmla="*/ 546100 h 5803900"/>
+              <a:gd name="connsiteX1" fmla="*/ 88900 w 8089901"/>
+              <a:gd name="connsiteY1" fmla="*/ 88900 h 5803900"/>
+              <a:gd name="connsiteX2" fmla="*/ 546100 w 8089901"/>
+              <a:gd name="connsiteY2" fmla="*/ 12701 h 5803900"/>
+              <a:gd name="connsiteX3" fmla="*/ 7556500 w 8089901"/>
+              <a:gd name="connsiteY3" fmla="*/ 12700 h 5803900"/>
+              <a:gd name="connsiteX4" fmla="*/ 7807194 w 8089901"/>
+              <a:gd name="connsiteY4" fmla="*/ 295407 h 5803900"/>
+              <a:gd name="connsiteX5" fmla="*/ 8089900 w 8089901"/>
+              <a:gd name="connsiteY5" fmla="*/ 469900 h 5803900"/>
+              <a:gd name="connsiteX6" fmla="*/ 8089900 w 8089901"/>
+              <a:gd name="connsiteY6" fmla="*/ 4838681 h 5803900"/>
+              <a:gd name="connsiteX7" fmla="*/ 7807194 w 8089901"/>
+              <a:gd name="connsiteY7" fmla="*/ 5521194 h 5803900"/>
+              <a:gd name="connsiteX8" fmla="*/ 7124681 w 8089901"/>
+              <a:gd name="connsiteY8" fmla="*/ 5803900 h 5803900"/>
+              <a:gd name="connsiteX9" fmla="*/ 546100 w 8089901"/>
+              <a:gd name="connsiteY9" fmla="*/ 5803900 h 5803900"/>
+              <a:gd name="connsiteX10" fmla="*/ 88900 w 8089901"/>
+              <a:gd name="connsiteY10" fmla="*/ 5727700 h 5803900"/>
+              <a:gd name="connsiteX11" fmla="*/ 12700 w 8089901"/>
+              <a:gd name="connsiteY11" fmla="*/ 5346700 h 5803900"/>
+              <a:gd name="connsiteX12" fmla="*/ 12700 w 8089901"/>
+              <a:gd name="connsiteY12" fmla="*/ 546100 h 5803900"/>
+              <a:gd name="connsiteX0" fmla="*/ 12700 w 8102600"/>
+              <a:gd name="connsiteY0" fmla="*/ 546100 h 5803900"/>
+              <a:gd name="connsiteX1" fmla="*/ 88900 w 8102600"/>
+              <a:gd name="connsiteY1" fmla="*/ 88900 h 5803900"/>
+              <a:gd name="connsiteX2" fmla="*/ 546100 w 8102600"/>
+              <a:gd name="connsiteY2" fmla="*/ 12701 h 5803900"/>
+              <a:gd name="connsiteX3" fmla="*/ 7556500 w 8102600"/>
+              <a:gd name="connsiteY3" fmla="*/ 12700 h 5803900"/>
+              <a:gd name="connsiteX4" fmla="*/ 8013700 w 8102600"/>
+              <a:gd name="connsiteY4" fmla="*/ 88900 h 5803900"/>
+              <a:gd name="connsiteX5" fmla="*/ 8089900 w 8102600"/>
+              <a:gd name="connsiteY5" fmla="*/ 469900 h 5803900"/>
+              <a:gd name="connsiteX6" fmla="*/ 8089900 w 8102600"/>
+              <a:gd name="connsiteY6" fmla="*/ 4838681 h 5803900"/>
+              <a:gd name="connsiteX7" fmla="*/ 7807194 w 8102600"/>
+              <a:gd name="connsiteY7" fmla="*/ 5521194 h 5803900"/>
+              <a:gd name="connsiteX8" fmla="*/ 7124681 w 8102600"/>
+              <a:gd name="connsiteY8" fmla="*/ 5803900 h 5803900"/>
+              <a:gd name="connsiteX9" fmla="*/ 546100 w 8102600"/>
+              <a:gd name="connsiteY9" fmla="*/ 5803900 h 5803900"/>
+              <a:gd name="connsiteX10" fmla="*/ 88900 w 8102600"/>
+              <a:gd name="connsiteY10" fmla="*/ 5727700 h 5803900"/>
+              <a:gd name="connsiteX11" fmla="*/ 12700 w 8102600"/>
+              <a:gd name="connsiteY11" fmla="*/ 5346700 h 5803900"/>
+              <a:gd name="connsiteX12" fmla="*/ 12700 w 8102600"/>
+              <a:gd name="connsiteY12" fmla="*/ 546100 h 5803900"/>
+              <a:gd name="connsiteX0" fmla="*/ 12700 w 8102600"/>
+              <a:gd name="connsiteY0" fmla="*/ 546100 h 5803900"/>
+              <a:gd name="connsiteX1" fmla="*/ 88900 w 8102600"/>
+              <a:gd name="connsiteY1" fmla="*/ 88900 h 5803900"/>
+              <a:gd name="connsiteX2" fmla="*/ 546100 w 8102600"/>
+              <a:gd name="connsiteY2" fmla="*/ 12701 h 5803900"/>
+              <a:gd name="connsiteX3" fmla="*/ 7556500 w 8102600"/>
+              <a:gd name="connsiteY3" fmla="*/ 12700 h 5803900"/>
+              <a:gd name="connsiteX4" fmla="*/ 8013700 w 8102600"/>
+              <a:gd name="connsiteY4" fmla="*/ 88900 h 5803900"/>
+              <a:gd name="connsiteX5" fmla="*/ 8089899 w 8102600"/>
+              <a:gd name="connsiteY5" fmla="*/ 469900 h 5803900"/>
+              <a:gd name="connsiteX6" fmla="*/ 8089900 w 8102600"/>
+              <a:gd name="connsiteY6" fmla="*/ 4838681 h 5803900"/>
+              <a:gd name="connsiteX7" fmla="*/ 7807194 w 8102600"/>
+              <a:gd name="connsiteY7" fmla="*/ 5521194 h 5803900"/>
+              <a:gd name="connsiteX8" fmla="*/ 7124681 w 8102600"/>
+              <a:gd name="connsiteY8" fmla="*/ 5803900 h 5803900"/>
+              <a:gd name="connsiteX9" fmla="*/ 546100 w 8102600"/>
+              <a:gd name="connsiteY9" fmla="*/ 5803900 h 5803900"/>
+              <a:gd name="connsiteX10" fmla="*/ 88900 w 8102600"/>
+              <a:gd name="connsiteY10" fmla="*/ 5727700 h 5803900"/>
+              <a:gd name="connsiteX11" fmla="*/ 12700 w 8102600"/>
+              <a:gd name="connsiteY11" fmla="*/ 5346700 h 5803900"/>
+              <a:gd name="connsiteX12" fmla="*/ 12700 w 8102600"/>
+              <a:gd name="connsiteY12" fmla="*/ 546100 h 5803900"/>
+              <a:gd name="connsiteX0" fmla="*/ 12700 w 8102599"/>
+              <a:gd name="connsiteY0" fmla="*/ 546100 h 5803900"/>
+              <a:gd name="connsiteX1" fmla="*/ 88900 w 8102599"/>
+              <a:gd name="connsiteY1" fmla="*/ 88900 h 5803900"/>
+              <a:gd name="connsiteX2" fmla="*/ 546100 w 8102599"/>
+              <a:gd name="connsiteY2" fmla="*/ 12701 h 5803900"/>
+              <a:gd name="connsiteX3" fmla="*/ 7556500 w 8102599"/>
+              <a:gd name="connsiteY3" fmla="*/ 12700 h 5803900"/>
+              <a:gd name="connsiteX4" fmla="*/ 8013699 w 8102599"/>
+              <a:gd name="connsiteY4" fmla="*/ 88900 h 5803900"/>
+              <a:gd name="connsiteX5" fmla="*/ 8089899 w 8102599"/>
+              <a:gd name="connsiteY5" fmla="*/ 469900 h 5803900"/>
+              <a:gd name="connsiteX6" fmla="*/ 8089900 w 8102599"/>
+              <a:gd name="connsiteY6" fmla="*/ 4838681 h 5803900"/>
+              <a:gd name="connsiteX7" fmla="*/ 7807194 w 8102599"/>
+              <a:gd name="connsiteY7" fmla="*/ 5521194 h 5803900"/>
+              <a:gd name="connsiteX8" fmla="*/ 7124681 w 8102599"/>
+              <a:gd name="connsiteY8" fmla="*/ 5803900 h 5803900"/>
+              <a:gd name="connsiteX9" fmla="*/ 546100 w 8102599"/>
+              <a:gd name="connsiteY9" fmla="*/ 5803900 h 5803900"/>
+              <a:gd name="connsiteX10" fmla="*/ 88900 w 8102599"/>
+              <a:gd name="connsiteY10" fmla="*/ 5727700 h 5803900"/>
+              <a:gd name="connsiteX11" fmla="*/ 12700 w 8102599"/>
+              <a:gd name="connsiteY11" fmla="*/ 5346700 h 5803900"/>
+              <a:gd name="connsiteX12" fmla="*/ 12700 w 8102599"/>
+              <a:gd name="connsiteY12" fmla="*/ 546100 h 5803900"/>
+              <a:gd name="connsiteX0" fmla="*/ 12700 w 8102599"/>
+              <a:gd name="connsiteY0" fmla="*/ 546100 h 5803900"/>
+              <a:gd name="connsiteX1" fmla="*/ 88900 w 8102599"/>
+              <a:gd name="connsiteY1" fmla="*/ 88900 h 5803900"/>
+              <a:gd name="connsiteX2" fmla="*/ 546100 w 8102599"/>
+              <a:gd name="connsiteY2" fmla="*/ 12701 h 5803900"/>
+              <a:gd name="connsiteX3" fmla="*/ 7556500 w 8102599"/>
+              <a:gd name="connsiteY3" fmla="*/ 12700 h 5803900"/>
+              <a:gd name="connsiteX4" fmla="*/ 8013699 w 8102599"/>
+              <a:gd name="connsiteY4" fmla="*/ 88900 h 5803900"/>
+              <a:gd name="connsiteX5" fmla="*/ 8089899 w 8102599"/>
+              <a:gd name="connsiteY5" fmla="*/ 469900 h 5803900"/>
+              <a:gd name="connsiteX6" fmla="*/ 8089900 w 8102599"/>
+              <a:gd name="connsiteY6" fmla="*/ 5346700 h 5803900"/>
+              <a:gd name="connsiteX7" fmla="*/ 7807194 w 8102599"/>
+              <a:gd name="connsiteY7" fmla="*/ 5521194 h 5803900"/>
+              <a:gd name="connsiteX8" fmla="*/ 7124681 w 8102599"/>
+              <a:gd name="connsiteY8" fmla="*/ 5803900 h 5803900"/>
+              <a:gd name="connsiteX9" fmla="*/ 546100 w 8102599"/>
+              <a:gd name="connsiteY9" fmla="*/ 5803900 h 5803900"/>
+              <a:gd name="connsiteX10" fmla="*/ 88900 w 8102599"/>
+              <a:gd name="connsiteY10" fmla="*/ 5727700 h 5803900"/>
+              <a:gd name="connsiteX11" fmla="*/ 12700 w 8102599"/>
+              <a:gd name="connsiteY11" fmla="*/ 5346700 h 5803900"/>
+              <a:gd name="connsiteX12" fmla="*/ 12700 w 8102599"/>
+              <a:gd name="connsiteY12" fmla="*/ 546100 h 5803900"/>
+              <a:gd name="connsiteX0" fmla="*/ 12700 w 8102599"/>
+              <a:gd name="connsiteY0" fmla="*/ 546100 h 5803900"/>
+              <a:gd name="connsiteX1" fmla="*/ 88900 w 8102599"/>
+              <a:gd name="connsiteY1" fmla="*/ 88900 h 5803900"/>
+              <a:gd name="connsiteX2" fmla="*/ 546100 w 8102599"/>
+              <a:gd name="connsiteY2" fmla="*/ 12701 h 5803900"/>
+              <a:gd name="connsiteX3" fmla="*/ 7556500 w 8102599"/>
+              <a:gd name="connsiteY3" fmla="*/ 12700 h 5803900"/>
+              <a:gd name="connsiteX4" fmla="*/ 8013699 w 8102599"/>
+              <a:gd name="connsiteY4" fmla="*/ 88900 h 5803900"/>
+              <a:gd name="connsiteX5" fmla="*/ 8089899 w 8102599"/>
+              <a:gd name="connsiteY5" fmla="*/ 469900 h 5803900"/>
+              <a:gd name="connsiteX6" fmla="*/ 8089900 w 8102599"/>
+              <a:gd name="connsiteY6" fmla="*/ 5346700 h 5803900"/>
+              <a:gd name="connsiteX7" fmla="*/ 7807194 w 8102599"/>
+              <a:gd name="connsiteY7" fmla="*/ 5521194 h 5803900"/>
+              <a:gd name="connsiteX8" fmla="*/ 7632700 w 8102599"/>
+              <a:gd name="connsiteY8" fmla="*/ 5803900 h 5803900"/>
+              <a:gd name="connsiteX9" fmla="*/ 546100 w 8102599"/>
+              <a:gd name="connsiteY9" fmla="*/ 5803900 h 5803900"/>
+              <a:gd name="connsiteX10" fmla="*/ 88900 w 8102599"/>
+              <a:gd name="connsiteY10" fmla="*/ 5727700 h 5803900"/>
+              <a:gd name="connsiteX11" fmla="*/ 12700 w 8102599"/>
+              <a:gd name="connsiteY11" fmla="*/ 5346700 h 5803900"/>
+              <a:gd name="connsiteX12" fmla="*/ 12700 w 8102599"/>
+              <a:gd name="connsiteY12" fmla="*/ 546100 h 5803900"/>
+              <a:gd name="connsiteX0" fmla="*/ 12700 w 8102599"/>
+              <a:gd name="connsiteY0" fmla="*/ 546100 h 5803900"/>
+              <a:gd name="connsiteX1" fmla="*/ 88900 w 8102599"/>
+              <a:gd name="connsiteY1" fmla="*/ 88900 h 5803900"/>
+              <a:gd name="connsiteX2" fmla="*/ 546100 w 8102599"/>
+              <a:gd name="connsiteY2" fmla="*/ 12701 h 5803900"/>
+              <a:gd name="connsiteX3" fmla="*/ 7556500 w 8102599"/>
+              <a:gd name="connsiteY3" fmla="*/ 12700 h 5803900"/>
+              <a:gd name="connsiteX4" fmla="*/ 8013699 w 8102599"/>
+              <a:gd name="connsiteY4" fmla="*/ 88900 h 5803900"/>
+              <a:gd name="connsiteX5" fmla="*/ 8089899 w 8102599"/>
+              <a:gd name="connsiteY5" fmla="*/ 469900 h 5803900"/>
+              <a:gd name="connsiteX6" fmla="*/ 8089900 w 8102599"/>
+              <a:gd name="connsiteY6" fmla="*/ 5346700 h 5803900"/>
+              <a:gd name="connsiteX7" fmla="*/ 8013700 w 8102599"/>
+              <a:gd name="connsiteY7" fmla="*/ 5727700 h 5803900"/>
+              <a:gd name="connsiteX8" fmla="*/ 7632700 w 8102599"/>
+              <a:gd name="connsiteY8" fmla="*/ 5803900 h 5803900"/>
+              <a:gd name="connsiteX9" fmla="*/ 546100 w 8102599"/>
+              <a:gd name="connsiteY9" fmla="*/ 5803900 h 5803900"/>
+              <a:gd name="connsiteX10" fmla="*/ 88900 w 8102599"/>
+              <a:gd name="connsiteY10" fmla="*/ 5727700 h 5803900"/>
+              <a:gd name="connsiteX11" fmla="*/ 12700 w 8102599"/>
+              <a:gd name="connsiteY11" fmla="*/ 5346700 h 5803900"/>
+              <a:gd name="connsiteX12" fmla="*/ 12700 w 8102599"/>
+              <a:gd name="connsiteY12" fmla="*/ 546100 h 5803900"/>
+            </a:gdLst>
+            <a:ahLst/>
+            <a:cxnLst>
+              <a:cxn ang="0">
+                <a:pos x="connsiteX0" y="connsiteY0"/>
+              </a:cxn>
+              <a:cxn ang="0">
+                <a:pos x="connsiteX1" y="connsiteY1"/>
+              </a:cxn>
+              <a:cxn ang="0">
+                <a:pos x="connsiteX2" y="connsiteY2"/>
+              </a:cxn>
+              <a:cxn ang="0">
+                <a:pos x="connsiteX3" y="connsiteY3"/>
+              </a:cxn>
+              <a:cxn ang="0">
+                <a:pos x="connsiteX4" y="connsiteY4"/>
+              </a:cxn>
+              <a:cxn ang="0">
+                <a:pos x="connsiteX5" y="connsiteY5"/>
+              </a:cxn>
+              <a:cxn ang="0">
+                <a:pos x="connsiteX6" y="connsiteY6"/>
+              </a:cxn>
+              <a:cxn ang="0">
+                <a:pos x="connsiteX7" y="connsiteY7"/>
+              </a:cxn>
+              <a:cxn ang="0">
+                <a:pos x="connsiteX8" y="connsiteY8"/>
+              </a:cxn>
+              <a:cxn ang="0">
+                <a:pos x="connsiteX9" y="connsiteY9"/>
+              </a:cxn>
+              <a:cxn ang="0">
+                <a:pos x="connsiteX10" y="connsiteY10"/>
+              </a:cxn>
+              <a:cxn ang="0">
+                <a:pos x="connsiteX11" y="connsiteY11"/>
+              </a:cxn>
+              <a:cxn ang="0">
+                <a:pos x="connsiteX12" y="connsiteY12"/>
+              </a:cxn>
+            </a:cxnLst>
+            <a:rect l="l" t="t" r="r" b="b"/>
+            <a:pathLst>
+              <a:path w="8102599" h="5803900">
+                <a:moveTo>
+                  <a:pt x="12700" y="546100"/>
+                </a:moveTo>
+                <a:cubicBezTo>
+                  <a:pt x="12700" y="290108"/>
+                  <a:pt x="0" y="177800"/>
+                  <a:pt x="88900" y="88900"/>
+                </a:cubicBezTo>
+                <a:cubicBezTo>
+                  <a:pt x="177800" y="0"/>
+                  <a:pt x="290107" y="12700"/>
+                  <a:pt x="546100" y="12701"/>
+                </a:cubicBezTo>
+                <a:lnTo>
+                  <a:pt x="7556500" y="12700"/>
+                </a:lnTo>
+                <a:cubicBezTo>
+                  <a:pt x="7812492" y="12700"/>
+                  <a:pt x="7924799" y="12700"/>
+                  <a:pt x="8013699" y="88900"/>
+                </a:cubicBezTo>
+                <a:cubicBezTo>
+                  <a:pt x="8102599" y="165100"/>
+                  <a:pt x="8089900" y="213907"/>
+                  <a:pt x="8089899" y="469900"/>
+                </a:cubicBezTo>
+                <a:cubicBezTo>
+                  <a:pt x="8089899" y="1926160"/>
+                  <a:pt x="8089900" y="3890440"/>
+                  <a:pt x="8089900" y="5346700"/>
+                </a:cubicBezTo>
+                <a:cubicBezTo>
+                  <a:pt x="8089900" y="5602692"/>
+                  <a:pt x="8089900" y="5651500"/>
+                  <a:pt x="8013700" y="5727700"/>
+                </a:cubicBezTo>
+                <a:cubicBezTo>
+                  <a:pt x="7937500" y="5803900"/>
+                  <a:pt x="7888692" y="5803900"/>
+                  <a:pt x="7632700" y="5803900"/>
+                </a:cubicBezTo>
+                <a:lnTo>
+                  <a:pt x="546100" y="5803900"/>
+                </a:lnTo>
+                <a:cubicBezTo>
+                  <a:pt x="290108" y="5803900"/>
+                  <a:pt x="177800" y="5803900"/>
+                  <a:pt x="88900" y="5727700"/>
+                </a:cubicBezTo>
+                <a:cubicBezTo>
+                  <a:pt x="0" y="5651500"/>
+                  <a:pt x="12700" y="5602692"/>
+                  <a:pt x="12700" y="5346700"/>
+                </a:cubicBezTo>
+                <a:lnTo>
+                  <a:pt x="12700" y="546100"/>
+                </a:lnTo>
+                <a:close/>
+              </a:path>
+            </a:pathLst>
+          </a:custGeom>
+          <a:gradFill>
+            <a:gsLst>
+              <a:gs pos="0">
+                <a:schemeClr val="bg1">
+                  <a:lumMod val="50000"/>
+                </a:schemeClr>
+              </a:gs>
+              <a:gs pos="39999">
+                <a:schemeClr val="bg1">
+                  <a:lumMod val="65000"/>
+                </a:schemeClr>
+              </a:gs>
+              <a:gs pos="70000">
+                <a:schemeClr val="bg1">
+                  <a:lumMod val="50000"/>
+                  <a:alpha val="73000"/>
+                </a:schemeClr>
+              </a:gs>
+            </a:gsLst>
+            <a:lin ang="5400000" scaled="0"/>
+          </a:gradFill>
+          <a:ln>
+            <a:solidFill>
+              <a:schemeClr val="bg1">
+                <a:lumMod val="75000"/>
+              </a:schemeClr>
+            </a:solidFill>
+          </a:ln>
+        </p:spPr>
+        <p:style>
+          <a:lnRef idx="2">
+            <a:schemeClr val="accent1">
+              <a:shade val="50000"/>
+            </a:schemeClr>
+          </a:lnRef>
+          <a:fillRef idx="1">
+            <a:schemeClr val="accent1"/>
+          </a:fillRef>
+          <a:effectRef idx="0">
+            <a:schemeClr val="accent1"/>
+          </a:effectRef>
+          <a:fontRef idx="minor">
+            <a:schemeClr val="lt1"/>
+          </a:fontRef>
+        </p:style>
+        <p:txBody>
+          <a:bodyPr rtlCol="0" anchor="ctr"/>
+          <a:lstStyle/>
+          <a:p>
+            <a:pPr fontAlgn="t"/>
+            <a:endParaRPr lang="es-AR" b="1" dirty="0" smtClean="0"/>
+          </a:p>
+          <a:p>
+            <a:pPr algn="ctr"/>
+            <a:endParaRPr lang="es-AR" dirty="0"/>
+          </a:p>
+        </p:txBody>
+      </p:sp>
+      <p:sp>
+        <p:nvSpPr>
+          <p:cNvPr id="14" name="Rectangle 13"/>
+          <p:cNvSpPr/>
+          <p:nvPr/>
+        </p:nvSpPr>
+        <p:spPr>
+          <a:xfrm>
+            <a:off x="381000" y="1295400"/>
+            <a:ext cx="8458200" cy="1066800"/>
+          </a:xfrm>
+          <a:prstGeom prst="rect">
+            <a:avLst/>
+          </a:prstGeom>
+          <a:noFill/>
+          <a:ln>
+            <a:noFill/>
+          </a:ln>
+        </p:spPr>
+        <p:style>
+          <a:lnRef idx="2">
+            <a:schemeClr val="accent1">
+              <a:shade val="50000"/>
+            </a:schemeClr>
+          </a:lnRef>
+          <a:fillRef idx="1">
+            <a:schemeClr val="accent1"/>
+          </a:fillRef>
+          <a:effectRef idx="0">
+            <a:schemeClr val="accent1"/>
+          </a:effectRef>
+          <a:fontRef idx="minor">
+            <a:schemeClr val="lt1"/>
+          </a:fontRef>
+        </p:style>
+        <p:txBody>
+          <a:bodyPr rtlCol="0" anchor="ctr"/>
+          <a:lstStyle/>
+          <a:p>
+            <a:pPr algn="ctr"/>
+            <a:r>
+              <a:rPr lang="es-AR" sz="4800" b="1" dirty="0" smtClean="0"/>
+              <a:t>Seguridad</a:t>
+            </a:r>
+          </a:p>
+          <a:p>
+            <a:pPr algn="ctr"/>
+            <a:endParaRPr lang="es-AR" sz="1200" dirty="0"/>
+          </a:p>
+        </p:txBody>
+      </p:sp>
+      <p:grpSp>
+        <p:nvGrpSpPr>
+          <p:cNvPr id="3" name="Group 14"/>
+          <p:cNvGrpSpPr/>
+          <p:nvPr/>
+        </p:nvGrpSpPr>
+        <p:grpSpPr>
+          <a:xfrm>
+            <a:off x="1295400" y="544415"/>
+            <a:ext cx="6553200" cy="903384"/>
+            <a:chOff x="1295400" y="544415"/>
+            <a:chExt cx="6553200" cy="903384"/>
+          </a:xfrm>
+        </p:grpSpPr>
+        <p:sp>
+          <p:nvSpPr>
+            <p:cNvPr id="16" name="Round Same Side Corner Rectangle 15"/>
+            <p:cNvSpPr/>
+            <p:nvPr/>
+          </p:nvSpPr>
+          <p:spPr>
+            <a:xfrm rot="10800000">
+              <a:off x="1295400" y="544415"/>
+              <a:ext cx="6553200" cy="903384"/>
+            </a:xfrm>
+            <a:prstGeom prst="round2SameRect">
+              <a:avLst/>
+            </a:prstGeom>
+          </p:spPr>
+          <p:style>
+            <a:lnRef idx="2">
+              <a:schemeClr val="dk1">
+                <a:shade val="50000"/>
+              </a:schemeClr>
+            </a:lnRef>
+            <a:fillRef idx="1">
+              <a:schemeClr val="dk1"/>
+            </a:fillRef>
+            <a:effectRef idx="0">
+              <a:schemeClr val="dk1"/>
+            </a:effectRef>
+            <a:fontRef idx="minor">
+              <a:schemeClr val="lt1"/>
+            </a:fontRef>
+          </p:style>
+          <p:txBody>
+            <a:bodyPr rtlCol="0" anchor="ctr"/>
+            <a:lstStyle/>
+            <a:p>
+              <a:pPr algn="ctr"/>
+              <a:endParaRPr lang="es-AR" dirty="0"/>
+            </a:p>
+          </p:txBody>
+        </p:sp>
+        <p:pic>
+          <p:nvPicPr>
+            <p:cNvPr id="20" name="Picture 2" descr="E:\U.B.A.Files\Materias\75.45 Taller de Desarrollo de Proyectos I\TP\Trunk\Proyecto\web\site\images\logo.png"/>
+            <p:cNvPicPr>
+              <a:picLocks noChangeAspect="1" noChangeArrowheads="1"/>
+            </p:cNvPicPr>
+            <p:nvPr/>
+          </p:nvPicPr>
+          <p:blipFill>
+            <a:blip r:embed="rId2" cstate="print"/>
+            <a:srcRect/>
+            <a:stretch>
+              <a:fillRect/>
+            </a:stretch>
+          </p:blipFill>
+          <p:spPr bwMode="auto">
+            <a:xfrm>
+              <a:off x="1600200" y="609600"/>
+              <a:ext cx="2640904" cy="762000"/>
+            </a:xfrm>
+            <a:prstGeom prst="rect">
+              <a:avLst/>
+            </a:prstGeom>
+            <a:noFill/>
+          </p:spPr>
+        </p:pic>
+        <p:sp>
+          <p:nvSpPr>
+            <p:cNvPr id="23" name="TextBox 22"/>
+            <p:cNvSpPr txBox="1"/>
+            <p:nvPr/>
+          </p:nvSpPr>
+          <p:spPr>
+            <a:xfrm>
+              <a:off x="4515457" y="685800"/>
+              <a:ext cx="3180743" cy="307777"/>
+            </a:xfrm>
+            <a:prstGeom prst="rect">
+              <a:avLst/>
+            </a:prstGeom>
+            <a:noFill/>
+          </p:spPr>
+          <p:txBody>
+            <a:bodyPr wrap="none" rtlCol="0">
+              <a:spAutoFit/>
+            </a:bodyPr>
+            <a:lstStyle/>
+            <a:p>
+              <a:r>
+                <a:rPr lang="es-AR" sz="1400" dirty="0" smtClean="0">
+                  <a:solidFill>
+                    <a:schemeClr val="bg1">
+                      <a:lumMod val="50000"/>
+                    </a:schemeClr>
+                  </a:solidFill>
+                </a:rPr>
+                <a:t>Centralización y análisis de datos</a:t>
+              </a:r>
+              <a:endParaRPr lang="es-AR" sz="1400" dirty="0">
+                <a:solidFill>
+                  <a:schemeClr val="bg1">
+                    <a:lumMod val="50000"/>
+                  </a:schemeClr>
+                </a:solidFill>
+              </a:endParaRPr>
+            </a:p>
+          </p:txBody>
+        </p:sp>
+      </p:grpSp>
+    </p:spTree>
+  </p:cSld>
+  <p:clrMapOvr>
+    <a:masterClrMapping/>
+  </p:clrMapOvr>
+</p:sld>
+</file>
+
+<file path=ppt/slides/slide8.xml><?xml version="1.0" encoding="utf-8"?>
+<p:sld xmlns:a="http://schemas.openxmlformats.org/drawingml/2006/main" xmlns:r="http://schemas.openxmlformats.org/officeDocument/2006/relationships" xmlns:p="http://schemas.openxmlformats.org/presentationml/2006/main">
+  <p:cSld>
+    <p:spTree>
+      <p:nvGrpSpPr>
+        <p:cNvPr id="1" name=""/>
+        <p:cNvGrpSpPr/>
+        <p:nvPr/>
+      </p:nvGrpSpPr>
+      <p:grpSpPr>
+        <a:xfrm>
+          <a:off x="0" y="0"/>
+          <a:ext cx="0" cy="0"/>
+          <a:chOff x="0" y="0"/>
+          <a:chExt cx="0" cy="0"/>
+        </a:xfrm>
+      </p:grpSpPr>
+      <p:grpSp>
+        <p:nvGrpSpPr>
+          <p:cNvPr id="2" name="Group 22"/>
+          <p:cNvGrpSpPr/>
+          <p:nvPr/>
+        </p:nvGrpSpPr>
+        <p:grpSpPr>
+          <a:xfrm>
+            <a:off x="304800" y="304800"/>
+            <a:ext cx="8534400" cy="6248400"/>
+            <a:chOff x="304800" y="304800"/>
+            <a:chExt cx="8534400" cy="6248400"/>
+          </a:xfrm>
+          <a:solidFill>
+            <a:schemeClr val="bg1">
+              <a:lumMod val="85000"/>
+            </a:schemeClr>
+          </a:solidFill>
+        </p:grpSpPr>
+        <p:sp>
+          <p:nvSpPr>
+            <p:cNvPr id="18" name="Rounded Rectangle 17"/>
+            <p:cNvSpPr/>
+            <p:nvPr/>
+          </p:nvSpPr>
+          <p:spPr>
+            <a:xfrm>
+              <a:off x="304800" y="304800"/>
+              <a:ext cx="8534400" cy="6248400"/>
+            </a:xfrm>
+            <a:prstGeom prst="roundRect">
+              <a:avLst/>
+            </a:prstGeom>
+            <a:grpFill/>
+            <a:ln>
+              <a:noFill/>
+            </a:ln>
+          </p:spPr>
+          <p:style>
+            <a:lnRef idx="2">
+              <a:schemeClr val="accent1">
+                <a:shade val="50000"/>
+              </a:schemeClr>
+            </a:lnRef>
+            <a:fillRef idx="1">
+              <a:schemeClr val="accent1"/>
+            </a:fillRef>
+            <a:effectRef idx="0">
+              <a:schemeClr val="accent1"/>
+            </a:effectRef>
+            <a:fontRef idx="minor">
+              <a:schemeClr val="lt1"/>
+            </a:fontRef>
+          </p:style>
+          <p:txBody>
+            <a:bodyPr rtlCol="0" anchor="ctr"/>
+            <a:lstStyle/>
+            <a:p>
+              <a:pPr algn="ctr"/>
+              <a:endParaRPr lang="es-AR"/>
+            </a:p>
+          </p:txBody>
+        </p:sp>
+        <p:sp>
+          <p:nvSpPr>
+            <p:cNvPr id="22" name="Rounded Rectangle 21"/>
+            <p:cNvSpPr/>
+            <p:nvPr/>
+          </p:nvSpPr>
+          <p:spPr>
+            <a:xfrm>
+              <a:off x="7086600" y="304800"/>
+              <a:ext cx="1752600" cy="1752600"/>
+            </a:xfrm>
+            <a:prstGeom prst="roundRect">
+              <a:avLst/>
+            </a:prstGeom>
+            <a:grpFill/>
+            <a:ln>
+              <a:noFill/>
+            </a:ln>
+          </p:spPr>
+          <p:style>
+            <a:lnRef idx="2">
+              <a:schemeClr val="accent1">
+                <a:shade val="50000"/>
+              </a:schemeClr>
+            </a:lnRef>
+            <a:fillRef idx="1">
+              <a:schemeClr val="accent1"/>
+            </a:fillRef>
+            <a:effectRef idx="0">
+              <a:schemeClr val="accent1"/>
+            </a:effectRef>
+            <a:fontRef idx="minor">
+              <a:schemeClr val="lt1"/>
+            </a:fontRef>
+          </p:style>
+          <p:txBody>
+            <a:bodyPr rtlCol="0" anchor="ctr"/>
+            <a:lstStyle/>
+            <a:p>
+              <a:pPr algn="ctr"/>
+              <a:endParaRPr lang="es-AR"/>
+            </a:p>
+          </p:txBody>
+        </p:sp>
+        <p:sp>
+          <p:nvSpPr>
+            <p:cNvPr id="21" name="Rounded Rectangle 20"/>
+            <p:cNvSpPr/>
+            <p:nvPr/>
+          </p:nvSpPr>
+          <p:spPr>
+            <a:xfrm>
+              <a:off x="304800" y="304800"/>
+              <a:ext cx="1752600" cy="1752600"/>
+            </a:xfrm>
+            <a:prstGeom prst="roundRect">
+              <a:avLst/>
+            </a:prstGeom>
+            <a:grpFill/>
+            <a:ln>
+              <a:noFill/>
+            </a:ln>
+          </p:spPr>
+          <p:style>
+            <a:lnRef idx="2">
+              <a:schemeClr val="accent1">
+                <a:shade val="50000"/>
+              </a:schemeClr>
+            </a:lnRef>
+            <a:fillRef idx="1">
+              <a:schemeClr val="accent1"/>
+            </a:fillRef>
+            <a:effectRef idx="0">
+              <a:schemeClr val="accent1"/>
+            </a:effectRef>
+            <a:fontRef idx="minor">
+              <a:schemeClr val="lt1"/>
+            </a:fontRef>
+          </p:style>
+          <p:txBody>
+            <a:bodyPr rtlCol="0" anchor="ctr"/>
+            <a:lstStyle/>
+            <a:p>
+              <a:pPr algn="ctr"/>
+              <a:endParaRPr lang="es-AR"/>
+            </a:p>
+          </p:txBody>
+        </p:sp>
+        <p:sp>
+          <p:nvSpPr>
+            <p:cNvPr id="17" name="Rounded Rectangle 16"/>
+            <p:cNvSpPr/>
+            <p:nvPr/>
+          </p:nvSpPr>
+          <p:spPr>
+            <a:xfrm>
+              <a:off x="304800" y="4800600"/>
+              <a:ext cx="1752600" cy="1752600"/>
+            </a:xfrm>
+            <a:prstGeom prst="roundRect">
+              <a:avLst/>
+            </a:prstGeom>
+            <a:grpFill/>
+            <a:ln>
+              <a:noFill/>
+            </a:ln>
+          </p:spPr>
+          <p:style>
+            <a:lnRef idx="2">
+              <a:schemeClr val="accent1">
+                <a:shade val="50000"/>
+              </a:schemeClr>
+            </a:lnRef>
+            <a:fillRef idx="1">
+              <a:schemeClr val="accent1"/>
+            </a:fillRef>
+            <a:effectRef idx="0">
+              <a:schemeClr val="accent1"/>
+            </a:effectRef>
+            <a:fontRef idx="minor">
+              <a:schemeClr val="lt1"/>
+            </a:fontRef>
+          </p:style>
+          <p:txBody>
+            <a:bodyPr rtlCol="0" anchor="ctr"/>
+            <a:lstStyle/>
+            <a:p>
+              <a:pPr algn="ctr"/>
+              <a:endParaRPr lang="es-AR"/>
+            </a:p>
+          </p:txBody>
+        </p:sp>
+        <p:sp>
+          <p:nvSpPr>
+            <p:cNvPr id="19" name="Rounded Rectangle 18"/>
+            <p:cNvSpPr/>
+            <p:nvPr/>
+          </p:nvSpPr>
+          <p:spPr>
+            <a:xfrm>
+              <a:off x="7086600" y="4800600"/>
+              <a:ext cx="1752600" cy="1752600"/>
+            </a:xfrm>
+            <a:prstGeom prst="roundRect">
+              <a:avLst/>
+            </a:prstGeom>
+            <a:grpFill/>
+            <a:ln>
+              <a:noFill/>
+            </a:ln>
+          </p:spPr>
+          <p:style>
+            <a:lnRef idx="2">
+              <a:schemeClr val="accent1">
+                <a:shade val="50000"/>
+              </a:schemeClr>
+            </a:lnRef>
+            <a:fillRef idx="1">
+              <a:schemeClr val="accent1"/>
+            </a:fillRef>
+            <a:effectRef idx="0">
+              <a:schemeClr val="accent1"/>
+            </a:effectRef>
+            <a:fontRef idx="minor">
+              <a:schemeClr val="lt1"/>
+            </a:fontRef>
+          </p:style>
+          <p:txBody>
+            <a:bodyPr rtlCol="0" anchor="ctr"/>
+            <a:lstStyle/>
+            <a:p>
+              <a:pPr algn="ctr"/>
+              <a:endParaRPr lang="es-AR"/>
+            </a:p>
+          </p:txBody>
+        </p:sp>
+      </p:grpSp>
+      <p:sp>
+        <p:nvSpPr>
+          <p:cNvPr id="40" name="Freeform 39"/>
+          <p:cNvSpPr/>
+          <p:nvPr/>
+        </p:nvSpPr>
+        <p:spPr>
+          <a:xfrm>
+            <a:off x="457200" y="457200"/>
+            <a:ext cx="8229600" cy="5803900"/>
+          </a:xfrm>
+          <a:custGeom>
+            <a:avLst/>
+            <a:gdLst>
+              <a:gd name="connsiteX0" fmla="*/ 0 w 8077200"/>
+              <a:gd name="connsiteY0" fmla="*/ 965219 h 5791200"/>
+              <a:gd name="connsiteX1" fmla="*/ 282707 w 8077200"/>
+              <a:gd name="connsiteY1" fmla="*/ 282706 h 5791200"/>
+              <a:gd name="connsiteX2" fmla="*/ 965221 w 8077200"/>
+              <a:gd name="connsiteY2" fmla="*/ 1 h 5791200"/>
+              <a:gd name="connsiteX3" fmla="*/ 7111981 w 8077200"/>
+              <a:gd name="connsiteY3" fmla="*/ 0 h 5791200"/>
+              <a:gd name="connsiteX4" fmla="*/ 7794494 w 8077200"/>
+              <a:gd name="connsiteY4" fmla="*/ 282707 h 5791200"/>
+              <a:gd name="connsiteX5" fmla="*/ 8077199 w 8077200"/>
+              <a:gd name="connsiteY5" fmla="*/ 965221 h 5791200"/>
+              <a:gd name="connsiteX6" fmla="*/ 8077200 w 8077200"/>
+              <a:gd name="connsiteY6" fmla="*/ 4825981 h 5791200"/>
+              <a:gd name="connsiteX7" fmla="*/ 7794494 w 8077200"/>
+              <a:gd name="connsiteY7" fmla="*/ 5508494 h 5791200"/>
+              <a:gd name="connsiteX8" fmla="*/ 7111981 w 8077200"/>
+              <a:gd name="connsiteY8" fmla="*/ 5791200 h 5791200"/>
+              <a:gd name="connsiteX9" fmla="*/ 965219 w 8077200"/>
+              <a:gd name="connsiteY9" fmla="*/ 5791200 h 5791200"/>
+              <a:gd name="connsiteX10" fmla="*/ 282706 w 8077200"/>
+              <a:gd name="connsiteY10" fmla="*/ 5508493 h 5791200"/>
+              <a:gd name="connsiteX11" fmla="*/ 0 w 8077200"/>
+              <a:gd name="connsiteY11" fmla="*/ 4825980 h 5791200"/>
+              <a:gd name="connsiteX12" fmla="*/ 0 w 8077200"/>
+              <a:gd name="connsiteY12" fmla="*/ 965219 h 5791200"/>
+              <a:gd name="connsiteX0" fmla="*/ 0 w 8077200"/>
+              <a:gd name="connsiteY0" fmla="*/ 609600 h 5791200"/>
+              <a:gd name="connsiteX1" fmla="*/ 282707 w 8077200"/>
+              <a:gd name="connsiteY1" fmla="*/ 282706 h 5791200"/>
+              <a:gd name="connsiteX2" fmla="*/ 965221 w 8077200"/>
+              <a:gd name="connsiteY2" fmla="*/ 1 h 5791200"/>
+              <a:gd name="connsiteX3" fmla="*/ 7111981 w 8077200"/>
+              <a:gd name="connsiteY3" fmla="*/ 0 h 5791200"/>
+              <a:gd name="connsiteX4" fmla="*/ 7794494 w 8077200"/>
+              <a:gd name="connsiteY4" fmla="*/ 282707 h 5791200"/>
+              <a:gd name="connsiteX5" fmla="*/ 8077199 w 8077200"/>
+              <a:gd name="connsiteY5" fmla="*/ 965221 h 5791200"/>
+              <a:gd name="connsiteX6" fmla="*/ 8077200 w 8077200"/>
+              <a:gd name="connsiteY6" fmla="*/ 4825981 h 5791200"/>
+              <a:gd name="connsiteX7" fmla="*/ 7794494 w 8077200"/>
+              <a:gd name="connsiteY7" fmla="*/ 5508494 h 5791200"/>
+              <a:gd name="connsiteX8" fmla="*/ 7111981 w 8077200"/>
+              <a:gd name="connsiteY8" fmla="*/ 5791200 h 5791200"/>
+              <a:gd name="connsiteX9" fmla="*/ 965219 w 8077200"/>
+              <a:gd name="connsiteY9" fmla="*/ 5791200 h 5791200"/>
+              <a:gd name="connsiteX10" fmla="*/ 282706 w 8077200"/>
+              <a:gd name="connsiteY10" fmla="*/ 5508493 h 5791200"/>
+              <a:gd name="connsiteX11" fmla="*/ 0 w 8077200"/>
+              <a:gd name="connsiteY11" fmla="*/ 4825980 h 5791200"/>
+              <a:gd name="connsiteX12" fmla="*/ 0 w 8077200"/>
+              <a:gd name="connsiteY12" fmla="*/ 609600 h 5791200"/>
+              <a:gd name="connsiteX0" fmla="*/ 0 w 8077200"/>
+              <a:gd name="connsiteY0" fmla="*/ 609601 h 5791201"/>
+              <a:gd name="connsiteX1" fmla="*/ 282707 w 8077200"/>
+              <a:gd name="connsiteY1" fmla="*/ 282707 h 5791201"/>
+              <a:gd name="connsiteX2" fmla="*/ 609600 w 8077200"/>
+              <a:gd name="connsiteY2" fmla="*/ 1 h 5791201"/>
+              <a:gd name="connsiteX3" fmla="*/ 7111981 w 8077200"/>
+              <a:gd name="connsiteY3" fmla="*/ 1 h 5791201"/>
+              <a:gd name="connsiteX4" fmla="*/ 7794494 w 8077200"/>
+              <a:gd name="connsiteY4" fmla="*/ 282708 h 5791201"/>
+              <a:gd name="connsiteX5" fmla="*/ 8077199 w 8077200"/>
+              <a:gd name="connsiteY5" fmla="*/ 965222 h 5791201"/>
+              <a:gd name="connsiteX6" fmla="*/ 8077200 w 8077200"/>
+              <a:gd name="connsiteY6" fmla="*/ 4825982 h 5791201"/>
+              <a:gd name="connsiteX7" fmla="*/ 7794494 w 8077200"/>
+              <a:gd name="connsiteY7" fmla="*/ 5508495 h 5791201"/>
+              <a:gd name="connsiteX8" fmla="*/ 7111981 w 8077200"/>
+              <a:gd name="connsiteY8" fmla="*/ 5791201 h 5791201"/>
+              <a:gd name="connsiteX9" fmla="*/ 965219 w 8077200"/>
+              <a:gd name="connsiteY9" fmla="*/ 5791201 h 5791201"/>
+              <a:gd name="connsiteX10" fmla="*/ 282706 w 8077200"/>
+              <a:gd name="connsiteY10" fmla="*/ 5508494 h 5791201"/>
+              <a:gd name="connsiteX11" fmla="*/ 0 w 8077200"/>
+              <a:gd name="connsiteY11" fmla="*/ 4825981 h 5791201"/>
+              <a:gd name="connsiteX12" fmla="*/ 0 w 8077200"/>
+              <a:gd name="connsiteY12" fmla="*/ 609601 h 5791201"/>
+              <a:gd name="connsiteX0" fmla="*/ 0 w 8077200"/>
+              <a:gd name="connsiteY0" fmla="*/ 609601 h 5791201"/>
+              <a:gd name="connsiteX1" fmla="*/ 152400 w 8077200"/>
+              <a:gd name="connsiteY1" fmla="*/ 152402 h 5791201"/>
+              <a:gd name="connsiteX2" fmla="*/ 609600 w 8077200"/>
+              <a:gd name="connsiteY2" fmla="*/ 1 h 5791201"/>
+              <a:gd name="connsiteX3" fmla="*/ 7111981 w 8077200"/>
+              <a:gd name="connsiteY3" fmla="*/ 1 h 5791201"/>
+              <a:gd name="connsiteX4" fmla="*/ 7794494 w 8077200"/>
+              <a:gd name="connsiteY4" fmla="*/ 282708 h 5791201"/>
+              <a:gd name="connsiteX5" fmla="*/ 8077199 w 8077200"/>
+              <a:gd name="connsiteY5" fmla="*/ 965222 h 5791201"/>
+              <a:gd name="connsiteX6" fmla="*/ 8077200 w 8077200"/>
+              <a:gd name="connsiteY6" fmla="*/ 4825982 h 5791201"/>
+              <a:gd name="connsiteX7" fmla="*/ 7794494 w 8077200"/>
+              <a:gd name="connsiteY7" fmla="*/ 5508495 h 5791201"/>
+              <a:gd name="connsiteX8" fmla="*/ 7111981 w 8077200"/>
+              <a:gd name="connsiteY8" fmla="*/ 5791201 h 5791201"/>
+              <a:gd name="connsiteX9" fmla="*/ 965219 w 8077200"/>
+              <a:gd name="connsiteY9" fmla="*/ 5791201 h 5791201"/>
+              <a:gd name="connsiteX10" fmla="*/ 282706 w 8077200"/>
+              <a:gd name="connsiteY10" fmla="*/ 5508494 h 5791201"/>
+              <a:gd name="connsiteX11" fmla="*/ 0 w 8077200"/>
+              <a:gd name="connsiteY11" fmla="*/ 4825981 h 5791201"/>
+              <a:gd name="connsiteX12" fmla="*/ 0 w 8077200"/>
+              <a:gd name="connsiteY12" fmla="*/ 609601 h 5791201"/>
+              <a:gd name="connsiteX0" fmla="*/ 0 w 8077200"/>
+              <a:gd name="connsiteY0" fmla="*/ 609600 h 5791200"/>
+              <a:gd name="connsiteX1" fmla="*/ 152400 w 8077200"/>
+              <a:gd name="connsiteY1" fmla="*/ 152401 h 5791200"/>
+              <a:gd name="connsiteX2" fmla="*/ 533400 w 8077200"/>
+              <a:gd name="connsiteY2" fmla="*/ 1 h 5791200"/>
+              <a:gd name="connsiteX3" fmla="*/ 7111981 w 8077200"/>
+              <a:gd name="connsiteY3" fmla="*/ 0 h 5791200"/>
+              <a:gd name="connsiteX4" fmla="*/ 7794494 w 8077200"/>
+              <a:gd name="connsiteY4" fmla="*/ 282707 h 5791200"/>
+              <a:gd name="connsiteX5" fmla="*/ 8077199 w 8077200"/>
+              <a:gd name="connsiteY5" fmla="*/ 965221 h 5791200"/>
+              <a:gd name="connsiteX6" fmla="*/ 8077200 w 8077200"/>
+              <a:gd name="connsiteY6" fmla="*/ 4825981 h 5791200"/>
+              <a:gd name="connsiteX7" fmla="*/ 7794494 w 8077200"/>
+              <a:gd name="connsiteY7" fmla="*/ 5508494 h 5791200"/>
+              <a:gd name="connsiteX8" fmla="*/ 7111981 w 8077200"/>
+              <a:gd name="connsiteY8" fmla="*/ 5791200 h 5791200"/>
+              <a:gd name="connsiteX9" fmla="*/ 965219 w 8077200"/>
+              <a:gd name="connsiteY9" fmla="*/ 5791200 h 5791200"/>
+              <a:gd name="connsiteX10" fmla="*/ 282706 w 8077200"/>
+              <a:gd name="connsiteY10" fmla="*/ 5508493 h 5791200"/>
+              <a:gd name="connsiteX11" fmla="*/ 0 w 8077200"/>
+              <a:gd name="connsiteY11" fmla="*/ 4825980 h 5791200"/>
+              <a:gd name="connsiteX12" fmla="*/ 0 w 8077200"/>
+              <a:gd name="connsiteY12" fmla="*/ 609600 h 5791200"/>
+              <a:gd name="connsiteX0" fmla="*/ 0 w 8077200"/>
+              <a:gd name="connsiteY0" fmla="*/ 533400 h 5791200"/>
+              <a:gd name="connsiteX1" fmla="*/ 152400 w 8077200"/>
+              <a:gd name="connsiteY1" fmla="*/ 152401 h 5791200"/>
+              <a:gd name="connsiteX2" fmla="*/ 533400 w 8077200"/>
+              <a:gd name="connsiteY2" fmla="*/ 1 h 5791200"/>
+              <a:gd name="connsiteX3" fmla="*/ 7111981 w 8077200"/>
+              <a:gd name="connsiteY3" fmla="*/ 0 h 5791200"/>
+              <a:gd name="connsiteX4" fmla="*/ 7794494 w 8077200"/>
+              <a:gd name="connsiteY4" fmla="*/ 282707 h 5791200"/>
+              <a:gd name="connsiteX5" fmla="*/ 8077199 w 8077200"/>
+              <a:gd name="connsiteY5" fmla="*/ 965221 h 5791200"/>
+              <a:gd name="connsiteX6" fmla="*/ 8077200 w 8077200"/>
+              <a:gd name="connsiteY6" fmla="*/ 4825981 h 5791200"/>
+              <a:gd name="connsiteX7" fmla="*/ 7794494 w 8077200"/>
+              <a:gd name="connsiteY7" fmla="*/ 5508494 h 5791200"/>
+              <a:gd name="connsiteX8" fmla="*/ 7111981 w 8077200"/>
+              <a:gd name="connsiteY8" fmla="*/ 5791200 h 5791200"/>
+              <a:gd name="connsiteX9" fmla="*/ 965219 w 8077200"/>
+              <a:gd name="connsiteY9" fmla="*/ 5791200 h 5791200"/>
+              <a:gd name="connsiteX10" fmla="*/ 282706 w 8077200"/>
+              <a:gd name="connsiteY10" fmla="*/ 5508493 h 5791200"/>
+              <a:gd name="connsiteX11" fmla="*/ 0 w 8077200"/>
+              <a:gd name="connsiteY11" fmla="*/ 4825980 h 5791200"/>
+              <a:gd name="connsiteX12" fmla="*/ 0 w 8077200"/>
+              <a:gd name="connsiteY12" fmla="*/ 533400 h 5791200"/>
+              <a:gd name="connsiteX0" fmla="*/ 12700 w 8089900"/>
+              <a:gd name="connsiteY0" fmla="*/ 546100 h 5803900"/>
+              <a:gd name="connsiteX1" fmla="*/ 88900 w 8089900"/>
+              <a:gd name="connsiteY1" fmla="*/ 88900 h 5803900"/>
+              <a:gd name="connsiteX2" fmla="*/ 546100 w 8089900"/>
+              <a:gd name="connsiteY2" fmla="*/ 12701 h 5803900"/>
+              <a:gd name="connsiteX3" fmla="*/ 7124681 w 8089900"/>
+              <a:gd name="connsiteY3" fmla="*/ 12700 h 5803900"/>
+              <a:gd name="connsiteX4" fmla="*/ 7807194 w 8089900"/>
+              <a:gd name="connsiteY4" fmla="*/ 295407 h 5803900"/>
+              <a:gd name="connsiteX5" fmla="*/ 8089899 w 8089900"/>
+              <a:gd name="connsiteY5" fmla="*/ 977921 h 5803900"/>
+              <a:gd name="connsiteX6" fmla="*/ 8089900 w 8089900"/>
+              <a:gd name="connsiteY6" fmla="*/ 4838681 h 5803900"/>
+              <a:gd name="connsiteX7" fmla="*/ 7807194 w 8089900"/>
+              <a:gd name="connsiteY7" fmla="*/ 5521194 h 5803900"/>
+              <a:gd name="connsiteX8" fmla="*/ 7124681 w 8089900"/>
+              <a:gd name="connsiteY8" fmla="*/ 5803900 h 5803900"/>
+              <a:gd name="connsiteX9" fmla="*/ 977919 w 8089900"/>
+              <a:gd name="connsiteY9" fmla="*/ 5803900 h 5803900"/>
+              <a:gd name="connsiteX10" fmla="*/ 295406 w 8089900"/>
+              <a:gd name="connsiteY10" fmla="*/ 5521193 h 5803900"/>
+              <a:gd name="connsiteX11" fmla="*/ 12700 w 8089900"/>
+              <a:gd name="connsiteY11" fmla="*/ 4838680 h 5803900"/>
+              <a:gd name="connsiteX12" fmla="*/ 12700 w 8089900"/>
+              <a:gd name="connsiteY12" fmla="*/ 546100 h 5803900"/>
+              <a:gd name="connsiteX0" fmla="*/ 12700 w 8089900"/>
+              <a:gd name="connsiteY0" fmla="*/ 546100 h 5803900"/>
+              <a:gd name="connsiteX1" fmla="*/ 88900 w 8089900"/>
+              <a:gd name="connsiteY1" fmla="*/ 88900 h 5803900"/>
+              <a:gd name="connsiteX2" fmla="*/ 546100 w 8089900"/>
+              <a:gd name="connsiteY2" fmla="*/ 12701 h 5803900"/>
+              <a:gd name="connsiteX3" fmla="*/ 7124681 w 8089900"/>
+              <a:gd name="connsiteY3" fmla="*/ 12700 h 5803900"/>
+              <a:gd name="connsiteX4" fmla="*/ 7807194 w 8089900"/>
+              <a:gd name="connsiteY4" fmla="*/ 295407 h 5803900"/>
+              <a:gd name="connsiteX5" fmla="*/ 8089899 w 8089900"/>
+              <a:gd name="connsiteY5" fmla="*/ 977921 h 5803900"/>
+              <a:gd name="connsiteX6" fmla="*/ 8089900 w 8089900"/>
+              <a:gd name="connsiteY6" fmla="*/ 4838681 h 5803900"/>
+              <a:gd name="connsiteX7" fmla="*/ 7807194 w 8089900"/>
+              <a:gd name="connsiteY7" fmla="*/ 5521194 h 5803900"/>
+              <a:gd name="connsiteX8" fmla="*/ 7124681 w 8089900"/>
+              <a:gd name="connsiteY8" fmla="*/ 5803900 h 5803900"/>
+              <a:gd name="connsiteX9" fmla="*/ 977919 w 8089900"/>
+              <a:gd name="connsiteY9" fmla="*/ 5803900 h 5803900"/>
+              <a:gd name="connsiteX10" fmla="*/ 295406 w 8089900"/>
+              <a:gd name="connsiteY10" fmla="*/ 5521193 h 5803900"/>
+              <a:gd name="connsiteX11" fmla="*/ 12700 w 8089900"/>
+              <a:gd name="connsiteY11" fmla="*/ 5346700 h 5803900"/>
+              <a:gd name="connsiteX12" fmla="*/ 12700 w 8089900"/>
+              <a:gd name="connsiteY12" fmla="*/ 546100 h 5803900"/>
+              <a:gd name="connsiteX0" fmla="*/ 12700 w 8089900"/>
+              <a:gd name="connsiteY0" fmla="*/ 546100 h 5803900"/>
+              <a:gd name="connsiteX1" fmla="*/ 88900 w 8089900"/>
+              <a:gd name="connsiteY1" fmla="*/ 88900 h 5803900"/>
+              <a:gd name="connsiteX2" fmla="*/ 546100 w 8089900"/>
+              <a:gd name="connsiteY2" fmla="*/ 12701 h 5803900"/>
+              <a:gd name="connsiteX3" fmla="*/ 7124681 w 8089900"/>
+              <a:gd name="connsiteY3" fmla="*/ 12700 h 5803900"/>
+              <a:gd name="connsiteX4" fmla="*/ 7807194 w 8089900"/>
+              <a:gd name="connsiteY4" fmla="*/ 295407 h 5803900"/>
+              <a:gd name="connsiteX5" fmla="*/ 8089899 w 8089900"/>
+              <a:gd name="connsiteY5" fmla="*/ 977921 h 5803900"/>
+              <a:gd name="connsiteX6" fmla="*/ 8089900 w 8089900"/>
+              <a:gd name="connsiteY6" fmla="*/ 4838681 h 5803900"/>
+              <a:gd name="connsiteX7" fmla="*/ 7807194 w 8089900"/>
+              <a:gd name="connsiteY7" fmla="*/ 5521194 h 5803900"/>
+              <a:gd name="connsiteX8" fmla="*/ 7124681 w 8089900"/>
+              <a:gd name="connsiteY8" fmla="*/ 5803900 h 5803900"/>
+              <a:gd name="connsiteX9" fmla="*/ 546100 w 8089900"/>
+              <a:gd name="connsiteY9" fmla="*/ 5803900 h 5803900"/>
+              <a:gd name="connsiteX10" fmla="*/ 295406 w 8089900"/>
+              <a:gd name="connsiteY10" fmla="*/ 5521193 h 5803900"/>
+              <a:gd name="connsiteX11" fmla="*/ 12700 w 8089900"/>
+              <a:gd name="connsiteY11" fmla="*/ 5346700 h 5803900"/>
+              <a:gd name="connsiteX12" fmla="*/ 12700 w 8089900"/>
+              <a:gd name="connsiteY12" fmla="*/ 546100 h 5803900"/>
+              <a:gd name="connsiteX0" fmla="*/ 12700 w 8089900"/>
+              <a:gd name="connsiteY0" fmla="*/ 546100 h 5803900"/>
+              <a:gd name="connsiteX1" fmla="*/ 88900 w 8089900"/>
+              <a:gd name="connsiteY1" fmla="*/ 88900 h 5803900"/>
+              <a:gd name="connsiteX2" fmla="*/ 546100 w 8089900"/>
+              <a:gd name="connsiteY2" fmla="*/ 12701 h 5803900"/>
+              <a:gd name="connsiteX3" fmla="*/ 7124681 w 8089900"/>
+              <a:gd name="connsiteY3" fmla="*/ 12700 h 5803900"/>
+              <a:gd name="connsiteX4" fmla="*/ 7807194 w 8089900"/>
+              <a:gd name="connsiteY4" fmla="*/ 295407 h 5803900"/>
+              <a:gd name="connsiteX5" fmla="*/ 8089899 w 8089900"/>
+              <a:gd name="connsiteY5" fmla="*/ 977921 h 5803900"/>
+              <a:gd name="connsiteX6" fmla="*/ 8089900 w 8089900"/>
+              <a:gd name="connsiteY6" fmla="*/ 4838681 h 5803900"/>
+              <a:gd name="connsiteX7" fmla="*/ 7807194 w 8089900"/>
+              <a:gd name="connsiteY7" fmla="*/ 5521194 h 5803900"/>
+              <a:gd name="connsiteX8" fmla="*/ 7124681 w 8089900"/>
+              <a:gd name="connsiteY8" fmla="*/ 5803900 h 5803900"/>
+              <a:gd name="connsiteX9" fmla="*/ 546100 w 8089900"/>
+              <a:gd name="connsiteY9" fmla="*/ 5803900 h 5803900"/>
+              <a:gd name="connsiteX10" fmla="*/ 88900 w 8089900"/>
+              <a:gd name="connsiteY10" fmla="*/ 5727700 h 5803900"/>
+              <a:gd name="connsiteX11" fmla="*/ 12700 w 8089900"/>
+              <a:gd name="connsiteY11" fmla="*/ 5346700 h 5803900"/>
+              <a:gd name="connsiteX12" fmla="*/ 12700 w 8089900"/>
+              <a:gd name="connsiteY12" fmla="*/ 546100 h 5803900"/>
+              <a:gd name="connsiteX0" fmla="*/ 12700 w 8089900"/>
+              <a:gd name="connsiteY0" fmla="*/ 546100 h 5803900"/>
+              <a:gd name="connsiteX1" fmla="*/ 88900 w 8089900"/>
+              <a:gd name="connsiteY1" fmla="*/ 88900 h 5803900"/>
+              <a:gd name="connsiteX2" fmla="*/ 546100 w 8089900"/>
+              <a:gd name="connsiteY2" fmla="*/ 12701 h 5803900"/>
+              <a:gd name="connsiteX3" fmla="*/ 7556500 w 8089900"/>
+              <a:gd name="connsiteY3" fmla="*/ 12700 h 5803900"/>
+              <a:gd name="connsiteX4" fmla="*/ 7807194 w 8089900"/>
+              <a:gd name="connsiteY4" fmla="*/ 295407 h 5803900"/>
+              <a:gd name="connsiteX5" fmla="*/ 8089899 w 8089900"/>
+              <a:gd name="connsiteY5" fmla="*/ 977921 h 5803900"/>
+              <a:gd name="connsiteX6" fmla="*/ 8089900 w 8089900"/>
+              <a:gd name="connsiteY6" fmla="*/ 4838681 h 5803900"/>
+              <a:gd name="connsiteX7" fmla="*/ 7807194 w 8089900"/>
+              <a:gd name="connsiteY7" fmla="*/ 5521194 h 5803900"/>
+              <a:gd name="connsiteX8" fmla="*/ 7124681 w 8089900"/>
+              <a:gd name="connsiteY8" fmla="*/ 5803900 h 5803900"/>
+              <a:gd name="connsiteX9" fmla="*/ 546100 w 8089900"/>
+              <a:gd name="connsiteY9" fmla="*/ 5803900 h 5803900"/>
+              <a:gd name="connsiteX10" fmla="*/ 88900 w 8089900"/>
+              <a:gd name="connsiteY10" fmla="*/ 5727700 h 5803900"/>
+              <a:gd name="connsiteX11" fmla="*/ 12700 w 8089900"/>
+              <a:gd name="connsiteY11" fmla="*/ 5346700 h 5803900"/>
+              <a:gd name="connsiteX12" fmla="*/ 12700 w 8089900"/>
+              <a:gd name="connsiteY12" fmla="*/ 546100 h 5803900"/>
+              <a:gd name="connsiteX0" fmla="*/ 12700 w 8089901"/>
+              <a:gd name="connsiteY0" fmla="*/ 546100 h 5803900"/>
+              <a:gd name="connsiteX1" fmla="*/ 88900 w 8089901"/>
+              <a:gd name="connsiteY1" fmla="*/ 88900 h 5803900"/>
+              <a:gd name="connsiteX2" fmla="*/ 546100 w 8089901"/>
+              <a:gd name="connsiteY2" fmla="*/ 12701 h 5803900"/>
+              <a:gd name="connsiteX3" fmla="*/ 7556500 w 8089901"/>
+              <a:gd name="connsiteY3" fmla="*/ 12700 h 5803900"/>
+              <a:gd name="connsiteX4" fmla="*/ 7807194 w 8089901"/>
+              <a:gd name="connsiteY4" fmla="*/ 295407 h 5803900"/>
+              <a:gd name="connsiteX5" fmla="*/ 8089900 w 8089901"/>
+              <a:gd name="connsiteY5" fmla="*/ 469900 h 5803900"/>
+              <a:gd name="connsiteX6" fmla="*/ 8089900 w 8089901"/>
+              <a:gd name="connsiteY6" fmla="*/ 4838681 h 5803900"/>
+              <a:gd name="connsiteX7" fmla="*/ 7807194 w 8089901"/>
+              <a:gd name="connsiteY7" fmla="*/ 5521194 h 5803900"/>
+              <a:gd name="connsiteX8" fmla="*/ 7124681 w 8089901"/>
+              <a:gd name="connsiteY8" fmla="*/ 5803900 h 5803900"/>
+              <a:gd name="connsiteX9" fmla="*/ 546100 w 8089901"/>
+              <a:gd name="connsiteY9" fmla="*/ 5803900 h 5803900"/>
+              <a:gd name="connsiteX10" fmla="*/ 88900 w 8089901"/>
+              <a:gd name="connsiteY10" fmla="*/ 5727700 h 5803900"/>
+              <a:gd name="connsiteX11" fmla="*/ 12700 w 8089901"/>
+              <a:gd name="connsiteY11" fmla="*/ 5346700 h 5803900"/>
+              <a:gd name="connsiteX12" fmla="*/ 12700 w 8089901"/>
+              <a:gd name="connsiteY12" fmla="*/ 546100 h 5803900"/>
+              <a:gd name="connsiteX0" fmla="*/ 12700 w 8102600"/>
+              <a:gd name="connsiteY0" fmla="*/ 546100 h 5803900"/>
+              <a:gd name="connsiteX1" fmla="*/ 88900 w 8102600"/>
+              <a:gd name="connsiteY1" fmla="*/ 88900 h 5803900"/>
+              <a:gd name="connsiteX2" fmla="*/ 546100 w 8102600"/>
+              <a:gd name="connsiteY2" fmla="*/ 12701 h 5803900"/>
+              <a:gd name="connsiteX3" fmla="*/ 7556500 w 8102600"/>
+              <a:gd name="connsiteY3" fmla="*/ 12700 h 5803900"/>
+              <a:gd name="connsiteX4" fmla="*/ 8013700 w 8102600"/>
+              <a:gd name="connsiteY4" fmla="*/ 88900 h 5803900"/>
+              <a:gd name="connsiteX5" fmla="*/ 8089900 w 8102600"/>
+              <a:gd name="connsiteY5" fmla="*/ 469900 h 5803900"/>
+              <a:gd name="connsiteX6" fmla="*/ 8089900 w 8102600"/>
+              <a:gd name="connsiteY6" fmla="*/ 4838681 h 5803900"/>
+              <a:gd name="connsiteX7" fmla="*/ 7807194 w 8102600"/>
+              <a:gd name="connsiteY7" fmla="*/ 5521194 h 5803900"/>
+              <a:gd name="connsiteX8" fmla="*/ 7124681 w 8102600"/>
+              <a:gd name="connsiteY8" fmla="*/ 5803900 h 5803900"/>
+              <a:gd name="connsiteX9" fmla="*/ 546100 w 8102600"/>
+              <a:gd name="connsiteY9" fmla="*/ 5803900 h 5803900"/>
+              <a:gd name="connsiteX10" fmla="*/ 88900 w 8102600"/>
+              <a:gd name="connsiteY10" fmla="*/ 5727700 h 5803900"/>
+              <a:gd name="connsiteX11" fmla="*/ 12700 w 8102600"/>
+              <a:gd name="connsiteY11" fmla="*/ 5346700 h 5803900"/>
+              <a:gd name="connsiteX12" fmla="*/ 12700 w 8102600"/>
+              <a:gd name="connsiteY12" fmla="*/ 546100 h 5803900"/>
+              <a:gd name="connsiteX0" fmla="*/ 12700 w 8102600"/>
+              <a:gd name="connsiteY0" fmla="*/ 546100 h 5803900"/>
+              <a:gd name="connsiteX1" fmla="*/ 88900 w 8102600"/>
+              <a:gd name="connsiteY1" fmla="*/ 88900 h 5803900"/>
+              <a:gd name="connsiteX2" fmla="*/ 546100 w 8102600"/>
+              <a:gd name="connsiteY2" fmla="*/ 12701 h 5803900"/>
+              <a:gd name="connsiteX3" fmla="*/ 7556500 w 8102600"/>
+              <a:gd name="connsiteY3" fmla="*/ 12700 h 5803900"/>
+              <a:gd name="connsiteX4" fmla="*/ 8013700 w 8102600"/>
+              <a:gd name="connsiteY4" fmla="*/ 88900 h 5803900"/>
+              <a:gd name="connsiteX5" fmla="*/ 8089899 w 8102600"/>
+              <a:gd name="connsiteY5" fmla="*/ 469900 h 5803900"/>
+              <a:gd name="connsiteX6" fmla="*/ 8089900 w 8102600"/>
+              <a:gd name="connsiteY6" fmla="*/ 4838681 h 5803900"/>
+              <a:gd name="connsiteX7" fmla="*/ 7807194 w 8102600"/>
+              <a:gd name="connsiteY7" fmla="*/ 5521194 h 5803900"/>
+              <a:gd name="connsiteX8" fmla="*/ 7124681 w 8102600"/>
+              <a:gd name="connsiteY8" fmla="*/ 5803900 h 5803900"/>
+              <a:gd name="connsiteX9" fmla="*/ 546100 w 8102600"/>
+              <a:gd name="connsiteY9" fmla="*/ 5803900 h 5803900"/>
+              <a:gd name="connsiteX10" fmla="*/ 88900 w 8102600"/>
+              <a:gd name="connsiteY10" fmla="*/ 5727700 h 5803900"/>
+              <a:gd name="connsiteX11" fmla="*/ 12700 w 8102600"/>
+              <a:gd name="connsiteY11" fmla="*/ 5346700 h 5803900"/>
+              <a:gd name="connsiteX12" fmla="*/ 12700 w 8102600"/>
+              <a:gd name="connsiteY12" fmla="*/ 546100 h 5803900"/>
+              <a:gd name="connsiteX0" fmla="*/ 12700 w 8102599"/>
+              <a:gd name="connsiteY0" fmla="*/ 546100 h 5803900"/>
+              <a:gd name="connsiteX1" fmla="*/ 88900 w 8102599"/>
+              <a:gd name="connsiteY1" fmla="*/ 88900 h 5803900"/>
+              <a:gd name="connsiteX2" fmla="*/ 546100 w 8102599"/>
+              <a:gd name="connsiteY2" fmla="*/ 12701 h 5803900"/>
+              <a:gd name="connsiteX3" fmla="*/ 7556500 w 8102599"/>
+              <a:gd name="connsiteY3" fmla="*/ 12700 h 5803900"/>
+              <a:gd name="connsiteX4" fmla="*/ 8013699 w 8102599"/>
+              <a:gd name="connsiteY4" fmla="*/ 88900 h 5803900"/>
+              <a:gd name="connsiteX5" fmla="*/ 8089899 w 8102599"/>
+              <a:gd name="connsiteY5" fmla="*/ 469900 h 5803900"/>
+              <a:gd name="connsiteX6" fmla="*/ 8089900 w 8102599"/>
+              <a:gd name="connsiteY6" fmla="*/ 4838681 h 5803900"/>
+              <a:gd name="connsiteX7" fmla="*/ 7807194 w 8102599"/>
+              <a:gd name="connsiteY7" fmla="*/ 5521194 h 5803900"/>
+              <a:gd name="connsiteX8" fmla="*/ 7124681 w 8102599"/>
+              <a:gd name="connsiteY8" fmla="*/ 5803900 h 5803900"/>
+              <a:gd name="connsiteX9" fmla="*/ 546100 w 8102599"/>
+              <a:gd name="connsiteY9" fmla="*/ 5803900 h 5803900"/>
+              <a:gd name="connsiteX10" fmla="*/ 88900 w 8102599"/>
+              <a:gd name="connsiteY10" fmla="*/ 5727700 h 5803900"/>
+              <a:gd name="connsiteX11" fmla="*/ 12700 w 8102599"/>
+              <a:gd name="connsiteY11" fmla="*/ 5346700 h 5803900"/>
+              <a:gd name="connsiteX12" fmla="*/ 12700 w 8102599"/>
+              <a:gd name="connsiteY12" fmla="*/ 546100 h 5803900"/>
+              <a:gd name="connsiteX0" fmla="*/ 12700 w 8102599"/>
+              <a:gd name="connsiteY0" fmla="*/ 546100 h 5803900"/>
+              <a:gd name="connsiteX1" fmla="*/ 88900 w 8102599"/>
+              <a:gd name="connsiteY1" fmla="*/ 88900 h 5803900"/>
+              <a:gd name="connsiteX2" fmla="*/ 546100 w 8102599"/>
+              <a:gd name="connsiteY2" fmla="*/ 12701 h 5803900"/>
+              <a:gd name="connsiteX3" fmla="*/ 7556500 w 8102599"/>
+              <a:gd name="connsiteY3" fmla="*/ 12700 h 5803900"/>
+              <a:gd name="connsiteX4" fmla="*/ 8013699 w 8102599"/>
+              <a:gd name="connsiteY4" fmla="*/ 88900 h 5803900"/>
+              <a:gd name="connsiteX5" fmla="*/ 8089899 w 8102599"/>
+              <a:gd name="connsiteY5" fmla="*/ 469900 h 5803900"/>
+              <a:gd name="connsiteX6" fmla="*/ 8089900 w 8102599"/>
+              <a:gd name="connsiteY6" fmla="*/ 5346700 h 5803900"/>
+              <a:gd name="connsiteX7" fmla="*/ 7807194 w 8102599"/>
+              <a:gd name="connsiteY7" fmla="*/ 5521194 h 5803900"/>
+              <a:gd name="connsiteX8" fmla="*/ 7124681 w 8102599"/>
+              <a:gd name="connsiteY8" fmla="*/ 5803900 h 5803900"/>
+              <a:gd name="connsiteX9" fmla="*/ 546100 w 8102599"/>
+              <a:gd name="connsiteY9" fmla="*/ 5803900 h 5803900"/>
+              <a:gd name="connsiteX10" fmla="*/ 88900 w 8102599"/>
+              <a:gd name="connsiteY10" fmla="*/ 5727700 h 5803900"/>
+              <a:gd name="connsiteX11" fmla="*/ 12700 w 8102599"/>
+              <a:gd name="connsiteY11" fmla="*/ 5346700 h 5803900"/>
+              <a:gd name="connsiteX12" fmla="*/ 12700 w 8102599"/>
+              <a:gd name="connsiteY12" fmla="*/ 546100 h 5803900"/>
+              <a:gd name="connsiteX0" fmla="*/ 12700 w 8102599"/>
+              <a:gd name="connsiteY0" fmla="*/ 546100 h 5803900"/>
+              <a:gd name="connsiteX1" fmla="*/ 88900 w 8102599"/>
+              <a:gd name="connsiteY1" fmla="*/ 88900 h 5803900"/>
+              <a:gd name="connsiteX2" fmla="*/ 546100 w 8102599"/>
+              <a:gd name="connsiteY2" fmla="*/ 12701 h 5803900"/>
+              <a:gd name="connsiteX3" fmla="*/ 7556500 w 8102599"/>
+              <a:gd name="connsiteY3" fmla="*/ 12700 h 5803900"/>
+              <a:gd name="connsiteX4" fmla="*/ 8013699 w 8102599"/>
+              <a:gd name="connsiteY4" fmla="*/ 88900 h 5803900"/>
+              <a:gd name="connsiteX5" fmla="*/ 8089899 w 8102599"/>
+              <a:gd name="connsiteY5" fmla="*/ 469900 h 5803900"/>
+              <a:gd name="connsiteX6" fmla="*/ 8089900 w 8102599"/>
+              <a:gd name="connsiteY6" fmla="*/ 5346700 h 5803900"/>
+              <a:gd name="connsiteX7" fmla="*/ 7807194 w 8102599"/>
+              <a:gd name="connsiteY7" fmla="*/ 5521194 h 5803900"/>
+              <a:gd name="connsiteX8" fmla="*/ 7632700 w 8102599"/>
+              <a:gd name="connsiteY8" fmla="*/ 5803900 h 5803900"/>
+              <a:gd name="connsiteX9" fmla="*/ 546100 w 8102599"/>
+              <a:gd name="connsiteY9" fmla="*/ 5803900 h 5803900"/>
+              <a:gd name="connsiteX10" fmla="*/ 88900 w 8102599"/>
+              <a:gd name="connsiteY10" fmla="*/ 5727700 h 5803900"/>
+              <a:gd name="connsiteX11" fmla="*/ 12700 w 8102599"/>
+              <a:gd name="connsiteY11" fmla="*/ 5346700 h 5803900"/>
+              <a:gd name="connsiteX12" fmla="*/ 12700 w 8102599"/>
+              <a:gd name="connsiteY12" fmla="*/ 546100 h 5803900"/>
+              <a:gd name="connsiteX0" fmla="*/ 12700 w 8102599"/>
+              <a:gd name="connsiteY0" fmla="*/ 546100 h 5803900"/>
+              <a:gd name="connsiteX1" fmla="*/ 88900 w 8102599"/>
+              <a:gd name="connsiteY1" fmla="*/ 88900 h 5803900"/>
+              <a:gd name="connsiteX2" fmla="*/ 546100 w 8102599"/>
+              <a:gd name="connsiteY2" fmla="*/ 12701 h 5803900"/>
+              <a:gd name="connsiteX3" fmla="*/ 7556500 w 8102599"/>
+              <a:gd name="connsiteY3" fmla="*/ 12700 h 5803900"/>
+              <a:gd name="connsiteX4" fmla="*/ 8013699 w 8102599"/>
+              <a:gd name="connsiteY4" fmla="*/ 88900 h 5803900"/>
+              <a:gd name="connsiteX5" fmla="*/ 8089899 w 8102599"/>
+              <a:gd name="connsiteY5" fmla="*/ 469900 h 5803900"/>
+              <a:gd name="connsiteX6" fmla="*/ 8089900 w 8102599"/>
+              <a:gd name="connsiteY6" fmla="*/ 5346700 h 5803900"/>
+              <a:gd name="connsiteX7" fmla="*/ 8013700 w 8102599"/>
+              <a:gd name="connsiteY7" fmla="*/ 5727700 h 5803900"/>
+              <a:gd name="connsiteX8" fmla="*/ 7632700 w 8102599"/>
+              <a:gd name="connsiteY8" fmla="*/ 5803900 h 5803900"/>
+              <a:gd name="connsiteX9" fmla="*/ 546100 w 8102599"/>
+              <a:gd name="connsiteY9" fmla="*/ 5803900 h 5803900"/>
+              <a:gd name="connsiteX10" fmla="*/ 88900 w 8102599"/>
+              <a:gd name="connsiteY10" fmla="*/ 5727700 h 5803900"/>
+              <a:gd name="connsiteX11" fmla="*/ 12700 w 8102599"/>
+              <a:gd name="connsiteY11" fmla="*/ 5346700 h 5803900"/>
+              <a:gd name="connsiteX12" fmla="*/ 12700 w 8102599"/>
+              <a:gd name="connsiteY12" fmla="*/ 546100 h 5803900"/>
+            </a:gdLst>
+            <a:ahLst/>
+            <a:cxnLst>
+              <a:cxn ang="0">
+                <a:pos x="connsiteX0" y="connsiteY0"/>
+              </a:cxn>
+              <a:cxn ang="0">
+                <a:pos x="connsiteX1" y="connsiteY1"/>
+              </a:cxn>
+              <a:cxn ang="0">
+                <a:pos x="connsiteX2" y="connsiteY2"/>
+              </a:cxn>
+              <a:cxn ang="0">
+                <a:pos x="connsiteX3" y="connsiteY3"/>
+              </a:cxn>
+              <a:cxn ang="0">
+                <a:pos x="connsiteX4" y="connsiteY4"/>
+              </a:cxn>
+              <a:cxn ang="0">
+                <a:pos x="connsiteX5" y="connsiteY5"/>
+              </a:cxn>
+              <a:cxn ang="0">
+                <a:pos x="connsiteX6" y="connsiteY6"/>
+              </a:cxn>
+              <a:cxn ang="0">
+                <a:pos x="connsiteX7" y="connsiteY7"/>
+              </a:cxn>
+              <a:cxn ang="0">
+                <a:pos x="connsiteX8" y="connsiteY8"/>
+              </a:cxn>
+              <a:cxn ang="0">
+                <a:pos x="connsiteX9" y="connsiteY9"/>
+              </a:cxn>
+              <a:cxn ang="0">
+                <a:pos x="connsiteX10" y="connsiteY10"/>
+              </a:cxn>
+              <a:cxn ang="0">
+                <a:pos x="connsiteX11" y="connsiteY11"/>
+              </a:cxn>
+              <a:cxn ang="0">
+                <a:pos x="connsiteX12" y="connsiteY12"/>
+              </a:cxn>
+            </a:cxnLst>
+            <a:rect l="l" t="t" r="r" b="b"/>
+            <a:pathLst>
+              <a:path w="8102599" h="5803900">
+                <a:moveTo>
+                  <a:pt x="12700" y="546100"/>
+                </a:moveTo>
+                <a:cubicBezTo>
+                  <a:pt x="12700" y="290108"/>
+                  <a:pt x="0" y="177800"/>
+                  <a:pt x="88900" y="88900"/>
+                </a:cubicBezTo>
+                <a:cubicBezTo>
+                  <a:pt x="177800" y="0"/>
+                  <a:pt x="290107" y="12700"/>
+                  <a:pt x="546100" y="12701"/>
+                </a:cubicBezTo>
+                <a:lnTo>
+                  <a:pt x="7556500" y="12700"/>
+                </a:lnTo>
+                <a:cubicBezTo>
+                  <a:pt x="7812492" y="12700"/>
+                  <a:pt x="7924799" y="12700"/>
+                  <a:pt x="8013699" y="88900"/>
+                </a:cubicBezTo>
+                <a:cubicBezTo>
+                  <a:pt x="8102599" y="165100"/>
+                  <a:pt x="8089900" y="213907"/>
+                  <a:pt x="8089899" y="469900"/>
+                </a:cubicBezTo>
+                <a:cubicBezTo>
+                  <a:pt x="8089899" y="1926160"/>
+                  <a:pt x="8089900" y="3890440"/>
+                  <a:pt x="8089900" y="5346700"/>
+                </a:cubicBezTo>
+                <a:cubicBezTo>
+                  <a:pt x="8089900" y="5602692"/>
+                  <a:pt x="8089900" y="5651500"/>
+                  <a:pt x="8013700" y="5727700"/>
+                </a:cubicBezTo>
+                <a:cubicBezTo>
+                  <a:pt x="7937500" y="5803900"/>
+                  <a:pt x="7888692" y="5803900"/>
+                  <a:pt x="7632700" y="5803900"/>
+                </a:cubicBezTo>
+                <a:lnTo>
+                  <a:pt x="546100" y="5803900"/>
+                </a:lnTo>
+                <a:cubicBezTo>
+                  <a:pt x="290108" y="5803900"/>
+                  <a:pt x="177800" y="5803900"/>
+                  <a:pt x="88900" y="5727700"/>
+                </a:cubicBezTo>
+                <a:cubicBezTo>
+                  <a:pt x="0" y="5651500"/>
+                  <a:pt x="12700" y="5602692"/>
+                  <a:pt x="12700" y="5346700"/>
+                </a:cubicBezTo>
+                <a:lnTo>
+                  <a:pt x="12700" y="546100"/>
+                </a:lnTo>
+                <a:close/>
+              </a:path>
+            </a:pathLst>
+          </a:custGeom>
+          <a:gradFill>
+            <a:gsLst>
+              <a:gs pos="0">
+                <a:schemeClr val="bg1">
+                  <a:lumMod val="50000"/>
+                </a:schemeClr>
+              </a:gs>
+              <a:gs pos="39999">
+                <a:schemeClr val="bg1">
+                  <a:lumMod val="65000"/>
+                </a:schemeClr>
+              </a:gs>
+              <a:gs pos="70000">
+                <a:schemeClr val="bg1">
+                  <a:lumMod val="50000"/>
+                  <a:alpha val="73000"/>
+                </a:schemeClr>
+              </a:gs>
+            </a:gsLst>
+            <a:lin ang="5400000" scaled="0"/>
+          </a:gradFill>
+          <a:ln>
+            <a:solidFill>
+              <a:schemeClr val="bg1">
+                <a:lumMod val="75000"/>
+              </a:schemeClr>
+            </a:solidFill>
+          </a:ln>
+        </p:spPr>
+        <p:style>
+          <a:lnRef idx="2">
+            <a:schemeClr val="accent1">
+              <a:shade val="50000"/>
+            </a:schemeClr>
+          </a:lnRef>
+          <a:fillRef idx="1">
+            <a:schemeClr val="accent1"/>
+          </a:fillRef>
+          <a:effectRef idx="0">
+            <a:schemeClr val="accent1"/>
+          </a:effectRef>
+          <a:fontRef idx="minor">
+            <a:schemeClr val="lt1"/>
+          </a:fontRef>
+        </p:style>
+        <p:txBody>
+          <a:bodyPr rtlCol="0" anchor="ctr"/>
+          <a:lstStyle/>
+          <a:p>
+            <a:pPr fontAlgn="t"/>
+            <a:endParaRPr lang="es-AR" b="1" dirty="0" smtClean="0"/>
+          </a:p>
+          <a:p>
+            <a:pPr algn="ctr"/>
+            <a:endParaRPr lang="es-AR" dirty="0"/>
+          </a:p>
+        </p:txBody>
+      </p:sp>
+      <p:sp>
+        <p:nvSpPr>
+          <p:cNvPr id="14" name="Rectangle 13"/>
+          <p:cNvSpPr/>
+          <p:nvPr/>
+        </p:nvSpPr>
+        <p:spPr>
+          <a:xfrm>
+            <a:off x="381000" y="1295400"/>
+            <a:ext cx="8458200" cy="1066800"/>
+          </a:xfrm>
+          <a:prstGeom prst="rect">
+            <a:avLst/>
+          </a:prstGeom>
+          <a:noFill/>
+          <a:ln>
+            <a:noFill/>
+          </a:ln>
+        </p:spPr>
+        <p:style>
+          <a:lnRef idx="2">
+            <a:schemeClr val="accent1">
+              <a:shade val="50000"/>
+            </a:schemeClr>
+          </a:lnRef>
+          <a:fillRef idx="1">
+            <a:schemeClr val="accent1"/>
+          </a:fillRef>
+          <a:effectRef idx="0">
+            <a:schemeClr val="accent1"/>
+          </a:effectRef>
+          <a:fontRef idx="minor">
+            <a:schemeClr val="lt1"/>
+          </a:fontRef>
+        </p:style>
+        <p:txBody>
+          <a:bodyPr rtlCol="0" anchor="ctr"/>
+          <a:lstStyle/>
+          <a:p>
+            <a:pPr algn="ctr"/>
+            <a:r>
+              <a:rPr lang="es-AR" sz="4800" b="1" dirty="0" smtClean="0"/>
+              <a:t>Interfaces</a:t>
+            </a:r>
+          </a:p>
+          <a:p>
+            <a:pPr algn="ctr"/>
+            <a:endParaRPr lang="es-AR" sz="1200" dirty="0"/>
+          </a:p>
+        </p:txBody>
+      </p:sp>
+      <p:grpSp>
+        <p:nvGrpSpPr>
+          <p:cNvPr id="3" name="Group 14"/>
+          <p:cNvGrpSpPr/>
+          <p:nvPr/>
+        </p:nvGrpSpPr>
+        <p:grpSpPr>
+          <a:xfrm>
+            <a:off x="1295400" y="544415"/>
+            <a:ext cx="6553200" cy="903384"/>
+            <a:chOff x="1295400" y="544415"/>
+            <a:chExt cx="6553200" cy="903384"/>
+          </a:xfrm>
+        </p:grpSpPr>
+        <p:sp>
+          <p:nvSpPr>
+            <p:cNvPr id="16" name="Round Same Side Corner Rectangle 15"/>
+            <p:cNvSpPr/>
+            <p:nvPr/>
+          </p:nvSpPr>
+          <p:spPr>
+            <a:xfrm rot="10800000">
+              <a:off x="1295400" y="544415"/>
+              <a:ext cx="6553200" cy="903384"/>
+            </a:xfrm>
+            <a:prstGeom prst="round2SameRect">
+              <a:avLst/>
+            </a:prstGeom>
+          </p:spPr>
+          <p:style>
+            <a:lnRef idx="2">
+              <a:schemeClr val="dk1">
+                <a:shade val="50000"/>
+              </a:schemeClr>
+            </a:lnRef>
+            <a:fillRef idx="1">
+              <a:schemeClr val="dk1"/>
+            </a:fillRef>
+            <a:effectRef idx="0">
+              <a:schemeClr val="dk1"/>
+            </a:effectRef>
+            <a:fontRef idx="minor">
+              <a:schemeClr val="lt1"/>
+            </a:fontRef>
+          </p:style>
+          <p:txBody>
+            <a:bodyPr rtlCol="0" anchor="ctr"/>
+            <a:lstStyle/>
+            <a:p>
+              <a:pPr algn="ctr"/>
+              <a:endParaRPr lang="es-AR" dirty="0"/>
+            </a:p>
+          </p:txBody>
+        </p:sp>
+        <p:pic>
+          <p:nvPicPr>
+            <p:cNvPr id="20" name="Picture 2" descr="E:\U.B.A.Files\Materias\75.45 Taller de Desarrollo de Proyectos I\TP\Trunk\Proyecto\web\site\images\logo.png"/>
+            <p:cNvPicPr>
+              <a:picLocks noChangeAspect="1" noChangeArrowheads="1"/>
+            </p:cNvPicPr>
+            <p:nvPr/>
+          </p:nvPicPr>
+          <p:blipFill>
+            <a:blip r:embed="rId2" cstate="print"/>
+            <a:srcRect/>
+            <a:stretch>
+              <a:fillRect/>
+            </a:stretch>
+          </p:blipFill>
+          <p:spPr bwMode="auto">
+            <a:xfrm>
+              <a:off x="1600200" y="609600"/>
+              <a:ext cx="2640904" cy="762000"/>
+            </a:xfrm>
+            <a:prstGeom prst="rect">
+              <a:avLst/>
+            </a:prstGeom>
+            <a:noFill/>
+          </p:spPr>
+        </p:pic>
+        <p:sp>
+          <p:nvSpPr>
+            <p:cNvPr id="23" name="TextBox 22"/>
+            <p:cNvSpPr txBox="1"/>
+            <p:nvPr/>
+          </p:nvSpPr>
+          <p:spPr>
+            <a:xfrm>
+              <a:off x="4515457" y="685800"/>
+              <a:ext cx="3180743" cy="307777"/>
+            </a:xfrm>
+            <a:prstGeom prst="rect">
+              <a:avLst/>
+            </a:prstGeom>
+            <a:noFill/>
+          </p:spPr>
+          <p:txBody>
+            <a:bodyPr wrap="none" rtlCol="0">
+              <a:spAutoFit/>
+            </a:bodyPr>
+            <a:lstStyle/>
+            <a:p>
+              <a:r>
+                <a:rPr lang="es-AR" sz="1400" dirty="0" smtClean="0">
+                  <a:solidFill>
+                    <a:schemeClr val="bg1">
+                      <a:lumMod val="50000"/>
+                    </a:schemeClr>
+                  </a:solidFill>
+                </a:rPr>
+                <a:t>Centralización y análisis de datos</a:t>
+              </a:r>
+              <a:endParaRPr lang="es-AR" sz="1400" dirty="0">
+                <a:solidFill>
+                  <a:schemeClr val="bg1">
+                    <a:lumMod val="50000"/>
+                  </a:schemeClr>
+                </a:solidFill>
+              </a:endParaRPr>
+            </a:p>
+          </p:txBody>
+        </p:sp>
+      </p:grpSp>
+    </p:spTree>
+  </p:cSld>
+  <p:clrMapOvr>
+    <a:masterClrMapping/>
+  </p:clrMapOvr>
+</p:sld>
+</file>
+
 <file path=ppt/theme/theme1.xml><?xml version="1.0" encoding="utf-8"?>
 <a:theme xmlns:a="http://schemas.openxmlformats.org/drawingml/2006/main" name="Office Theme">
   <a:themeElements>

</xml_diff>

<commit_message>
Modelo de datos partido y diagrama de componentes.
</commit_message>
<xml_diff>
--- a/Presentacion/Tecnica/Presentacion Tecnica.pptx
+++ b/Presentacion/Tecnica/Presentacion Tecnica.pptx
@@ -5,7 +5,7 @@
     <p:sldMasterId id="2147484416" r:id="rId1"/>
   </p:sldMasterIdLst>
   <p:notesMasterIdLst>
-    <p:notesMasterId r:id="rId13"/>
+    <p:notesMasterId r:id="rId14"/>
   </p:notesMasterIdLst>
   <p:sldIdLst>
     <p:sldId id="256" r:id="rId2"/>
@@ -15,10 +15,11 @@
     <p:sldId id="271" r:id="rId6"/>
     <p:sldId id="264" r:id="rId7"/>
     <p:sldId id="265" r:id="rId8"/>
-    <p:sldId id="267" r:id="rId9"/>
-    <p:sldId id="266" r:id="rId10"/>
-    <p:sldId id="268" r:id="rId11"/>
-    <p:sldId id="269" r:id="rId12"/>
+    <p:sldId id="272" r:id="rId9"/>
+    <p:sldId id="267" r:id="rId10"/>
+    <p:sldId id="266" r:id="rId11"/>
+    <p:sldId id="268" r:id="rId12"/>
+    <p:sldId id="269" r:id="rId13"/>
   </p:sldIdLst>
   <p:sldSz cx="9144000" cy="6858000" type="screen4x3"/>
   <p:notesSz cx="6858000" cy="9144000"/>
@@ -4930,6 +4931,1099 @@
             <a:pPr algn="ctr"/>
             <a:r>
               <a:rPr lang="es-AR" sz="4800" b="1" dirty="0" smtClean="0"/>
+              <a:t>Seguridad</a:t>
+            </a:r>
+          </a:p>
+          <a:p>
+            <a:pPr algn="ctr"/>
+            <a:endParaRPr lang="es-AR" sz="1200" dirty="0"/>
+          </a:p>
+        </p:txBody>
+      </p:sp>
+      <p:grpSp>
+        <p:nvGrpSpPr>
+          <p:cNvPr id="3" name="Group 14"/>
+          <p:cNvGrpSpPr/>
+          <p:nvPr/>
+        </p:nvGrpSpPr>
+        <p:grpSpPr>
+          <a:xfrm>
+            <a:off x="1295400" y="544415"/>
+            <a:ext cx="6553200" cy="903384"/>
+            <a:chOff x="1295400" y="544415"/>
+            <a:chExt cx="6553200" cy="903384"/>
+          </a:xfrm>
+        </p:grpSpPr>
+        <p:sp>
+          <p:nvSpPr>
+            <p:cNvPr id="16" name="Round Same Side Corner Rectangle 15"/>
+            <p:cNvSpPr/>
+            <p:nvPr/>
+          </p:nvSpPr>
+          <p:spPr>
+            <a:xfrm rot="10800000">
+              <a:off x="1295400" y="544415"/>
+              <a:ext cx="6553200" cy="903384"/>
+            </a:xfrm>
+            <a:prstGeom prst="round2SameRect">
+              <a:avLst/>
+            </a:prstGeom>
+          </p:spPr>
+          <p:style>
+            <a:lnRef idx="2">
+              <a:schemeClr val="dk1">
+                <a:shade val="50000"/>
+              </a:schemeClr>
+            </a:lnRef>
+            <a:fillRef idx="1">
+              <a:schemeClr val="dk1"/>
+            </a:fillRef>
+            <a:effectRef idx="0">
+              <a:schemeClr val="dk1"/>
+            </a:effectRef>
+            <a:fontRef idx="minor">
+              <a:schemeClr val="lt1"/>
+            </a:fontRef>
+          </p:style>
+          <p:txBody>
+            <a:bodyPr rtlCol="0" anchor="ctr"/>
+            <a:lstStyle/>
+            <a:p>
+              <a:pPr algn="ctr"/>
+              <a:endParaRPr lang="es-AR" dirty="0"/>
+            </a:p>
+          </p:txBody>
+        </p:sp>
+        <p:pic>
+          <p:nvPicPr>
+            <p:cNvPr id="20" name="Picture 2" descr="E:\U.B.A.Files\Materias\75.45 Taller de Desarrollo de Proyectos I\TP\Trunk\Proyecto\web\site\images\logo.png"/>
+            <p:cNvPicPr>
+              <a:picLocks noChangeAspect="1" noChangeArrowheads="1"/>
+            </p:cNvPicPr>
+            <p:nvPr/>
+          </p:nvPicPr>
+          <p:blipFill>
+            <a:blip r:embed="rId2" cstate="print"/>
+            <a:srcRect/>
+            <a:stretch>
+              <a:fillRect/>
+            </a:stretch>
+          </p:blipFill>
+          <p:spPr bwMode="auto">
+            <a:xfrm>
+              <a:off x="1600200" y="609600"/>
+              <a:ext cx="2640904" cy="762000"/>
+            </a:xfrm>
+            <a:prstGeom prst="rect">
+              <a:avLst/>
+            </a:prstGeom>
+            <a:noFill/>
+          </p:spPr>
+        </p:pic>
+        <p:sp>
+          <p:nvSpPr>
+            <p:cNvPr id="23" name="TextBox 22"/>
+            <p:cNvSpPr txBox="1"/>
+            <p:nvPr/>
+          </p:nvSpPr>
+          <p:spPr>
+            <a:xfrm>
+              <a:off x="4515457" y="685800"/>
+              <a:ext cx="3180743" cy="307777"/>
+            </a:xfrm>
+            <a:prstGeom prst="rect">
+              <a:avLst/>
+            </a:prstGeom>
+            <a:noFill/>
+          </p:spPr>
+          <p:txBody>
+            <a:bodyPr wrap="none" rtlCol="0">
+              <a:spAutoFit/>
+            </a:bodyPr>
+            <a:lstStyle/>
+            <a:p>
+              <a:r>
+                <a:rPr lang="es-AR" sz="1400" dirty="0" smtClean="0">
+                  <a:solidFill>
+                    <a:schemeClr val="bg1">
+                      <a:lumMod val="50000"/>
+                    </a:schemeClr>
+                  </a:solidFill>
+                </a:rPr>
+                <a:t>Centralización y análisis de datos</a:t>
+              </a:r>
+              <a:endParaRPr lang="es-AR" sz="1400" dirty="0">
+                <a:solidFill>
+                  <a:schemeClr val="bg1">
+                    <a:lumMod val="50000"/>
+                  </a:schemeClr>
+                </a:solidFill>
+              </a:endParaRPr>
+            </a:p>
+          </p:txBody>
+        </p:sp>
+      </p:grpSp>
+    </p:spTree>
+  </p:cSld>
+  <p:clrMapOvr>
+    <a:masterClrMapping/>
+  </p:clrMapOvr>
+  <p:timing>
+    <p:tnLst>
+      <p:par>
+        <p:cTn id="1" dur="indefinite" restart="never" nodeType="tmRoot"/>
+      </p:par>
+    </p:tnLst>
+  </p:timing>
+</p:sld>
+</file>
+
+<file path=ppt/slides/slide11.xml><?xml version="1.0" encoding="utf-8"?>
+<p:sld xmlns:a="http://schemas.openxmlformats.org/drawingml/2006/main" xmlns:r="http://schemas.openxmlformats.org/officeDocument/2006/relationships" xmlns:p="http://schemas.openxmlformats.org/presentationml/2006/main">
+  <p:cSld>
+    <p:spTree>
+      <p:nvGrpSpPr>
+        <p:cNvPr id="1" name=""/>
+        <p:cNvGrpSpPr/>
+        <p:nvPr/>
+      </p:nvGrpSpPr>
+      <p:grpSpPr>
+        <a:xfrm>
+          <a:off x="0" y="0"/>
+          <a:ext cx="0" cy="0"/>
+          <a:chOff x="0" y="0"/>
+          <a:chExt cx="0" cy="0"/>
+        </a:xfrm>
+      </p:grpSpPr>
+      <p:grpSp>
+        <p:nvGrpSpPr>
+          <p:cNvPr id="2" name="Group 22"/>
+          <p:cNvGrpSpPr/>
+          <p:nvPr/>
+        </p:nvGrpSpPr>
+        <p:grpSpPr>
+          <a:xfrm>
+            <a:off x="304800" y="304800"/>
+            <a:ext cx="8534400" cy="6248400"/>
+            <a:chOff x="304800" y="304800"/>
+            <a:chExt cx="8534400" cy="6248400"/>
+          </a:xfrm>
+          <a:solidFill>
+            <a:schemeClr val="bg1">
+              <a:lumMod val="85000"/>
+            </a:schemeClr>
+          </a:solidFill>
+        </p:grpSpPr>
+        <p:sp>
+          <p:nvSpPr>
+            <p:cNvPr id="18" name="Rounded Rectangle 17"/>
+            <p:cNvSpPr/>
+            <p:nvPr/>
+          </p:nvSpPr>
+          <p:spPr>
+            <a:xfrm>
+              <a:off x="304800" y="304800"/>
+              <a:ext cx="8534400" cy="6248400"/>
+            </a:xfrm>
+            <a:prstGeom prst="roundRect">
+              <a:avLst/>
+            </a:prstGeom>
+            <a:grpFill/>
+            <a:ln>
+              <a:noFill/>
+            </a:ln>
+          </p:spPr>
+          <p:style>
+            <a:lnRef idx="2">
+              <a:schemeClr val="accent1">
+                <a:shade val="50000"/>
+              </a:schemeClr>
+            </a:lnRef>
+            <a:fillRef idx="1">
+              <a:schemeClr val="accent1"/>
+            </a:fillRef>
+            <a:effectRef idx="0">
+              <a:schemeClr val="accent1"/>
+            </a:effectRef>
+            <a:fontRef idx="minor">
+              <a:schemeClr val="lt1"/>
+            </a:fontRef>
+          </p:style>
+          <p:txBody>
+            <a:bodyPr rtlCol="0" anchor="ctr"/>
+            <a:lstStyle/>
+            <a:p>
+              <a:pPr algn="ctr"/>
+              <a:endParaRPr lang="es-AR"/>
+            </a:p>
+          </p:txBody>
+        </p:sp>
+        <p:sp>
+          <p:nvSpPr>
+            <p:cNvPr id="22" name="Rounded Rectangle 21"/>
+            <p:cNvSpPr/>
+            <p:nvPr/>
+          </p:nvSpPr>
+          <p:spPr>
+            <a:xfrm>
+              <a:off x="7086600" y="304800"/>
+              <a:ext cx="1752600" cy="1752600"/>
+            </a:xfrm>
+            <a:prstGeom prst="roundRect">
+              <a:avLst/>
+            </a:prstGeom>
+            <a:grpFill/>
+            <a:ln>
+              <a:noFill/>
+            </a:ln>
+          </p:spPr>
+          <p:style>
+            <a:lnRef idx="2">
+              <a:schemeClr val="accent1">
+                <a:shade val="50000"/>
+              </a:schemeClr>
+            </a:lnRef>
+            <a:fillRef idx="1">
+              <a:schemeClr val="accent1"/>
+            </a:fillRef>
+            <a:effectRef idx="0">
+              <a:schemeClr val="accent1"/>
+            </a:effectRef>
+            <a:fontRef idx="minor">
+              <a:schemeClr val="lt1"/>
+            </a:fontRef>
+          </p:style>
+          <p:txBody>
+            <a:bodyPr rtlCol="0" anchor="ctr"/>
+            <a:lstStyle/>
+            <a:p>
+              <a:pPr algn="ctr"/>
+              <a:endParaRPr lang="es-AR"/>
+            </a:p>
+          </p:txBody>
+        </p:sp>
+        <p:sp>
+          <p:nvSpPr>
+            <p:cNvPr id="21" name="Rounded Rectangle 20"/>
+            <p:cNvSpPr/>
+            <p:nvPr/>
+          </p:nvSpPr>
+          <p:spPr>
+            <a:xfrm>
+              <a:off x="304800" y="304800"/>
+              <a:ext cx="1752600" cy="1752600"/>
+            </a:xfrm>
+            <a:prstGeom prst="roundRect">
+              <a:avLst/>
+            </a:prstGeom>
+            <a:grpFill/>
+            <a:ln>
+              <a:noFill/>
+            </a:ln>
+          </p:spPr>
+          <p:style>
+            <a:lnRef idx="2">
+              <a:schemeClr val="accent1">
+                <a:shade val="50000"/>
+              </a:schemeClr>
+            </a:lnRef>
+            <a:fillRef idx="1">
+              <a:schemeClr val="accent1"/>
+            </a:fillRef>
+            <a:effectRef idx="0">
+              <a:schemeClr val="accent1"/>
+            </a:effectRef>
+            <a:fontRef idx="minor">
+              <a:schemeClr val="lt1"/>
+            </a:fontRef>
+          </p:style>
+          <p:txBody>
+            <a:bodyPr rtlCol="0" anchor="ctr"/>
+            <a:lstStyle/>
+            <a:p>
+              <a:pPr algn="ctr"/>
+              <a:endParaRPr lang="es-AR"/>
+            </a:p>
+          </p:txBody>
+        </p:sp>
+        <p:sp>
+          <p:nvSpPr>
+            <p:cNvPr id="17" name="Rounded Rectangle 16"/>
+            <p:cNvSpPr/>
+            <p:nvPr/>
+          </p:nvSpPr>
+          <p:spPr>
+            <a:xfrm>
+              <a:off x="304800" y="4800600"/>
+              <a:ext cx="1752600" cy="1752600"/>
+            </a:xfrm>
+            <a:prstGeom prst="roundRect">
+              <a:avLst/>
+            </a:prstGeom>
+            <a:grpFill/>
+            <a:ln>
+              <a:noFill/>
+            </a:ln>
+          </p:spPr>
+          <p:style>
+            <a:lnRef idx="2">
+              <a:schemeClr val="accent1">
+                <a:shade val="50000"/>
+              </a:schemeClr>
+            </a:lnRef>
+            <a:fillRef idx="1">
+              <a:schemeClr val="accent1"/>
+            </a:fillRef>
+            <a:effectRef idx="0">
+              <a:schemeClr val="accent1"/>
+            </a:effectRef>
+            <a:fontRef idx="minor">
+              <a:schemeClr val="lt1"/>
+            </a:fontRef>
+          </p:style>
+          <p:txBody>
+            <a:bodyPr rtlCol="0" anchor="ctr"/>
+            <a:lstStyle/>
+            <a:p>
+              <a:pPr algn="ctr"/>
+              <a:endParaRPr lang="es-AR"/>
+            </a:p>
+          </p:txBody>
+        </p:sp>
+        <p:sp>
+          <p:nvSpPr>
+            <p:cNvPr id="19" name="Rounded Rectangle 18"/>
+            <p:cNvSpPr/>
+            <p:nvPr/>
+          </p:nvSpPr>
+          <p:spPr>
+            <a:xfrm>
+              <a:off x="7086600" y="4800600"/>
+              <a:ext cx="1752600" cy="1752600"/>
+            </a:xfrm>
+            <a:prstGeom prst="roundRect">
+              <a:avLst/>
+            </a:prstGeom>
+            <a:grpFill/>
+            <a:ln>
+              <a:noFill/>
+            </a:ln>
+          </p:spPr>
+          <p:style>
+            <a:lnRef idx="2">
+              <a:schemeClr val="accent1">
+                <a:shade val="50000"/>
+              </a:schemeClr>
+            </a:lnRef>
+            <a:fillRef idx="1">
+              <a:schemeClr val="accent1"/>
+            </a:fillRef>
+            <a:effectRef idx="0">
+              <a:schemeClr val="accent1"/>
+            </a:effectRef>
+            <a:fontRef idx="minor">
+              <a:schemeClr val="lt1"/>
+            </a:fontRef>
+          </p:style>
+          <p:txBody>
+            <a:bodyPr rtlCol="0" anchor="ctr"/>
+            <a:lstStyle/>
+            <a:p>
+              <a:pPr algn="ctr"/>
+              <a:endParaRPr lang="es-AR"/>
+            </a:p>
+          </p:txBody>
+        </p:sp>
+      </p:grpSp>
+      <p:sp>
+        <p:nvSpPr>
+          <p:cNvPr id="40" name="Freeform 39"/>
+          <p:cNvSpPr/>
+          <p:nvPr/>
+        </p:nvSpPr>
+        <p:spPr>
+          <a:xfrm>
+            <a:off x="457200" y="457200"/>
+            <a:ext cx="8229600" cy="5803900"/>
+          </a:xfrm>
+          <a:custGeom>
+            <a:avLst/>
+            <a:gdLst>
+              <a:gd name="connsiteX0" fmla="*/ 0 w 8077200"/>
+              <a:gd name="connsiteY0" fmla="*/ 965219 h 5791200"/>
+              <a:gd name="connsiteX1" fmla="*/ 282707 w 8077200"/>
+              <a:gd name="connsiteY1" fmla="*/ 282706 h 5791200"/>
+              <a:gd name="connsiteX2" fmla="*/ 965221 w 8077200"/>
+              <a:gd name="connsiteY2" fmla="*/ 1 h 5791200"/>
+              <a:gd name="connsiteX3" fmla="*/ 7111981 w 8077200"/>
+              <a:gd name="connsiteY3" fmla="*/ 0 h 5791200"/>
+              <a:gd name="connsiteX4" fmla="*/ 7794494 w 8077200"/>
+              <a:gd name="connsiteY4" fmla="*/ 282707 h 5791200"/>
+              <a:gd name="connsiteX5" fmla="*/ 8077199 w 8077200"/>
+              <a:gd name="connsiteY5" fmla="*/ 965221 h 5791200"/>
+              <a:gd name="connsiteX6" fmla="*/ 8077200 w 8077200"/>
+              <a:gd name="connsiteY6" fmla="*/ 4825981 h 5791200"/>
+              <a:gd name="connsiteX7" fmla="*/ 7794494 w 8077200"/>
+              <a:gd name="connsiteY7" fmla="*/ 5508494 h 5791200"/>
+              <a:gd name="connsiteX8" fmla="*/ 7111981 w 8077200"/>
+              <a:gd name="connsiteY8" fmla="*/ 5791200 h 5791200"/>
+              <a:gd name="connsiteX9" fmla="*/ 965219 w 8077200"/>
+              <a:gd name="connsiteY9" fmla="*/ 5791200 h 5791200"/>
+              <a:gd name="connsiteX10" fmla="*/ 282706 w 8077200"/>
+              <a:gd name="connsiteY10" fmla="*/ 5508493 h 5791200"/>
+              <a:gd name="connsiteX11" fmla="*/ 0 w 8077200"/>
+              <a:gd name="connsiteY11" fmla="*/ 4825980 h 5791200"/>
+              <a:gd name="connsiteX12" fmla="*/ 0 w 8077200"/>
+              <a:gd name="connsiteY12" fmla="*/ 965219 h 5791200"/>
+              <a:gd name="connsiteX0" fmla="*/ 0 w 8077200"/>
+              <a:gd name="connsiteY0" fmla="*/ 609600 h 5791200"/>
+              <a:gd name="connsiteX1" fmla="*/ 282707 w 8077200"/>
+              <a:gd name="connsiteY1" fmla="*/ 282706 h 5791200"/>
+              <a:gd name="connsiteX2" fmla="*/ 965221 w 8077200"/>
+              <a:gd name="connsiteY2" fmla="*/ 1 h 5791200"/>
+              <a:gd name="connsiteX3" fmla="*/ 7111981 w 8077200"/>
+              <a:gd name="connsiteY3" fmla="*/ 0 h 5791200"/>
+              <a:gd name="connsiteX4" fmla="*/ 7794494 w 8077200"/>
+              <a:gd name="connsiteY4" fmla="*/ 282707 h 5791200"/>
+              <a:gd name="connsiteX5" fmla="*/ 8077199 w 8077200"/>
+              <a:gd name="connsiteY5" fmla="*/ 965221 h 5791200"/>
+              <a:gd name="connsiteX6" fmla="*/ 8077200 w 8077200"/>
+              <a:gd name="connsiteY6" fmla="*/ 4825981 h 5791200"/>
+              <a:gd name="connsiteX7" fmla="*/ 7794494 w 8077200"/>
+              <a:gd name="connsiteY7" fmla="*/ 5508494 h 5791200"/>
+              <a:gd name="connsiteX8" fmla="*/ 7111981 w 8077200"/>
+              <a:gd name="connsiteY8" fmla="*/ 5791200 h 5791200"/>
+              <a:gd name="connsiteX9" fmla="*/ 965219 w 8077200"/>
+              <a:gd name="connsiteY9" fmla="*/ 5791200 h 5791200"/>
+              <a:gd name="connsiteX10" fmla="*/ 282706 w 8077200"/>
+              <a:gd name="connsiteY10" fmla="*/ 5508493 h 5791200"/>
+              <a:gd name="connsiteX11" fmla="*/ 0 w 8077200"/>
+              <a:gd name="connsiteY11" fmla="*/ 4825980 h 5791200"/>
+              <a:gd name="connsiteX12" fmla="*/ 0 w 8077200"/>
+              <a:gd name="connsiteY12" fmla="*/ 609600 h 5791200"/>
+              <a:gd name="connsiteX0" fmla="*/ 0 w 8077200"/>
+              <a:gd name="connsiteY0" fmla="*/ 609601 h 5791201"/>
+              <a:gd name="connsiteX1" fmla="*/ 282707 w 8077200"/>
+              <a:gd name="connsiteY1" fmla="*/ 282707 h 5791201"/>
+              <a:gd name="connsiteX2" fmla="*/ 609600 w 8077200"/>
+              <a:gd name="connsiteY2" fmla="*/ 1 h 5791201"/>
+              <a:gd name="connsiteX3" fmla="*/ 7111981 w 8077200"/>
+              <a:gd name="connsiteY3" fmla="*/ 1 h 5791201"/>
+              <a:gd name="connsiteX4" fmla="*/ 7794494 w 8077200"/>
+              <a:gd name="connsiteY4" fmla="*/ 282708 h 5791201"/>
+              <a:gd name="connsiteX5" fmla="*/ 8077199 w 8077200"/>
+              <a:gd name="connsiteY5" fmla="*/ 965222 h 5791201"/>
+              <a:gd name="connsiteX6" fmla="*/ 8077200 w 8077200"/>
+              <a:gd name="connsiteY6" fmla="*/ 4825982 h 5791201"/>
+              <a:gd name="connsiteX7" fmla="*/ 7794494 w 8077200"/>
+              <a:gd name="connsiteY7" fmla="*/ 5508495 h 5791201"/>
+              <a:gd name="connsiteX8" fmla="*/ 7111981 w 8077200"/>
+              <a:gd name="connsiteY8" fmla="*/ 5791201 h 5791201"/>
+              <a:gd name="connsiteX9" fmla="*/ 965219 w 8077200"/>
+              <a:gd name="connsiteY9" fmla="*/ 5791201 h 5791201"/>
+              <a:gd name="connsiteX10" fmla="*/ 282706 w 8077200"/>
+              <a:gd name="connsiteY10" fmla="*/ 5508494 h 5791201"/>
+              <a:gd name="connsiteX11" fmla="*/ 0 w 8077200"/>
+              <a:gd name="connsiteY11" fmla="*/ 4825981 h 5791201"/>
+              <a:gd name="connsiteX12" fmla="*/ 0 w 8077200"/>
+              <a:gd name="connsiteY12" fmla="*/ 609601 h 5791201"/>
+              <a:gd name="connsiteX0" fmla="*/ 0 w 8077200"/>
+              <a:gd name="connsiteY0" fmla="*/ 609601 h 5791201"/>
+              <a:gd name="connsiteX1" fmla="*/ 152400 w 8077200"/>
+              <a:gd name="connsiteY1" fmla="*/ 152402 h 5791201"/>
+              <a:gd name="connsiteX2" fmla="*/ 609600 w 8077200"/>
+              <a:gd name="connsiteY2" fmla="*/ 1 h 5791201"/>
+              <a:gd name="connsiteX3" fmla="*/ 7111981 w 8077200"/>
+              <a:gd name="connsiteY3" fmla="*/ 1 h 5791201"/>
+              <a:gd name="connsiteX4" fmla="*/ 7794494 w 8077200"/>
+              <a:gd name="connsiteY4" fmla="*/ 282708 h 5791201"/>
+              <a:gd name="connsiteX5" fmla="*/ 8077199 w 8077200"/>
+              <a:gd name="connsiteY5" fmla="*/ 965222 h 5791201"/>
+              <a:gd name="connsiteX6" fmla="*/ 8077200 w 8077200"/>
+              <a:gd name="connsiteY6" fmla="*/ 4825982 h 5791201"/>
+              <a:gd name="connsiteX7" fmla="*/ 7794494 w 8077200"/>
+              <a:gd name="connsiteY7" fmla="*/ 5508495 h 5791201"/>
+              <a:gd name="connsiteX8" fmla="*/ 7111981 w 8077200"/>
+              <a:gd name="connsiteY8" fmla="*/ 5791201 h 5791201"/>
+              <a:gd name="connsiteX9" fmla="*/ 965219 w 8077200"/>
+              <a:gd name="connsiteY9" fmla="*/ 5791201 h 5791201"/>
+              <a:gd name="connsiteX10" fmla="*/ 282706 w 8077200"/>
+              <a:gd name="connsiteY10" fmla="*/ 5508494 h 5791201"/>
+              <a:gd name="connsiteX11" fmla="*/ 0 w 8077200"/>
+              <a:gd name="connsiteY11" fmla="*/ 4825981 h 5791201"/>
+              <a:gd name="connsiteX12" fmla="*/ 0 w 8077200"/>
+              <a:gd name="connsiteY12" fmla="*/ 609601 h 5791201"/>
+              <a:gd name="connsiteX0" fmla="*/ 0 w 8077200"/>
+              <a:gd name="connsiteY0" fmla="*/ 609600 h 5791200"/>
+              <a:gd name="connsiteX1" fmla="*/ 152400 w 8077200"/>
+              <a:gd name="connsiteY1" fmla="*/ 152401 h 5791200"/>
+              <a:gd name="connsiteX2" fmla="*/ 533400 w 8077200"/>
+              <a:gd name="connsiteY2" fmla="*/ 1 h 5791200"/>
+              <a:gd name="connsiteX3" fmla="*/ 7111981 w 8077200"/>
+              <a:gd name="connsiteY3" fmla="*/ 0 h 5791200"/>
+              <a:gd name="connsiteX4" fmla="*/ 7794494 w 8077200"/>
+              <a:gd name="connsiteY4" fmla="*/ 282707 h 5791200"/>
+              <a:gd name="connsiteX5" fmla="*/ 8077199 w 8077200"/>
+              <a:gd name="connsiteY5" fmla="*/ 965221 h 5791200"/>
+              <a:gd name="connsiteX6" fmla="*/ 8077200 w 8077200"/>
+              <a:gd name="connsiteY6" fmla="*/ 4825981 h 5791200"/>
+              <a:gd name="connsiteX7" fmla="*/ 7794494 w 8077200"/>
+              <a:gd name="connsiteY7" fmla="*/ 5508494 h 5791200"/>
+              <a:gd name="connsiteX8" fmla="*/ 7111981 w 8077200"/>
+              <a:gd name="connsiteY8" fmla="*/ 5791200 h 5791200"/>
+              <a:gd name="connsiteX9" fmla="*/ 965219 w 8077200"/>
+              <a:gd name="connsiteY9" fmla="*/ 5791200 h 5791200"/>
+              <a:gd name="connsiteX10" fmla="*/ 282706 w 8077200"/>
+              <a:gd name="connsiteY10" fmla="*/ 5508493 h 5791200"/>
+              <a:gd name="connsiteX11" fmla="*/ 0 w 8077200"/>
+              <a:gd name="connsiteY11" fmla="*/ 4825980 h 5791200"/>
+              <a:gd name="connsiteX12" fmla="*/ 0 w 8077200"/>
+              <a:gd name="connsiteY12" fmla="*/ 609600 h 5791200"/>
+              <a:gd name="connsiteX0" fmla="*/ 0 w 8077200"/>
+              <a:gd name="connsiteY0" fmla="*/ 533400 h 5791200"/>
+              <a:gd name="connsiteX1" fmla="*/ 152400 w 8077200"/>
+              <a:gd name="connsiteY1" fmla="*/ 152401 h 5791200"/>
+              <a:gd name="connsiteX2" fmla="*/ 533400 w 8077200"/>
+              <a:gd name="connsiteY2" fmla="*/ 1 h 5791200"/>
+              <a:gd name="connsiteX3" fmla="*/ 7111981 w 8077200"/>
+              <a:gd name="connsiteY3" fmla="*/ 0 h 5791200"/>
+              <a:gd name="connsiteX4" fmla="*/ 7794494 w 8077200"/>
+              <a:gd name="connsiteY4" fmla="*/ 282707 h 5791200"/>
+              <a:gd name="connsiteX5" fmla="*/ 8077199 w 8077200"/>
+              <a:gd name="connsiteY5" fmla="*/ 965221 h 5791200"/>
+              <a:gd name="connsiteX6" fmla="*/ 8077200 w 8077200"/>
+              <a:gd name="connsiteY6" fmla="*/ 4825981 h 5791200"/>
+              <a:gd name="connsiteX7" fmla="*/ 7794494 w 8077200"/>
+              <a:gd name="connsiteY7" fmla="*/ 5508494 h 5791200"/>
+              <a:gd name="connsiteX8" fmla="*/ 7111981 w 8077200"/>
+              <a:gd name="connsiteY8" fmla="*/ 5791200 h 5791200"/>
+              <a:gd name="connsiteX9" fmla="*/ 965219 w 8077200"/>
+              <a:gd name="connsiteY9" fmla="*/ 5791200 h 5791200"/>
+              <a:gd name="connsiteX10" fmla="*/ 282706 w 8077200"/>
+              <a:gd name="connsiteY10" fmla="*/ 5508493 h 5791200"/>
+              <a:gd name="connsiteX11" fmla="*/ 0 w 8077200"/>
+              <a:gd name="connsiteY11" fmla="*/ 4825980 h 5791200"/>
+              <a:gd name="connsiteX12" fmla="*/ 0 w 8077200"/>
+              <a:gd name="connsiteY12" fmla="*/ 533400 h 5791200"/>
+              <a:gd name="connsiteX0" fmla="*/ 12700 w 8089900"/>
+              <a:gd name="connsiteY0" fmla="*/ 546100 h 5803900"/>
+              <a:gd name="connsiteX1" fmla="*/ 88900 w 8089900"/>
+              <a:gd name="connsiteY1" fmla="*/ 88900 h 5803900"/>
+              <a:gd name="connsiteX2" fmla="*/ 546100 w 8089900"/>
+              <a:gd name="connsiteY2" fmla="*/ 12701 h 5803900"/>
+              <a:gd name="connsiteX3" fmla="*/ 7124681 w 8089900"/>
+              <a:gd name="connsiteY3" fmla="*/ 12700 h 5803900"/>
+              <a:gd name="connsiteX4" fmla="*/ 7807194 w 8089900"/>
+              <a:gd name="connsiteY4" fmla="*/ 295407 h 5803900"/>
+              <a:gd name="connsiteX5" fmla="*/ 8089899 w 8089900"/>
+              <a:gd name="connsiteY5" fmla="*/ 977921 h 5803900"/>
+              <a:gd name="connsiteX6" fmla="*/ 8089900 w 8089900"/>
+              <a:gd name="connsiteY6" fmla="*/ 4838681 h 5803900"/>
+              <a:gd name="connsiteX7" fmla="*/ 7807194 w 8089900"/>
+              <a:gd name="connsiteY7" fmla="*/ 5521194 h 5803900"/>
+              <a:gd name="connsiteX8" fmla="*/ 7124681 w 8089900"/>
+              <a:gd name="connsiteY8" fmla="*/ 5803900 h 5803900"/>
+              <a:gd name="connsiteX9" fmla="*/ 977919 w 8089900"/>
+              <a:gd name="connsiteY9" fmla="*/ 5803900 h 5803900"/>
+              <a:gd name="connsiteX10" fmla="*/ 295406 w 8089900"/>
+              <a:gd name="connsiteY10" fmla="*/ 5521193 h 5803900"/>
+              <a:gd name="connsiteX11" fmla="*/ 12700 w 8089900"/>
+              <a:gd name="connsiteY11" fmla="*/ 4838680 h 5803900"/>
+              <a:gd name="connsiteX12" fmla="*/ 12700 w 8089900"/>
+              <a:gd name="connsiteY12" fmla="*/ 546100 h 5803900"/>
+              <a:gd name="connsiteX0" fmla="*/ 12700 w 8089900"/>
+              <a:gd name="connsiteY0" fmla="*/ 546100 h 5803900"/>
+              <a:gd name="connsiteX1" fmla="*/ 88900 w 8089900"/>
+              <a:gd name="connsiteY1" fmla="*/ 88900 h 5803900"/>
+              <a:gd name="connsiteX2" fmla="*/ 546100 w 8089900"/>
+              <a:gd name="connsiteY2" fmla="*/ 12701 h 5803900"/>
+              <a:gd name="connsiteX3" fmla="*/ 7124681 w 8089900"/>
+              <a:gd name="connsiteY3" fmla="*/ 12700 h 5803900"/>
+              <a:gd name="connsiteX4" fmla="*/ 7807194 w 8089900"/>
+              <a:gd name="connsiteY4" fmla="*/ 295407 h 5803900"/>
+              <a:gd name="connsiteX5" fmla="*/ 8089899 w 8089900"/>
+              <a:gd name="connsiteY5" fmla="*/ 977921 h 5803900"/>
+              <a:gd name="connsiteX6" fmla="*/ 8089900 w 8089900"/>
+              <a:gd name="connsiteY6" fmla="*/ 4838681 h 5803900"/>
+              <a:gd name="connsiteX7" fmla="*/ 7807194 w 8089900"/>
+              <a:gd name="connsiteY7" fmla="*/ 5521194 h 5803900"/>
+              <a:gd name="connsiteX8" fmla="*/ 7124681 w 8089900"/>
+              <a:gd name="connsiteY8" fmla="*/ 5803900 h 5803900"/>
+              <a:gd name="connsiteX9" fmla="*/ 977919 w 8089900"/>
+              <a:gd name="connsiteY9" fmla="*/ 5803900 h 5803900"/>
+              <a:gd name="connsiteX10" fmla="*/ 295406 w 8089900"/>
+              <a:gd name="connsiteY10" fmla="*/ 5521193 h 5803900"/>
+              <a:gd name="connsiteX11" fmla="*/ 12700 w 8089900"/>
+              <a:gd name="connsiteY11" fmla="*/ 5346700 h 5803900"/>
+              <a:gd name="connsiteX12" fmla="*/ 12700 w 8089900"/>
+              <a:gd name="connsiteY12" fmla="*/ 546100 h 5803900"/>
+              <a:gd name="connsiteX0" fmla="*/ 12700 w 8089900"/>
+              <a:gd name="connsiteY0" fmla="*/ 546100 h 5803900"/>
+              <a:gd name="connsiteX1" fmla="*/ 88900 w 8089900"/>
+              <a:gd name="connsiteY1" fmla="*/ 88900 h 5803900"/>
+              <a:gd name="connsiteX2" fmla="*/ 546100 w 8089900"/>
+              <a:gd name="connsiteY2" fmla="*/ 12701 h 5803900"/>
+              <a:gd name="connsiteX3" fmla="*/ 7124681 w 8089900"/>
+              <a:gd name="connsiteY3" fmla="*/ 12700 h 5803900"/>
+              <a:gd name="connsiteX4" fmla="*/ 7807194 w 8089900"/>
+              <a:gd name="connsiteY4" fmla="*/ 295407 h 5803900"/>
+              <a:gd name="connsiteX5" fmla="*/ 8089899 w 8089900"/>
+              <a:gd name="connsiteY5" fmla="*/ 977921 h 5803900"/>
+              <a:gd name="connsiteX6" fmla="*/ 8089900 w 8089900"/>
+              <a:gd name="connsiteY6" fmla="*/ 4838681 h 5803900"/>
+              <a:gd name="connsiteX7" fmla="*/ 7807194 w 8089900"/>
+              <a:gd name="connsiteY7" fmla="*/ 5521194 h 5803900"/>
+              <a:gd name="connsiteX8" fmla="*/ 7124681 w 8089900"/>
+              <a:gd name="connsiteY8" fmla="*/ 5803900 h 5803900"/>
+              <a:gd name="connsiteX9" fmla="*/ 546100 w 8089900"/>
+              <a:gd name="connsiteY9" fmla="*/ 5803900 h 5803900"/>
+              <a:gd name="connsiteX10" fmla="*/ 295406 w 8089900"/>
+              <a:gd name="connsiteY10" fmla="*/ 5521193 h 5803900"/>
+              <a:gd name="connsiteX11" fmla="*/ 12700 w 8089900"/>
+              <a:gd name="connsiteY11" fmla="*/ 5346700 h 5803900"/>
+              <a:gd name="connsiteX12" fmla="*/ 12700 w 8089900"/>
+              <a:gd name="connsiteY12" fmla="*/ 546100 h 5803900"/>
+              <a:gd name="connsiteX0" fmla="*/ 12700 w 8089900"/>
+              <a:gd name="connsiteY0" fmla="*/ 546100 h 5803900"/>
+              <a:gd name="connsiteX1" fmla="*/ 88900 w 8089900"/>
+              <a:gd name="connsiteY1" fmla="*/ 88900 h 5803900"/>
+              <a:gd name="connsiteX2" fmla="*/ 546100 w 8089900"/>
+              <a:gd name="connsiteY2" fmla="*/ 12701 h 5803900"/>
+              <a:gd name="connsiteX3" fmla="*/ 7124681 w 8089900"/>
+              <a:gd name="connsiteY3" fmla="*/ 12700 h 5803900"/>
+              <a:gd name="connsiteX4" fmla="*/ 7807194 w 8089900"/>
+              <a:gd name="connsiteY4" fmla="*/ 295407 h 5803900"/>
+              <a:gd name="connsiteX5" fmla="*/ 8089899 w 8089900"/>
+              <a:gd name="connsiteY5" fmla="*/ 977921 h 5803900"/>
+              <a:gd name="connsiteX6" fmla="*/ 8089900 w 8089900"/>
+              <a:gd name="connsiteY6" fmla="*/ 4838681 h 5803900"/>
+              <a:gd name="connsiteX7" fmla="*/ 7807194 w 8089900"/>
+              <a:gd name="connsiteY7" fmla="*/ 5521194 h 5803900"/>
+              <a:gd name="connsiteX8" fmla="*/ 7124681 w 8089900"/>
+              <a:gd name="connsiteY8" fmla="*/ 5803900 h 5803900"/>
+              <a:gd name="connsiteX9" fmla="*/ 546100 w 8089900"/>
+              <a:gd name="connsiteY9" fmla="*/ 5803900 h 5803900"/>
+              <a:gd name="connsiteX10" fmla="*/ 88900 w 8089900"/>
+              <a:gd name="connsiteY10" fmla="*/ 5727700 h 5803900"/>
+              <a:gd name="connsiteX11" fmla="*/ 12700 w 8089900"/>
+              <a:gd name="connsiteY11" fmla="*/ 5346700 h 5803900"/>
+              <a:gd name="connsiteX12" fmla="*/ 12700 w 8089900"/>
+              <a:gd name="connsiteY12" fmla="*/ 546100 h 5803900"/>
+              <a:gd name="connsiteX0" fmla="*/ 12700 w 8089900"/>
+              <a:gd name="connsiteY0" fmla="*/ 546100 h 5803900"/>
+              <a:gd name="connsiteX1" fmla="*/ 88900 w 8089900"/>
+              <a:gd name="connsiteY1" fmla="*/ 88900 h 5803900"/>
+              <a:gd name="connsiteX2" fmla="*/ 546100 w 8089900"/>
+              <a:gd name="connsiteY2" fmla="*/ 12701 h 5803900"/>
+              <a:gd name="connsiteX3" fmla="*/ 7556500 w 8089900"/>
+              <a:gd name="connsiteY3" fmla="*/ 12700 h 5803900"/>
+              <a:gd name="connsiteX4" fmla="*/ 7807194 w 8089900"/>
+              <a:gd name="connsiteY4" fmla="*/ 295407 h 5803900"/>
+              <a:gd name="connsiteX5" fmla="*/ 8089899 w 8089900"/>
+              <a:gd name="connsiteY5" fmla="*/ 977921 h 5803900"/>
+              <a:gd name="connsiteX6" fmla="*/ 8089900 w 8089900"/>
+              <a:gd name="connsiteY6" fmla="*/ 4838681 h 5803900"/>
+              <a:gd name="connsiteX7" fmla="*/ 7807194 w 8089900"/>
+              <a:gd name="connsiteY7" fmla="*/ 5521194 h 5803900"/>
+              <a:gd name="connsiteX8" fmla="*/ 7124681 w 8089900"/>
+              <a:gd name="connsiteY8" fmla="*/ 5803900 h 5803900"/>
+              <a:gd name="connsiteX9" fmla="*/ 546100 w 8089900"/>
+              <a:gd name="connsiteY9" fmla="*/ 5803900 h 5803900"/>
+              <a:gd name="connsiteX10" fmla="*/ 88900 w 8089900"/>
+              <a:gd name="connsiteY10" fmla="*/ 5727700 h 5803900"/>
+              <a:gd name="connsiteX11" fmla="*/ 12700 w 8089900"/>
+              <a:gd name="connsiteY11" fmla="*/ 5346700 h 5803900"/>
+              <a:gd name="connsiteX12" fmla="*/ 12700 w 8089900"/>
+              <a:gd name="connsiteY12" fmla="*/ 546100 h 5803900"/>
+              <a:gd name="connsiteX0" fmla="*/ 12700 w 8089901"/>
+              <a:gd name="connsiteY0" fmla="*/ 546100 h 5803900"/>
+              <a:gd name="connsiteX1" fmla="*/ 88900 w 8089901"/>
+              <a:gd name="connsiteY1" fmla="*/ 88900 h 5803900"/>
+              <a:gd name="connsiteX2" fmla="*/ 546100 w 8089901"/>
+              <a:gd name="connsiteY2" fmla="*/ 12701 h 5803900"/>
+              <a:gd name="connsiteX3" fmla="*/ 7556500 w 8089901"/>
+              <a:gd name="connsiteY3" fmla="*/ 12700 h 5803900"/>
+              <a:gd name="connsiteX4" fmla="*/ 7807194 w 8089901"/>
+              <a:gd name="connsiteY4" fmla="*/ 295407 h 5803900"/>
+              <a:gd name="connsiteX5" fmla="*/ 8089900 w 8089901"/>
+              <a:gd name="connsiteY5" fmla="*/ 469900 h 5803900"/>
+              <a:gd name="connsiteX6" fmla="*/ 8089900 w 8089901"/>
+              <a:gd name="connsiteY6" fmla="*/ 4838681 h 5803900"/>
+              <a:gd name="connsiteX7" fmla="*/ 7807194 w 8089901"/>
+              <a:gd name="connsiteY7" fmla="*/ 5521194 h 5803900"/>
+              <a:gd name="connsiteX8" fmla="*/ 7124681 w 8089901"/>
+              <a:gd name="connsiteY8" fmla="*/ 5803900 h 5803900"/>
+              <a:gd name="connsiteX9" fmla="*/ 546100 w 8089901"/>
+              <a:gd name="connsiteY9" fmla="*/ 5803900 h 5803900"/>
+              <a:gd name="connsiteX10" fmla="*/ 88900 w 8089901"/>
+              <a:gd name="connsiteY10" fmla="*/ 5727700 h 5803900"/>
+              <a:gd name="connsiteX11" fmla="*/ 12700 w 8089901"/>
+              <a:gd name="connsiteY11" fmla="*/ 5346700 h 5803900"/>
+              <a:gd name="connsiteX12" fmla="*/ 12700 w 8089901"/>
+              <a:gd name="connsiteY12" fmla="*/ 546100 h 5803900"/>
+              <a:gd name="connsiteX0" fmla="*/ 12700 w 8102600"/>
+              <a:gd name="connsiteY0" fmla="*/ 546100 h 5803900"/>
+              <a:gd name="connsiteX1" fmla="*/ 88900 w 8102600"/>
+              <a:gd name="connsiteY1" fmla="*/ 88900 h 5803900"/>
+              <a:gd name="connsiteX2" fmla="*/ 546100 w 8102600"/>
+              <a:gd name="connsiteY2" fmla="*/ 12701 h 5803900"/>
+              <a:gd name="connsiteX3" fmla="*/ 7556500 w 8102600"/>
+              <a:gd name="connsiteY3" fmla="*/ 12700 h 5803900"/>
+              <a:gd name="connsiteX4" fmla="*/ 8013700 w 8102600"/>
+              <a:gd name="connsiteY4" fmla="*/ 88900 h 5803900"/>
+              <a:gd name="connsiteX5" fmla="*/ 8089900 w 8102600"/>
+              <a:gd name="connsiteY5" fmla="*/ 469900 h 5803900"/>
+              <a:gd name="connsiteX6" fmla="*/ 8089900 w 8102600"/>
+              <a:gd name="connsiteY6" fmla="*/ 4838681 h 5803900"/>
+              <a:gd name="connsiteX7" fmla="*/ 7807194 w 8102600"/>
+              <a:gd name="connsiteY7" fmla="*/ 5521194 h 5803900"/>
+              <a:gd name="connsiteX8" fmla="*/ 7124681 w 8102600"/>
+              <a:gd name="connsiteY8" fmla="*/ 5803900 h 5803900"/>
+              <a:gd name="connsiteX9" fmla="*/ 546100 w 8102600"/>
+              <a:gd name="connsiteY9" fmla="*/ 5803900 h 5803900"/>
+              <a:gd name="connsiteX10" fmla="*/ 88900 w 8102600"/>
+              <a:gd name="connsiteY10" fmla="*/ 5727700 h 5803900"/>
+              <a:gd name="connsiteX11" fmla="*/ 12700 w 8102600"/>
+              <a:gd name="connsiteY11" fmla="*/ 5346700 h 5803900"/>
+              <a:gd name="connsiteX12" fmla="*/ 12700 w 8102600"/>
+              <a:gd name="connsiteY12" fmla="*/ 546100 h 5803900"/>
+              <a:gd name="connsiteX0" fmla="*/ 12700 w 8102600"/>
+              <a:gd name="connsiteY0" fmla="*/ 546100 h 5803900"/>
+              <a:gd name="connsiteX1" fmla="*/ 88900 w 8102600"/>
+              <a:gd name="connsiteY1" fmla="*/ 88900 h 5803900"/>
+              <a:gd name="connsiteX2" fmla="*/ 546100 w 8102600"/>
+              <a:gd name="connsiteY2" fmla="*/ 12701 h 5803900"/>
+              <a:gd name="connsiteX3" fmla="*/ 7556500 w 8102600"/>
+              <a:gd name="connsiteY3" fmla="*/ 12700 h 5803900"/>
+              <a:gd name="connsiteX4" fmla="*/ 8013700 w 8102600"/>
+              <a:gd name="connsiteY4" fmla="*/ 88900 h 5803900"/>
+              <a:gd name="connsiteX5" fmla="*/ 8089899 w 8102600"/>
+              <a:gd name="connsiteY5" fmla="*/ 469900 h 5803900"/>
+              <a:gd name="connsiteX6" fmla="*/ 8089900 w 8102600"/>
+              <a:gd name="connsiteY6" fmla="*/ 4838681 h 5803900"/>
+              <a:gd name="connsiteX7" fmla="*/ 7807194 w 8102600"/>
+              <a:gd name="connsiteY7" fmla="*/ 5521194 h 5803900"/>
+              <a:gd name="connsiteX8" fmla="*/ 7124681 w 8102600"/>
+              <a:gd name="connsiteY8" fmla="*/ 5803900 h 5803900"/>
+              <a:gd name="connsiteX9" fmla="*/ 546100 w 8102600"/>
+              <a:gd name="connsiteY9" fmla="*/ 5803900 h 5803900"/>
+              <a:gd name="connsiteX10" fmla="*/ 88900 w 8102600"/>
+              <a:gd name="connsiteY10" fmla="*/ 5727700 h 5803900"/>
+              <a:gd name="connsiteX11" fmla="*/ 12700 w 8102600"/>
+              <a:gd name="connsiteY11" fmla="*/ 5346700 h 5803900"/>
+              <a:gd name="connsiteX12" fmla="*/ 12700 w 8102600"/>
+              <a:gd name="connsiteY12" fmla="*/ 546100 h 5803900"/>
+              <a:gd name="connsiteX0" fmla="*/ 12700 w 8102599"/>
+              <a:gd name="connsiteY0" fmla="*/ 546100 h 5803900"/>
+              <a:gd name="connsiteX1" fmla="*/ 88900 w 8102599"/>
+              <a:gd name="connsiteY1" fmla="*/ 88900 h 5803900"/>
+              <a:gd name="connsiteX2" fmla="*/ 546100 w 8102599"/>
+              <a:gd name="connsiteY2" fmla="*/ 12701 h 5803900"/>
+              <a:gd name="connsiteX3" fmla="*/ 7556500 w 8102599"/>
+              <a:gd name="connsiteY3" fmla="*/ 12700 h 5803900"/>
+              <a:gd name="connsiteX4" fmla="*/ 8013699 w 8102599"/>
+              <a:gd name="connsiteY4" fmla="*/ 88900 h 5803900"/>
+              <a:gd name="connsiteX5" fmla="*/ 8089899 w 8102599"/>
+              <a:gd name="connsiteY5" fmla="*/ 469900 h 5803900"/>
+              <a:gd name="connsiteX6" fmla="*/ 8089900 w 8102599"/>
+              <a:gd name="connsiteY6" fmla="*/ 4838681 h 5803900"/>
+              <a:gd name="connsiteX7" fmla="*/ 7807194 w 8102599"/>
+              <a:gd name="connsiteY7" fmla="*/ 5521194 h 5803900"/>
+              <a:gd name="connsiteX8" fmla="*/ 7124681 w 8102599"/>
+              <a:gd name="connsiteY8" fmla="*/ 5803900 h 5803900"/>
+              <a:gd name="connsiteX9" fmla="*/ 546100 w 8102599"/>
+              <a:gd name="connsiteY9" fmla="*/ 5803900 h 5803900"/>
+              <a:gd name="connsiteX10" fmla="*/ 88900 w 8102599"/>
+              <a:gd name="connsiteY10" fmla="*/ 5727700 h 5803900"/>
+              <a:gd name="connsiteX11" fmla="*/ 12700 w 8102599"/>
+              <a:gd name="connsiteY11" fmla="*/ 5346700 h 5803900"/>
+              <a:gd name="connsiteX12" fmla="*/ 12700 w 8102599"/>
+              <a:gd name="connsiteY12" fmla="*/ 546100 h 5803900"/>
+              <a:gd name="connsiteX0" fmla="*/ 12700 w 8102599"/>
+              <a:gd name="connsiteY0" fmla="*/ 546100 h 5803900"/>
+              <a:gd name="connsiteX1" fmla="*/ 88900 w 8102599"/>
+              <a:gd name="connsiteY1" fmla="*/ 88900 h 5803900"/>
+              <a:gd name="connsiteX2" fmla="*/ 546100 w 8102599"/>
+              <a:gd name="connsiteY2" fmla="*/ 12701 h 5803900"/>
+              <a:gd name="connsiteX3" fmla="*/ 7556500 w 8102599"/>
+              <a:gd name="connsiteY3" fmla="*/ 12700 h 5803900"/>
+              <a:gd name="connsiteX4" fmla="*/ 8013699 w 8102599"/>
+              <a:gd name="connsiteY4" fmla="*/ 88900 h 5803900"/>
+              <a:gd name="connsiteX5" fmla="*/ 8089899 w 8102599"/>
+              <a:gd name="connsiteY5" fmla="*/ 469900 h 5803900"/>
+              <a:gd name="connsiteX6" fmla="*/ 8089900 w 8102599"/>
+              <a:gd name="connsiteY6" fmla="*/ 5346700 h 5803900"/>
+              <a:gd name="connsiteX7" fmla="*/ 7807194 w 8102599"/>
+              <a:gd name="connsiteY7" fmla="*/ 5521194 h 5803900"/>
+              <a:gd name="connsiteX8" fmla="*/ 7124681 w 8102599"/>
+              <a:gd name="connsiteY8" fmla="*/ 5803900 h 5803900"/>
+              <a:gd name="connsiteX9" fmla="*/ 546100 w 8102599"/>
+              <a:gd name="connsiteY9" fmla="*/ 5803900 h 5803900"/>
+              <a:gd name="connsiteX10" fmla="*/ 88900 w 8102599"/>
+              <a:gd name="connsiteY10" fmla="*/ 5727700 h 5803900"/>
+              <a:gd name="connsiteX11" fmla="*/ 12700 w 8102599"/>
+              <a:gd name="connsiteY11" fmla="*/ 5346700 h 5803900"/>
+              <a:gd name="connsiteX12" fmla="*/ 12700 w 8102599"/>
+              <a:gd name="connsiteY12" fmla="*/ 546100 h 5803900"/>
+              <a:gd name="connsiteX0" fmla="*/ 12700 w 8102599"/>
+              <a:gd name="connsiteY0" fmla="*/ 546100 h 5803900"/>
+              <a:gd name="connsiteX1" fmla="*/ 88900 w 8102599"/>
+              <a:gd name="connsiteY1" fmla="*/ 88900 h 5803900"/>
+              <a:gd name="connsiteX2" fmla="*/ 546100 w 8102599"/>
+              <a:gd name="connsiteY2" fmla="*/ 12701 h 5803900"/>
+              <a:gd name="connsiteX3" fmla="*/ 7556500 w 8102599"/>
+              <a:gd name="connsiteY3" fmla="*/ 12700 h 5803900"/>
+              <a:gd name="connsiteX4" fmla="*/ 8013699 w 8102599"/>
+              <a:gd name="connsiteY4" fmla="*/ 88900 h 5803900"/>
+              <a:gd name="connsiteX5" fmla="*/ 8089899 w 8102599"/>
+              <a:gd name="connsiteY5" fmla="*/ 469900 h 5803900"/>
+              <a:gd name="connsiteX6" fmla="*/ 8089900 w 8102599"/>
+              <a:gd name="connsiteY6" fmla="*/ 5346700 h 5803900"/>
+              <a:gd name="connsiteX7" fmla="*/ 7807194 w 8102599"/>
+              <a:gd name="connsiteY7" fmla="*/ 5521194 h 5803900"/>
+              <a:gd name="connsiteX8" fmla="*/ 7632700 w 8102599"/>
+              <a:gd name="connsiteY8" fmla="*/ 5803900 h 5803900"/>
+              <a:gd name="connsiteX9" fmla="*/ 546100 w 8102599"/>
+              <a:gd name="connsiteY9" fmla="*/ 5803900 h 5803900"/>
+              <a:gd name="connsiteX10" fmla="*/ 88900 w 8102599"/>
+              <a:gd name="connsiteY10" fmla="*/ 5727700 h 5803900"/>
+              <a:gd name="connsiteX11" fmla="*/ 12700 w 8102599"/>
+              <a:gd name="connsiteY11" fmla="*/ 5346700 h 5803900"/>
+              <a:gd name="connsiteX12" fmla="*/ 12700 w 8102599"/>
+              <a:gd name="connsiteY12" fmla="*/ 546100 h 5803900"/>
+              <a:gd name="connsiteX0" fmla="*/ 12700 w 8102599"/>
+              <a:gd name="connsiteY0" fmla="*/ 546100 h 5803900"/>
+              <a:gd name="connsiteX1" fmla="*/ 88900 w 8102599"/>
+              <a:gd name="connsiteY1" fmla="*/ 88900 h 5803900"/>
+              <a:gd name="connsiteX2" fmla="*/ 546100 w 8102599"/>
+              <a:gd name="connsiteY2" fmla="*/ 12701 h 5803900"/>
+              <a:gd name="connsiteX3" fmla="*/ 7556500 w 8102599"/>
+              <a:gd name="connsiteY3" fmla="*/ 12700 h 5803900"/>
+              <a:gd name="connsiteX4" fmla="*/ 8013699 w 8102599"/>
+              <a:gd name="connsiteY4" fmla="*/ 88900 h 5803900"/>
+              <a:gd name="connsiteX5" fmla="*/ 8089899 w 8102599"/>
+              <a:gd name="connsiteY5" fmla="*/ 469900 h 5803900"/>
+              <a:gd name="connsiteX6" fmla="*/ 8089900 w 8102599"/>
+              <a:gd name="connsiteY6" fmla="*/ 5346700 h 5803900"/>
+              <a:gd name="connsiteX7" fmla="*/ 8013700 w 8102599"/>
+              <a:gd name="connsiteY7" fmla="*/ 5727700 h 5803900"/>
+              <a:gd name="connsiteX8" fmla="*/ 7632700 w 8102599"/>
+              <a:gd name="connsiteY8" fmla="*/ 5803900 h 5803900"/>
+              <a:gd name="connsiteX9" fmla="*/ 546100 w 8102599"/>
+              <a:gd name="connsiteY9" fmla="*/ 5803900 h 5803900"/>
+              <a:gd name="connsiteX10" fmla="*/ 88900 w 8102599"/>
+              <a:gd name="connsiteY10" fmla="*/ 5727700 h 5803900"/>
+              <a:gd name="connsiteX11" fmla="*/ 12700 w 8102599"/>
+              <a:gd name="connsiteY11" fmla="*/ 5346700 h 5803900"/>
+              <a:gd name="connsiteX12" fmla="*/ 12700 w 8102599"/>
+              <a:gd name="connsiteY12" fmla="*/ 546100 h 5803900"/>
+            </a:gdLst>
+            <a:ahLst/>
+            <a:cxnLst>
+              <a:cxn ang="0">
+                <a:pos x="connsiteX0" y="connsiteY0"/>
+              </a:cxn>
+              <a:cxn ang="0">
+                <a:pos x="connsiteX1" y="connsiteY1"/>
+              </a:cxn>
+              <a:cxn ang="0">
+                <a:pos x="connsiteX2" y="connsiteY2"/>
+              </a:cxn>
+              <a:cxn ang="0">
+                <a:pos x="connsiteX3" y="connsiteY3"/>
+              </a:cxn>
+              <a:cxn ang="0">
+                <a:pos x="connsiteX4" y="connsiteY4"/>
+              </a:cxn>
+              <a:cxn ang="0">
+                <a:pos x="connsiteX5" y="connsiteY5"/>
+              </a:cxn>
+              <a:cxn ang="0">
+                <a:pos x="connsiteX6" y="connsiteY6"/>
+              </a:cxn>
+              <a:cxn ang="0">
+                <a:pos x="connsiteX7" y="connsiteY7"/>
+              </a:cxn>
+              <a:cxn ang="0">
+                <a:pos x="connsiteX8" y="connsiteY8"/>
+              </a:cxn>
+              <a:cxn ang="0">
+                <a:pos x="connsiteX9" y="connsiteY9"/>
+              </a:cxn>
+              <a:cxn ang="0">
+                <a:pos x="connsiteX10" y="connsiteY10"/>
+              </a:cxn>
+              <a:cxn ang="0">
+                <a:pos x="connsiteX11" y="connsiteY11"/>
+              </a:cxn>
+              <a:cxn ang="0">
+                <a:pos x="connsiteX12" y="connsiteY12"/>
+              </a:cxn>
+            </a:cxnLst>
+            <a:rect l="l" t="t" r="r" b="b"/>
+            <a:pathLst>
+              <a:path w="8102599" h="5803900">
+                <a:moveTo>
+                  <a:pt x="12700" y="546100"/>
+                </a:moveTo>
+                <a:cubicBezTo>
+                  <a:pt x="12700" y="290108"/>
+                  <a:pt x="0" y="177800"/>
+                  <a:pt x="88900" y="88900"/>
+                </a:cubicBezTo>
+                <a:cubicBezTo>
+                  <a:pt x="177800" y="0"/>
+                  <a:pt x="290107" y="12700"/>
+                  <a:pt x="546100" y="12701"/>
+                </a:cubicBezTo>
+                <a:lnTo>
+                  <a:pt x="7556500" y="12700"/>
+                </a:lnTo>
+                <a:cubicBezTo>
+                  <a:pt x="7812492" y="12700"/>
+                  <a:pt x="7924799" y="12700"/>
+                  <a:pt x="8013699" y="88900"/>
+                </a:cubicBezTo>
+                <a:cubicBezTo>
+                  <a:pt x="8102599" y="165100"/>
+                  <a:pt x="8089900" y="213907"/>
+                  <a:pt x="8089899" y="469900"/>
+                </a:cubicBezTo>
+                <a:cubicBezTo>
+                  <a:pt x="8089899" y="1926160"/>
+                  <a:pt x="8089900" y="3890440"/>
+                  <a:pt x="8089900" y="5346700"/>
+                </a:cubicBezTo>
+                <a:cubicBezTo>
+                  <a:pt x="8089900" y="5602692"/>
+                  <a:pt x="8089900" y="5651500"/>
+                  <a:pt x="8013700" y="5727700"/>
+                </a:cubicBezTo>
+                <a:cubicBezTo>
+                  <a:pt x="7937500" y="5803900"/>
+                  <a:pt x="7888692" y="5803900"/>
+                  <a:pt x="7632700" y="5803900"/>
+                </a:cubicBezTo>
+                <a:lnTo>
+                  <a:pt x="546100" y="5803900"/>
+                </a:lnTo>
+                <a:cubicBezTo>
+                  <a:pt x="290108" y="5803900"/>
+                  <a:pt x="177800" y="5803900"/>
+                  <a:pt x="88900" y="5727700"/>
+                </a:cubicBezTo>
+                <a:cubicBezTo>
+                  <a:pt x="0" y="5651500"/>
+                  <a:pt x="12700" y="5602692"/>
+                  <a:pt x="12700" y="5346700"/>
+                </a:cubicBezTo>
+                <a:lnTo>
+                  <a:pt x="12700" y="546100"/>
+                </a:lnTo>
+                <a:close/>
+              </a:path>
+            </a:pathLst>
+          </a:custGeom>
+          <a:gradFill>
+            <a:gsLst>
+              <a:gs pos="0">
+                <a:schemeClr val="bg1">
+                  <a:lumMod val="50000"/>
+                </a:schemeClr>
+              </a:gs>
+              <a:gs pos="39999">
+                <a:schemeClr val="bg1">
+                  <a:lumMod val="65000"/>
+                </a:schemeClr>
+              </a:gs>
+              <a:gs pos="70000">
+                <a:schemeClr val="bg1">
+                  <a:lumMod val="50000"/>
+                  <a:alpha val="73000"/>
+                </a:schemeClr>
+              </a:gs>
+            </a:gsLst>
+            <a:lin ang="5400000" scaled="0"/>
+          </a:gradFill>
+          <a:ln>
+            <a:solidFill>
+              <a:schemeClr val="bg1">
+                <a:lumMod val="75000"/>
+              </a:schemeClr>
+            </a:solidFill>
+          </a:ln>
+        </p:spPr>
+        <p:style>
+          <a:lnRef idx="2">
+            <a:schemeClr val="accent1">
+              <a:shade val="50000"/>
+            </a:schemeClr>
+          </a:lnRef>
+          <a:fillRef idx="1">
+            <a:schemeClr val="accent1"/>
+          </a:fillRef>
+          <a:effectRef idx="0">
+            <a:schemeClr val="accent1"/>
+          </a:effectRef>
+          <a:fontRef idx="minor">
+            <a:schemeClr val="lt1"/>
+          </a:fontRef>
+        </p:style>
+        <p:txBody>
+          <a:bodyPr rtlCol="0" anchor="ctr"/>
+          <a:lstStyle/>
+          <a:p>
+            <a:pPr fontAlgn="t"/>
+            <a:endParaRPr lang="es-AR" b="1" dirty="0" smtClean="0"/>
+          </a:p>
+          <a:p>
+            <a:pPr algn="ctr"/>
+            <a:endParaRPr lang="es-AR" dirty="0"/>
+          </a:p>
+        </p:txBody>
+      </p:sp>
+      <p:sp>
+        <p:nvSpPr>
+          <p:cNvPr id="14" name="Rectangle 13"/>
+          <p:cNvSpPr/>
+          <p:nvPr/>
+        </p:nvSpPr>
+        <p:spPr>
+          <a:xfrm>
+            <a:off x="381000" y="1295400"/>
+            <a:ext cx="8458200" cy="1066800"/>
+          </a:xfrm>
+          <a:prstGeom prst="rect">
+            <a:avLst/>
+          </a:prstGeom>
+          <a:noFill/>
+          <a:ln>
+            <a:noFill/>
+          </a:ln>
+        </p:spPr>
+        <p:style>
+          <a:lnRef idx="2">
+            <a:schemeClr val="accent1">
+              <a:shade val="50000"/>
+            </a:schemeClr>
+          </a:lnRef>
+          <a:fillRef idx="1">
+            <a:schemeClr val="accent1"/>
+          </a:fillRef>
+          <a:effectRef idx="0">
+            <a:schemeClr val="accent1"/>
+          </a:effectRef>
+          <a:fontRef idx="minor">
+            <a:schemeClr val="lt1"/>
+          </a:fontRef>
+        </p:style>
+        <p:txBody>
+          <a:bodyPr rtlCol="0" anchor="ctr"/>
+          <a:lstStyle/>
+          <a:p>
+            <a:pPr algn="ctr"/>
+            <a:r>
+              <a:rPr lang="es-AR" sz="4800" b="1" dirty="0" smtClean="0"/>
               <a:t>Interfaces</a:t>
             </a:r>
           </a:p>
@@ -5918,7 +7012,7 @@
 </p:sld>
 </file>
 
-<file path=ppt/slides/slide11.xml><?xml version="1.0" encoding="utf-8"?>
+<file path=ppt/slides/slide12.xml><?xml version="1.0" encoding="utf-8"?>
 <p:sld xmlns:a="http://schemas.openxmlformats.org/drawingml/2006/main" xmlns:r="http://schemas.openxmlformats.org/officeDocument/2006/relationships" xmlns:p="http://schemas.openxmlformats.org/presentationml/2006/main">
   <p:cSld>
     <p:spTree>
@@ -12539,7 +13633,7 @@
         </p:nvGrpSpPr>
         <p:grpSpPr>
           <a:xfrm>
-            <a:off x="304800" y="304800"/>
+            <a:off x="304800" y="228600"/>
             <a:ext cx="8534400" cy="6248400"/>
             <a:chOff x="304800" y="304800"/>
             <a:chExt cx="8534400" cy="6248400"/>
@@ -13597,7 +14691,7 @@
         </p:nvGrpSpPr>
         <p:grpSpPr>
           <a:xfrm>
-            <a:off x="762000" y="3428997"/>
+            <a:off x="609600" y="3733800"/>
             <a:ext cx="1295400" cy="566738"/>
             <a:chOff x="1291771" y="3439884"/>
             <a:chExt cx="1219200" cy="533400"/>
@@ -13804,7 +14898,7 @@
         </p:nvSpPr>
         <p:spPr>
           <a:xfrm>
-            <a:off x="2286000" y="2590800"/>
+            <a:off x="2514600" y="2590800"/>
             <a:ext cx="1295400" cy="566738"/>
           </a:xfrm>
           <a:prstGeom prst="rect">
@@ -13861,7 +14955,7 @@
         </p:nvSpPr>
         <p:spPr>
           <a:xfrm>
-            <a:off x="3388223" y="2677990"/>
+            <a:off x="3616823" y="2677990"/>
             <a:ext cx="121376" cy="174381"/>
           </a:xfrm>
           <a:prstGeom prst="rect">
@@ -13901,7 +14995,7 @@
         </p:nvSpPr>
         <p:spPr>
           <a:xfrm>
-            <a:off x="3338514" y="2791444"/>
+            <a:off x="3567114" y="2791444"/>
             <a:ext cx="113987" cy="42245"/>
           </a:xfrm>
           <a:prstGeom prst="rect">
@@ -13945,7 +15039,7 @@
         </p:nvSpPr>
         <p:spPr>
           <a:xfrm>
-            <a:off x="3338514" y="2710481"/>
+            <a:off x="3567114" y="2710481"/>
             <a:ext cx="113987" cy="42245"/>
           </a:xfrm>
           <a:prstGeom prst="rect">
@@ -13989,7 +15083,7 @@
         </p:nvSpPr>
         <p:spPr>
           <a:xfrm>
-            <a:off x="2286000" y="4419600"/>
+            <a:off x="2514600" y="4919662"/>
             <a:ext cx="1295400" cy="566738"/>
           </a:xfrm>
           <a:prstGeom prst="rect">
@@ -14046,7 +15140,7 @@
         </p:nvSpPr>
         <p:spPr>
           <a:xfrm>
-            <a:off x="3886200" y="2667000"/>
+            <a:off x="4419600" y="2590800"/>
             <a:ext cx="1295400" cy="566738"/>
           </a:xfrm>
           <a:prstGeom prst="rect">
@@ -14103,7 +15197,7 @@
         </p:nvSpPr>
         <p:spPr>
           <a:xfrm>
-            <a:off x="3886200" y="3657600"/>
+            <a:off x="4419600" y="3657600"/>
             <a:ext cx="1295400" cy="566738"/>
           </a:xfrm>
           <a:prstGeom prst="rect">
@@ -14160,7 +15254,7 @@
         </p:nvSpPr>
         <p:spPr>
           <a:xfrm>
-            <a:off x="4988423" y="3744790"/>
+            <a:off x="5521823" y="3744790"/>
             <a:ext cx="121376" cy="174381"/>
           </a:xfrm>
           <a:prstGeom prst="rect">
@@ -14200,7 +15294,7 @@
         </p:nvSpPr>
         <p:spPr>
           <a:xfrm>
-            <a:off x="4938714" y="3858244"/>
+            <a:off x="5472114" y="3858244"/>
             <a:ext cx="113987" cy="42245"/>
           </a:xfrm>
           <a:prstGeom prst="rect">
@@ -14244,7 +15338,7 @@
         </p:nvSpPr>
         <p:spPr>
           <a:xfrm>
-            <a:off x="4938714" y="3777281"/>
+            <a:off x="5472114" y="3777281"/>
             <a:ext cx="113987" cy="42245"/>
           </a:xfrm>
           <a:prstGeom prst="rect">
@@ -14288,7 +15382,7 @@
         </p:nvSpPr>
         <p:spPr>
           <a:xfrm>
-            <a:off x="3886200" y="4953000"/>
+            <a:off x="4419600" y="4919662"/>
             <a:ext cx="1295400" cy="566738"/>
           </a:xfrm>
           <a:prstGeom prst="rect">
@@ -14345,7 +15439,7 @@
         </p:nvSpPr>
         <p:spPr>
           <a:xfrm>
-            <a:off x="4988423" y="5040190"/>
+            <a:off x="5521823" y="5040190"/>
             <a:ext cx="121376" cy="174381"/>
           </a:xfrm>
           <a:prstGeom prst="rect">
@@ -14385,7 +15479,7 @@
         </p:nvSpPr>
         <p:spPr>
           <a:xfrm>
-            <a:off x="4938714" y="5153644"/>
+            <a:off x="5472114" y="5153644"/>
             <a:ext cx="113987" cy="42245"/>
           </a:xfrm>
           <a:prstGeom prst="rect">
@@ -14429,7 +15523,7 @@
         </p:nvSpPr>
         <p:spPr>
           <a:xfrm>
-            <a:off x="4938714" y="5072681"/>
+            <a:off x="5472114" y="5072681"/>
             <a:ext cx="113987" cy="42245"/>
           </a:xfrm>
           <a:prstGeom prst="rect">
@@ -14473,7 +15567,7 @@
         </p:nvSpPr>
         <p:spPr>
           <a:xfrm>
-            <a:off x="5638800" y="3733800"/>
+            <a:off x="6477000" y="3657600"/>
             <a:ext cx="1295400" cy="566738"/>
           </a:xfrm>
           <a:prstGeom prst="rect">
@@ -14530,7 +15624,7 @@
         </p:nvSpPr>
         <p:spPr>
           <a:xfrm>
-            <a:off x="7162800" y="3581400"/>
+            <a:off x="6477000" y="2743200"/>
             <a:ext cx="1295400" cy="566738"/>
           </a:xfrm>
           <a:prstGeom prst="rect">
@@ -14587,7 +15681,7 @@
         </p:nvSpPr>
         <p:spPr>
           <a:xfrm>
-            <a:off x="8265023" y="3668590"/>
+            <a:off x="7593509" y="2819400"/>
             <a:ext cx="121376" cy="174381"/>
           </a:xfrm>
           <a:prstGeom prst="rect">
@@ -14627,7 +15721,7 @@
         </p:nvSpPr>
         <p:spPr>
           <a:xfrm>
-            <a:off x="8215314" y="3782044"/>
+            <a:off x="7543800" y="2932854"/>
             <a:ext cx="113987" cy="42245"/>
           </a:xfrm>
           <a:prstGeom prst="rect">
@@ -14671,7 +15765,7 @@
         </p:nvSpPr>
         <p:spPr>
           <a:xfrm>
-            <a:off x="8215314" y="3701081"/>
+            <a:off x="7543800" y="2851891"/>
             <a:ext cx="113987" cy="42245"/>
           </a:xfrm>
           <a:prstGeom prst="rect">
@@ -14715,7 +15809,7 @@
         </p:nvSpPr>
         <p:spPr>
           <a:xfrm>
-            <a:off x="5715000" y="4724400"/>
+            <a:off x="6477000" y="4876800"/>
             <a:ext cx="1295400" cy="566738"/>
           </a:xfrm>
           <a:prstGeom prst="rect">
@@ -14772,7 +15866,7 @@
         </p:nvSpPr>
         <p:spPr>
           <a:xfrm>
-            <a:off x="5002709" y="2710709"/>
+            <a:off x="5536109" y="2645019"/>
             <a:ext cx="121376" cy="174381"/>
           </a:xfrm>
           <a:prstGeom prst="rect">
@@ -14812,7 +15906,7 @@
         </p:nvSpPr>
         <p:spPr>
           <a:xfrm>
-            <a:off x="4953000" y="2824163"/>
+            <a:off x="5486400" y="2758473"/>
             <a:ext cx="113987" cy="42245"/>
           </a:xfrm>
           <a:prstGeom prst="rect">
@@ -14856,7 +15950,7 @@
         </p:nvSpPr>
         <p:spPr>
           <a:xfrm>
-            <a:off x="4953000" y="2743200"/>
+            <a:off x="5486400" y="2677510"/>
             <a:ext cx="113987" cy="42245"/>
           </a:xfrm>
           <a:prstGeom prst="rect">
@@ -14900,7 +15994,7 @@
         </p:nvSpPr>
         <p:spPr>
           <a:xfrm>
-            <a:off x="3402509" y="4463309"/>
+            <a:off x="3631109" y="4963371"/>
             <a:ext cx="121376" cy="174381"/>
           </a:xfrm>
           <a:prstGeom prst="rect">
@@ -14940,7 +16034,7 @@
         </p:nvSpPr>
         <p:spPr>
           <a:xfrm>
-            <a:off x="3352800" y="4576763"/>
+            <a:off x="3581400" y="5076825"/>
             <a:ext cx="113987" cy="42245"/>
           </a:xfrm>
           <a:prstGeom prst="rect">
@@ -14984,7 +16078,7 @@
         </p:nvSpPr>
         <p:spPr>
           <a:xfrm>
-            <a:off x="3352800" y="4495800"/>
+            <a:off x="3581400" y="4995862"/>
             <a:ext cx="113987" cy="42245"/>
           </a:xfrm>
           <a:prstGeom prst="rect">
@@ -15028,7 +16122,7 @@
         </p:nvSpPr>
         <p:spPr>
           <a:xfrm>
-            <a:off x="6705600" y="3810000"/>
+            <a:off x="7574824" y="3733800"/>
             <a:ext cx="121376" cy="174381"/>
           </a:xfrm>
           <a:prstGeom prst="rect">
@@ -15068,7 +16162,7 @@
         </p:nvSpPr>
         <p:spPr>
           <a:xfrm>
-            <a:off x="6655891" y="3923454"/>
+            <a:off x="7525115" y="3847254"/>
             <a:ext cx="113987" cy="42245"/>
           </a:xfrm>
           <a:prstGeom prst="rect">
@@ -15112,7 +16206,7 @@
         </p:nvSpPr>
         <p:spPr>
           <a:xfrm>
-            <a:off x="6655891" y="3842491"/>
+            <a:off x="7525115" y="3766291"/>
             <a:ext cx="113987" cy="42245"/>
           </a:xfrm>
           <a:prstGeom prst="rect">
@@ -15156,7 +16250,7 @@
         </p:nvSpPr>
         <p:spPr>
           <a:xfrm>
-            <a:off x="6831509" y="4763346"/>
+            <a:off x="7593509" y="4915746"/>
             <a:ext cx="121376" cy="174381"/>
           </a:xfrm>
           <a:prstGeom prst="rect">
@@ -15196,7 +16290,7 @@
         </p:nvSpPr>
         <p:spPr>
           <a:xfrm>
-            <a:off x="6781800" y="4876800"/>
+            <a:off x="7543800" y="5029200"/>
             <a:ext cx="113987" cy="42245"/>
           </a:xfrm>
           <a:prstGeom prst="rect">
@@ -15240,7 +16334,7 @@
         </p:nvSpPr>
         <p:spPr>
           <a:xfrm>
-            <a:off x="6781800" y="4795837"/>
+            <a:off x="7543800" y="4948237"/>
             <a:ext cx="113987" cy="42245"/>
           </a:xfrm>
           <a:prstGeom prst="rect">
@@ -15273,6 +16367,368 @@
           <a:p>
             <a:pPr algn="ctr"/>
             <a:endParaRPr lang="es-AR" sz="1600"/>
+          </a:p>
+        </p:txBody>
+      </p:sp>
+      <p:cxnSp>
+        <p:nvCxnSpPr>
+          <p:cNvPr id="53" name="52 Conector recto de flecha"/>
+          <p:cNvCxnSpPr>
+            <a:endCxn id="72" idx="1"/>
+          </p:cNvCxnSpPr>
+          <p:nvPr/>
+        </p:nvCxnSpPr>
+        <p:spPr>
+          <a:xfrm rot="5400000" flipH="1" flipV="1">
+            <a:off x="1703786" y="3075386"/>
+            <a:ext cx="1012031" cy="609598"/>
+          </a:xfrm>
+          <a:prstGeom prst="straightConnector1">
+            <a:avLst/>
+          </a:prstGeom>
+          <a:ln>
+            <a:prstDash val="dash"/>
+            <a:tailEnd type="arrow"/>
+          </a:ln>
+        </p:spPr>
+        <p:style>
+          <a:lnRef idx="1">
+            <a:schemeClr val="dk1"/>
+          </a:lnRef>
+          <a:fillRef idx="0">
+            <a:schemeClr val="dk1"/>
+          </a:fillRef>
+          <a:effectRef idx="0">
+            <a:schemeClr val="dk1"/>
+          </a:effectRef>
+          <a:fontRef idx="minor">
+            <a:schemeClr val="tx1"/>
+          </a:fontRef>
+        </p:style>
+      </p:cxnSp>
+      <p:cxnSp>
+        <p:nvCxnSpPr>
+          <p:cNvPr id="55" name="54 Conector recto de flecha"/>
+          <p:cNvCxnSpPr/>
+          <p:nvPr/>
+        </p:nvCxnSpPr>
+        <p:spPr>
+          <a:xfrm>
+            <a:off x="1905000" y="4017169"/>
+            <a:ext cx="609601" cy="1185861"/>
+          </a:xfrm>
+          <a:prstGeom prst="straightConnector1">
+            <a:avLst/>
+          </a:prstGeom>
+          <a:ln>
+            <a:prstDash val="dash"/>
+            <a:tailEnd type="arrow"/>
+          </a:ln>
+        </p:spPr>
+        <p:style>
+          <a:lnRef idx="1">
+            <a:schemeClr val="dk1"/>
+          </a:lnRef>
+          <a:fillRef idx="0">
+            <a:schemeClr val="dk1"/>
+          </a:fillRef>
+          <a:effectRef idx="0">
+            <a:schemeClr val="dk1"/>
+          </a:effectRef>
+          <a:fontRef idx="minor">
+            <a:schemeClr val="tx1"/>
+          </a:fontRef>
+        </p:style>
+      </p:cxnSp>
+      <p:cxnSp>
+        <p:nvCxnSpPr>
+          <p:cNvPr id="59" name="58 Conector recto de flecha"/>
+          <p:cNvCxnSpPr>
+            <a:stCxn id="72" idx="3"/>
+            <a:endCxn id="80" idx="1"/>
+          </p:cNvCxnSpPr>
+          <p:nvPr/>
+        </p:nvCxnSpPr>
+        <p:spPr>
+          <a:xfrm>
+            <a:off x="3810000" y="2874169"/>
+            <a:ext cx="609600" cy="1588"/>
+          </a:xfrm>
+          <a:prstGeom prst="straightConnector1">
+            <a:avLst/>
+          </a:prstGeom>
+          <a:ln>
+            <a:prstDash val="dash"/>
+            <a:tailEnd type="arrow"/>
+          </a:ln>
+        </p:spPr>
+        <p:style>
+          <a:lnRef idx="1">
+            <a:schemeClr val="dk1"/>
+          </a:lnRef>
+          <a:fillRef idx="0">
+            <a:schemeClr val="dk1"/>
+          </a:fillRef>
+          <a:effectRef idx="0">
+            <a:schemeClr val="dk1"/>
+          </a:effectRef>
+          <a:fontRef idx="minor">
+            <a:schemeClr val="tx1"/>
+          </a:fontRef>
+        </p:style>
+      </p:cxnSp>
+      <p:cxnSp>
+        <p:nvCxnSpPr>
+          <p:cNvPr id="61" name="60 Conector recto de flecha"/>
+          <p:cNvCxnSpPr>
+            <a:endCxn id="84" idx="1"/>
+          </p:cNvCxnSpPr>
+          <p:nvPr/>
+        </p:nvCxnSpPr>
+        <p:spPr>
+          <a:xfrm rot="16200000" flipH="1">
+            <a:off x="3668316" y="3189684"/>
+            <a:ext cx="892969" cy="609600"/>
+          </a:xfrm>
+          <a:prstGeom prst="straightConnector1">
+            <a:avLst/>
+          </a:prstGeom>
+          <a:ln>
+            <a:prstDash val="dash"/>
+            <a:tailEnd type="arrow"/>
+          </a:ln>
+        </p:spPr>
+        <p:style>
+          <a:lnRef idx="1">
+            <a:schemeClr val="dk1"/>
+          </a:lnRef>
+          <a:fillRef idx="0">
+            <a:schemeClr val="dk1"/>
+          </a:fillRef>
+          <a:effectRef idx="0">
+            <a:schemeClr val="dk1"/>
+          </a:effectRef>
+          <a:fontRef idx="minor">
+            <a:schemeClr val="tx1"/>
+          </a:fontRef>
+        </p:style>
+      </p:cxnSp>
+      <p:cxnSp>
+        <p:nvCxnSpPr>
+          <p:cNvPr id="64" name="63 Conector recto de flecha"/>
+          <p:cNvCxnSpPr>
+            <a:stCxn id="76" idx="3"/>
+            <a:endCxn id="88" idx="1"/>
+          </p:cNvCxnSpPr>
+          <p:nvPr/>
+        </p:nvCxnSpPr>
+        <p:spPr>
+          <a:xfrm>
+            <a:off x="3810000" y="5203031"/>
+            <a:ext cx="609600" cy="1588"/>
+          </a:xfrm>
+          <a:prstGeom prst="straightConnector1">
+            <a:avLst/>
+          </a:prstGeom>
+          <a:ln>
+            <a:prstDash val="dash"/>
+            <a:tailEnd type="arrow"/>
+          </a:ln>
+        </p:spPr>
+        <p:style>
+          <a:lnRef idx="1">
+            <a:schemeClr val="dk1"/>
+          </a:lnRef>
+          <a:fillRef idx="0">
+            <a:schemeClr val="dk1"/>
+          </a:fillRef>
+          <a:effectRef idx="0">
+            <a:schemeClr val="dk1"/>
+          </a:effectRef>
+          <a:fontRef idx="minor">
+            <a:schemeClr val="tx1"/>
+          </a:fontRef>
+        </p:style>
+      </p:cxnSp>
+      <p:cxnSp>
+        <p:nvCxnSpPr>
+          <p:cNvPr id="66" name="65 Conector recto de flecha"/>
+          <p:cNvCxnSpPr>
+            <a:stCxn id="84" idx="3"/>
+            <a:endCxn id="92" idx="1"/>
+          </p:cNvCxnSpPr>
+          <p:nvPr/>
+        </p:nvCxnSpPr>
+        <p:spPr>
+          <a:xfrm>
+            <a:off x="5715000" y="3940969"/>
+            <a:ext cx="762000" cy="1588"/>
+          </a:xfrm>
+          <a:prstGeom prst="straightConnector1">
+            <a:avLst/>
+          </a:prstGeom>
+          <a:ln>
+            <a:prstDash val="dash"/>
+            <a:tailEnd type="arrow"/>
+          </a:ln>
+        </p:spPr>
+        <p:style>
+          <a:lnRef idx="1">
+            <a:schemeClr val="dk1"/>
+          </a:lnRef>
+          <a:fillRef idx="0">
+            <a:schemeClr val="dk1"/>
+          </a:fillRef>
+          <a:effectRef idx="0">
+            <a:schemeClr val="dk1"/>
+          </a:effectRef>
+          <a:fontRef idx="minor">
+            <a:schemeClr val="tx1"/>
+          </a:fontRef>
+        </p:style>
+      </p:cxnSp>
+      <p:cxnSp>
+        <p:nvCxnSpPr>
+          <p:cNvPr id="68" name="67 Conector recto de flecha"/>
+          <p:cNvCxnSpPr>
+            <a:stCxn id="100" idx="0"/>
+            <a:endCxn id="92" idx="2"/>
+          </p:cNvCxnSpPr>
+          <p:nvPr/>
+        </p:nvCxnSpPr>
+        <p:spPr>
+          <a:xfrm rot="5400000" flipH="1" flipV="1">
+            <a:off x="6798469" y="4550569"/>
+            <a:ext cx="652462" cy="1588"/>
+          </a:xfrm>
+          <a:prstGeom prst="straightConnector1">
+            <a:avLst/>
+          </a:prstGeom>
+          <a:ln>
+            <a:prstDash val="dash"/>
+            <a:tailEnd type="arrow"/>
+          </a:ln>
+        </p:spPr>
+        <p:style>
+          <a:lnRef idx="1">
+            <a:schemeClr val="dk1"/>
+          </a:lnRef>
+          <a:fillRef idx="0">
+            <a:schemeClr val="dk1"/>
+          </a:fillRef>
+          <a:effectRef idx="0">
+            <a:schemeClr val="dk1"/>
+          </a:effectRef>
+          <a:fontRef idx="minor">
+            <a:schemeClr val="tx1"/>
+          </a:fontRef>
+        </p:style>
+      </p:cxnSp>
+      <p:cxnSp>
+        <p:nvCxnSpPr>
+          <p:cNvPr id="70" name="69 Conector recto de flecha"/>
+          <p:cNvCxnSpPr>
+            <a:stCxn id="80" idx="3"/>
+          </p:cNvCxnSpPr>
+          <p:nvPr/>
+        </p:nvCxnSpPr>
+        <p:spPr>
+          <a:xfrm>
+            <a:off x="5715000" y="2874169"/>
+            <a:ext cx="914400" cy="783431"/>
+          </a:xfrm>
+          <a:prstGeom prst="straightConnector1">
+            <a:avLst/>
+          </a:prstGeom>
+          <a:ln>
+            <a:prstDash val="dash"/>
+            <a:tailEnd type="arrow"/>
+          </a:ln>
+        </p:spPr>
+        <p:style>
+          <a:lnRef idx="1">
+            <a:schemeClr val="dk1"/>
+          </a:lnRef>
+          <a:fillRef idx="0">
+            <a:schemeClr val="dk1"/>
+          </a:fillRef>
+          <a:effectRef idx="0">
+            <a:schemeClr val="dk1"/>
+          </a:effectRef>
+          <a:fontRef idx="minor">
+            <a:schemeClr val="tx1"/>
+          </a:fontRef>
+        </p:style>
+      </p:cxnSp>
+      <p:cxnSp>
+        <p:nvCxnSpPr>
+          <p:cNvPr id="77" name="76 Conector recto de flecha"/>
+          <p:cNvCxnSpPr/>
+          <p:nvPr/>
+        </p:nvCxnSpPr>
+        <p:spPr>
+          <a:xfrm rot="5400000" flipH="1" flipV="1">
+            <a:off x="6935653" y="3503747"/>
+            <a:ext cx="304006" cy="2112"/>
+          </a:xfrm>
+          <a:prstGeom prst="straightConnector1">
+            <a:avLst/>
+          </a:prstGeom>
+          <a:ln>
+            <a:prstDash val="dash"/>
+            <a:tailEnd type="arrow"/>
+          </a:ln>
+        </p:spPr>
+        <p:style>
+          <a:lnRef idx="1">
+            <a:schemeClr val="dk1"/>
+          </a:lnRef>
+          <a:fillRef idx="0">
+            <a:schemeClr val="dk1"/>
+          </a:fillRef>
+          <a:effectRef idx="0">
+            <a:schemeClr val="dk1"/>
+          </a:effectRef>
+          <a:fontRef idx="minor">
+            <a:schemeClr val="tx1"/>
+          </a:fontRef>
+        </p:style>
+      </p:cxnSp>
+      <p:sp>
+        <p:nvSpPr>
+          <p:cNvPr id="95" name="94 CuadroTexto"/>
+          <p:cNvSpPr txBox="1"/>
+          <p:nvPr/>
+        </p:nvSpPr>
+        <p:spPr>
+          <a:xfrm>
+            <a:off x="7162800" y="3352800"/>
+            <a:ext cx="896399" cy="253916"/>
+          </a:xfrm>
+          <a:prstGeom prst="rect">
+            <a:avLst/>
+          </a:prstGeom>
+          <a:noFill/>
+        </p:spPr>
+        <p:txBody>
+          <a:bodyPr wrap="none" rtlCol="0">
+            <a:spAutoFit/>
+          </a:bodyPr>
+          <a:lstStyle/>
+          <a:p>
+            <a:r>
+              <a:rPr lang="es-AR" sz="1050" i="1" dirty="0" smtClean="0"/>
+              <a:t>&lt;&lt;</a:t>
+            </a:r>
+            <a:r>
+              <a:rPr lang="es-AR" sz="1050" i="1" dirty="0" err="1" smtClean="0"/>
+              <a:t>requires</a:t>
+            </a:r>
+            <a:r>
+              <a:rPr lang="es-AR" sz="1050" i="1" dirty="0" smtClean="0"/>
+              <a:t>&gt;&gt;</a:t>
+            </a:r>
+            <a:endParaRPr lang="es-AR" sz="1050" i="1" dirty="0"/>
           </a:p>
         </p:txBody>
       </p:sp>
@@ -17420,11 +18876,7 @@
                 <a:pPr algn="ctr"/>
                 <a:r>
                   <a:rPr lang="es-AR" sz="1200" dirty="0" smtClean="0"/>
-                  <a:t>Clases de </a:t>
-                </a:r>
-                <a:r>
-                  <a:rPr lang="es-AR" sz="1200" dirty="0" smtClean="0"/>
-                  <a:t>dominio y JXL</a:t>
+                  <a:t>Clases de dominio y JXL</a:t>
                 </a:r>
                 <a:endParaRPr lang="es-AR" sz="1200" dirty="0"/>
               </a:p>
@@ -19357,9 +20809,14 @@
           <a:p>
             <a:pPr algn="ctr"/>
             <a:r>
-              <a:rPr lang="es-AR" sz="4800" b="1" dirty="0" smtClean="0"/>
-              <a:t>Modelo de Datos</a:t>
+              <a:rPr lang="es-AR" sz="4800" b="1" u="sng" dirty="0" smtClean="0"/>
+              <a:t>Modelo de </a:t>
             </a:r>
+            <a:r>
+              <a:rPr lang="es-AR" sz="4800" b="1" u="sng" dirty="0" smtClean="0"/>
+              <a:t>Datos (I)</a:t>
+            </a:r>
+            <a:endParaRPr lang="es-AR" sz="4800" b="1" u="sng" dirty="0" smtClean="0"/>
           </a:p>
           <a:p>
             <a:pPr algn="ctr"/>
@@ -19492,28 +20949,26 @@
       </p:grpSp>
       <p:pic>
         <p:nvPicPr>
-          <p:cNvPr id="1026" name="Picture 2" descr="C:\Users\Dario\Desktop\Taller Desarrollo I\Investigacion\BBDD\Diagrama-MR.png"/>
+          <p:cNvPr id="25" name="24 Imagen" descr="parte1.gif"/>
           <p:cNvPicPr>
-            <a:picLocks noChangeAspect="1" noChangeArrowheads="1"/>
+            <a:picLocks noChangeAspect="1"/>
           </p:cNvPicPr>
           <p:nvPr/>
         </p:nvPicPr>
         <p:blipFill>
-          <a:blip r:embed="rId3" cstate="print"/>
-          <a:srcRect/>
+          <a:blip r:embed="rId3"/>
           <a:stretch>
             <a:fillRect/>
           </a:stretch>
         </p:blipFill>
-        <p:spPr bwMode="auto">
+        <p:spPr>
           <a:xfrm>
-            <a:off x="2362200" y="2133600"/>
-            <a:ext cx="4572000" cy="4082902"/>
+            <a:off x="1371600" y="2133600"/>
+            <a:ext cx="6511672" cy="4329310"/>
           </a:xfrm>
           <a:prstGeom prst="rect">
             <a:avLst/>
           </a:prstGeom>
-          <a:noFill/>
         </p:spPr>
       </p:pic>
     </p:spTree>
@@ -19532,6 +20987,1128 @@
 </file>
 
 <file path=ppt/slides/slide8.xml><?xml version="1.0" encoding="utf-8"?>
+<p:sld xmlns:a="http://schemas.openxmlformats.org/drawingml/2006/main" xmlns:r="http://schemas.openxmlformats.org/officeDocument/2006/relationships" xmlns:p="http://schemas.openxmlformats.org/presentationml/2006/main">
+  <p:cSld>
+    <p:spTree>
+      <p:nvGrpSpPr>
+        <p:cNvPr id="1" name=""/>
+        <p:cNvGrpSpPr/>
+        <p:nvPr/>
+      </p:nvGrpSpPr>
+      <p:grpSpPr>
+        <a:xfrm>
+          <a:off x="0" y="0"/>
+          <a:ext cx="0" cy="0"/>
+          <a:chOff x="0" y="0"/>
+          <a:chExt cx="0" cy="0"/>
+        </a:xfrm>
+      </p:grpSpPr>
+      <p:grpSp>
+        <p:nvGrpSpPr>
+          <p:cNvPr id="4" name="Group 22"/>
+          <p:cNvGrpSpPr/>
+          <p:nvPr/>
+        </p:nvGrpSpPr>
+        <p:grpSpPr>
+          <a:xfrm>
+            <a:off x="304800" y="304800"/>
+            <a:ext cx="8534400" cy="6248400"/>
+            <a:chOff x="304800" y="304800"/>
+            <a:chExt cx="8534400" cy="6248400"/>
+          </a:xfrm>
+          <a:solidFill>
+            <a:schemeClr val="bg1">
+              <a:lumMod val="85000"/>
+            </a:schemeClr>
+          </a:solidFill>
+        </p:grpSpPr>
+        <p:sp>
+          <p:nvSpPr>
+            <p:cNvPr id="5" name="Rounded Rectangle 17"/>
+            <p:cNvSpPr/>
+            <p:nvPr/>
+          </p:nvSpPr>
+          <p:spPr>
+            <a:xfrm>
+              <a:off x="304800" y="304800"/>
+              <a:ext cx="8534400" cy="6248400"/>
+            </a:xfrm>
+            <a:prstGeom prst="roundRect">
+              <a:avLst/>
+            </a:prstGeom>
+            <a:grpFill/>
+            <a:ln>
+              <a:noFill/>
+            </a:ln>
+          </p:spPr>
+          <p:style>
+            <a:lnRef idx="2">
+              <a:schemeClr val="accent1">
+                <a:shade val="50000"/>
+              </a:schemeClr>
+            </a:lnRef>
+            <a:fillRef idx="1">
+              <a:schemeClr val="accent1"/>
+            </a:fillRef>
+            <a:effectRef idx="0">
+              <a:schemeClr val="accent1"/>
+            </a:effectRef>
+            <a:fontRef idx="minor">
+              <a:schemeClr val="lt1"/>
+            </a:fontRef>
+          </p:style>
+          <p:txBody>
+            <a:bodyPr rtlCol="0" anchor="ctr"/>
+            <a:lstStyle/>
+            <a:p>
+              <a:pPr algn="ctr"/>
+              <a:endParaRPr lang="es-AR"/>
+            </a:p>
+          </p:txBody>
+        </p:sp>
+        <p:sp>
+          <p:nvSpPr>
+            <p:cNvPr id="6" name="Rounded Rectangle 21"/>
+            <p:cNvSpPr/>
+            <p:nvPr/>
+          </p:nvSpPr>
+          <p:spPr>
+            <a:xfrm>
+              <a:off x="7086600" y="304800"/>
+              <a:ext cx="1752600" cy="1752600"/>
+            </a:xfrm>
+            <a:prstGeom prst="roundRect">
+              <a:avLst/>
+            </a:prstGeom>
+            <a:grpFill/>
+            <a:ln>
+              <a:noFill/>
+            </a:ln>
+          </p:spPr>
+          <p:style>
+            <a:lnRef idx="2">
+              <a:schemeClr val="accent1">
+                <a:shade val="50000"/>
+              </a:schemeClr>
+            </a:lnRef>
+            <a:fillRef idx="1">
+              <a:schemeClr val="accent1"/>
+            </a:fillRef>
+            <a:effectRef idx="0">
+              <a:schemeClr val="accent1"/>
+            </a:effectRef>
+            <a:fontRef idx="minor">
+              <a:schemeClr val="lt1"/>
+            </a:fontRef>
+          </p:style>
+          <p:txBody>
+            <a:bodyPr rtlCol="0" anchor="ctr"/>
+            <a:lstStyle/>
+            <a:p>
+              <a:pPr algn="ctr"/>
+              <a:endParaRPr lang="es-AR"/>
+            </a:p>
+          </p:txBody>
+        </p:sp>
+        <p:sp>
+          <p:nvSpPr>
+            <p:cNvPr id="7" name="Rounded Rectangle 20"/>
+            <p:cNvSpPr/>
+            <p:nvPr/>
+          </p:nvSpPr>
+          <p:spPr>
+            <a:xfrm>
+              <a:off x="304800" y="304800"/>
+              <a:ext cx="1752600" cy="1752600"/>
+            </a:xfrm>
+            <a:prstGeom prst="roundRect">
+              <a:avLst/>
+            </a:prstGeom>
+            <a:grpFill/>
+            <a:ln>
+              <a:noFill/>
+            </a:ln>
+          </p:spPr>
+          <p:style>
+            <a:lnRef idx="2">
+              <a:schemeClr val="accent1">
+                <a:shade val="50000"/>
+              </a:schemeClr>
+            </a:lnRef>
+            <a:fillRef idx="1">
+              <a:schemeClr val="accent1"/>
+            </a:fillRef>
+            <a:effectRef idx="0">
+              <a:schemeClr val="accent1"/>
+            </a:effectRef>
+            <a:fontRef idx="minor">
+              <a:schemeClr val="lt1"/>
+            </a:fontRef>
+          </p:style>
+          <p:txBody>
+            <a:bodyPr rtlCol="0" anchor="ctr"/>
+            <a:lstStyle/>
+            <a:p>
+              <a:pPr algn="ctr"/>
+              <a:endParaRPr lang="es-AR"/>
+            </a:p>
+          </p:txBody>
+        </p:sp>
+        <p:sp>
+          <p:nvSpPr>
+            <p:cNvPr id="8" name="Rounded Rectangle 16"/>
+            <p:cNvSpPr/>
+            <p:nvPr/>
+          </p:nvSpPr>
+          <p:spPr>
+            <a:xfrm>
+              <a:off x="304800" y="4800600"/>
+              <a:ext cx="1752600" cy="1752600"/>
+            </a:xfrm>
+            <a:prstGeom prst="roundRect">
+              <a:avLst/>
+            </a:prstGeom>
+            <a:grpFill/>
+            <a:ln>
+              <a:noFill/>
+            </a:ln>
+          </p:spPr>
+          <p:style>
+            <a:lnRef idx="2">
+              <a:schemeClr val="accent1">
+                <a:shade val="50000"/>
+              </a:schemeClr>
+            </a:lnRef>
+            <a:fillRef idx="1">
+              <a:schemeClr val="accent1"/>
+            </a:fillRef>
+            <a:effectRef idx="0">
+              <a:schemeClr val="accent1"/>
+            </a:effectRef>
+            <a:fontRef idx="minor">
+              <a:schemeClr val="lt1"/>
+            </a:fontRef>
+          </p:style>
+          <p:txBody>
+            <a:bodyPr rtlCol="0" anchor="ctr"/>
+            <a:lstStyle/>
+            <a:p>
+              <a:pPr algn="ctr"/>
+              <a:endParaRPr lang="es-AR"/>
+            </a:p>
+          </p:txBody>
+        </p:sp>
+        <p:sp>
+          <p:nvSpPr>
+            <p:cNvPr id="9" name="Rounded Rectangle 18"/>
+            <p:cNvSpPr/>
+            <p:nvPr/>
+          </p:nvSpPr>
+          <p:spPr>
+            <a:xfrm>
+              <a:off x="7086600" y="4800600"/>
+              <a:ext cx="1752600" cy="1752600"/>
+            </a:xfrm>
+            <a:prstGeom prst="roundRect">
+              <a:avLst/>
+            </a:prstGeom>
+            <a:grpFill/>
+            <a:ln>
+              <a:noFill/>
+            </a:ln>
+          </p:spPr>
+          <p:style>
+            <a:lnRef idx="2">
+              <a:schemeClr val="accent1">
+                <a:shade val="50000"/>
+              </a:schemeClr>
+            </a:lnRef>
+            <a:fillRef idx="1">
+              <a:schemeClr val="accent1"/>
+            </a:fillRef>
+            <a:effectRef idx="0">
+              <a:schemeClr val="accent1"/>
+            </a:effectRef>
+            <a:fontRef idx="minor">
+              <a:schemeClr val="lt1"/>
+            </a:fontRef>
+          </p:style>
+          <p:txBody>
+            <a:bodyPr rtlCol="0" anchor="ctr"/>
+            <a:lstStyle/>
+            <a:p>
+              <a:pPr algn="ctr"/>
+              <a:endParaRPr lang="es-AR"/>
+            </a:p>
+          </p:txBody>
+        </p:sp>
+      </p:grpSp>
+      <p:sp>
+        <p:nvSpPr>
+          <p:cNvPr id="10" name="Freeform 39"/>
+          <p:cNvSpPr/>
+          <p:nvPr/>
+        </p:nvSpPr>
+        <p:spPr>
+          <a:xfrm>
+            <a:off x="457200" y="457200"/>
+            <a:ext cx="8229600" cy="5803900"/>
+          </a:xfrm>
+          <a:custGeom>
+            <a:avLst/>
+            <a:gdLst>
+              <a:gd name="connsiteX0" fmla="*/ 0 w 8077200"/>
+              <a:gd name="connsiteY0" fmla="*/ 965219 h 5791200"/>
+              <a:gd name="connsiteX1" fmla="*/ 282707 w 8077200"/>
+              <a:gd name="connsiteY1" fmla="*/ 282706 h 5791200"/>
+              <a:gd name="connsiteX2" fmla="*/ 965221 w 8077200"/>
+              <a:gd name="connsiteY2" fmla="*/ 1 h 5791200"/>
+              <a:gd name="connsiteX3" fmla="*/ 7111981 w 8077200"/>
+              <a:gd name="connsiteY3" fmla="*/ 0 h 5791200"/>
+              <a:gd name="connsiteX4" fmla="*/ 7794494 w 8077200"/>
+              <a:gd name="connsiteY4" fmla="*/ 282707 h 5791200"/>
+              <a:gd name="connsiteX5" fmla="*/ 8077199 w 8077200"/>
+              <a:gd name="connsiteY5" fmla="*/ 965221 h 5791200"/>
+              <a:gd name="connsiteX6" fmla="*/ 8077200 w 8077200"/>
+              <a:gd name="connsiteY6" fmla="*/ 4825981 h 5791200"/>
+              <a:gd name="connsiteX7" fmla="*/ 7794494 w 8077200"/>
+              <a:gd name="connsiteY7" fmla="*/ 5508494 h 5791200"/>
+              <a:gd name="connsiteX8" fmla="*/ 7111981 w 8077200"/>
+              <a:gd name="connsiteY8" fmla="*/ 5791200 h 5791200"/>
+              <a:gd name="connsiteX9" fmla="*/ 965219 w 8077200"/>
+              <a:gd name="connsiteY9" fmla="*/ 5791200 h 5791200"/>
+              <a:gd name="connsiteX10" fmla="*/ 282706 w 8077200"/>
+              <a:gd name="connsiteY10" fmla="*/ 5508493 h 5791200"/>
+              <a:gd name="connsiteX11" fmla="*/ 0 w 8077200"/>
+              <a:gd name="connsiteY11" fmla="*/ 4825980 h 5791200"/>
+              <a:gd name="connsiteX12" fmla="*/ 0 w 8077200"/>
+              <a:gd name="connsiteY12" fmla="*/ 965219 h 5791200"/>
+              <a:gd name="connsiteX0" fmla="*/ 0 w 8077200"/>
+              <a:gd name="connsiteY0" fmla="*/ 609600 h 5791200"/>
+              <a:gd name="connsiteX1" fmla="*/ 282707 w 8077200"/>
+              <a:gd name="connsiteY1" fmla="*/ 282706 h 5791200"/>
+              <a:gd name="connsiteX2" fmla="*/ 965221 w 8077200"/>
+              <a:gd name="connsiteY2" fmla="*/ 1 h 5791200"/>
+              <a:gd name="connsiteX3" fmla="*/ 7111981 w 8077200"/>
+              <a:gd name="connsiteY3" fmla="*/ 0 h 5791200"/>
+              <a:gd name="connsiteX4" fmla="*/ 7794494 w 8077200"/>
+              <a:gd name="connsiteY4" fmla="*/ 282707 h 5791200"/>
+              <a:gd name="connsiteX5" fmla="*/ 8077199 w 8077200"/>
+              <a:gd name="connsiteY5" fmla="*/ 965221 h 5791200"/>
+              <a:gd name="connsiteX6" fmla="*/ 8077200 w 8077200"/>
+              <a:gd name="connsiteY6" fmla="*/ 4825981 h 5791200"/>
+              <a:gd name="connsiteX7" fmla="*/ 7794494 w 8077200"/>
+              <a:gd name="connsiteY7" fmla="*/ 5508494 h 5791200"/>
+              <a:gd name="connsiteX8" fmla="*/ 7111981 w 8077200"/>
+              <a:gd name="connsiteY8" fmla="*/ 5791200 h 5791200"/>
+              <a:gd name="connsiteX9" fmla="*/ 965219 w 8077200"/>
+              <a:gd name="connsiteY9" fmla="*/ 5791200 h 5791200"/>
+              <a:gd name="connsiteX10" fmla="*/ 282706 w 8077200"/>
+              <a:gd name="connsiteY10" fmla="*/ 5508493 h 5791200"/>
+              <a:gd name="connsiteX11" fmla="*/ 0 w 8077200"/>
+              <a:gd name="connsiteY11" fmla="*/ 4825980 h 5791200"/>
+              <a:gd name="connsiteX12" fmla="*/ 0 w 8077200"/>
+              <a:gd name="connsiteY12" fmla="*/ 609600 h 5791200"/>
+              <a:gd name="connsiteX0" fmla="*/ 0 w 8077200"/>
+              <a:gd name="connsiteY0" fmla="*/ 609601 h 5791201"/>
+              <a:gd name="connsiteX1" fmla="*/ 282707 w 8077200"/>
+              <a:gd name="connsiteY1" fmla="*/ 282707 h 5791201"/>
+              <a:gd name="connsiteX2" fmla="*/ 609600 w 8077200"/>
+              <a:gd name="connsiteY2" fmla="*/ 1 h 5791201"/>
+              <a:gd name="connsiteX3" fmla="*/ 7111981 w 8077200"/>
+              <a:gd name="connsiteY3" fmla="*/ 1 h 5791201"/>
+              <a:gd name="connsiteX4" fmla="*/ 7794494 w 8077200"/>
+              <a:gd name="connsiteY4" fmla="*/ 282708 h 5791201"/>
+              <a:gd name="connsiteX5" fmla="*/ 8077199 w 8077200"/>
+              <a:gd name="connsiteY5" fmla="*/ 965222 h 5791201"/>
+              <a:gd name="connsiteX6" fmla="*/ 8077200 w 8077200"/>
+              <a:gd name="connsiteY6" fmla="*/ 4825982 h 5791201"/>
+              <a:gd name="connsiteX7" fmla="*/ 7794494 w 8077200"/>
+              <a:gd name="connsiteY7" fmla="*/ 5508495 h 5791201"/>
+              <a:gd name="connsiteX8" fmla="*/ 7111981 w 8077200"/>
+              <a:gd name="connsiteY8" fmla="*/ 5791201 h 5791201"/>
+              <a:gd name="connsiteX9" fmla="*/ 965219 w 8077200"/>
+              <a:gd name="connsiteY9" fmla="*/ 5791201 h 5791201"/>
+              <a:gd name="connsiteX10" fmla="*/ 282706 w 8077200"/>
+              <a:gd name="connsiteY10" fmla="*/ 5508494 h 5791201"/>
+              <a:gd name="connsiteX11" fmla="*/ 0 w 8077200"/>
+              <a:gd name="connsiteY11" fmla="*/ 4825981 h 5791201"/>
+              <a:gd name="connsiteX12" fmla="*/ 0 w 8077200"/>
+              <a:gd name="connsiteY12" fmla="*/ 609601 h 5791201"/>
+              <a:gd name="connsiteX0" fmla="*/ 0 w 8077200"/>
+              <a:gd name="connsiteY0" fmla="*/ 609601 h 5791201"/>
+              <a:gd name="connsiteX1" fmla="*/ 152400 w 8077200"/>
+              <a:gd name="connsiteY1" fmla="*/ 152402 h 5791201"/>
+              <a:gd name="connsiteX2" fmla="*/ 609600 w 8077200"/>
+              <a:gd name="connsiteY2" fmla="*/ 1 h 5791201"/>
+              <a:gd name="connsiteX3" fmla="*/ 7111981 w 8077200"/>
+              <a:gd name="connsiteY3" fmla="*/ 1 h 5791201"/>
+              <a:gd name="connsiteX4" fmla="*/ 7794494 w 8077200"/>
+              <a:gd name="connsiteY4" fmla="*/ 282708 h 5791201"/>
+              <a:gd name="connsiteX5" fmla="*/ 8077199 w 8077200"/>
+              <a:gd name="connsiteY5" fmla="*/ 965222 h 5791201"/>
+              <a:gd name="connsiteX6" fmla="*/ 8077200 w 8077200"/>
+              <a:gd name="connsiteY6" fmla="*/ 4825982 h 5791201"/>
+              <a:gd name="connsiteX7" fmla="*/ 7794494 w 8077200"/>
+              <a:gd name="connsiteY7" fmla="*/ 5508495 h 5791201"/>
+              <a:gd name="connsiteX8" fmla="*/ 7111981 w 8077200"/>
+              <a:gd name="connsiteY8" fmla="*/ 5791201 h 5791201"/>
+              <a:gd name="connsiteX9" fmla="*/ 965219 w 8077200"/>
+              <a:gd name="connsiteY9" fmla="*/ 5791201 h 5791201"/>
+              <a:gd name="connsiteX10" fmla="*/ 282706 w 8077200"/>
+              <a:gd name="connsiteY10" fmla="*/ 5508494 h 5791201"/>
+              <a:gd name="connsiteX11" fmla="*/ 0 w 8077200"/>
+              <a:gd name="connsiteY11" fmla="*/ 4825981 h 5791201"/>
+              <a:gd name="connsiteX12" fmla="*/ 0 w 8077200"/>
+              <a:gd name="connsiteY12" fmla="*/ 609601 h 5791201"/>
+              <a:gd name="connsiteX0" fmla="*/ 0 w 8077200"/>
+              <a:gd name="connsiteY0" fmla="*/ 609600 h 5791200"/>
+              <a:gd name="connsiteX1" fmla="*/ 152400 w 8077200"/>
+              <a:gd name="connsiteY1" fmla="*/ 152401 h 5791200"/>
+              <a:gd name="connsiteX2" fmla="*/ 533400 w 8077200"/>
+              <a:gd name="connsiteY2" fmla="*/ 1 h 5791200"/>
+              <a:gd name="connsiteX3" fmla="*/ 7111981 w 8077200"/>
+              <a:gd name="connsiteY3" fmla="*/ 0 h 5791200"/>
+              <a:gd name="connsiteX4" fmla="*/ 7794494 w 8077200"/>
+              <a:gd name="connsiteY4" fmla="*/ 282707 h 5791200"/>
+              <a:gd name="connsiteX5" fmla="*/ 8077199 w 8077200"/>
+              <a:gd name="connsiteY5" fmla="*/ 965221 h 5791200"/>
+              <a:gd name="connsiteX6" fmla="*/ 8077200 w 8077200"/>
+              <a:gd name="connsiteY6" fmla="*/ 4825981 h 5791200"/>
+              <a:gd name="connsiteX7" fmla="*/ 7794494 w 8077200"/>
+              <a:gd name="connsiteY7" fmla="*/ 5508494 h 5791200"/>
+              <a:gd name="connsiteX8" fmla="*/ 7111981 w 8077200"/>
+              <a:gd name="connsiteY8" fmla="*/ 5791200 h 5791200"/>
+              <a:gd name="connsiteX9" fmla="*/ 965219 w 8077200"/>
+              <a:gd name="connsiteY9" fmla="*/ 5791200 h 5791200"/>
+              <a:gd name="connsiteX10" fmla="*/ 282706 w 8077200"/>
+              <a:gd name="connsiteY10" fmla="*/ 5508493 h 5791200"/>
+              <a:gd name="connsiteX11" fmla="*/ 0 w 8077200"/>
+              <a:gd name="connsiteY11" fmla="*/ 4825980 h 5791200"/>
+              <a:gd name="connsiteX12" fmla="*/ 0 w 8077200"/>
+              <a:gd name="connsiteY12" fmla="*/ 609600 h 5791200"/>
+              <a:gd name="connsiteX0" fmla="*/ 0 w 8077200"/>
+              <a:gd name="connsiteY0" fmla="*/ 533400 h 5791200"/>
+              <a:gd name="connsiteX1" fmla="*/ 152400 w 8077200"/>
+              <a:gd name="connsiteY1" fmla="*/ 152401 h 5791200"/>
+              <a:gd name="connsiteX2" fmla="*/ 533400 w 8077200"/>
+              <a:gd name="connsiteY2" fmla="*/ 1 h 5791200"/>
+              <a:gd name="connsiteX3" fmla="*/ 7111981 w 8077200"/>
+              <a:gd name="connsiteY3" fmla="*/ 0 h 5791200"/>
+              <a:gd name="connsiteX4" fmla="*/ 7794494 w 8077200"/>
+              <a:gd name="connsiteY4" fmla="*/ 282707 h 5791200"/>
+              <a:gd name="connsiteX5" fmla="*/ 8077199 w 8077200"/>
+              <a:gd name="connsiteY5" fmla="*/ 965221 h 5791200"/>
+              <a:gd name="connsiteX6" fmla="*/ 8077200 w 8077200"/>
+              <a:gd name="connsiteY6" fmla="*/ 4825981 h 5791200"/>
+              <a:gd name="connsiteX7" fmla="*/ 7794494 w 8077200"/>
+              <a:gd name="connsiteY7" fmla="*/ 5508494 h 5791200"/>
+              <a:gd name="connsiteX8" fmla="*/ 7111981 w 8077200"/>
+              <a:gd name="connsiteY8" fmla="*/ 5791200 h 5791200"/>
+              <a:gd name="connsiteX9" fmla="*/ 965219 w 8077200"/>
+              <a:gd name="connsiteY9" fmla="*/ 5791200 h 5791200"/>
+              <a:gd name="connsiteX10" fmla="*/ 282706 w 8077200"/>
+              <a:gd name="connsiteY10" fmla="*/ 5508493 h 5791200"/>
+              <a:gd name="connsiteX11" fmla="*/ 0 w 8077200"/>
+              <a:gd name="connsiteY11" fmla="*/ 4825980 h 5791200"/>
+              <a:gd name="connsiteX12" fmla="*/ 0 w 8077200"/>
+              <a:gd name="connsiteY12" fmla="*/ 533400 h 5791200"/>
+              <a:gd name="connsiteX0" fmla="*/ 12700 w 8089900"/>
+              <a:gd name="connsiteY0" fmla="*/ 546100 h 5803900"/>
+              <a:gd name="connsiteX1" fmla="*/ 88900 w 8089900"/>
+              <a:gd name="connsiteY1" fmla="*/ 88900 h 5803900"/>
+              <a:gd name="connsiteX2" fmla="*/ 546100 w 8089900"/>
+              <a:gd name="connsiteY2" fmla="*/ 12701 h 5803900"/>
+              <a:gd name="connsiteX3" fmla="*/ 7124681 w 8089900"/>
+              <a:gd name="connsiteY3" fmla="*/ 12700 h 5803900"/>
+              <a:gd name="connsiteX4" fmla="*/ 7807194 w 8089900"/>
+              <a:gd name="connsiteY4" fmla="*/ 295407 h 5803900"/>
+              <a:gd name="connsiteX5" fmla="*/ 8089899 w 8089900"/>
+              <a:gd name="connsiteY5" fmla="*/ 977921 h 5803900"/>
+              <a:gd name="connsiteX6" fmla="*/ 8089900 w 8089900"/>
+              <a:gd name="connsiteY6" fmla="*/ 4838681 h 5803900"/>
+              <a:gd name="connsiteX7" fmla="*/ 7807194 w 8089900"/>
+              <a:gd name="connsiteY7" fmla="*/ 5521194 h 5803900"/>
+              <a:gd name="connsiteX8" fmla="*/ 7124681 w 8089900"/>
+              <a:gd name="connsiteY8" fmla="*/ 5803900 h 5803900"/>
+              <a:gd name="connsiteX9" fmla="*/ 977919 w 8089900"/>
+              <a:gd name="connsiteY9" fmla="*/ 5803900 h 5803900"/>
+              <a:gd name="connsiteX10" fmla="*/ 295406 w 8089900"/>
+              <a:gd name="connsiteY10" fmla="*/ 5521193 h 5803900"/>
+              <a:gd name="connsiteX11" fmla="*/ 12700 w 8089900"/>
+              <a:gd name="connsiteY11" fmla="*/ 4838680 h 5803900"/>
+              <a:gd name="connsiteX12" fmla="*/ 12700 w 8089900"/>
+              <a:gd name="connsiteY12" fmla="*/ 546100 h 5803900"/>
+              <a:gd name="connsiteX0" fmla="*/ 12700 w 8089900"/>
+              <a:gd name="connsiteY0" fmla="*/ 546100 h 5803900"/>
+              <a:gd name="connsiteX1" fmla="*/ 88900 w 8089900"/>
+              <a:gd name="connsiteY1" fmla="*/ 88900 h 5803900"/>
+              <a:gd name="connsiteX2" fmla="*/ 546100 w 8089900"/>
+              <a:gd name="connsiteY2" fmla="*/ 12701 h 5803900"/>
+              <a:gd name="connsiteX3" fmla="*/ 7124681 w 8089900"/>
+              <a:gd name="connsiteY3" fmla="*/ 12700 h 5803900"/>
+              <a:gd name="connsiteX4" fmla="*/ 7807194 w 8089900"/>
+              <a:gd name="connsiteY4" fmla="*/ 295407 h 5803900"/>
+              <a:gd name="connsiteX5" fmla="*/ 8089899 w 8089900"/>
+              <a:gd name="connsiteY5" fmla="*/ 977921 h 5803900"/>
+              <a:gd name="connsiteX6" fmla="*/ 8089900 w 8089900"/>
+              <a:gd name="connsiteY6" fmla="*/ 4838681 h 5803900"/>
+              <a:gd name="connsiteX7" fmla="*/ 7807194 w 8089900"/>
+              <a:gd name="connsiteY7" fmla="*/ 5521194 h 5803900"/>
+              <a:gd name="connsiteX8" fmla="*/ 7124681 w 8089900"/>
+              <a:gd name="connsiteY8" fmla="*/ 5803900 h 5803900"/>
+              <a:gd name="connsiteX9" fmla="*/ 977919 w 8089900"/>
+              <a:gd name="connsiteY9" fmla="*/ 5803900 h 5803900"/>
+              <a:gd name="connsiteX10" fmla="*/ 295406 w 8089900"/>
+              <a:gd name="connsiteY10" fmla="*/ 5521193 h 5803900"/>
+              <a:gd name="connsiteX11" fmla="*/ 12700 w 8089900"/>
+              <a:gd name="connsiteY11" fmla="*/ 5346700 h 5803900"/>
+              <a:gd name="connsiteX12" fmla="*/ 12700 w 8089900"/>
+              <a:gd name="connsiteY12" fmla="*/ 546100 h 5803900"/>
+              <a:gd name="connsiteX0" fmla="*/ 12700 w 8089900"/>
+              <a:gd name="connsiteY0" fmla="*/ 546100 h 5803900"/>
+              <a:gd name="connsiteX1" fmla="*/ 88900 w 8089900"/>
+              <a:gd name="connsiteY1" fmla="*/ 88900 h 5803900"/>
+              <a:gd name="connsiteX2" fmla="*/ 546100 w 8089900"/>
+              <a:gd name="connsiteY2" fmla="*/ 12701 h 5803900"/>
+              <a:gd name="connsiteX3" fmla="*/ 7124681 w 8089900"/>
+              <a:gd name="connsiteY3" fmla="*/ 12700 h 5803900"/>
+              <a:gd name="connsiteX4" fmla="*/ 7807194 w 8089900"/>
+              <a:gd name="connsiteY4" fmla="*/ 295407 h 5803900"/>
+              <a:gd name="connsiteX5" fmla="*/ 8089899 w 8089900"/>
+              <a:gd name="connsiteY5" fmla="*/ 977921 h 5803900"/>
+              <a:gd name="connsiteX6" fmla="*/ 8089900 w 8089900"/>
+              <a:gd name="connsiteY6" fmla="*/ 4838681 h 5803900"/>
+              <a:gd name="connsiteX7" fmla="*/ 7807194 w 8089900"/>
+              <a:gd name="connsiteY7" fmla="*/ 5521194 h 5803900"/>
+              <a:gd name="connsiteX8" fmla="*/ 7124681 w 8089900"/>
+              <a:gd name="connsiteY8" fmla="*/ 5803900 h 5803900"/>
+              <a:gd name="connsiteX9" fmla="*/ 546100 w 8089900"/>
+              <a:gd name="connsiteY9" fmla="*/ 5803900 h 5803900"/>
+              <a:gd name="connsiteX10" fmla="*/ 295406 w 8089900"/>
+              <a:gd name="connsiteY10" fmla="*/ 5521193 h 5803900"/>
+              <a:gd name="connsiteX11" fmla="*/ 12700 w 8089900"/>
+              <a:gd name="connsiteY11" fmla="*/ 5346700 h 5803900"/>
+              <a:gd name="connsiteX12" fmla="*/ 12700 w 8089900"/>
+              <a:gd name="connsiteY12" fmla="*/ 546100 h 5803900"/>
+              <a:gd name="connsiteX0" fmla="*/ 12700 w 8089900"/>
+              <a:gd name="connsiteY0" fmla="*/ 546100 h 5803900"/>
+              <a:gd name="connsiteX1" fmla="*/ 88900 w 8089900"/>
+              <a:gd name="connsiteY1" fmla="*/ 88900 h 5803900"/>
+              <a:gd name="connsiteX2" fmla="*/ 546100 w 8089900"/>
+              <a:gd name="connsiteY2" fmla="*/ 12701 h 5803900"/>
+              <a:gd name="connsiteX3" fmla="*/ 7124681 w 8089900"/>
+              <a:gd name="connsiteY3" fmla="*/ 12700 h 5803900"/>
+              <a:gd name="connsiteX4" fmla="*/ 7807194 w 8089900"/>
+              <a:gd name="connsiteY4" fmla="*/ 295407 h 5803900"/>
+              <a:gd name="connsiteX5" fmla="*/ 8089899 w 8089900"/>
+              <a:gd name="connsiteY5" fmla="*/ 977921 h 5803900"/>
+              <a:gd name="connsiteX6" fmla="*/ 8089900 w 8089900"/>
+              <a:gd name="connsiteY6" fmla="*/ 4838681 h 5803900"/>
+              <a:gd name="connsiteX7" fmla="*/ 7807194 w 8089900"/>
+              <a:gd name="connsiteY7" fmla="*/ 5521194 h 5803900"/>
+              <a:gd name="connsiteX8" fmla="*/ 7124681 w 8089900"/>
+              <a:gd name="connsiteY8" fmla="*/ 5803900 h 5803900"/>
+              <a:gd name="connsiteX9" fmla="*/ 546100 w 8089900"/>
+              <a:gd name="connsiteY9" fmla="*/ 5803900 h 5803900"/>
+              <a:gd name="connsiteX10" fmla="*/ 88900 w 8089900"/>
+              <a:gd name="connsiteY10" fmla="*/ 5727700 h 5803900"/>
+              <a:gd name="connsiteX11" fmla="*/ 12700 w 8089900"/>
+              <a:gd name="connsiteY11" fmla="*/ 5346700 h 5803900"/>
+              <a:gd name="connsiteX12" fmla="*/ 12700 w 8089900"/>
+              <a:gd name="connsiteY12" fmla="*/ 546100 h 5803900"/>
+              <a:gd name="connsiteX0" fmla="*/ 12700 w 8089900"/>
+              <a:gd name="connsiteY0" fmla="*/ 546100 h 5803900"/>
+              <a:gd name="connsiteX1" fmla="*/ 88900 w 8089900"/>
+              <a:gd name="connsiteY1" fmla="*/ 88900 h 5803900"/>
+              <a:gd name="connsiteX2" fmla="*/ 546100 w 8089900"/>
+              <a:gd name="connsiteY2" fmla="*/ 12701 h 5803900"/>
+              <a:gd name="connsiteX3" fmla="*/ 7556500 w 8089900"/>
+              <a:gd name="connsiteY3" fmla="*/ 12700 h 5803900"/>
+              <a:gd name="connsiteX4" fmla="*/ 7807194 w 8089900"/>
+              <a:gd name="connsiteY4" fmla="*/ 295407 h 5803900"/>
+              <a:gd name="connsiteX5" fmla="*/ 8089899 w 8089900"/>
+              <a:gd name="connsiteY5" fmla="*/ 977921 h 5803900"/>
+              <a:gd name="connsiteX6" fmla="*/ 8089900 w 8089900"/>
+              <a:gd name="connsiteY6" fmla="*/ 4838681 h 5803900"/>
+              <a:gd name="connsiteX7" fmla="*/ 7807194 w 8089900"/>
+              <a:gd name="connsiteY7" fmla="*/ 5521194 h 5803900"/>
+              <a:gd name="connsiteX8" fmla="*/ 7124681 w 8089900"/>
+              <a:gd name="connsiteY8" fmla="*/ 5803900 h 5803900"/>
+              <a:gd name="connsiteX9" fmla="*/ 546100 w 8089900"/>
+              <a:gd name="connsiteY9" fmla="*/ 5803900 h 5803900"/>
+              <a:gd name="connsiteX10" fmla="*/ 88900 w 8089900"/>
+              <a:gd name="connsiteY10" fmla="*/ 5727700 h 5803900"/>
+              <a:gd name="connsiteX11" fmla="*/ 12700 w 8089900"/>
+              <a:gd name="connsiteY11" fmla="*/ 5346700 h 5803900"/>
+              <a:gd name="connsiteX12" fmla="*/ 12700 w 8089900"/>
+              <a:gd name="connsiteY12" fmla="*/ 546100 h 5803900"/>
+              <a:gd name="connsiteX0" fmla="*/ 12700 w 8089901"/>
+              <a:gd name="connsiteY0" fmla="*/ 546100 h 5803900"/>
+              <a:gd name="connsiteX1" fmla="*/ 88900 w 8089901"/>
+              <a:gd name="connsiteY1" fmla="*/ 88900 h 5803900"/>
+              <a:gd name="connsiteX2" fmla="*/ 546100 w 8089901"/>
+              <a:gd name="connsiteY2" fmla="*/ 12701 h 5803900"/>
+              <a:gd name="connsiteX3" fmla="*/ 7556500 w 8089901"/>
+              <a:gd name="connsiteY3" fmla="*/ 12700 h 5803900"/>
+              <a:gd name="connsiteX4" fmla="*/ 7807194 w 8089901"/>
+              <a:gd name="connsiteY4" fmla="*/ 295407 h 5803900"/>
+              <a:gd name="connsiteX5" fmla="*/ 8089900 w 8089901"/>
+              <a:gd name="connsiteY5" fmla="*/ 469900 h 5803900"/>
+              <a:gd name="connsiteX6" fmla="*/ 8089900 w 8089901"/>
+              <a:gd name="connsiteY6" fmla="*/ 4838681 h 5803900"/>
+              <a:gd name="connsiteX7" fmla="*/ 7807194 w 8089901"/>
+              <a:gd name="connsiteY7" fmla="*/ 5521194 h 5803900"/>
+              <a:gd name="connsiteX8" fmla="*/ 7124681 w 8089901"/>
+              <a:gd name="connsiteY8" fmla="*/ 5803900 h 5803900"/>
+              <a:gd name="connsiteX9" fmla="*/ 546100 w 8089901"/>
+              <a:gd name="connsiteY9" fmla="*/ 5803900 h 5803900"/>
+              <a:gd name="connsiteX10" fmla="*/ 88900 w 8089901"/>
+              <a:gd name="connsiteY10" fmla="*/ 5727700 h 5803900"/>
+              <a:gd name="connsiteX11" fmla="*/ 12700 w 8089901"/>
+              <a:gd name="connsiteY11" fmla="*/ 5346700 h 5803900"/>
+              <a:gd name="connsiteX12" fmla="*/ 12700 w 8089901"/>
+              <a:gd name="connsiteY12" fmla="*/ 546100 h 5803900"/>
+              <a:gd name="connsiteX0" fmla="*/ 12700 w 8102600"/>
+              <a:gd name="connsiteY0" fmla="*/ 546100 h 5803900"/>
+              <a:gd name="connsiteX1" fmla="*/ 88900 w 8102600"/>
+              <a:gd name="connsiteY1" fmla="*/ 88900 h 5803900"/>
+              <a:gd name="connsiteX2" fmla="*/ 546100 w 8102600"/>
+              <a:gd name="connsiteY2" fmla="*/ 12701 h 5803900"/>
+              <a:gd name="connsiteX3" fmla="*/ 7556500 w 8102600"/>
+              <a:gd name="connsiteY3" fmla="*/ 12700 h 5803900"/>
+              <a:gd name="connsiteX4" fmla="*/ 8013700 w 8102600"/>
+              <a:gd name="connsiteY4" fmla="*/ 88900 h 5803900"/>
+              <a:gd name="connsiteX5" fmla="*/ 8089900 w 8102600"/>
+              <a:gd name="connsiteY5" fmla="*/ 469900 h 5803900"/>
+              <a:gd name="connsiteX6" fmla="*/ 8089900 w 8102600"/>
+              <a:gd name="connsiteY6" fmla="*/ 4838681 h 5803900"/>
+              <a:gd name="connsiteX7" fmla="*/ 7807194 w 8102600"/>
+              <a:gd name="connsiteY7" fmla="*/ 5521194 h 5803900"/>
+              <a:gd name="connsiteX8" fmla="*/ 7124681 w 8102600"/>
+              <a:gd name="connsiteY8" fmla="*/ 5803900 h 5803900"/>
+              <a:gd name="connsiteX9" fmla="*/ 546100 w 8102600"/>
+              <a:gd name="connsiteY9" fmla="*/ 5803900 h 5803900"/>
+              <a:gd name="connsiteX10" fmla="*/ 88900 w 8102600"/>
+              <a:gd name="connsiteY10" fmla="*/ 5727700 h 5803900"/>
+              <a:gd name="connsiteX11" fmla="*/ 12700 w 8102600"/>
+              <a:gd name="connsiteY11" fmla="*/ 5346700 h 5803900"/>
+              <a:gd name="connsiteX12" fmla="*/ 12700 w 8102600"/>
+              <a:gd name="connsiteY12" fmla="*/ 546100 h 5803900"/>
+              <a:gd name="connsiteX0" fmla="*/ 12700 w 8102600"/>
+              <a:gd name="connsiteY0" fmla="*/ 546100 h 5803900"/>
+              <a:gd name="connsiteX1" fmla="*/ 88900 w 8102600"/>
+              <a:gd name="connsiteY1" fmla="*/ 88900 h 5803900"/>
+              <a:gd name="connsiteX2" fmla="*/ 546100 w 8102600"/>
+              <a:gd name="connsiteY2" fmla="*/ 12701 h 5803900"/>
+              <a:gd name="connsiteX3" fmla="*/ 7556500 w 8102600"/>
+              <a:gd name="connsiteY3" fmla="*/ 12700 h 5803900"/>
+              <a:gd name="connsiteX4" fmla="*/ 8013700 w 8102600"/>
+              <a:gd name="connsiteY4" fmla="*/ 88900 h 5803900"/>
+              <a:gd name="connsiteX5" fmla="*/ 8089899 w 8102600"/>
+              <a:gd name="connsiteY5" fmla="*/ 469900 h 5803900"/>
+              <a:gd name="connsiteX6" fmla="*/ 8089900 w 8102600"/>
+              <a:gd name="connsiteY6" fmla="*/ 4838681 h 5803900"/>
+              <a:gd name="connsiteX7" fmla="*/ 7807194 w 8102600"/>
+              <a:gd name="connsiteY7" fmla="*/ 5521194 h 5803900"/>
+              <a:gd name="connsiteX8" fmla="*/ 7124681 w 8102600"/>
+              <a:gd name="connsiteY8" fmla="*/ 5803900 h 5803900"/>
+              <a:gd name="connsiteX9" fmla="*/ 546100 w 8102600"/>
+              <a:gd name="connsiteY9" fmla="*/ 5803900 h 5803900"/>
+              <a:gd name="connsiteX10" fmla="*/ 88900 w 8102600"/>
+              <a:gd name="connsiteY10" fmla="*/ 5727700 h 5803900"/>
+              <a:gd name="connsiteX11" fmla="*/ 12700 w 8102600"/>
+              <a:gd name="connsiteY11" fmla="*/ 5346700 h 5803900"/>
+              <a:gd name="connsiteX12" fmla="*/ 12700 w 8102600"/>
+              <a:gd name="connsiteY12" fmla="*/ 546100 h 5803900"/>
+              <a:gd name="connsiteX0" fmla="*/ 12700 w 8102599"/>
+              <a:gd name="connsiteY0" fmla="*/ 546100 h 5803900"/>
+              <a:gd name="connsiteX1" fmla="*/ 88900 w 8102599"/>
+              <a:gd name="connsiteY1" fmla="*/ 88900 h 5803900"/>
+              <a:gd name="connsiteX2" fmla="*/ 546100 w 8102599"/>
+              <a:gd name="connsiteY2" fmla="*/ 12701 h 5803900"/>
+              <a:gd name="connsiteX3" fmla="*/ 7556500 w 8102599"/>
+              <a:gd name="connsiteY3" fmla="*/ 12700 h 5803900"/>
+              <a:gd name="connsiteX4" fmla="*/ 8013699 w 8102599"/>
+              <a:gd name="connsiteY4" fmla="*/ 88900 h 5803900"/>
+              <a:gd name="connsiteX5" fmla="*/ 8089899 w 8102599"/>
+              <a:gd name="connsiteY5" fmla="*/ 469900 h 5803900"/>
+              <a:gd name="connsiteX6" fmla="*/ 8089900 w 8102599"/>
+              <a:gd name="connsiteY6" fmla="*/ 4838681 h 5803900"/>
+              <a:gd name="connsiteX7" fmla="*/ 7807194 w 8102599"/>
+              <a:gd name="connsiteY7" fmla="*/ 5521194 h 5803900"/>
+              <a:gd name="connsiteX8" fmla="*/ 7124681 w 8102599"/>
+              <a:gd name="connsiteY8" fmla="*/ 5803900 h 5803900"/>
+              <a:gd name="connsiteX9" fmla="*/ 546100 w 8102599"/>
+              <a:gd name="connsiteY9" fmla="*/ 5803900 h 5803900"/>
+              <a:gd name="connsiteX10" fmla="*/ 88900 w 8102599"/>
+              <a:gd name="connsiteY10" fmla="*/ 5727700 h 5803900"/>
+              <a:gd name="connsiteX11" fmla="*/ 12700 w 8102599"/>
+              <a:gd name="connsiteY11" fmla="*/ 5346700 h 5803900"/>
+              <a:gd name="connsiteX12" fmla="*/ 12700 w 8102599"/>
+              <a:gd name="connsiteY12" fmla="*/ 546100 h 5803900"/>
+              <a:gd name="connsiteX0" fmla="*/ 12700 w 8102599"/>
+              <a:gd name="connsiteY0" fmla="*/ 546100 h 5803900"/>
+              <a:gd name="connsiteX1" fmla="*/ 88900 w 8102599"/>
+              <a:gd name="connsiteY1" fmla="*/ 88900 h 5803900"/>
+              <a:gd name="connsiteX2" fmla="*/ 546100 w 8102599"/>
+              <a:gd name="connsiteY2" fmla="*/ 12701 h 5803900"/>
+              <a:gd name="connsiteX3" fmla="*/ 7556500 w 8102599"/>
+              <a:gd name="connsiteY3" fmla="*/ 12700 h 5803900"/>
+              <a:gd name="connsiteX4" fmla="*/ 8013699 w 8102599"/>
+              <a:gd name="connsiteY4" fmla="*/ 88900 h 5803900"/>
+              <a:gd name="connsiteX5" fmla="*/ 8089899 w 8102599"/>
+              <a:gd name="connsiteY5" fmla="*/ 469900 h 5803900"/>
+              <a:gd name="connsiteX6" fmla="*/ 8089900 w 8102599"/>
+              <a:gd name="connsiteY6" fmla="*/ 5346700 h 5803900"/>
+              <a:gd name="connsiteX7" fmla="*/ 7807194 w 8102599"/>
+              <a:gd name="connsiteY7" fmla="*/ 5521194 h 5803900"/>
+              <a:gd name="connsiteX8" fmla="*/ 7124681 w 8102599"/>
+              <a:gd name="connsiteY8" fmla="*/ 5803900 h 5803900"/>
+              <a:gd name="connsiteX9" fmla="*/ 546100 w 8102599"/>
+              <a:gd name="connsiteY9" fmla="*/ 5803900 h 5803900"/>
+              <a:gd name="connsiteX10" fmla="*/ 88900 w 8102599"/>
+              <a:gd name="connsiteY10" fmla="*/ 5727700 h 5803900"/>
+              <a:gd name="connsiteX11" fmla="*/ 12700 w 8102599"/>
+              <a:gd name="connsiteY11" fmla="*/ 5346700 h 5803900"/>
+              <a:gd name="connsiteX12" fmla="*/ 12700 w 8102599"/>
+              <a:gd name="connsiteY12" fmla="*/ 546100 h 5803900"/>
+              <a:gd name="connsiteX0" fmla="*/ 12700 w 8102599"/>
+              <a:gd name="connsiteY0" fmla="*/ 546100 h 5803900"/>
+              <a:gd name="connsiteX1" fmla="*/ 88900 w 8102599"/>
+              <a:gd name="connsiteY1" fmla="*/ 88900 h 5803900"/>
+              <a:gd name="connsiteX2" fmla="*/ 546100 w 8102599"/>
+              <a:gd name="connsiteY2" fmla="*/ 12701 h 5803900"/>
+              <a:gd name="connsiteX3" fmla="*/ 7556500 w 8102599"/>
+              <a:gd name="connsiteY3" fmla="*/ 12700 h 5803900"/>
+              <a:gd name="connsiteX4" fmla="*/ 8013699 w 8102599"/>
+              <a:gd name="connsiteY4" fmla="*/ 88900 h 5803900"/>
+              <a:gd name="connsiteX5" fmla="*/ 8089899 w 8102599"/>
+              <a:gd name="connsiteY5" fmla="*/ 469900 h 5803900"/>
+              <a:gd name="connsiteX6" fmla="*/ 8089900 w 8102599"/>
+              <a:gd name="connsiteY6" fmla="*/ 5346700 h 5803900"/>
+              <a:gd name="connsiteX7" fmla="*/ 7807194 w 8102599"/>
+              <a:gd name="connsiteY7" fmla="*/ 5521194 h 5803900"/>
+              <a:gd name="connsiteX8" fmla="*/ 7632700 w 8102599"/>
+              <a:gd name="connsiteY8" fmla="*/ 5803900 h 5803900"/>
+              <a:gd name="connsiteX9" fmla="*/ 546100 w 8102599"/>
+              <a:gd name="connsiteY9" fmla="*/ 5803900 h 5803900"/>
+              <a:gd name="connsiteX10" fmla="*/ 88900 w 8102599"/>
+              <a:gd name="connsiteY10" fmla="*/ 5727700 h 5803900"/>
+              <a:gd name="connsiteX11" fmla="*/ 12700 w 8102599"/>
+              <a:gd name="connsiteY11" fmla="*/ 5346700 h 5803900"/>
+              <a:gd name="connsiteX12" fmla="*/ 12700 w 8102599"/>
+              <a:gd name="connsiteY12" fmla="*/ 546100 h 5803900"/>
+              <a:gd name="connsiteX0" fmla="*/ 12700 w 8102599"/>
+              <a:gd name="connsiteY0" fmla="*/ 546100 h 5803900"/>
+              <a:gd name="connsiteX1" fmla="*/ 88900 w 8102599"/>
+              <a:gd name="connsiteY1" fmla="*/ 88900 h 5803900"/>
+              <a:gd name="connsiteX2" fmla="*/ 546100 w 8102599"/>
+              <a:gd name="connsiteY2" fmla="*/ 12701 h 5803900"/>
+              <a:gd name="connsiteX3" fmla="*/ 7556500 w 8102599"/>
+              <a:gd name="connsiteY3" fmla="*/ 12700 h 5803900"/>
+              <a:gd name="connsiteX4" fmla="*/ 8013699 w 8102599"/>
+              <a:gd name="connsiteY4" fmla="*/ 88900 h 5803900"/>
+              <a:gd name="connsiteX5" fmla="*/ 8089899 w 8102599"/>
+              <a:gd name="connsiteY5" fmla="*/ 469900 h 5803900"/>
+              <a:gd name="connsiteX6" fmla="*/ 8089900 w 8102599"/>
+              <a:gd name="connsiteY6" fmla="*/ 5346700 h 5803900"/>
+              <a:gd name="connsiteX7" fmla="*/ 8013700 w 8102599"/>
+              <a:gd name="connsiteY7" fmla="*/ 5727700 h 5803900"/>
+              <a:gd name="connsiteX8" fmla="*/ 7632700 w 8102599"/>
+              <a:gd name="connsiteY8" fmla="*/ 5803900 h 5803900"/>
+              <a:gd name="connsiteX9" fmla="*/ 546100 w 8102599"/>
+              <a:gd name="connsiteY9" fmla="*/ 5803900 h 5803900"/>
+              <a:gd name="connsiteX10" fmla="*/ 88900 w 8102599"/>
+              <a:gd name="connsiteY10" fmla="*/ 5727700 h 5803900"/>
+              <a:gd name="connsiteX11" fmla="*/ 12700 w 8102599"/>
+              <a:gd name="connsiteY11" fmla="*/ 5346700 h 5803900"/>
+              <a:gd name="connsiteX12" fmla="*/ 12700 w 8102599"/>
+              <a:gd name="connsiteY12" fmla="*/ 546100 h 5803900"/>
+            </a:gdLst>
+            <a:ahLst/>
+            <a:cxnLst>
+              <a:cxn ang="0">
+                <a:pos x="connsiteX0" y="connsiteY0"/>
+              </a:cxn>
+              <a:cxn ang="0">
+                <a:pos x="connsiteX1" y="connsiteY1"/>
+              </a:cxn>
+              <a:cxn ang="0">
+                <a:pos x="connsiteX2" y="connsiteY2"/>
+              </a:cxn>
+              <a:cxn ang="0">
+                <a:pos x="connsiteX3" y="connsiteY3"/>
+              </a:cxn>
+              <a:cxn ang="0">
+                <a:pos x="connsiteX4" y="connsiteY4"/>
+              </a:cxn>
+              <a:cxn ang="0">
+                <a:pos x="connsiteX5" y="connsiteY5"/>
+              </a:cxn>
+              <a:cxn ang="0">
+                <a:pos x="connsiteX6" y="connsiteY6"/>
+              </a:cxn>
+              <a:cxn ang="0">
+                <a:pos x="connsiteX7" y="connsiteY7"/>
+              </a:cxn>
+              <a:cxn ang="0">
+                <a:pos x="connsiteX8" y="connsiteY8"/>
+              </a:cxn>
+              <a:cxn ang="0">
+                <a:pos x="connsiteX9" y="connsiteY9"/>
+              </a:cxn>
+              <a:cxn ang="0">
+                <a:pos x="connsiteX10" y="connsiteY10"/>
+              </a:cxn>
+              <a:cxn ang="0">
+                <a:pos x="connsiteX11" y="connsiteY11"/>
+              </a:cxn>
+              <a:cxn ang="0">
+                <a:pos x="connsiteX12" y="connsiteY12"/>
+              </a:cxn>
+            </a:cxnLst>
+            <a:rect l="l" t="t" r="r" b="b"/>
+            <a:pathLst>
+              <a:path w="8102599" h="5803900">
+                <a:moveTo>
+                  <a:pt x="12700" y="546100"/>
+                </a:moveTo>
+                <a:cubicBezTo>
+                  <a:pt x="12700" y="290108"/>
+                  <a:pt x="0" y="177800"/>
+                  <a:pt x="88900" y="88900"/>
+                </a:cubicBezTo>
+                <a:cubicBezTo>
+                  <a:pt x="177800" y="0"/>
+                  <a:pt x="290107" y="12700"/>
+                  <a:pt x="546100" y="12701"/>
+                </a:cubicBezTo>
+                <a:lnTo>
+                  <a:pt x="7556500" y="12700"/>
+                </a:lnTo>
+                <a:cubicBezTo>
+                  <a:pt x="7812492" y="12700"/>
+                  <a:pt x="7924799" y="12700"/>
+                  <a:pt x="8013699" y="88900"/>
+                </a:cubicBezTo>
+                <a:cubicBezTo>
+                  <a:pt x="8102599" y="165100"/>
+                  <a:pt x="8089900" y="213907"/>
+                  <a:pt x="8089899" y="469900"/>
+                </a:cubicBezTo>
+                <a:cubicBezTo>
+                  <a:pt x="8089899" y="1926160"/>
+                  <a:pt x="8089900" y="3890440"/>
+                  <a:pt x="8089900" y="5346700"/>
+                </a:cubicBezTo>
+                <a:cubicBezTo>
+                  <a:pt x="8089900" y="5602692"/>
+                  <a:pt x="8089900" y="5651500"/>
+                  <a:pt x="8013700" y="5727700"/>
+                </a:cubicBezTo>
+                <a:cubicBezTo>
+                  <a:pt x="7937500" y="5803900"/>
+                  <a:pt x="7888692" y="5803900"/>
+                  <a:pt x="7632700" y="5803900"/>
+                </a:cubicBezTo>
+                <a:lnTo>
+                  <a:pt x="546100" y="5803900"/>
+                </a:lnTo>
+                <a:cubicBezTo>
+                  <a:pt x="290108" y="5803900"/>
+                  <a:pt x="177800" y="5803900"/>
+                  <a:pt x="88900" y="5727700"/>
+                </a:cubicBezTo>
+                <a:cubicBezTo>
+                  <a:pt x="0" y="5651500"/>
+                  <a:pt x="12700" y="5602692"/>
+                  <a:pt x="12700" y="5346700"/>
+                </a:cubicBezTo>
+                <a:lnTo>
+                  <a:pt x="12700" y="546100"/>
+                </a:lnTo>
+                <a:close/>
+              </a:path>
+            </a:pathLst>
+          </a:custGeom>
+          <a:gradFill>
+            <a:gsLst>
+              <a:gs pos="0">
+                <a:schemeClr val="bg1">
+                  <a:lumMod val="50000"/>
+                </a:schemeClr>
+              </a:gs>
+              <a:gs pos="39999">
+                <a:schemeClr val="bg1">
+                  <a:lumMod val="65000"/>
+                </a:schemeClr>
+              </a:gs>
+              <a:gs pos="70000">
+                <a:schemeClr val="bg1">
+                  <a:lumMod val="50000"/>
+                  <a:alpha val="73000"/>
+                </a:schemeClr>
+              </a:gs>
+            </a:gsLst>
+            <a:lin ang="5400000" scaled="0"/>
+          </a:gradFill>
+          <a:ln>
+            <a:solidFill>
+              <a:schemeClr val="bg1">
+                <a:lumMod val="75000"/>
+              </a:schemeClr>
+            </a:solidFill>
+          </a:ln>
+        </p:spPr>
+        <p:style>
+          <a:lnRef idx="2">
+            <a:schemeClr val="accent1">
+              <a:shade val="50000"/>
+            </a:schemeClr>
+          </a:lnRef>
+          <a:fillRef idx="1">
+            <a:schemeClr val="accent1"/>
+          </a:fillRef>
+          <a:effectRef idx="0">
+            <a:schemeClr val="accent1"/>
+          </a:effectRef>
+          <a:fontRef idx="minor">
+            <a:schemeClr val="lt1"/>
+          </a:fontRef>
+        </p:style>
+        <p:txBody>
+          <a:bodyPr rtlCol="0" anchor="ctr"/>
+          <a:lstStyle/>
+          <a:p>
+            <a:pPr fontAlgn="t"/>
+            <a:endParaRPr lang="es-AR" b="1" dirty="0" smtClean="0"/>
+          </a:p>
+          <a:p>
+            <a:pPr algn="ctr"/>
+            <a:endParaRPr lang="es-AR" dirty="0"/>
+          </a:p>
+        </p:txBody>
+      </p:sp>
+      <p:sp>
+        <p:nvSpPr>
+          <p:cNvPr id="11" name="Rectangle 13"/>
+          <p:cNvSpPr/>
+          <p:nvPr/>
+        </p:nvSpPr>
+        <p:spPr>
+          <a:xfrm>
+            <a:off x="381000" y="1295400"/>
+            <a:ext cx="8458200" cy="1066800"/>
+          </a:xfrm>
+          <a:prstGeom prst="rect">
+            <a:avLst/>
+          </a:prstGeom>
+          <a:noFill/>
+          <a:ln>
+            <a:noFill/>
+          </a:ln>
+        </p:spPr>
+        <p:style>
+          <a:lnRef idx="2">
+            <a:schemeClr val="accent1">
+              <a:shade val="50000"/>
+            </a:schemeClr>
+          </a:lnRef>
+          <a:fillRef idx="1">
+            <a:schemeClr val="accent1"/>
+          </a:fillRef>
+          <a:effectRef idx="0">
+            <a:schemeClr val="accent1"/>
+          </a:effectRef>
+          <a:fontRef idx="minor">
+            <a:schemeClr val="lt1"/>
+          </a:fontRef>
+        </p:style>
+        <p:txBody>
+          <a:bodyPr rtlCol="0" anchor="ctr"/>
+          <a:lstStyle/>
+          <a:p>
+            <a:pPr algn="ctr"/>
+            <a:r>
+              <a:rPr lang="es-AR" sz="4800" b="1" u="sng" dirty="0" smtClean="0"/>
+              <a:t>Modelo de </a:t>
+            </a:r>
+            <a:r>
+              <a:rPr lang="es-AR" sz="4800" b="1" u="sng" dirty="0" smtClean="0"/>
+              <a:t>Datos (II)</a:t>
+            </a:r>
+            <a:endParaRPr lang="es-AR" sz="4800" b="1" u="sng" dirty="0" smtClean="0"/>
+          </a:p>
+          <a:p>
+            <a:pPr algn="ctr"/>
+            <a:endParaRPr lang="es-AR" sz="1200" dirty="0"/>
+          </a:p>
+        </p:txBody>
+      </p:sp>
+      <p:grpSp>
+        <p:nvGrpSpPr>
+          <p:cNvPr id="12" name="Group 14"/>
+          <p:cNvGrpSpPr/>
+          <p:nvPr/>
+        </p:nvGrpSpPr>
+        <p:grpSpPr>
+          <a:xfrm>
+            <a:off x="1295400" y="544415"/>
+            <a:ext cx="6553200" cy="903384"/>
+            <a:chOff x="1295400" y="544415"/>
+            <a:chExt cx="6553200" cy="903384"/>
+          </a:xfrm>
+        </p:grpSpPr>
+        <p:sp>
+          <p:nvSpPr>
+            <p:cNvPr id="13" name="Round Same Side Corner Rectangle 15"/>
+            <p:cNvSpPr/>
+            <p:nvPr/>
+          </p:nvSpPr>
+          <p:spPr>
+            <a:xfrm rot="10800000">
+              <a:off x="1295400" y="544415"/>
+              <a:ext cx="6553200" cy="903384"/>
+            </a:xfrm>
+            <a:prstGeom prst="round2SameRect">
+              <a:avLst/>
+            </a:prstGeom>
+          </p:spPr>
+          <p:style>
+            <a:lnRef idx="2">
+              <a:schemeClr val="dk1">
+                <a:shade val="50000"/>
+              </a:schemeClr>
+            </a:lnRef>
+            <a:fillRef idx="1">
+              <a:schemeClr val="dk1"/>
+            </a:fillRef>
+            <a:effectRef idx="0">
+              <a:schemeClr val="dk1"/>
+            </a:effectRef>
+            <a:fontRef idx="minor">
+              <a:schemeClr val="lt1"/>
+            </a:fontRef>
+          </p:style>
+          <p:txBody>
+            <a:bodyPr rtlCol="0" anchor="ctr"/>
+            <a:lstStyle/>
+            <a:p>
+              <a:pPr algn="ctr"/>
+              <a:endParaRPr lang="es-AR" dirty="0"/>
+            </a:p>
+          </p:txBody>
+        </p:sp>
+        <p:pic>
+          <p:nvPicPr>
+            <p:cNvPr id="14" name="Picture 2" descr="E:\U.B.A.Files\Materias\75.45 Taller de Desarrollo de Proyectos I\TP\Trunk\Proyecto\web\site\images\logo.png"/>
+            <p:cNvPicPr>
+              <a:picLocks noChangeAspect="1" noChangeArrowheads="1"/>
+            </p:cNvPicPr>
+            <p:nvPr/>
+          </p:nvPicPr>
+          <p:blipFill>
+            <a:blip r:embed="rId2" cstate="print"/>
+            <a:srcRect/>
+            <a:stretch>
+              <a:fillRect/>
+            </a:stretch>
+          </p:blipFill>
+          <p:spPr bwMode="auto">
+            <a:xfrm>
+              <a:off x="1600200" y="609600"/>
+              <a:ext cx="2640904" cy="762000"/>
+            </a:xfrm>
+            <a:prstGeom prst="rect">
+              <a:avLst/>
+            </a:prstGeom>
+            <a:noFill/>
+          </p:spPr>
+        </p:pic>
+        <p:sp>
+          <p:nvSpPr>
+            <p:cNvPr id="15" name="TextBox 22"/>
+            <p:cNvSpPr txBox="1"/>
+            <p:nvPr/>
+          </p:nvSpPr>
+          <p:spPr>
+            <a:xfrm>
+              <a:off x="4515457" y="685800"/>
+              <a:ext cx="3180743" cy="307777"/>
+            </a:xfrm>
+            <a:prstGeom prst="rect">
+              <a:avLst/>
+            </a:prstGeom>
+            <a:noFill/>
+          </p:spPr>
+          <p:txBody>
+            <a:bodyPr wrap="none" rtlCol="0">
+              <a:spAutoFit/>
+            </a:bodyPr>
+            <a:lstStyle/>
+            <a:p>
+              <a:r>
+                <a:rPr lang="es-AR" sz="1400" dirty="0" smtClean="0">
+                  <a:solidFill>
+                    <a:schemeClr val="bg1">
+                      <a:lumMod val="50000"/>
+                    </a:schemeClr>
+                  </a:solidFill>
+                </a:rPr>
+                <a:t>Centralización y análisis de datos</a:t>
+              </a:r>
+              <a:endParaRPr lang="es-AR" sz="1400" dirty="0">
+                <a:solidFill>
+                  <a:schemeClr val="bg1">
+                    <a:lumMod val="50000"/>
+                  </a:schemeClr>
+                </a:solidFill>
+              </a:endParaRPr>
+            </a:p>
+          </p:txBody>
+        </p:sp>
+      </p:grpSp>
+      <p:pic>
+        <p:nvPicPr>
+          <p:cNvPr id="19" name="18 Imagen" descr="parte2.gif"/>
+          <p:cNvPicPr>
+            <a:picLocks noChangeAspect="1"/>
+          </p:cNvPicPr>
+          <p:nvPr/>
+        </p:nvPicPr>
+        <p:blipFill>
+          <a:blip r:embed="rId3"/>
+          <a:stretch>
+            <a:fillRect/>
+          </a:stretch>
+        </p:blipFill>
+        <p:spPr>
+          <a:xfrm>
+            <a:off x="2362200" y="2133600"/>
+            <a:ext cx="4409831" cy="4062600"/>
+          </a:xfrm>
+          <a:prstGeom prst="rect">
+            <a:avLst/>
+          </a:prstGeom>
+        </p:spPr>
+      </p:pic>
+    </p:spTree>
+  </p:cSld>
+  <p:clrMapOvr>
+    <a:masterClrMapping/>
+  </p:clrMapOvr>
+  <p:timing>
+    <p:tnLst>
+      <p:par>
+        <p:cTn id="1" dur="indefinite" restart="never" nodeType="tmRoot"/>
+      </p:par>
+    </p:tnLst>
+  </p:timing>
+</p:sld>
+</file>
+
+<file path=ppt/slides/slide9.xml><?xml version="1.0" encoding="utf-8"?>
 <p:sld xmlns:a="http://schemas.openxmlformats.org/drawingml/2006/main" xmlns:r="http://schemas.openxmlformats.org/officeDocument/2006/relationships" xmlns:p="http://schemas.openxmlformats.org/presentationml/2006/main">
   <p:cSld>
     <p:spTree>
@@ -21057,1099 +23634,6 @@
 </p:sld>
 </file>
 
-<file path=ppt/slides/slide9.xml><?xml version="1.0" encoding="utf-8"?>
-<p:sld xmlns:a="http://schemas.openxmlformats.org/drawingml/2006/main" xmlns:r="http://schemas.openxmlformats.org/officeDocument/2006/relationships" xmlns:p="http://schemas.openxmlformats.org/presentationml/2006/main">
-  <p:cSld>
-    <p:spTree>
-      <p:nvGrpSpPr>
-        <p:cNvPr id="1" name=""/>
-        <p:cNvGrpSpPr/>
-        <p:nvPr/>
-      </p:nvGrpSpPr>
-      <p:grpSpPr>
-        <a:xfrm>
-          <a:off x="0" y="0"/>
-          <a:ext cx="0" cy="0"/>
-          <a:chOff x="0" y="0"/>
-          <a:chExt cx="0" cy="0"/>
-        </a:xfrm>
-      </p:grpSpPr>
-      <p:grpSp>
-        <p:nvGrpSpPr>
-          <p:cNvPr id="2" name="Group 22"/>
-          <p:cNvGrpSpPr/>
-          <p:nvPr/>
-        </p:nvGrpSpPr>
-        <p:grpSpPr>
-          <a:xfrm>
-            <a:off x="304800" y="304800"/>
-            <a:ext cx="8534400" cy="6248400"/>
-            <a:chOff x="304800" y="304800"/>
-            <a:chExt cx="8534400" cy="6248400"/>
-          </a:xfrm>
-          <a:solidFill>
-            <a:schemeClr val="bg1">
-              <a:lumMod val="85000"/>
-            </a:schemeClr>
-          </a:solidFill>
-        </p:grpSpPr>
-        <p:sp>
-          <p:nvSpPr>
-            <p:cNvPr id="18" name="Rounded Rectangle 17"/>
-            <p:cNvSpPr/>
-            <p:nvPr/>
-          </p:nvSpPr>
-          <p:spPr>
-            <a:xfrm>
-              <a:off x="304800" y="304800"/>
-              <a:ext cx="8534400" cy="6248400"/>
-            </a:xfrm>
-            <a:prstGeom prst="roundRect">
-              <a:avLst/>
-            </a:prstGeom>
-            <a:grpFill/>
-            <a:ln>
-              <a:noFill/>
-            </a:ln>
-          </p:spPr>
-          <p:style>
-            <a:lnRef idx="2">
-              <a:schemeClr val="accent1">
-                <a:shade val="50000"/>
-              </a:schemeClr>
-            </a:lnRef>
-            <a:fillRef idx="1">
-              <a:schemeClr val="accent1"/>
-            </a:fillRef>
-            <a:effectRef idx="0">
-              <a:schemeClr val="accent1"/>
-            </a:effectRef>
-            <a:fontRef idx="minor">
-              <a:schemeClr val="lt1"/>
-            </a:fontRef>
-          </p:style>
-          <p:txBody>
-            <a:bodyPr rtlCol="0" anchor="ctr"/>
-            <a:lstStyle/>
-            <a:p>
-              <a:pPr algn="ctr"/>
-              <a:endParaRPr lang="es-AR"/>
-            </a:p>
-          </p:txBody>
-        </p:sp>
-        <p:sp>
-          <p:nvSpPr>
-            <p:cNvPr id="22" name="Rounded Rectangle 21"/>
-            <p:cNvSpPr/>
-            <p:nvPr/>
-          </p:nvSpPr>
-          <p:spPr>
-            <a:xfrm>
-              <a:off x="7086600" y="304800"/>
-              <a:ext cx="1752600" cy="1752600"/>
-            </a:xfrm>
-            <a:prstGeom prst="roundRect">
-              <a:avLst/>
-            </a:prstGeom>
-            <a:grpFill/>
-            <a:ln>
-              <a:noFill/>
-            </a:ln>
-          </p:spPr>
-          <p:style>
-            <a:lnRef idx="2">
-              <a:schemeClr val="accent1">
-                <a:shade val="50000"/>
-              </a:schemeClr>
-            </a:lnRef>
-            <a:fillRef idx="1">
-              <a:schemeClr val="accent1"/>
-            </a:fillRef>
-            <a:effectRef idx="0">
-              <a:schemeClr val="accent1"/>
-            </a:effectRef>
-            <a:fontRef idx="minor">
-              <a:schemeClr val="lt1"/>
-            </a:fontRef>
-          </p:style>
-          <p:txBody>
-            <a:bodyPr rtlCol="0" anchor="ctr"/>
-            <a:lstStyle/>
-            <a:p>
-              <a:pPr algn="ctr"/>
-              <a:endParaRPr lang="es-AR"/>
-            </a:p>
-          </p:txBody>
-        </p:sp>
-        <p:sp>
-          <p:nvSpPr>
-            <p:cNvPr id="21" name="Rounded Rectangle 20"/>
-            <p:cNvSpPr/>
-            <p:nvPr/>
-          </p:nvSpPr>
-          <p:spPr>
-            <a:xfrm>
-              <a:off x="304800" y="304800"/>
-              <a:ext cx="1752600" cy="1752600"/>
-            </a:xfrm>
-            <a:prstGeom prst="roundRect">
-              <a:avLst/>
-            </a:prstGeom>
-            <a:grpFill/>
-            <a:ln>
-              <a:noFill/>
-            </a:ln>
-          </p:spPr>
-          <p:style>
-            <a:lnRef idx="2">
-              <a:schemeClr val="accent1">
-                <a:shade val="50000"/>
-              </a:schemeClr>
-            </a:lnRef>
-            <a:fillRef idx="1">
-              <a:schemeClr val="accent1"/>
-            </a:fillRef>
-            <a:effectRef idx="0">
-              <a:schemeClr val="accent1"/>
-            </a:effectRef>
-            <a:fontRef idx="minor">
-              <a:schemeClr val="lt1"/>
-            </a:fontRef>
-          </p:style>
-          <p:txBody>
-            <a:bodyPr rtlCol="0" anchor="ctr"/>
-            <a:lstStyle/>
-            <a:p>
-              <a:pPr algn="ctr"/>
-              <a:endParaRPr lang="es-AR"/>
-            </a:p>
-          </p:txBody>
-        </p:sp>
-        <p:sp>
-          <p:nvSpPr>
-            <p:cNvPr id="17" name="Rounded Rectangle 16"/>
-            <p:cNvSpPr/>
-            <p:nvPr/>
-          </p:nvSpPr>
-          <p:spPr>
-            <a:xfrm>
-              <a:off x="304800" y="4800600"/>
-              <a:ext cx="1752600" cy="1752600"/>
-            </a:xfrm>
-            <a:prstGeom prst="roundRect">
-              <a:avLst/>
-            </a:prstGeom>
-            <a:grpFill/>
-            <a:ln>
-              <a:noFill/>
-            </a:ln>
-          </p:spPr>
-          <p:style>
-            <a:lnRef idx="2">
-              <a:schemeClr val="accent1">
-                <a:shade val="50000"/>
-              </a:schemeClr>
-            </a:lnRef>
-            <a:fillRef idx="1">
-              <a:schemeClr val="accent1"/>
-            </a:fillRef>
-            <a:effectRef idx="0">
-              <a:schemeClr val="accent1"/>
-            </a:effectRef>
-            <a:fontRef idx="minor">
-              <a:schemeClr val="lt1"/>
-            </a:fontRef>
-          </p:style>
-          <p:txBody>
-            <a:bodyPr rtlCol="0" anchor="ctr"/>
-            <a:lstStyle/>
-            <a:p>
-              <a:pPr algn="ctr"/>
-              <a:endParaRPr lang="es-AR"/>
-            </a:p>
-          </p:txBody>
-        </p:sp>
-        <p:sp>
-          <p:nvSpPr>
-            <p:cNvPr id="19" name="Rounded Rectangle 18"/>
-            <p:cNvSpPr/>
-            <p:nvPr/>
-          </p:nvSpPr>
-          <p:spPr>
-            <a:xfrm>
-              <a:off x="7086600" y="4800600"/>
-              <a:ext cx="1752600" cy="1752600"/>
-            </a:xfrm>
-            <a:prstGeom prst="roundRect">
-              <a:avLst/>
-            </a:prstGeom>
-            <a:grpFill/>
-            <a:ln>
-              <a:noFill/>
-            </a:ln>
-          </p:spPr>
-          <p:style>
-            <a:lnRef idx="2">
-              <a:schemeClr val="accent1">
-                <a:shade val="50000"/>
-              </a:schemeClr>
-            </a:lnRef>
-            <a:fillRef idx="1">
-              <a:schemeClr val="accent1"/>
-            </a:fillRef>
-            <a:effectRef idx="0">
-              <a:schemeClr val="accent1"/>
-            </a:effectRef>
-            <a:fontRef idx="minor">
-              <a:schemeClr val="lt1"/>
-            </a:fontRef>
-          </p:style>
-          <p:txBody>
-            <a:bodyPr rtlCol="0" anchor="ctr"/>
-            <a:lstStyle/>
-            <a:p>
-              <a:pPr algn="ctr"/>
-              <a:endParaRPr lang="es-AR"/>
-            </a:p>
-          </p:txBody>
-        </p:sp>
-      </p:grpSp>
-      <p:sp>
-        <p:nvSpPr>
-          <p:cNvPr id="40" name="Freeform 39"/>
-          <p:cNvSpPr/>
-          <p:nvPr/>
-        </p:nvSpPr>
-        <p:spPr>
-          <a:xfrm>
-            <a:off x="457200" y="457200"/>
-            <a:ext cx="8229600" cy="5803900"/>
-          </a:xfrm>
-          <a:custGeom>
-            <a:avLst/>
-            <a:gdLst>
-              <a:gd name="connsiteX0" fmla="*/ 0 w 8077200"/>
-              <a:gd name="connsiteY0" fmla="*/ 965219 h 5791200"/>
-              <a:gd name="connsiteX1" fmla="*/ 282707 w 8077200"/>
-              <a:gd name="connsiteY1" fmla="*/ 282706 h 5791200"/>
-              <a:gd name="connsiteX2" fmla="*/ 965221 w 8077200"/>
-              <a:gd name="connsiteY2" fmla="*/ 1 h 5791200"/>
-              <a:gd name="connsiteX3" fmla="*/ 7111981 w 8077200"/>
-              <a:gd name="connsiteY3" fmla="*/ 0 h 5791200"/>
-              <a:gd name="connsiteX4" fmla="*/ 7794494 w 8077200"/>
-              <a:gd name="connsiteY4" fmla="*/ 282707 h 5791200"/>
-              <a:gd name="connsiteX5" fmla="*/ 8077199 w 8077200"/>
-              <a:gd name="connsiteY5" fmla="*/ 965221 h 5791200"/>
-              <a:gd name="connsiteX6" fmla="*/ 8077200 w 8077200"/>
-              <a:gd name="connsiteY6" fmla="*/ 4825981 h 5791200"/>
-              <a:gd name="connsiteX7" fmla="*/ 7794494 w 8077200"/>
-              <a:gd name="connsiteY7" fmla="*/ 5508494 h 5791200"/>
-              <a:gd name="connsiteX8" fmla="*/ 7111981 w 8077200"/>
-              <a:gd name="connsiteY8" fmla="*/ 5791200 h 5791200"/>
-              <a:gd name="connsiteX9" fmla="*/ 965219 w 8077200"/>
-              <a:gd name="connsiteY9" fmla="*/ 5791200 h 5791200"/>
-              <a:gd name="connsiteX10" fmla="*/ 282706 w 8077200"/>
-              <a:gd name="connsiteY10" fmla="*/ 5508493 h 5791200"/>
-              <a:gd name="connsiteX11" fmla="*/ 0 w 8077200"/>
-              <a:gd name="connsiteY11" fmla="*/ 4825980 h 5791200"/>
-              <a:gd name="connsiteX12" fmla="*/ 0 w 8077200"/>
-              <a:gd name="connsiteY12" fmla="*/ 965219 h 5791200"/>
-              <a:gd name="connsiteX0" fmla="*/ 0 w 8077200"/>
-              <a:gd name="connsiteY0" fmla="*/ 609600 h 5791200"/>
-              <a:gd name="connsiteX1" fmla="*/ 282707 w 8077200"/>
-              <a:gd name="connsiteY1" fmla="*/ 282706 h 5791200"/>
-              <a:gd name="connsiteX2" fmla="*/ 965221 w 8077200"/>
-              <a:gd name="connsiteY2" fmla="*/ 1 h 5791200"/>
-              <a:gd name="connsiteX3" fmla="*/ 7111981 w 8077200"/>
-              <a:gd name="connsiteY3" fmla="*/ 0 h 5791200"/>
-              <a:gd name="connsiteX4" fmla="*/ 7794494 w 8077200"/>
-              <a:gd name="connsiteY4" fmla="*/ 282707 h 5791200"/>
-              <a:gd name="connsiteX5" fmla="*/ 8077199 w 8077200"/>
-              <a:gd name="connsiteY5" fmla="*/ 965221 h 5791200"/>
-              <a:gd name="connsiteX6" fmla="*/ 8077200 w 8077200"/>
-              <a:gd name="connsiteY6" fmla="*/ 4825981 h 5791200"/>
-              <a:gd name="connsiteX7" fmla="*/ 7794494 w 8077200"/>
-              <a:gd name="connsiteY7" fmla="*/ 5508494 h 5791200"/>
-              <a:gd name="connsiteX8" fmla="*/ 7111981 w 8077200"/>
-              <a:gd name="connsiteY8" fmla="*/ 5791200 h 5791200"/>
-              <a:gd name="connsiteX9" fmla="*/ 965219 w 8077200"/>
-              <a:gd name="connsiteY9" fmla="*/ 5791200 h 5791200"/>
-              <a:gd name="connsiteX10" fmla="*/ 282706 w 8077200"/>
-              <a:gd name="connsiteY10" fmla="*/ 5508493 h 5791200"/>
-              <a:gd name="connsiteX11" fmla="*/ 0 w 8077200"/>
-              <a:gd name="connsiteY11" fmla="*/ 4825980 h 5791200"/>
-              <a:gd name="connsiteX12" fmla="*/ 0 w 8077200"/>
-              <a:gd name="connsiteY12" fmla="*/ 609600 h 5791200"/>
-              <a:gd name="connsiteX0" fmla="*/ 0 w 8077200"/>
-              <a:gd name="connsiteY0" fmla="*/ 609601 h 5791201"/>
-              <a:gd name="connsiteX1" fmla="*/ 282707 w 8077200"/>
-              <a:gd name="connsiteY1" fmla="*/ 282707 h 5791201"/>
-              <a:gd name="connsiteX2" fmla="*/ 609600 w 8077200"/>
-              <a:gd name="connsiteY2" fmla="*/ 1 h 5791201"/>
-              <a:gd name="connsiteX3" fmla="*/ 7111981 w 8077200"/>
-              <a:gd name="connsiteY3" fmla="*/ 1 h 5791201"/>
-              <a:gd name="connsiteX4" fmla="*/ 7794494 w 8077200"/>
-              <a:gd name="connsiteY4" fmla="*/ 282708 h 5791201"/>
-              <a:gd name="connsiteX5" fmla="*/ 8077199 w 8077200"/>
-              <a:gd name="connsiteY5" fmla="*/ 965222 h 5791201"/>
-              <a:gd name="connsiteX6" fmla="*/ 8077200 w 8077200"/>
-              <a:gd name="connsiteY6" fmla="*/ 4825982 h 5791201"/>
-              <a:gd name="connsiteX7" fmla="*/ 7794494 w 8077200"/>
-              <a:gd name="connsiteY7" fmla="*/ 5508495 h 5791201"/>
-              <a:gd name="connsiteX8" fmla="*/ 7111981 w 8077200"/>
-              <a:gd name="connsiteY8" fmla="*/ 5791201 h 5791201"/>
-              <a:gd name="connsiteX9" fmla="*/ 965219 w 8077200"/>
-              <a:gd name="connsiteY9" fmla="*/ 5791201 h 5791201"/>
-              <a:gd name="connsiteX10" fmla="*/ 282706 w 8077200"/>
-              <a:gd name="connsiteY10" fmla="*/ 5508494 h 5791201"/>
-              <a:gd name="connsiteX11" fmla="*/ 0 w 8077200"/>
-              <a:gd name="connsiteY11" fmla="*/ 4825981 h 5791201"/>
-              <a:gd name="connsiteX12" fmla="*/ 0 w 8077200"/>
-              <a:gd name="connsiteY12" fmla="*/ 609601 h 5791201"/>
-              <a:gd name="connsiteX0" fmla="*/ 0 w 8077200"/>
-              <a:gd name="connsiteY0" fmla="*/ 609601 h 5791201"/>
-              <a:gd name="connsiteX1" fmla="*/ 152400 w 8077200"/>
-              <a:gd name="connsiteY1" fmla="*/ 152402 h 5791201"/>
-              <a:gd name="connsiteX2" fmla="*/ 609600 w 8077200"/>
-              <a:gd name="connsiteY2" fmla="*/ 1 h 5791201"/>
-              <a:gd name="connsiteX3" fmla="*/ 7111981 w 8077200"/>
-              <a:gd name="connsiteY3" fmla="*/ 1 h 5791201"/>
-              <a:gd name="connsiteX4" fmla="*/ 7794494 w 8077200"/>
-              <a:gd name="connsiteY4" fmla="*/ 282708 h 5791201"/>
-              <a:gd name="connsiteX5" fmla="*/ 8077199 w 8077200"/>
-              <a:gd name="connsiteY5" fmla="*/ 965222 h 5791201"/>
-              <a:gd name="connsiteX6" fmla="*/ 8077200 w 8077200"/>
-              <a:gd name="connsiteY6" fmla="*/ 4825982 h 5791201"/>
-              <a:gd name="connsiteX7" fmla="*/ 7794494 w 8077200"/>
-              <a:gd name="connsiteY7" fmla="*/ 5508495 h 5791201"/>
-              <a:gd name="connsiteX8" fmla="*/ 7111981 w 8077200"/>
-              <a:gd name="connsiteY8" fmla="*/ 5791201 h 5791201"/>
-              <a:gd name="connsiteX9" fmla="*/ 965219 w 8077200"/>
-              <a:gd name="connsiteY9" fmla="*/ 5791201 h 5791201"/>
-              <a:gd name="connsiteX10" fmla="*/ 282706 w 8077200"/>
-              <a:gd name="connsiteY10" fmla="*/ 5508494 h 5791201"/>
-              <a:gd name="connsiteX11" fmla="*/ 0 w 8077200"/>
-              <a:gd name="connsiteY11" fmla="*/ 4825981 h 5791201"/>
-              <a:gd name="connsiteX12" fmla="*/ 0 w 8077200"/>
-              <a:gd name="connsiteY12" fmla="*/ 609601 h 5791201"/>
-              <a:gd name="connsiteX0" fmla="*/ 0 w 8077200"/>
-              <a:gd name="connsiteY0" fmla="*/ 609600 h 5791200"/>
-              <a:gd name="connsiteX1" fmla="*/ 152400 w 8077200"/>
-              <a:gd name="connsiteY1" fmla="*/ 152401 h 5791200"/>
-              <a:gd name="connsiteX2" fmla="*/ 533400 w 8077200"/>
-              <a:gd name="connsiteY2" fmla="*/ 1 h 5791200"/>
-              <a:gd name="connsiteX3" fmla="*/ 7111981 w 8077200"/>
-              <a:gd name="connsiteY3" fmla="*/ 0 h 5791200"/>
-              <a:gd name="connsiteX4" fmla="*/ 7794494 w 8077200"/>
-              <a:gd name="connsiteY4" fmla="*/ 282707 h 5791200"/>
-              <a:gd name="connsiteX5" fmla="*/ 8077199 w 8077200"/>
-              <a:gd name="connsiteY5" fmla="*/ 965221 h 5791200"/>
-              <a:gd name="connsiteX6" fmla="*/ 8077200 w 8077200"/>
-              <a:gd name="connsiteY6" fmla="*/ 4825981 h 5791200"/>
-              <a:gd name="connsiteX7" fmla="*/ 7794494 w 8077200"/>
-              <a:gd name="connsiteY7" fmla="*/ 5508494 h 5791200"/>
-              <a:gd name="connsiteX8" fmla="*/ 7111981 w 8077200"/>
-              <a:gd name="connsiteY8" fmla="*/ 5791200 h 5791200"/>
-              <a:gd name="connsiteX9" fmla="*/ 965219 w 8077200"/>
-              <a:gd name="connsiteY9" fmla="*/ 5791200 h 5791200"/>
-              <a:gd name="connsiteX10" fmla="*/ 282706 w 8077200"/>
-              <a:gd name="connsiteY10" fmla="*/ 5508493 h 5791200"/>
-              <a:gd name="connsiteX11" fmla="*/ 0 w 8077200"/>
-              <a:gd name="connsiteY11" fmla="*/ 4825980 h 5791200"/>
-              <a:gd name="connsiteX12" fmla="*/ 0 w 8077200"/>
-              <a:gd name="connsiteY12" fmla="*/ 609600 h 5791200"/>
-              <a:gd name="connsiteX0" fmla="*/ 0 w 8077200"/>
-              <a:gd name="connsiteY0" fmla="*/ 533400 h 5791200"/>
-              <a:gd name="connsiteX1" fmla="*/ 152400 w 8077200"/>
-              <a:gd name="connsiteY1" fmla="*/ 152401 h 5791200"/>
-              <a:gd name="connsiteX2" fmla="*/ 533400 w 8077200"/>
-              <a:gd name="connsiteY2" fmla="*/ 1 h 5791200"/>
-              <a:gd name="connsiteX3" fmla="*/ 7111981 w 8077200"/>
-              <a:gd name="connsiteY3" fmla="*/ 0 h 5791200"/>
-              <a:gd name="connsiteX4" fmla="*/ 7794494 w 8077200"/>
-              <a:gd name="connsiteY4" fmla="*/ 282707 h 5791200"/>
-              <a:gd name="connsiteX5" fmla="*/ 8077199 w 8077200"/>
-              <a:gd name="connsiteY5" fmla="*/ 965221 h 5791200"/>
-              <a:gd name="connsiteX6" fmla="*/ 8077200 w 8077200"/>
-              <a:gd name="connsiteY6" fmla="*/ 4825981 h 5791200"/>
-              <a:gd name="connsiteX7" fmla="*/ 7794494 w 8077200"/>
-              <a:gd name="connsiteY7" fmla="*/ 5508494 h 5791200"/>
-              <a:gd name="connsiteX8" fmla="*/ 7111981 w 8077200"/>
-              <a:gd name="connsiteY8" fmla="*/ 5791200 h 5791200"/>
-              <a:gd name="connsiteX9" fmla="*/ 965219 w 8077200"/>
-              <a:gd name="connsiteY9" fmla="*/ 5791200 h 5791200"/>
-              <a:gd name="connsiteX10" fmla="*/ 282706 w 8077200"/>
-              <a:gd name="connsiteY10" fmla="*/ 5508493 h 5791200"/>
-              <a:gd name="connsiteX11" fmla="*/ 0 w 8077200"/>
-              <a:gd name="connsiteY11" fmla="*/ 4825980 h 5791200"/>
-              <a:gd name="connsiteX12" fmla="*/ 0 w 8077200"/>
-              <a:gd name="connsiteY12" fmla="*/ 533400 h 5791200"/>
-              <a:gd name="connsiteX0" fmla="*/ 12700 w 8089900"/>
-              <a:gd name="connsiteY0" fmla="*/ 546100 h 5803900"/>
-              <a:gd name="connsiteX1" fmla="*/ 88900 w 8089900"/>
-              <a:gd name="connsiteY1" fmla="*/ 88900 h 5803900"/>
-              <a:gd name="connsiteX2" fmla="*/ 546100 w 8089900"/>
-              <a:gd name="connsiteY2" fmla="*/ 12701 h 5803900"/>
-              <a:gd name="connsiteX3" fmla="*/ 7124681 w 8089900"/>
-              <a:gd name="connsiteY3" fmla="*/ 12700 h 5803900"/>
-              <a:gd name="connsiteX4" fmla="*/ 7807194 w 8089900"/>
-              <a:gd name="connsiteY4" fmla="*/ 295407 h 5803900"/>
-              <a:gd name="connsiteX5" fmla="*/ 8089899 w 8089900"/>
-              <a:gd name="connsiteY5" fmla="*/ 977921 h 5803900"/>
-              <a:gd name="connsiteX6" fmla="*/ 8089900 w 8089900"/>
-              <a:gd name="connsiteY6" fmla="*/ 4838681 h 5803900"/>
-              <a:gd name="connsiteX7" fmla="*/ 7807194 w 8089900"/>
-              <a:gd name="connsiteY7" fmla="*/ 5521194 h 5803900"/>
-              <a:gd name="connsiteX8" fmla="*/ 7124681 w 8089900"/>
-              <a:gd name="connsiteY8" fmla="*/ 5803900 h 5803900"/>
-              <a:gd name="connsiteX9" fmla="*/ 977919 w 8089900"/>
-              <a:gd name="connsiteY9" fmla="*/ 5803900 h 5803900"/>
-              <a:gd name="connsiteX10" fmla="*/ 295406 w 8089900"/>
-              <a:gd name="connsiteY10" fmla="*/ 5521193 h 5803900"/>
-              <a:gd name="connsiteX11" fmla="*/ 12700 w 8089900"/>
-              <a:gd name="connsiteY11" fmla="*/ 4838680 h 5803900"/>
-              <a:gd name="connsiteX12" fmla="*/ 12700 w 8089900"/>
-              <a:gd name="connsiteY12" fmla="*/ 546100 h 5803900"/>
-              <a:gd name="connsiteX0" fmla="*/ 12700 w 8089900"/>
-              <a:gd name="connsiteY0" fmla="*/ 546100 h 5803900"/>
-              <a:gd name="connsiteX1" fmla="*/ 88900 w 8089900"/>
-              <a:gd name="connsiteY1" fmla="*/ 88900 h 5803900"/>
-              <a:gd name="connsiteX2" fmla="*/ 546100 w 8089900"/>
-              <a:gd name="connsiteY2" fmla="*/ 12701 h 5803900"/>
-              <a:gd name="connsiteX3" fmla="*/ 7124681 w 8089900"/>
-              <a:gd name="connsiteY3" fmla="*/ 12700 h 5803900"/>
-              <a:gd name="connsiteX4" fmla="*/ 7807194 w 8089900"/>
-              <a:gd name="connsiteY4" fmla="*/ 295407 h 5803900"/>
-              <a:gd name="connsiteX5" fmla="*/ 8089899 w 8089900"/>
-              <a:gd name="connsiteY5" fmla="*/ 977921 h 5803900"/>
-              <a:gd name="connsiteX6" fmla="*/ 8089900 w 8089900"/>
-              <a:gd name="connsiteY6" fmla="*/ 4838681 h 5803900"/>
-              <a:gd name="connsiteX7" fmla="*/ 7807194 w 8089900"/>
-              <a:gd name="connsiteY7" fmla="*/ 5521194 h 5803900"/>
-              <a:gd name="connsiteX8" fmla="*/ 7124681 w 8089900"/>
-              <a:gd name="connsiteY8" fmla="*/ 5803900 h 5803900"/>
-              <a:gd name="connsiteX9" fmla="*/ 977919 w 8089900"/>
-              <a:gd name="connsiteY9" fmla="*/ 5803900 h 5803900"/>
-              <a:gd name="connsiteX10" fmla="*/ 295406 w 8089900"/>
-              <a:gd name="connsiteY10" fmla="*/ 5521193 h 5803900"/>
-              <a:gd name="connsiteX11" fmla="*/ 12700 w 8089900"/>
-              <a:gd name="connsiteY11" fmla="*/ 5346700 h 5803900"/>
-              <a:gd name="connsiteX12" fmla="*/ 12700 w 8089900"/>
-              <a:gd name="connsiteY12" fmla="*/ 546100 h 5803900"/>
-              <a:gd name="connsiteX0" fmla="*/ 12700 w 8089900"/>
-              <a:gd name="connsiteY0" fmla="*/ 546100 h 5803900"/>
-              <a:gd name="connsiteX1" fmla="*/ 88900 w 8089900"/>
-              <a:gd name="connsiteY1" fmla="*/ 88900 h 5803900"/>
-              <a:gd name="connsiteX2" fmla="*/ 546100 w 8089900"/>
-              <a:gd name="connsiteY2" fmla="*/ 12701 h 5803900"/>
-              <a:gd name="connsiteX3" fmla="*/ 7124681 w 8089900"/>
-              <a:gd name="connsiteY3" fmla="*/ 12700 h 5803900"/>
-              <a:gd name="connsiteX4" fmla="*/ 7807194 w 8089900"/>
-              <a:gd name="connsiteY4" fmla="*/ 295407 h 5803900"/>
-              <a:gd name="connsiteX5" fmla="*/ 8089899 w 8089900"/>
-              <a:gd name="connsiteY5" fmla="*/ 977921 h 5803900"/>
-              <a:gd name="connsiteX6" fmla="*/ 8089900 w 8089900"/>
-              <a:gd name="connsiteY6" fmla="*/ 4838681 h 5803900"/>
-              <a:gd name="connsiteX7" fmla="*/ 7807194 w 8089900"/>
-              <a:gd name="connsiteY7" fmla="*/ 5521194 h 5803900"/>
-              <a:gd name="connsiteX8" fmla="*/ 7124681 w 8089900"/>
-              <a:gd name="connsiteY8" fmla="*/ 5803900 h 5803900"/>
-              <a:gd name="connsiteX9" fmla="*/ 546100 w 8089900"/>
-              <a:gd name="connsiteY9" fmla="*/ 5803900 h 5803900"/>
-              <a:gd name="connsiteX10" fmla="*/ 295406 w 8089900"/>
-              <a:gd name="connsiteY10" fmla="*/ 5521193 h 5803900"/>
-              <a:gd name="connsiteX11" fmla="*/ 12700 w 8089900"/>
-              <a:gd name="connsiteY11" fmla="*/ 5346700 h 5803900"/>
-              <a:gd name="connsiteX12" fmla="*/ 12700 w 8089900"/>
-              <a:gd name="connsiteY12" fmla="*/ 546100 h 5803900"/>
-              <a:gd name="connsiteX0" fmla="*/ 12700 w 8089900"/>
-              <a:gd name="connsiteY0" fmla="*/ 546100 h 5803900"/>
-              <a:gd name="connsiteX1" fmla="*/ 88900 w 8089900"/>
-              <a:gd name="connsiteY1" fmla="*/ 88900 h 5803900"/>
-              <a:gd name="connsiteX2" fmla="*/ 546100 w 8089900"/>
-              <a:gd name="connsiteY2" fmla="*/ 12701 h 5803900"/>
-              <a:gd name="connsiteX3" fmla="*/ 7124681 w 8089900"/>
-              <a:gd name="connsiteY3" fmla="*/ 12700 h 5803900"/>
-              <a:gd name="connsiteX4" fmla="*/ 7807194 w 8089900"/>
-              <a:gd name="connsiteY4" fmla="*/ 295407 h 5803900"/>
-              <a:gd name="connsiteX5" fmla="*/ 8089899 w 8089900"/>
-              <a:gd name="connsiteY5" fmla="*/ 977921 h 5803900"/>
-              <a:gd name="connsiteX6" fmla="*/ 8089900 w 8089900"/>
-              <a:gd name="connsiteY6" fmla="*/ 4838681 h 5803900"/>
-              <a:gd name="connsiteX7" fmla="*/ 7807194 w 8089900"/>
-              <a:gd name="connsiteY7" fmla="*/ 5521194 h 5803900"/>
-              <a:gd name="connsiteX8" fmla="*/ 7124681 w 8089900"/>
-              <a:gd name="connsiteY8" fmla="*/ 5803900 h 5803900"/>
-              <a:gd name="connsiteX9" fmla="*/ 546100 w 8089900"/>
-              <a:gd name="connsiteY9" fmla="*/ 5803900 h 5803900"/>
-              <a:gd name="connsiteX10" fmla="*/ 88900 w 8089900"/>
-              <a:gd name="connsiteY10" fmla="*/ 5727700 h 5803900"/>
-              <a:gd name="connsiteX11" fmla="*/ 12700 w 8089900"/>
-              <a:gd name="connsiteY11" fmla="*/ 5346700 h 5803900"/>
-              <a:gd name="connsiteX12" fmla="*/ 12700 w 8089900"/>
-              <a:gd name="connsiteY12" fmla="*/ 546100 h 5803900"/>
-              <a:gd name="connsiteX0" fmla="*/ 12700 w 8089900"/>
-              <a:gd name="connsiteY0" fmla="*/ 546100 h 5803900"/>
-              <a:gd name="connsiteX1" fmla="*/ 88900 w 8089900"/>
-              <a:gd name="connsiteY1" fmla="*/ 88900 h 5803900"/>
-              <a:gd name="connsiteX2" fmla="*/ 546100 w 8089900"/>
-              <a:gd name="connsiteY2" fmla="*/ 12701 h 5803900"/>
-              <a:gd name="connsiteX3" fmla="*/ 7556500 w 8089900"/>
-              <a:gd name="connsiteY3" fmla="*/ 12700 h 5803900"/>
-              <a:gd name="connsiteX4" fmla="*/ 7807194 w 8089900"/>
-              <a:gd name="connsiteY4" fmla="*/ 295407 h 5803900"/>
-              <a:gd name="connsiteX5" fmla="*/ 8089899 w 8089900"/>
-              <a:gd name="connsiteY5" fmla="*/ 977921 h 5803900"/>
-              <a:gd name="connsiteX6" fmla="*/ 8089900 w 8089900"/>
-              <a:gd name="connsiteY6" fmla="*/ 4838681 h 5803900"/>
-              <a:gd name="connsiteX7" fmla="*/ 7807194 w 8089900"/>
-              <a:gd name="connsiteY7" fmla="*/ 5521194 h 5803900"/>
-              <a:gd name="connsiteX8" fmla="*/ 7124681 w 8089900"/>
-              <a:gd name="connsiteY8" fmla="*/ 5803900 h 5803900"/>
-              <a:gd name="connsiteX9" fmla="*/ 546100 w 8089900"/>
-              <a:gd name="connsiteY9" fmla="*/ 5803900 h 5803900"/>
-              <a:gd name="connsiteX10" fmla="*/ 88900 w 8089900"/>
-              <a:gd name="connsiteY10" fmla="*/ 5727700 h 5803900"/>
-              <a:gd name="connsiteX11" fmla="*/ 12700 w 8089900"/>
-              <a:gd name="connsiteY11" fmla="*/ 5346700 h 5803900"/>
-              <a:gd name="connsiteX12" fmla="*/ 12700 w 8089900"/>
-              <a:gd name="connsiteY12" fmla="*/ 546100 h 5803900"/>
-              <a:gd name="connsiteX0" fmla="*/ 12700 w 8089901"/>
-              <a:gd name="connsiteY0" fmla="*/ 546100 h 5803900"/>
-              <a:gd name="connsiteX1" fmla="*/ 88900 w 8089901"/>
-              <a:gd name="connsiteY1" fmla="*/ 88900 h 5803900"/>
-              <a:gd name="connsiteX2" fmla="*/ 546100 w 8089901"/>
-              <a:gd name="connsiteY2" fmla="*/ 12701 h 5803900"/>
-              <a:gd name="connsiteX3" fmla="*/ 7556500 w 8089901"/>
-              <a:gd name="connsiteY3" fmla="*/ 12700 h 5803900"/>
-              <a:gd name="connsiteX4" fmla="*/ 7807194 w 8089901"/>
-              <a:gd name="connsiteY4" fmla="*/ 295407 h 5803900"/>
-              <a:gd name="connsiteX5" fmla="*/ 8089900 w 8089901"/>
-              <a:gd name="connsiteY5" fmla="*/ 469900 h 5803900"/>
-              <a:gd name="connsiteX6" fmla="*/ 8089900 w 8089901"/>
-              <a:gd name="connsiteY6" fmla="*/ 4838681 h 5803900"/>
-              <a:gd name="connsiteX7" fmla="*/ 7807194 w 8089901"/>
-              <a:gd name="connsiteY7" fmla="*/ 5521194 h 5803900"/>
-              <a:gd name="connsiteX8" fmla="*/ 7124681 w 8089901"/>
-              <a:gd name="connsiteY8" fmla="*/ 5803900 h 5803900"/>
-              <a:gd name="connsiteX9" fmla="*/ 546100 w 8089901"/>
-              <a:gd name="connsiteY9" fmla="*/ 5803900 h 5803900"/>
-              <a:gd name="connsiteX10" fmla="*/ 88900 w 8089901"/>
-              <a:gd name="connsiteY10" fmla="*/ 5727700 h 5803900"/>
-              <a:gd name="connsiteX11" fmla="*/ 12700 w 8089901"/>
-              <a:gd name="connsiteY11" fmla="*/ 5346700 h 5803900"/>
-              <a:gd name="connsiteX12" fmla="*/ 12700 w 8089901"/>
-              <a:gd name="connsiteY12" fmla="*/ 546100 h 5803900"/>
-              <a:gd name="connsiteX0" fmla="*/ 12700 w 8102600"/>
-              <a:gd name="connsiteY0" fmla="*/ 546100 h 5803900"/>
-              <a:gd name="connsiteX1" fmla="*/ 88900 w 8102600"/>
-              <a:gd name="connsiteY1" fmla="*/ 88900 h 5803900"/>
-              <a:gd name="connsiteX2" fmla="*/ 546100 w 8102600"/>
-              <a:gd name="connsiteY2" fmla="*/ 12701 h 5803900"/>
-              <a:gd name="connsiteX3" fmla="*/ 7556500 w 8102600"/>
-              <a:gd name="connsiteY3" fmla="*/ 12700 h 5803900"/>
-              <a:gd name="connsiteX4" fmla="*/ 8013700 w 8102600"/>
-              <a:gd name="connsiteY4" fmla="*/ 88900 h 5803900"/>
-              <a:gd name="connsiteX5" fmla="*/ 8089900 w 8102600"/>
-              <a:gd name="connsiteY5" fmla="*/ 469900 h 5803900"/>
-              <a:gd name="connsiteX6" fmla="*/ 8089900 w 8102600"/>
-              <a:gd name="connsiteY6" fmla="*/ 4838681 h 5803900"/>
-              <a:gd name="connsiteX7" fmla="*/ 7807194 w 8102600"/>
-              <a:gd name="connsiteY7" fmla="*/ 5521194 h 5803900"/>
-              <a:gd name="connsiteX8" fmla="*/ 7124681 w 8102600"/>
-              <a:gd name="connsiteY8" fmla="*/ 5803900 h 5803900"/>
-              <a:gd name="connsiteX9" fmla="*/ 546100 w 8102600"/>
-              <a:gd name="connsiteY9" fmla="*/ 5803900 h 5803900"/>
-              <a:gd name="connsiteX10" fmla="*/ 88900 w 8102600"/>
-              <a:gd name="connsiteY10" fmla="*/ 5727700 h 5803900"/>
-              <a:gd name="connsiteX11" fmla="*/ 12700 w 8102600"/>
-              <a:gd name="connsiteY11" fmla="*/ 5346700 h 5803900"/>
-              <a:gd name="connsiteX12" fmla="*/ 12700 w 8102600"/>
-              <a:gd name="connsiteY12" fmla="*/ 546100 h 5803900"/>
-              <a:gd name="connsiteX0" fmla="*/ 12700 w 8102600"/>
-              <a:gd name="connsiteY0" fmla="*/ 546100 h 5803900"/>
-              <a:gd name="connsiteX1" fmla="*/ 88900 w 8102600"/>
-              <a:gd name="connsiteY1" fmla="*/ 88900 h 5803900"/>
-              <a:gd name="connsiteX2" fmla="*/ 546100 w 8102600"/>
-              <a:gd name="connsiteY2" fmla="*/ 12701 h 5803900"/>
-              <a:gd name="connsiteX3" fmla="*/ 7556500 w 8102600"/>
-              <a:gd name="connsiteY3" fmla="*/ 12700 h 5803900"/>
-              <a:gd name="connsiteX4" fmla="*/ 8013700 w 8102600"/>
-              <a:gd name="connsiteY4" fmla="*/ 88900 h 5803900"/>
-              <a:gd name="connsiteX5" fmla="*/ 8089899 w 8102600"/>
-              <a:gd name="connsiteY5" fmla="*/ 469900 h 5803900"/>
-              <a:gd name="connsiteX6" fmla="*/ 8089900 w 8102600"/>
-              <a:gd name="connsiteY6" fmla="*/ 4838681 h 5803900"/>
-              <a:gd name="connsiteX7" fmla="*/ 7807194 w 8102600"/>
-              <a:gd name="connsiteY7" fmla="*/ 5521194 h 5803900"/>
-              <a:gd name="connsiteX8" fmla="*/ 7124681 w 8102600"/>
-              <a:gd name="connsiteY8" fmla="*/ 5803900 h 5803900"/>
-              <a:gd name="connsiteX9" fmla="*/ 546100 w 8102600"/>
-              <a:gd name="connsiteY9" fmla="*/ 5803900 h 5803900"/>
-              <a:gd name="connsiteX10" fmla="*/ 88900 w 8102600"/>
-              <a:gd name="connsiteY10" fmla="*/ 5727700 h 5803900"/>
-              <a:gd name="connsiteX11" fmla="*/ 12700 w 8102600"/>
-              <a:gd name="connsiteY11" fmla="*/ 5346700 h 5803900"/>
-              <a:gd name="connsiteX12" fmla="*/ 12700 w 8102600"/>
-              <a:gd name="connsiteY12" fmla="*/ 546100 h 5803900"/>
-              <a:gd name="connsiteX0" fmla="*/ 12700 w 8102599"/>
-              <a:gd name="connsiteY0" fmla="*/ 546100 h 5803900"/>
-              <a:gd name="connsiteX1" fmla="*/ 88900 w 8102599"/>
-              <a:gd name="connsiteY1" fmla="*/ 88900 h 5803900"/>
-              <a:gd name="connsiteX2" fmla="*/ 546100 w 8102599"/>
-              <a:gd name="connsiteY2" fmla="*/ 12701 h 5803900"/>
-              <a:gd name="connsiteX3" fmla="*/ 7556500 w 8102599"/>
-              <a:gd name="connsiteY3" fmla="*/ 12700 h 5803900"/>
-              <a:gd name="connsiteX4" fmla="*/ 8013699 w 8102599"/>
-              <a:gd name="connsiteY4" fmla="*/ 88900 h 5803900"/>
-              <a:gd name="connsiteX5" fmla="*/ 8089899 w 8102599"/>
-              <a:gd name="connsiteY5" fmla="*/ 469900 h 5803900"/>
-              <a:gd name="connsiteX6" fmla="*/ 8089900 w 8102599"/>
-              <a:gd name="connsiteY6" fmla="*/ 4838681 h 5803900"/>
-              <a:gd name="connsiteX7" fmla="*/ 7807194 w 8102599"/>
-              <a:gd name="connsiteY7" fmla="*/ 5521194 h 5803900"/>
-              <a:gd name="connsiteX8" fmla="*/ 7124681 w 8102599"/>
-              <a:gd name="connsiteY8" fmla="*/ 5803900 h 5803900"/>
-              <a:gd name="connsiteX9" fmla="*/ 546100 w 8102599"/>
-              <a:gd name="connsiteY9" fmla="*/ 5803900 h 5803900"/>
-              <a:gd name="connsiteX10" fmla="*/ 88900 w 8102599"/>
-              <a:gd name="connsiteY10" fmla="*/ 5727700 h 5803900"/>
-              <a:gd name="connsiteX11" fmla="*/ 12700 w 8102599"/>
-              <a:gd name="connsiteY11" fmla="*/ 5346700 h 5803900"/>
-              <a:gd name="connsiteX12" fmla="*/ 12700 w 8102599"/>
-              <a:gd name="connsiteY12" fmla="*/ 546100 h 5803900"/>
-              <a:gd name="connsiteX0" fmla="*/ 12700 w 8102599"/>
-              <a:gd name="connsiteY0" fmla="*/ 546100 h 5803900"/>
-              <a:gd name="connsiteX1" fmla="*/ 88900 w 8102599"/>
-              <a:gd name="connsiteY1" fmla="*/ 88900 h 5803900"/>
-              <a:gd name="connsiteX2" fmla="*/ 546100 w 8102599"/>
-              <a:gd name="connsiteY2" fmla="*/ 12701 h 5803900"/>
-              <a:gd name="connsiteX3" fmla="*/ 7556500 w 8102599"/>
-              <a:gd name="connsiteY3" fmla="*/ 12700 h 5803900"/>
-              <a:gd name="connsiteX4" fmla="*/ 8013699 w 8102599"/>
-              <a:gd name="connsiteY4" fmla="*/ 88900 h 5803900"/>
-              <a:gd name="connsiteX5" fmla="*/ 8089899 w 8102599"/>
-              <a:gd name="connsiteY5" fmla="*/ 469900 h 5803900"/>
-              <a:gd name="connsiteX6" fmla="*/ 8089900 w 8102599"/>
-              <a:gd name="connsiteY6" fmla="*/ 5346700 h 5803900"/>
-              <a:gd name="connsiteX7" fmla="*/ 7807194 w 8102599"/>
-              <a:gd name="connsiteY7" fmla="*/ 5521194 h 5803900"/>
-              <a:gd name="connsiteX8" fmla="*/ 7124681 w 8102599"/>
-              <a:gd name="connsiteY8" fmla="*/ 5803900 h 5803900"/>
-              <a:gd name="connsiteX9" fmla="*/ 546100 w 8102599"/>
-              <a:gd name="connsiteY9" fmla="*/ 5803900 h 5803900"/>
-              <a:gd name="connsiteX10" fmla="*/ 88900 w 8102599"/>
-              <a:gd name="connsiteY10" fmla="*/ 5727700 h 5803900"/>
-              <a:gd name="connsiteX11" fmla="*/ 12700 w 8102599"/>
-              <a:gd name="connsiteY11" fmla="*/ 5346700 h 5803900"/>
-              <a:gd name="connsiteX12" fmla="*/ 12700 w 8102599"/>
-              <a:gd name="connsiteY12" fmla="*/ 546100 h 5803900"/>
-              <a:gd name="connsiteX0" fmla="*/ 12700 w 8102599"/>
-              <a:gd name="connsiteY0" fmla="*/ 546100 h 5803900"/>
-              <a:gd name="connsiteX1" fmla="*/ 88900 w 8102599"/>
-              <a:gd name="connsiteY1" fmla="*/ 88900 h 5803900"/>
-              <a:gd name="connsiteX2" fmla="*/ 546100 w 8102599"/>
-              <a:gd name="connsiteY2" fmla="*/ 12701 h 5803900"/>
-              <a:gd name="connsiteX3" fmla="*/ 7556500 w 8102599"/>
-              <a:gd name="connsiteY3" fmla="*/ 12700 h 5803900"/>
-              <a:gd name="connsiteX4" fmla="*/ 8013699 w 8102599"/>
-              <a:gd name="connsiteY4" fmla="*/ 88900 h 5803900"/>
-              <a:gd name="connsiteX5" fmla="*/ 8089899 w 8102599"/>
-              <a:gd name="connsiteY5" fmla="*/ 469900 h 5803900"/>
-              <a:gd name="connsiteX6" fmla="*/ 8089900 w 8102599"/>
-              <a:gd name="connsiteY6" fmla="*/ 5346700 h 5803900"/>
-              <a:gd name="connsiteX7" fmla="*/ 7807194 w 8102599"/>
-              <a:gd name="connsiteY7" fmla="*/ 5521194 h 5803900"/>
-              <a:gd name="connsiteX8" fmla="*/ 7632700 w 8102599"/>
-              <a:gd name="connsiteY8" fmla="*/ 5803900 h 5803900"/>
-              <a:gd name="connsiteX9" fmla="*/ 546100 w 8102599"/>
-              <a:gd name="connsiteY9" fmla="*/ 5803900 h 5803900"/>
-              <a:gd name="connsiteX10" fmla="*/ 88900 w 8102599"/>
-              <a:gd name="connsiteY10" fmla="*/ 5727700 h 5803900"/>
-              <a:gd name="connsiteX11" fmla="*/ 12700 w 8102599"/>
-              <a:gd name="connsiteY11" fmla="*/ 5346700 h 5803900"/>
-              <a:gd name="connsiteX12" fmla="*/ 12700 w 8102599"/>
-              <a:gd name="connsiteY12" fmla="*/ 546100 h 5803900"/>
-              <a:gd name="connsiteX0" fmla="*/ 12700 w 8102599"/>
-              <a:gd name="connsiteY0" fmla="*/ 546100 h 5803900"/>
-              <a:gd name="connsiteX1" fmla="*/ 88900 w 8102599"/>
-              <a:gd name="connsiteY1" fmla="*/ 88900 h 5803900"/>
-              <a:gd name="connsiteX2" fmla="*/ 546100 w 8102599"/>
-              <a:gd name="connsiteY2" fmla="*/ 12701 h 5803900"/>
-              <a:gd name="connsiteX3" fmla="*/ 7556500 w 8102599"/>
-              <a:gd name="connsiteY3" fmla="*/ 12700 h 5803900"/>
-              <a:gd name="connsiteX4" fmla="*/ 8013699 w 8102599"/>
-              <a:gd name="connsiteY4" fmla="*/ 88900 h 5803900"/>
-              <a:gd name="connsiteX5" fmla="*/ 8089899 w 8102599"/>
-              <a:gd name="connsiteY5" fmla="*/ 469900 h 5803900"/>
-              <a:gd name="connsiteX6" fmla="*/ 8089900 w 8102599"/>
-              <a:gd name="connsiteY6" fmla="*/ 5346700 h 5803900"/>
-              <a:gd name="connsiteX7" fmla="*/ 8013700 w 8102599"/>
-              <a:gd name="connsiteY7" fmla="*/ 5727700 h 5803900"/>
-              <a:gd name="connsiteX8" fmla="*/ 7632700 w 8102599"/>
-              <a:gd name="connsiteY8" fmla="*/ 5803900 h 5803900"/>
-              <a:gd name="connsiteX9" fmla="*/ 546100 w 8102599"/>
-              <a:gd name="connsiteY9" fmla="*/ 5803900 h 5803900"/>
-              <a:gd name="connsiteX10" fmla="*/ 88900 w 8102599"/>
-              <a:gd name="connsiteY10" fmla="*/ 5727700 h 5803900"/>
-              <a:gd name="connsiteX11" fmla="*/ 12700 w 8102599"/>
-              <a:gd name="connsiteY11" fmla="*/ 5346700 h 5803900"/>
-              <a:gd name="connsiteX12" fmla="*/ 12700 w 8102599"/>
-              <a:gd name="connsiteY12" fmla="*/ 546100 h 5803900"/>
-            </a:gdLst>
-            <a:ahLst/>
-            <a:cxnLst>
-              <a:cxn ang="0">
-                <a:pos x="connsiteX0" y="connsiteY0"/>
-              </a:cxn>
-              <a:cxn ang="0">
-                <a:pos x="connsiteX1" y="connsiteY1"/>
-              </a:cxn>
-              <a:cxn ang="0">
-                <a:pos x="connsiteX2" y="connsiteY2"/>
-              </a:cxn>
-              <a:cxn ang="0">
-                <a:pos x="connsiteX3" y="connsiteY3"/>
-              </a:cxn>
-              <a:cxn ang="0">
-                <a:pos x="connsiteX4" y="connsiteY4"/>
-              </a:cxn>
-              <a:cxn ang="0">
-                <a:pos x="connsiteX5" y="connsiteY5"/>
-              </a:cxn>
-              <a:cxn ang="0">
-                <a:pos x="connsiteX6" y="connsiteY6"/>
-              </a:cxn>
-              <a:cxn ang="0">
-                <a:pos x="connsiteX7" y="connsiteY7"/>
-              </a:cxn>
-              <a:cxn ang="0">
-                <a:pos x="connsiteX8" y="connsiteY8"/>
-              </a:cxn>
-              <a:cxn ang="0">
-                <a:pos x="connsiteX9" y="connsiteY9"/>
-              </a:cxn>
-              <a:cxn ang="0">
-                <a:pos x="connsiteX10" y="connsiteY10"/>
-              </a:cxn>
-              <a:cxn ang="0">
-                <a:pos x="connsiteX11" y="connsiteY11"/>
-              </a:cxn>
-              <a:cxn ang="0">
-                <a:pos x="connsiteX12" y="connsiteY12"/>
-              </a:cxn>
-            </a:cxnLst>
-            <a:rect l="l" t="t" r="r" b="b"/>
-            <a:pathLst>
-              <a:path w="8102599" h="5803900">
-                <a:moveTo>
-                  <a:pt x="12700" y="546100"/>
-                </a:moveTo>
-                <a:cubicBezTo>
-                  <a:pt x="12700" y="290108"/>
-                  <a:pt x="0" y="177800"/>
-                  <a:pt x="88900" y="88900"/>
-                </a:cubicBezTo>
-                <a:cubicBezTo>
-                  <a:pt x="177800" y="0"/>
-                  <a:pt x="290107" y="12700"/>
-                  <a:pt x="546100" y="12701"/>
-                </a:cubicBezTo>
-                <a:lnTo>
-                  <a:pt x="7556500" y="12700"/>
-                </a:lnTo>
-                <a:cubicBezTo>
-                  <a:pt x="7812492" y="12700"/>
-                  <a:pt x="7924799" y="12700"/>
-                  <a:pt x="8013699" y="88900"/>
-                </a:cubicBezTo>
-                <a:cubicBezTo>
-                  <a:pt x="8102599" y="165100"/>
-                  <a:pt x="8089900" y="213907"/>
-                  <a:pt x="8089899" y="469900"/>
-                </a:cubicBezTo>
-                <a:cubicBezTo>
-                  <a:pt x="8089899" y="1926160"/>
-                  <a:pt x="8089900" y="3890440"/>
-                  <a:pt x="8089900" y="5346700"/>
-                </a:cubicBezTo>
-                <a:cubicBezTo>
-                  <a:pt x="8089900" y="5602692"/>
-                  <a:pt x="8089900" y="5651500"/>
-                  <a:pt x="8013700" y="5727700"/>
-                </a:cubicBezTo>
-                <a:cubicBezTo>
-                  <a:pt x="7937500" y="5803900"/>
-                  <a:pt x="7888692" y="5803900"/>
-                  <a:pt x="7632700" y="5803900"/>
-                </a:cubicBezTo>
-                <a:lnTo>
-                  <a:pt x="546100" y="5803900"/>
-                </a:lnTo>
-                <a:cubicBezTo>
-                  <a:pt x="290108" y="5803900"/>
-                  <a:pt x="177800" y="5803900"/>
-                  <a:pt x="88900" y="5727700"/>
-                </a:cubicBezTo>
-                <a:cubicBezTo>
-                  <a:pt x="0" y="5651500"/>
-                  <a:pt x="12700" y="5602692"/>
-                  <a:pt x="12700" y="5346700"/>
-                </a:cubicBezTo>
-                <a:lnTo>
-                  <a:pt x="12700" y="546100"/>
-                </a:lnTo>
-                <a:close/>
-              </a:path>
-            </a:pathLst>
-          </a:custGeom>
-          <a:gradFill>
-            <a:gsLst>
-              <a:gs pos="0">
-                <a:schemeClr val="bg1">
-                  <a:lumMod val="50000"/>
-                </a:schemeClr>
-              </a:gs>
-              <a:gs pos="39999">
-                <a:schemeClr val="bg1">
-                  <a:lumMod val="65000"/>
-                </a:schemeClr>
-              </a:gs>
-              <a:gs pos="70000">
-                <a:schemeClr val="bg1">
-                  <a:lumMod val="50000"/>
-                  <a:alpha val="73000"/>
-                </a:schemeClr>
-              </a:gs>
-            </a:gsLst>
-            <a:lin ang="5400000" scaled="0"/>
-          </a:gradFill>
-          <a:ln>
-            <a:solidFill>
-              <a:schemeClr val="bg1">
-                <a:lumMod val="75000"/>
-              </a:schemeClr>
-            </a:solidFill>
-          </a:ln>
-        </p:spPr>
-        <p:style>
-          <a:lnRef idx="2">
-            <a:schemeClr val="accent1">
-              <a:shade val="50000"/>
-            </a:schemeClr>
-          </a:lnRef>
-          <a:fillRef idx="1">
-            <a:schemeClr val="accent1"/>
-          </a:fillRef>
-          <a:effectRef idx="0">
-            <a:schemeClr val="accent1"/>
-          </a:effectRef>
-          <a:fontRef idx="minor">
-            <a:schemeClr val="lt1"/>
-          </a:fontRef>
-        </p:style>
-        <p:txBody>
-          <a:bodyPr rtlCol="0" anchor="ctr"/>
-          <a:lstStyle/>
-          <a:p>
-            <a:pPr fontAlgn="t"/>
-            <a:endParaRPr lang="es-AR" b="1" dirty="0" smtClean="0"/>
-          </a:p>
-          <a:p>
-            <a:pPr algn="ctr"/>
-            <a:endParaRPr lang="es-AR" dirty="0"/>
-          </a:p>
-        </p:txBody>
-      </p:sp>
-      <p:sp>
-        <p:nvSpPr>
-          <p:cNvPr id="14" name="Rectangle 13"/>
-          <p:cNvSpPr/>
-          <p:nvPr/>
-        </p:nvSpPr>
-        <p:spPr>
-          <a:xfrm>
-            <a:off x="381000" y="1295400"/>
-            <a:ext cx="8458200" cy="1066800"/>
-          </a:xfrm>
-          <a:prstGeom prst="rect">
-            <a:avLst/>
-          </a:prstGeom>
-          <a:noFill/>
-          <a:ln>
-            <a:noFill/>
-          </a:ln>
-        </p:spPr>
-        <p:style>
-          <a:lnRef idx="2">
-            <a:schemeClr val="accent1">
-              <a:shade val="50000"/>
-            </a:schemeClr>
-          </a:lnRef>
-          <a:fillRef idx="1">
-            <a:schemeClr val="accent1"/>
-          </a:fillRef>
-          <a:effectRef idx="0">
-            <a:schemeClr val="accent1"/>
-          </a:effectRef>
-          <a:fontRef idx="minor">
-            <a:schemeClr val="lt1"/>
-          </a:fontRef>
-        </p:style>
-        <p:txBody>
-          <a:bodyPr rtlCol="0" anchor="ctr"/>
-          <a:lstStyle/>
-          <a:p>
-            <a:pPr algn="ctr"/>
-            <a:r>
-              <a:rPr lang="es-AR" sz="4800" b="1" dirty="0" smtClean="0"/>
-              <a:t>Seguridad</a:t>
-            </a:r>
-          </a:p>
-          <a:p>
-            <a:pPr algn="ctr"/>
-            <a:endParaRPr lang="es-AR" sz="1200" dirty="0"/>
-          </a:p>
-        </p:txBody>
-      </p:sp>
-      <p:grpSp>
-        <p:nvGrpSpPr>
-          <p:cNvPr id="3" name="Group 14"/>
-          <p:cNvGrpSpPr/>
-          <p:nvPr/>
-        </p:nvGrpSpPr>
-        <p:grpSpPr>
-          <a:xfrm>
-            <a:off x="1295400" y="544415"/>
-            <a:ext cx="6553200" cy="903384"/>
-            <a:chOff x="1295400" y="544415"/>
-            <a:chExt cx="6553200" cy="903384"/>
-          </a:xfrm>
-        </p:grpSpPr>
-        <p:sp>
-          <p:nvSpPr>
-            <p:cNvPr id="16" name="Round Same Side Corner Rectangle 15"/>
-            <p:cNvSpPr/>
-            <p:nvPr/>
-          </p:nvSpPr>
-          <p:spPr>
-            <a:xfrm rot="10800000">
-              <a:off x="1295400" y="544415"/>
-              <a:ext cx="6553200" cy="903384"/>
-            </a:xfrm>
-            <a:prstGeom prst="round2SameRect">
-              <a:avLst/>
-            </a:prstGeom>
-          </p:spPr>
-          <p:style>
-            <a:lnRef idx="2">
-              <a:schemeClr val="dk1">
-                <a:shade val="50000"/>
-              </a:schemeClr>
-            </a:lnRef>
-            <a:fillRef idx="1">
-              <a:schemeClr val="dk1"/>
-            </a:fillRef>
-            <a:effectRef idx="0">
-              <a:schemeClr val="dk1"/>
-            </a:effectRef>
-            <a:fontRef idx="minor">
-              <a:schemeClr val="lt1"/>
-            </a:fontRef>
-          </p:style>
-          <p:txBody>
-            <a:bodyPr rtlCol="0" anchor="ctr"/>
-            <a:lstStyle/>
-            <a:p>
-              <a:pPr algn="ctr"/>
-              <a:endParaRPr lang="es-AR" dirty="0"/>
-            </a:p>
-          </p:txBody>
-        </p:sp>
-        <p:pic>
-          <p:nvPicPr>
-            <p:cNvPr id="20" name="Picture 2" descr="E:\U.B.A.Files\Materias\75.45 Taller de Desarrollo de Proyectos I\TP\Trunk\Proyecto\web\site\images\logo.png"/>
-            <p:cNvPicPr>
-              <a:picLocks noChangeAspect="1" noChangeArrowheads="1"/>
-            </p:cNvPicPr>
-            <p:nvPr/>
-          </p:nvPicPr>
-          <p:blipFill>
-            <a:blip r:embed="rId2" cstate="print"/>
-            <a:srcRect/>
-            <a:stretch>
-              <a:fillRect/>
-            </a:stretch>
-          </p:blipFill>
-          <p:spPr bwMode="auto">
-            <a:xfrm>
-              <a:off x="1600200" y="609600"/>
-              <a:ext cx="2640904" cy="762000"/>
-            </a:xfrm>
-            <a:prstGeom prst="rect">
-              <a:avLst/>
-            </a:prstGeom>
-            <a:noFill/>
-          </p:spPr>
-        </p:pic>
-        <p:sp>
-          <p:nvSpPr>
-            <p:cNvPr id="23" name="TextBox 22"/>
-            <p:cNvSpPr txBox="1"/>
-            <p:nvPr/>
-          </p:nvSpPr>
-          <p:spPr>
-            <a:xfrm>
-              <a:off x="4515457" y="685800"/>
-              <a:ext cx="3180743" cy="307777"/>
-            </a:xfrm>
-            <a:prstGeom prst="rect">
-              <a:avLst/>
-            </a:prstGeom>
-            <a:noFill/>
-          </p:spPr>
-          <p:txBody>
-            <a:bodyPr wrap="none" rtlCol="0">
-              <a:spAutoFit/>
-            </a:bodyPr>
-            <a:lstStyle/>
-            <a:p>
-              <a:r>
-                <a:rPr lang="es-AR" sz="1400" dirty="0" smtClean="0">
-                  <a:solidFill>
-                    <a:schemeClr val="bg1">
-                      <a:lumMod val="50000"/>
-                    </a:schemeClr>
-                  </a:solidFill>
-                </a:rPr>
-                <a:t>Centralización y análisis de datos</a:t>
-              </a:r>
-              <a:endParaRPr lang="es-AR" sz="1400" dirty="0">
-                <a:solidFill>
-                  <a:schemeClr val="bg1">
-                    <a:lumMod val="50000"/>
-                  </a:schemeClr>
-                </a:solidFill>
-              </a:endParaRPr>
-            </a:p>
-          </p:txBody>
-        </p:sp>
-      </p:grpSp>
-    </p:spTree>
-  </p:cSld>
-  <p:clrMapOvr>
-    <a:masterClrMapping/>
-  </p:clrMapOvr>
-  <p:timing>
-    <p:tnLst>
-      <p:par>
-        <p:cTn id="1" dur="indefinite" restart="never" nodeType="tmRoot"/>
-      </p:par>
-    </p:tnLst>
-  </p:timing>
-</p:sld>
-</file>
-
 <file path=ppt/theme/theme1.xml><?xml version="1.0" encoding="utf-8"?>
 <a:theme xmlns:a="http://schemas.openxmlformats.org/drawingml/2006/main" name="Office Theme">
   <a:themeElements>

</xml_diff>

<commit_message>
Agregué las diferencias y mejoras.
</commit_message>
<xml_diff>
--- a/Presentacion/Tecnica/Presentacion Tecnica.pptx
+++ b/Presentacion/Tecnica/Presentacion Tecnica.pptx
@@ -5,7 +5,7 @@
     <p:sldMasterId id="2147484416" r:id="rId1"/>
   </p:sldMasterIdLst>
   <p:notesMasterIdLst>
-    <p:notesMasterId r:id="rId16"/>
+    <p:notesMasterId r:id="rId17"/>
   </p:notesMasterIdLst>
   <p:sldIdLst>
     <p:sldId id="256" r:id="rId2"/>
@@ -22,6 +22,7 @@
     <p:sldId id="273" r:id="rId13"/>
     <p:sldId id="274" r:id="rId14"/>
     <p:sldId id="269" r:id="rId15"/>
+    <p:sldId id="277" r:id="rId16"/>
   </p:sldIdLst>
   <p:sldSz cx="9144000" cy="6858000" type="screen4x3"/>
   <p:notesSz cx="6858000" cy="9144000"/>
@@ -206,7 +207,7 @@
             <a:fld id="{9763C9BB-72E2-4283-8DE8-50E875797B7C}" type="datetimeFigureOut">
               <a:rPr lang="es-AR" smtClean="0"/>
               <a:pPr/>
-              <a:t>07/07/2011</a:t>
+              <a:t>08/07/2011</a:t>
             </a:fld>
             <a:endParaRPr lang="es-AR"/>
           </a:p>
@@ -654,7 +655,7 @@
             <a:fld id="{1D8BD707-D9CF-40AE-B4C6-C98DA3205C09}" type="datetimeFigureOut">
               <a:rPr lang="en-US" smtClean="0"/>
               <a:pPr/>
-              <a:t>7/7/2011</a:t>
+              <a:t>7/8/2011</a:t>
             </a:fld>
             <a:endParaRPr lang="en-US"/>
           </a:p>
@@ -821,7 +822,7 @@
             <a:fld id="{1D8BD707-D9CF-40AE-B4C6-C98DA3205C09}" type="datetimeFigureOut">
               <a:rPr lang="en-US" smtClean="0"/>
               <a:pPr/>
-              <a:t>7/7/2011</a:t>
+              <a:t>7/8/2011</a:t>
             </a:fld>
             <a:endParaRPr lang="en-US"/>
           </a:p>
@@ -998,7 +999,7 @@
             <a:fld id="{1D8BD707-D9CF-40AE-B4C6-C98DA3205C09}" type="datetimeFigureOut">
               <a:rPr lang="en-US" smtClean="0"/>
               <a:pPr/>
-              <a:t>7/7/2011</a:t>
+              <a:t>7/8/2011</a:t>
             </a:fld>
             <a:endParaRPr lang="en-US"/>
           </a:p>
@@ -1165,7 +1166,7 @@
             <a:fld id="{1D8BD707-D9CF-40AE-B4C6-C98DA3205C09}" type="datetimeFigureOut">
               <a:rPr lang="en-US" smtClean="0"/>
               <a:pPr/>
-              <a:t>7/7/2011</a:t>
+              <a:t>7/8/2011</a:t>
             </a:fld>
             <a:endParaRPr lang="en-US"/>
           </a:p>
@@ -1408,7 +1409,7 @@
             <a:fld id="{1D8BD707-D9CF-40AE-B4C6-C98DA3205C09}" type="datetimeFigureOut">
               <a:rPr lang="en-US" smtClean="0"/>
               <a:pPr/>
-              <a:t>7/7/2011</a:t>
+              <a:t>7/8/2011</a:t>
             </a:fld>
             <a:endParaRPr lang="en-US"/>
           </a:p>
@@ -1693,7 +1694,7 @@
             <a:fld id="{1D8BD707-D9CF-40AE-B4C6-C98DA3205C09}" type="datetimeFigureOut">
               <a:rPr lang="en-US" smtClean="0"/>
               <a:pPr/>
-              <a:t>7/7/2011</a:t>
+              <a:t>7/8/2011</a:t>
             </a:fld>
             <a:endParaRPr lang="en-US"/>
           </a:p>
@@ -2112,7 +2113,7 @@
             <a:fld id="{1D8BD707-D9CF-40AE-B4C6-C98DA3205C09}" type="datetimeFigureOut">
               <a:rPr lang="en-US" smtClean="0"/>
               <a:pPr/>
-              <a:t>7/7/2011</a:t>
+              <a:t>7/8/2011</a:t>
             </a:fld>
             <a:endParaRPr lang="en-US"/>
           </a:p>
@@ -2227,7 +2228,7 @@
             <a:fld id="{1D8BD707-D9CF-40AE-B4C6-C98DA3205C09}" type="datetimeFigureOut">
               <a:rPr lang="en-US" smtClean="0"/>
               <a:pPr/>
-              <a:t>7/7/2011</a:t>
+              <a:t>7/8/2011</a:t>
             </a:fld>
             <a:endParaRPr lang="en-US"/>
           </a:p>
@@ -2319,7 +2320,7 @@
             <a:fld id="{1D8BD707-D9CF-40AE-B4C6-C98DA3205C09}" type="datetimeFigureOut">
               <a:rPr lang="en-US" smtClean="0"/>
               <a:pPr/>
-              <a:t>7/7/2011</a:t>
+              <a:t>7/8/2011</a:t>
             </a:fld>
             <a:endParaRPr lang="en-US"/>
           </a:p>
@@ -2593,7 +2594,7 @@
             <a:fld id="{1D8BD707-D9CF-40AE-B4C6-C98DA3205C09}" type="datetimeFigureOut">
               <a:rPr lang="en-US" smtClean="0"/>
               <a:pPr/>
-              <a:t>7/7/2011</a:t>
+              <a:t>7/8/2011</a:t>
             </a:fld>
             <a:endParaRPr lang="en-US"/>
           </a:p>
@@ -2843,7 +2844,7 @@
             <a:fld id="{1D8BD707-D9CF-40AE-B4C6-C98DA3205C09}" type="datetimeFigureOut">
               <a:rPr lang="en-US" smtClean="0"/>
               <a:pPr/>
-              <a:t>7/7/2011</a:t>
+              <a:t>7/8/2011</a:t>
             </a:fld>
             <a:endParaRPr lang="en-US"/>
           </a:p>
@@ -3058,7 +3059,7 @@
             <a:fld id="{1D8BD707-D9CF-40AE-B4C6-C98DA3205C09}" type="datetimeFigureOut">
               <a:rPr lang="en-US" smtClean="0"/>
               <a:pPr/>
-              <a:t>7/7/2011</a:t>
+              <a:t>7/8/2011</a:t>
             </a:fld>
             <a:endParaRPr lang="en-US"/>
           </a:p>
@@ -4932,7 +4933,7 @@
           <a:p>
             <a:pPr algn="ctr"/>
             <a:r>
-              <a:rPr lang="es-AR" sz="4800" b="1" dirty="0" smtClean="0"/>
+              <a:rPr lang="es-AR" sz="4800" b="1" u="sng" dirty="0" smtClean="0"/>
               <a:t>Modelo de Datos (I)</a:t>
             </a:r>
           </a:p>
@@ -6049,7 +6050,7 @@
           <a:p>
             <a:pPr algn="ctr"/>
             <a:r>
-              <a:rPr lang="es-AR" sz="4800" b="1" dirty="0" smtClean="0"/>
+              <a:rPr lang="es-AR" sz="4800" b="1" u="sng" dirty="0" smtClean="0"/>
               <a:t>Modelo de Datos (II)</a:t>
             </a:r>
           </a:p>
@@ -7337,11 +7338,7 @@
             </a:pPr>
             <a:r>
               <a:rPr lang="es-AR" sz="4000" dirty="0" smtClean="0"/>
-              <a:t> </a:t>
-            </a:r>
-            <a:r>
-              <a:rPr lang="es-AR" sz="4000" dirty="0" smtClean="0"/>
-              <a:t>URL encriptado</a:t>
+              <a:t> URL encriptado</a:t>
             </a:r>
           </a:p>
           <a:p>
@@ -10381,7 +10378,7 @@
         </p:nvSpPr>
         <p:spPr>
           <a:xfrm>
-            <a:off x="381000" y="1295400"/>
+            <a:off x="381000" y="1828800"/>
             <a:ext cx="8458200" cy="1066800"/>
           </a:xfrm>
           <a:prstGeom prst="rect">
@@ -10414,14 +10411,16 @@
           <a:p>
             <a:pPr algn="ctr"/>
             <a:r>
-              <a:rPr lang="es-AR" sz="4800" b="1" dirty="0" smtClean="0"/>
-              <a:t>Data </a:t>
+              <a:rPr lang="es-AR" sz="4800" b="1" u="sng" dirty="0" smtClean="0"/>
+              <a:t>Diferencias</a:t>
             </a:r>
+          </a:p>
+          <a:p>
+            <a:pPr algn="ctr"/>
             <a:r>
-              <a:rPr lang="es-AR" sz="4800" b="1" dirty="0" err="1" smtClean="0"/>
-              <a:t>Mining</a:t>
+              <a:rPr lang="es-AR" sz="3200" b="1" dirty="0" smtClean="0"/>
+              <a:t>(entre el prototipo y el sistema real)</a:t>
             </a:r>
-            <a:endParaRPr lang="es-AR" sz="4800" b="1" dirty="0" smtClean="0"/>
           </a:p>
           <a:p>
             <a:pPr algn="ctr"/>
@@ -10552,6 +10551,76 @@
           </p:txBody>
         </p:sp>
       </p:grpSp>
+      <p:sp>
+        <p:nvSpPr>
+          <p:cNvPr id="15" name="14 Rectángulo"/>
+          <p:cNvSpPr/>
+          <p:nvPr/>
+        </p:nvSpPr>
+        <p:spPr>
+          <a:xfrm>
+            <a:off x="685800" y="2895600"/>
+            <a:ext cx="7467600" cy="3108543"/>
+          </a:xfrm>
+          <a:prstGeom prst="rect">
+            <a:avLst/>
+          </a:prstGeom>
+        </p:spPr>
+        <p:txBody>
+          <a:bodyPr wrap="square">
+            <a:spAutoFit/>
+          </a:bodyPr>
+          <a:lstStyle/>
+          <a:p>
+            <a:pPr lvl="0">
+              <a:buFont typeface="Arial" pitchFamily="34" charset="0"/>
+              <a:buChar char="•"/>
+            </a:pPr>
+            <a:r>
+              <a:rPr lang="es-AR" sz="2800" dirty="0" smtClean="0"/>
+              <a:t> Contratos y convenios con las diferentes entidades para obtener los datos.</a:t>
+            </a:r>
+          </a:p>
+          <a:p>
+            <a:pPr lvl="0">
+              <a:buFont typeface="Arial" pitchFamily="34" charset="0"/>
+              <a:buChar char="•"/>
+            </a:pPr>
+            <a:r>
+              <a:rPr lang="es-AR" sz="2800" dirty="0" smtClean="0"/>
+              <a:t>Montaje de la base de datos y de la web en un </a:t>
+            </a:r>
+            <a:r>
+              <a:rPr lang="es-AR" sz="2800" dirty="0" err="1" smtClean="0"/>
+              <a:t>datacenter</a:t>
+            </a:r>
+            <a:r>
+              <a:rPr lang="es-AR" sz="2800" dirty="0" smtClean="0"/>
+              <a:t>.</a:t>
+            </a:r>
+          </a:p>
+          <a:p>
+            <a:pPr lvl="0">
+              <a:buFont typeface="Arial" pitchFamily="34" charset="0"/>
+              <a:buChar char="•"/>
+            </a:pPr>
+            <a:r>
+              <a:rPr lang="es-AR" sz="2800" dirty="0" smtClean="0"/>
+              <a:t>Análisis y estimación de riesgos realizado por un actuario u otro tipo de profesional.</a:t>
+            </a:r>
+          </a:p>
+          <a:p>
+            <a:pPr lvl="0">
+              <a:buFont typeface="Arial" pitchFamily="34" charset="0"/>
+              <a:buChar char="•"/>
+            </a:pPr>
+            <a:r>
+              <a:rPr lang="es-AR" sz="2800" dirty="0" smtClean="0"/>
+              <a:t> Procesos de actualización de la base de datos.</a:t>
+            </a:r>
+          </a:p>
+        </p:txBody>
+      </p:sp>
     </p:spTree>
   </p:cSld>
   <p:clrMapOvr>
@@ -10564,6 +10633,1161 @@
       </p:par>
     </p:tnLst>
   </p:timing>
+</p:sld>
+</file>
+
+<file path=ppt/slides/slide15.xml><?xml version="1.0" encoding="utf-8"?>
+<p:sld xmlns:a="http://schemas.openxmlformats.org/drawingml/2006/main" xmlns:r="http://schemas.openxmlformats.org/officeDocument/2006/relationships" xmlns:p="http://schemas.openxmlformats.org/presentationml/2006/main">
+  <p:cSld>
+    <p:spTree>
+      <p:nvGrpSpPr>
+        <p:cNvPr id="1" name=""/>
+        <p:cNvGrpSpPr/>
+        <p:nvPr/>
+      </p:nvGrpSpPr>
+      <p:grpSpPr>
+        <a:xfrm>
+          <a:off x="0" y="0"/>
+          <a:ext cx="0" cy="0"/>
+          <a:chOff x="0" y="0"/>
+          <a:chExt cx="0" cy="0"/>
+        </a:xfrm>
+      </p:grpSpPr>
+      <p:grpSp>
+        <p:nvGrpSpPr>
+          <p:cNvPr id="17" name="Group 22"/>
+          <p:cNvGrpSpPr/>
+          <p:nvPr/>
+        </p:nvGrpSpPr>
+        <p:grpSpPr>
+          <a:xfrm>
+            <a:off x="304800" y="304800"/>
+            <a:ext cx="8534400" cy="6248400"/>
+            <a:chOff x="304800" y="304800"/>
+            <a:chExt cx="8534400" cy="6248400"/>
+          </a:xfrm>
+          <a:solidFill>
+            <a:schemeClr val="bg1">
+              <a:lumMod val="85000"/>
+            </a:schemeClr>
+          </a:solidFill>
+        </p:grpSpPr>
+        <p:sp>
+          <p:nvSpPr>
+            <p:cNvPr id="18" name="Rounded Rectangle 17"/>
+            <p:cNvSpPr/>
+            <p:nvPr/>
+          </p:nvSpPr>
+          <p:spPr>
+            <a:xfrm>
+              <a:off x="304800" y="304800"/>
+              <a:ext cx="8534400" cy="6248400"/>
+            </a:xfrm>
+            <a:prstGeom prst="roundRect">
+              <a:avLst/>
+            </a:prstGeom>
+            <a:grpFill/>
+            <a:ln>
+              <a:noFill/>
+            </a:ln>
+          </p:spPr>
+          <p:style>
+            <a:lnRef idx="2">
+              <a:schemeClr val="accent1">
+                <a:shade val="50000"/>
+              </a:schemeClr>
+            </a:lnRef>
+            <a:fillRef idx="1">
+              <a:schemeClr val="accent1"/>
+            </a:fillRef>
+            <a:effectRef idx="0">
+              <a:schemeClr val="accent1"/>
+            </a:effectRef>
+            <a:fontRef idx="minor">
+              <a:schemeClr val="lt1"/>
+            </a:fontRef>
+          </p:style>
+          <p:txBody>
+            <a:bodyPr rtlCol="0" anchor="ctr"/>
+            <a:lstStyle/>
+            <a:p>
+              <a:pPr algn="ctr"/>
+              <a:endParaRPr lang="es-AR"/>
+            </a:p>
+          </p:txBody>
+        </p:sp>
+        <p:sp>
+          <p:nvSpPr>
+            <p:cNvPr id="19" name="Rounded Rectangle 21"/>
+            <p:cNvSpPr/>
+            <p:nvPr/>
+          </p:nvSpPr>
+          <p:spPr>
+            <a:xfrm>
+              <a:off x="7086600" y="304800"/>
+              <a:ext cx="1752600" cy="1752600"/>
+            </a:xfrm>
+            <a:prstGeom prst="roundRect">
+              <a:avLst/>
+            </a:prstGeom>
+            <a:grpFill/>
+            <a:ln>
+              <a:noFill/>
+            </a:ln>
+          </p:spPr>
+          <p:style>
+            <a:lnRef idx="2">
+              <a:schemeClr val="accent1">
+                <a:shade val="50000"/>
+              </a:schemeClr>
+            </a:lnRef>
+            <a:fillRef idx="1">
+              <a:schemeClr val="accent1"/>
+            </a:fillRef>
+            <a:effectRef idx="0">
+              <a:schemeClr val="accent1"/>
+            </a:effectRef>
+            <a:fontRef idx="minor">
+              <a:schemeClr val="lt1"/>
+            </a:fontRef>
+          </p:style>
+          <p:txBody>
+            <a:bodyPr rtlCol="0" anchor="ctr"/>
+            <a:lstStyle/>
+            <a:p>
+              <a:pPr algn="ctr"/>
+              <a:endParaRPr lang="es-AR"/>
+            </a:p>
+          </p:txBody>
+        </p:sp>
+        <p:sp>
+          <p:nvSpPr>
+            <p:cNvPr id="20" name="Rounded Rectangle 20"/>
+            <p:cNvSpPr/>
+            <p:nvPr/>
+          </p:nvSpPr>
+          <p:spPr>
+            <a:xfrm>
+              <a:off x="304800" y="304800"/>
+              <a:ext cx="1752600" cy="1752600"/>
+            </a:xfrm>
+            <a:prstGeom prst="roundRect">
+              <a:avLst/>
+            </a:prstGeom>
+            <a:grpFill/>
+            <a:ln>
+              <a:noFill/>
+            </a:ln>
+          </p:spPr>
+          <p:style>
+            <a:lnRef idx="2">
+              <a:schemeClr val="accent1">
+                <a:shade val="50000"/>
+              </a:schemeClr>
+            </a:lnRef>
+            <a:fillRef idx="1">
+              <a:schemeClr val="accent1"/>
+            </a:fillRef>
+            <a:effectRef idx="0">
+              <a:schemeClr val="accent1"/>
+            </a:effectRef>
+            <a:fontRef idx="minor">
+              <a:schemeClr val="lt1"/>
+            </a:fontRef>
+          </p:style>
+          <p:txBody>
+            <a:bodyPr rtlCol="0" anchor="ctr"/>
+            <a:lstStyle/>
+            <a:p>
+              <a:pPr algn="ctr"/>
+              <a:endParaRPr lang="es-AR"/>
+            </a:p>
+          </p:txBody>
+        </p:sp>
+        <p:sp>
+          <p:nvSpPr>
+            <p:cNvPr id="21" name="Rounded Rectangle 16"/>
+            <p:cNvSpPr/>
+            <p:nvPr/>
+          </p:nvSpPr>
+          <p:spPr>
+            <a:xfrm>
+              <a:off x="304800" y="4800600"/>
+              <a:ext cx="1752600" cy="1752600"/>
+            </a:xfrm>
+            <a:prstGeom prst="roundRect">
+              <a:avLst/>
+            </a:prstGeom>
+            <a:grpFill/>
+            <a:ln>
+              <a:noFill/>
+            </a:ln>
+          </p:spPr>
+          <p:style>
+            <a:lnRef idx="2">
+              <a:schemeClr val="accent1">
+                <a:shade val="50000"/>
+              </a:schemeClr>
+            </a:lnRef>
+            <a:fillRef idx="1">
+              <a:schemeClr val="accent1"/>
+            </a:fillRef>
+            <a:effectRef idx="0">
+              <a:schemeClr val="accent1"/>
+            </a:effectRef>
+            <a:fontRef idx="minor">
+              <a:schemeClr val="lt1"/>
+            </a:fontRef>
+          </p:style>
+          <p:txBody>
+            <a:bodyPr rtlCol="0" anchor="ctr"/>
+            <a:lstStyle/>
+            <a:p>
+              <a:pPr algn="ctr"/>
+              <a:endParaRPr lang="es-AR"/>
+            </a:p>
+          </p:txBody>
+        </p:sp>
+        <p:sp>
+          <p:nvSpPr>
+            <p:cNvPr id="22" name="Rounded Rectangle 18"/>
+            <p:cNvSpPr/>
+            <p:nvPr/>
+          </p:nvSpPr>
+          <p:spPr>
+            <a:xfrm>
+              <a:off x="7086600" y="4800600"/>
+              <a:ext cx="1752600" cy="1752600"/>
+            </a:xfrm>
+            <a:prstGeom prst="roundRect">
+              <a:avLst/>
+            </a:prstGeom>
+            <a:grpFill/>
+            <a:ln>
+              <a:noFill/>
+            </a:ln>
+          </p:spPr>
+          <p:style>
+            <a:lnRef idx="2">
+              <a:schemeClr val="accent1">
+                <a:shade val="50000"/>
+              </a:schemeClr>
+            </a:lnRef>
+            <a:fillRef idx="1">
+              <a:schemeClr val="accent1"/>
+            </a:fillRef>
+            <a:effectRef idx="0">
+              <a:schemeClr val="accent1"/>
+            </a:effectRef>
+            <a:fontRef idx="minor">
+              <a:schemeClr val="lt1"/>
+            </a:fontRef>
+          </p:style>
+          <p:txBody>
+            <a:bodyPr rtlCol="0" anchor="ctr"/>
+            <a:lstStyle/>
+            <a:p>
+              <a:pPr algn="ctr"/>
+              <a:endParaRPr lang="es-AR"/>
+            </a:p>
+          </p:txBody>
+        </p:sp>
+      </p:grpSp>
+      <p:sp>
+        <p:nvSpPr>
+          <p:cNvPr id="23" name="Freeform 39"/>
+          <p:cNvSpPr/>
+          <p:nvPr/>
+        </p:nvSpPr>
+        <p:spPr>
+          <a:xfrm>
+            <a:off x="457200" y="457200"/>
+            <a:ext cx="8229600" cy="5803900"/>
+          </a:xfrm>
+          <a:custGeom>
+            <a:avLst/>
+            <a:gdLst>
+              <a:gd name="connsiteX0" fmla="*/ 0 w 8077200"/>
+              <a:gd name="connsiteY0" fmla="*/ 965219 h 5791200"/>
+              <a:gd name="connsiteX1" fmla="*/ 282707 w 8077200"/>
+              <a:gd name="connsiteY1" fmla="*/ 282706 h 5791200"/>
+              <a:gd name="connsiteX2" fmla="*/ 965221 w 8077200"/>
+              <a:gd name="connsiteY2" fmla="*/ 1 h 5791200"/>
+              <a:gd name="connsiteX3" fmla="*/ 7111981 w 8077200"/>
+              <a:gd name="connsiteY3" fmla="*/ 0 h 5791200"/>
+              <a:gd name="connsiteX4" fmla="*/ 7794494 w 8077200"/>
+              <a:gd name="connsiteY4" fmla="*/ 282707 h 5791200"/>
+              <a:gd name="connsiteX5" fmla="*/ 8077199 w 8077200"/>
+              <a:gd name="connsiteY5" fmla="*/ 965221 h 5791200"/>
+              <a:gd name="connsiteX6" fmla="*/ 8077200 w 8077200"/>
+              <a:gd name="connsiteY6" fmla="*/ 4825981 h 5791200"/>
+              <a:gd name="connsiteX7" fmla="*/ 7794494 w 8077200"/>
+              <a:gd name="connsiteY7" fmla="*/ 5508494 h 5791200"/>
+              <a:gd name="connsiteX8" fmla="*/ 7111981 w 8077200"/>
+              <a:gd name="connsiteY8" fmla="*/ 5791200 h 5791200"/>
+              <a:gd name="connsiteX9" fmla="*/ 965219 w 8077200"/>
+              <a:gd name="connsiteY9" fmla="*/ 5791200 h 5791200"/>
+              <a:gd name="connsiteX10" fmla="*/ 282706 w 8077200"/>
+              <a:gd name="connsiteY10" fmla="*/ 5508493 h 5791200"/>
+              <a:gd name="connsiteX11" fmla="*/ 0 w 8077200"/>
+              <a:gd name="connsiteY11" fmla="*/ 4825980 h 5791200"/>
+              <a:gd name="connsiteX12" fmla="*/ 0 w 8077200"/>
+              <a:gd name="connsiteY12" fmla="*/ 965219 h 5791200"/>
+              <a:gd name="connsiteX0" fmla="*/ 0 w 8077200"/>
+              <a:gd name="connsiteY0" fmla="*/ 609600 h 5791200"/>
+              <a:gd name="connsiteX1" fmla="*/ 282707 w 8077200"/>
+              <a:gd name="connsiteY1" fmla="*/ 282706 h 5791200"/>
+              <a:gd name="connsiteX2" fmla="*/ 965221 w 8077200"/>
+              <a:gd name="connsiteY2" fmla="*/ 1 h 5791200"/>
+              <a:gd name="connsiteX3" fmla="*/ 7111981 w 8077200"/>
+              <a:gd name="connsiteY3" fmla="*/ 0 h 5791200"/>
+              <a:gd name="connsiteX4" fmla="*/ 7794494 w 8077200"/>
+              <a:gd name="connsiteY4" fmla="*/ 282707 h 5791200"/>
+              <a:gd name="connsiteX5" fmla="*/ 8077199 w 8077200"/>
+              <a:gd name="connsiteY5" fmla="*/ 965221 h 5791200"/>
+              <a:gd name="connsiteX6" fmla="*/ 8077200 w 8077200"/>
+              <a:gd name="connsiteY6" fmla="*/ 4825981 h 5791200"/>
+              <a:gd name="connsiteX7" fmla="*/ 7794494 w 8077200"/>
+              <a:gd name="connsiteY7" fmla="*/ 5508494 h 5791200"/>
+              <a:gd name="connsiteX8" fmla="*/ 7111981 w 8077200"/>
+              <a:gd name="connsiteY8" fmla="*/ 5791200 h 5791200"/>
+              <a:gd name="connsiteX9" fmla="*/ 965219 w 8077200"/>
+              <a:gd name="connsiteY9" fmla="*/ 5791200 h 5791200"/>
+              <a:gd name="connsiteX10" fmla="*/ 282706 w 8077200"/>
+              <a:gd name="connsiteY10" fmla="*/ 5508493 h 5791200"/>
+              <a:gd name="connsiteX11" fmla="*/ 0 w 8077200"/>
+              <a:gd name="connsiteY11" fmla="*/ 4825980 h 5791200"/>
+              <a:gd name="connsiteX12" fmla="*/ 0 w 8077200"/>
+              <a:gd name="connsiteY12" fmla="*/ 609600 h 5791200"/>
+              <a:gd name="connsiteX0" fmla="*/ 0 w 8077200"/>
+              <a:gd name="connsiteY0" fmla="*/ 609601 h 5791201"/>
+              <a:gd name="connsiteX1" fmla="*/ 282707 w 8077200"/>
+              <a:gd name="connsiteY1" fmla="*/ 282707 h 5791201"/>
+              <a:gd name="connsiteX2" fmla="*/ 609600 w 8077200"/>
+              <a:gd name="connsiteY2" fmla="*/ 1 h 5791201"/>
+              <a:gd name="connsiteX3" fmla="*/ 7111981 w 8077200"/>
+              <a:gd name="connsiteY3" fmla="*/ 1 h 5791201"/>
+              <a:gd name="connsiteX4" fmla="*/ 7794494 w 8077200"/>
+              <a:gd name="connsiteY4" fmla="*/ 282708 h 5791201"/>
+              <a:gd name="connsiteX5" fmla="*/ 8077199 w 8077200"/>
+              <a:gd name="connsiteY5" fmla="*/ 965222 h 5791201"/>
+              <a:gd name="connsiteX6" fmla="*/ 8077200 w 8077200"/>
+              <a:gd name="connsiteY6" fmla="*/ 4825982 h 5791201"/>
+              <a:gd name="connsiteX7" fmla="*/ 7794494 w 8077200"/>
+              <a:gd name="connsiteY7" fmla="*/ 5508495 h 5791201"/>
+              <a:gd name="connsiteX8" fmla="*/ 7111981 w 8077200"/>
+              <a:gd name="connsiteY8" fmla="*/ 5791201 h 5791201"/>
+              <a:gd name="connsiteX9" fmla="*/ 965219 w 8077200"/>
+              <a:gd name="connsiteY9" fmla="*/ 5791201 h 5791201"/>
+              <a:gd name="connsiteX10" fmla="*/ 282706 w 8077200"/>
+              <a:gd name="connsiteY10" fmla="*/ 5508494 h 5791201"/>
+              <a:gd name="connsiteX11" fmla="*/ 0 w 8077200"/>
+              <a:gd name="connsiteY11" fmla="*/ 4825981 h 5791201"/>
+              <a:gd name="connsiteX12" fmla="*/ 0 w 8077200"/>
+              <a:gd name="connsiteY12" fmla="*/ 609601 h 5791201"/>
+              <a:gd name="connsiteX0" fmla="*/ 0 w 8077200"/>
+              <a:gd name="connsiteY0" fmla="*/ 609601 h 5791201"/>
+              <a:gd name="connsiteX1" fmla="*/ 152400 w 8077200"/>
+              <a:gd name="connsiteY1" fmla="*/ 152402 h 5791201"/>
+              <a:gd name="connsiteX2" fmla="*/ 609600 w 8077200"/>
+              <a:gd name="connsiteY2" fmla="*/ 1 h 5791201"/>
+              <a:gd name="connsiteX3" fmla="*/ 7111981 w 8077200"/>
+              <a:gd name="connsiteY3" fmla="*/ 1 h 5791201"/>
+              <a:gd name="connsiteX4" fmla="*/ 7794494 w 8077200"/>
+              <a:gd name="connsiteY4" fmla="*/ 282708 h 5791201"/>
+              <a:gd name="connsiteX5" fmla="*/ 8077199 w 8077200"/>
+              <a:gd name="connsiteY5" fmla="*/ 965222 h 5791201"/>
+              <a:gd name="connsiteX6" fmla="*/ 8077200 w 8077200"/>
+              <a:gd name="connsiteY6" fmla="*/ 4825982 h 5791201"/>
+              <a:gd name="connsiteX7" fmla="*/ 7794494 w 8077200"/>
+              <a:gd name="connsiteY7" fmla="*/ 5508495 h 5791201"/>
+              <a:gd name="connsiteX8" fmla="*/ 7111981 w 8077200"/>
+              <a:gd name="connsiteY8" fmla="*/ 5791201 h 5791201"/>
+              <a:gd name="connsiteX9" fmla="*/ 965219 w 8077200"/>
+              <a:gd name="connsiteY9" fmla="*/ 5791201 h 5791201"/>
+              <a:gd name="connsiteX10" fmla="*/ 282706 w 8077200"/>
+              <a:gd name="connsiteY10" fmla="*/ 5508494 h 5791201"/>
+              <a:gd name="connsiteX11" fmla="*/ 0 w 8077200"/>
+              <a:gd name="connsiteY11" fmla="*/ 4825981 h 5791201"/>
+              <a:gd name="connsiteX12" fmla="*/ 0 w 8077200"/>
+              <a:gd name="connsiteY12" fmla="*/ 609601 h 5791201"/>
+              <a:gd name="connsiteX0" fmla="*/ 0 w 8077200"/>
+              <a:gd name="connsiteY0" fmla="*/ 609600 h 5791200"/>
+              <a:gd name="connsiteX1" fmla="*/ 152400 w 8077200"/>
+              <a:gd name="connsiteY1" fmla="*/ 152401 h 5791200"/>
+              <a:gd name="connsiteX2" fmla="*/ 533400 w 8077200"/>
+              <a:gd name="connsiteY2" fmla="*/ 1 h 5791200"/>
+              <a:gd name="connsiteX3" fmla="*/ 7111981 w 8077200"/>
+              <a:gd name="connsiteY3" fmla="*/ 0 h 5791200"/>
+              <a:gd name="connsiteX4" fmla="*/ 7794494 w 8077200"/>
+              <a:gd name="connsiteY4" fmla="*/ 282707 h 5791200"/>
+              <a:gd name="connsiteX5" fmla="*/ 8077199 w 8077200"/>
+              <a:gd name="connsiteY5" fmla="*/ 965221 h 5791200"/>
+              <a:gd name="connsiteX6" fmla="*/ 8077200 w 8077200"/>
+              <a:gd name="connsiteY6" fmla="*/ 4825981 h 5791200"/>
+              <a:gd name="connsiteX7" fmla="*/ 7794494 w 8077200"/>
+              <a:gd name="connsiteY7" fmla="*/ 5508494 h 5791200"/>
+              <a:gd name="connsiteX8" fmla="*/ 7111981 w 8077200"/>
+              <a:gd name="connsiteY8" fmla="*/ 5791200 h 5791200"/>
+              <a:gd name="connsiteX9" fmla="*/ 965219 w 8077200"/>
+              <a:gd name="connsiteY9" fmla="*/ 5791200 h 5791200"/>
+              <a:gd name="connsiteX10" fmla="*/ 282706 w 8077200"/>
+              <a:gd name="connsiteY10" fmla="*/ 5508493 h 5791200"/>
+              <a:gd name="connsiteX11" fmla="*/ 0 w 8077200"/>
+              <a:gd name="connsiteY11" fmla="*/ 4825980 h 5791200"/>
+              <a:gd name="connsiteX12" fmla="*/ 0 w 8077200"/>
+              <a:gd name="connsiteY12" fmla="*/ 609600 h 5791200"/>
+              <a:gd name="connsiteX0" fmla="*/ 0 w 8077200"/>
+              <a:gd name="connsiteY0" fmla="*/ 533400 h 5791200"/>
+              <a:gd name="connsiteX1" fmla="*/ 152400 w 8077200"/>
+              <a:gd name="connsiteY1" fmla="*/ 152401 h 5791200"/>
+              <a:gd name="connsiteX2" fmla="*/ 533400 w 8077200"/>
+              <a:gd name="connsiteY2" fmla="*/ 1 h 5791200"/>
+              <a:gd name="connsiteX3" fmla="*/ 7111981 w 8077200"/>
+              <a:gd name="connsiteY3" fmla="*/ 0 h 5791200"/>
+              <a:gd name="connsiteX4" fmla="*/ 7794494 w 8077200"/>
+              <a:gd name="connsiteY4" fmla="*/ 282707 h 5791200"/>
+              <a:gd name="connsiteX5" fmla="*/ 8077199 w 8077200"/>
+              <a:gd name="connsiteY5" fmla="*/ 965221 h 5791200"/>
+              <a:gd name="connsiteX6" fmla="*/ 8077200 w 8077200"/>
+              <a:gd name="connsiteY6" fmla="*/ 4825981 h 5791200"/>
+              <a:gd name="connsiteX7" fmla="*/ 7794494 w 8077200"/>
+              <a:gd name="connsiteY7" fmla="*/ 5508494 h 5791200"/>
+              <a:gd name="connsiteX8" fmla="*/ 7111981 w 8077200"/>
+              <a:gd name="connsiteY8" fmla="*/ 5791200 h 5791200"/>
+              <a:gd name="connsiteX9" fmla="*/ 965219 w 8077200"/>
+              <a:gd name="connsiteY9" fmla="*/ 5791200 h 5791200"/>
+              <a:gd name="connsiteX10" fmla="*/ 282706 w 8077200"/>
+              <a:gd name="connsiteY10" fmla="*/ 5508493 h 5791200"/>
+              <a:gd name="connsiteX11" fmla="*/ 0 w 8077200"/>
+              <a:gd name="connsiteY11" fmla="*/ 4825980 h 5791200"/>
+              <a:gd name="connsiteX12" fmla="*/ 0 w 8077200"/>
+              <a:gd name="connsiteY12" fmla="*/ 533400 h 5791200"/>
+              <a:gd name="connsiteX0" fmla="*/ 12700 w 8089900"/>
+              <a:gd name="connsiteY0" fmla="*/ 546100 h 5803900"/>
+              <a:gd name="connsiteX1" fmla="*/ 88900 w 8089900"/>
+              <a:gd name="connsiteY1" fmla="*/ 88900 h 5803900"/>
+              <a:gd name="connsiteX2" fmla="*/ 546100 w 8089900"/>
+              <a:gd name="connsiteY2" fmla="*/ 12701 h 5803900"/>
+              <a:gd name="connsiteX3" fmla="*/ 7124681 w 8089900"/>
+              <a:gd name="connsiteY3" fmla="*/ 12700 h 5803900"/>
+              <a:gd name="connsiteX4" fmla="*/ 7807194 w 8089900"/>
+              <a:gd name="connsiteY4" fmla="*/ 295407 h 5803900"/>
+              <a:gd name="connsiteX5" fmla="*/ 8089899 w 8089900"/>
+              <a:gd name="connsiteY5" fmla="*/ 977921 h 5803900"/>
+              <a:gd name="connsiteX6" fmla="*/ 8089900 w 8089900"/>
+              <a:gd name="connsiteY6" fmla="*/ 4838681 h 5803900"/>
+              <a:gd name="connsiteX7" fmla="*/ 7807194 w 8089900"/>
+              <a:gd name="connsiteY7" fmla="*/ 5521194 h 5803900"/>
+              <a:gd name="connsiteX8" fmla="*/ 7124681 w 8089900"/>
+              <a:gd name="connsiteY8" fmla="*/ 5803900 h 5803900"/>
+              <a:gd name="connsiteX9" fmla="*/ 977919 w 8089900"/>
+              <a:gd name="connsiteY9" fmla="*/ 5803900 h 5803900"/>
+              <a:gd name="connsiteX10" fmla="*/ 295406 w 8089900"/>
+              <a:gd name="connsiteY10" fmla="*/ 5521193 h 5803900"/>
+              <a:gd name="connsiteX11" fmla="*/ 12700 w 8089900"/>
+              <a:gd name="connsiteY11" fmla="*/ 4838680 h 5803900"/>
+              <a:gd name="connsiteX12" fmla="*/ 12700 w 8089900"/>
+              <a:gd name="connsiteY12" fmla="*/ 546100 h 5803900"/>
+              <a:gd name="connsiteX0" fmla="*/ 12700 w 8089900"/>
+              <a:gd name="connsiteY0" fmla="*/ 546100 h 5803900"/>
+              <a:gd name="connsiteX1" fmla="*/ 88900 w 8089900"/>
+              <a:gd name="connsiteY1" fmla="*/ 88900 h 5803900"/>
+              <a:gd name="connsiteX2" fmla="*/ 546100 w 8089900"/>
+              <a:gd name="connsiteY2" fmla="*/ 12701 h 5803900"/>
+              <a:gd name="connsiteX3" fmla="*/ 7124681 w 8089900"/>
+              <a:gd name="connsiteY3" fmla="*/ 12700 h 5803900"/>
+              <a:gd name="connsiteX4" fmla="*/ 7807194 w 8089900"/>
+              <a:gd name="connsiteY4" fmla="*/ 295407 h 5803900"/>
+              <a:gd name="connsiteX5" fmla="*/ 8089899 w 8089900"/>
+              <a:gd name="connsiteY5" fmla="*/ 977921 h 5803900"/>
+              <a:gd name="connsiteX6" fmla="*/ 8089900 w 8089900"/>
+              <a:gd name="connsiteY6" fmla="*/ 4838681 h 5803900"/>
+              <a:gd name="connsiteX7" fmla="*/ 7807194 w 8089900"/>
+              <a:gd name="connsiteY7" fmla="*/ 5521194 h 5803900"/>
+              <a:gd name="connsiteX8" fmla="*/ 7124681 w 8089900"/>
+              <a:gd name="connsiteY8" fmla="*/ 5803900 h 5803900"/>
+              <a:gd name="connsiteX9" fmla="*/ 977919 w 8089900"/>
+              <a:gd name="connsiteY9" fmla="*/ 5803900 h 5803900"/>
+              <a:gd name="connsiteX10" fmla="*/ 295406 w 8089900"/>
+              <a:gd name="connsiteY10" fmla="*/ 5521193 h 5803900"/>
+              <a:gd name="connsiteX11" fmla="*/ 12700 w 8089900"/>
+              <a:gd name="connsiteY11" fmla="*/ 5346700 h 5803900"/>
+              <a:gd name="connsiteX12" fmla="*/ 12700 w 8089900"/>
+              <a:gd name="connsiteY12" fmla="*/ 546100 h 5803900"/>
+              <a:gd name="connsiteX0" fmla="*/ 12700 w 8089900"/>
+              <a:gd name="connsiteY0" fmla="*/ 546100 h 5803900"/>
+              <a:gd name="connsiteX1" fmla="*/ 88900 w 8089900"/>
+              <a:gd name="connsiteY1" fmla="*/ 88900 h 5803900"/>
+              <a:gd name="connsiteX2" fmla="*/ 546100 w 8089900"/>
+              <a:gd name="connsiteY2" fmla="*/ 12701 h 5803900"/>
+              <a:gd name="connsiteX3" fmla="*/ 7124681 w 8089900"/>
+              <a:gd name="connsiteY3" fmla="*/ 12700 h 5803900"/>
+              <a:gd name="connsiteX4" fmla="*/ 7807194 w 8089900"/>
+              <a:gd name="connsiteY4" fmla="*/ 295407 h 5803900"/>
+              <a:gd name="connsiteX5" fmla="*/ 8089899 w 8089900"/>
+              <a:gd name="connsiteY5" fmla="*/ 977921 h 5803900"/>
+              <a:gd name="connsiteX6" fmla="*/ 8089900 w 8089900"/>
+              <a:gd name="connsiteY6" fmla="*/ 4838681 h 5803900"/>
+              <a:gd name="connsiteX7" fmla="*/ 7807194 w 8089900"/>
+              <a:gd name="connsiteY7" fmla="*/ 5521194 h 5803900"/>
+              <a:gd name="connsiteX8" fmla="*/ 7124681 w 8089900"/>
+              <a:gd name="connsiteY8" fmla="*/ 5803900 h 5803900"/>
+              <a:gd name="connsiteX9" fmla="*/ 546100 w 8089900"/>
+              <a:gd name="connsiteY9" fmla="*/ 5803900 h 5803900"/>
+              <a:gd name="connsiteX10" fmla="*/ 295406 w 8089900"/>
+              <a:gd name="connsiteY10" fmla="*/ 5521193 h 5803900"/>
+              <a:gd name="connsiteX11" fmla="*/ 12700 w 8089900"/>
+              <a:gd name="connsiteY11" fmla="*/ 5346700 h 5803900"/>
+              <a:gd name="connsiteX12" fmla="*/ 12700 w 8089900"/>
+              <a:gd name="connsiteY12" fmla="*/ 546100 h 5803900"/>
+              <a:gd name="connsiteX0" fmla="*/ 12700 w 8089900"/>
+              <a:gd name="connsiteY0" fmla="*/ 546100 h 5803900"/>
+              <a:gd name="connsiteX1" fmla="*/ 88900 w 8089900"/>
+              <a:gd name="connsiteY1" fmla="*/ 88900 h 5803900"/>
+              <a:gd name="connsiteX2" fmla="*/ 546100 w 8089900"/>
+              <a:gd name="connsiteY2" fmla="*/ 12701 h 5803900"/>
+              <a:gd name="connsiteX3" fmla="*/ 7124681 w 8089900"/>
+              <a:gd name="connsiteY3" fmla="*/ 12700 h 5803900"/>
+              <a:gd name="connsiteX4" fmla="*/ 7807194 w 8089900"/>
+              <a:gd name="connsiteY4" fmla="*/ 295407 h 5803900"/>
+              <a:gd name="connsiteX5" fmla="*/ 8089899 w 8089900"/>
+              <a:gd name="connsiteY5" fmla="*/ 977921 h 5803900"/>
+              <a:gd name="connsiteX6" fmla="*/ 8089900 w 8089900"/>
+              <a:gd name="connsiteY6" fmla="*/ 4838681 h 5803900"/>
+              <a:gd name="connsiteX7" fmla="*/ 7807194 w 8089900"/>
+              <a:gd name="connsiteY7" fmla="*/ 5521194 h 5803900"/>
+              <a:gd name="connsiteX8" fmla="*/ 7124681 w 8089900"/>
+              <a:gd name="connsiteY8" fmla="*/ 5803900 h 5803900"/>
+              <a:gd name="connsiteX9" fmla="*/ 546100 w 8089900"/>
+              <a:gd name="connsiteY9" fmla="*/ 5803900 h 5803900"/>
+              <a:gd name="connsiteX10" fmla="*/ 88900 w 8089900"/>
+              <a:gd name="connsiteY10" fmla="*/ 5727700 h 5803900"/>
+              <a:gd name="connsiteX11" fmla="*/ 12700 w 8089900"/>
+              <a:gd name="connsiteY11" fmla="*/ 5346700 h 5803900"/>
+              <a:gd name="connsiteX12" fmla="*/ 12700 w 8089900"/>
+              <a:gd name="connsiteY12" fmla="*/ 546100 h 5803900"/>
+              <a:gd name="connsiteX0" fmla="*/ 12700 w 8089900"/>
+              <a:gd name="connsiteY0" fmla="*/ 546100 h 5803900"/>
+              <a:gd name="connsiteX1" fmla="*/ 88900 w 8089900"/>
+              <a:gd name="connsiteY1" fmla="*/ 88900 h 5803900"/>
+              <a:gd name="connsiteX2" fmla="*/ 546100 w 8089900"/>
+              <a:gd name="connsiteY2" fmla="*/ 12701 h 5803900"/>
+              <a:gd name="connsiteX3" fmla="*/ 7556500 w 8089900"/>
+              <a:gd name="connsiteY3" fmla="*/ 12700 h 5803900"/>
+              <a:gd name="connsiteX4" fmla="*/ 7807194 w 8089900"/>
+              <a:gd name="connsiteY4" fmla="*/ 295407 h 5803900"/>
+              <a:gd name="connsiteX5" fmla="*/ 8089899 w 8089900"/>
+              <a:gd name="connsiteY5" fmla="*/ 977921 h 5803900"/>
+              <a:gd name="connsiteX6" fmla="*/ 8089900 w 8089900"/>
+              <a:gd name="connsiteY6" fmla="*/ 4838681 h 5803900"/>
+              <a:gd name="connsiteX7" fmla="*/ 7807194 w 8089900"/>
+              <a:gd name="connsiteY7" fmla="*/ 5521194 h 5803900"/>
+              <a:gd name="connsiteX8" fmla="*/ 7124681 w 8089900"/>
+              <a:gd name="connsiteY8" fmla="*/ 5803900 h 5803900"/>
+              <a:gd name="connsiteX9" fmla="*/ 546100 w 8089900"/>
+              <a:gd name="connsiteY9" fmla="*/ 5803900 h 5803900"/>
+              <a:gd name="connsiteX10" fmla="*/ 88900 w 8089900"/>
+              <a:gd name="connsiteY10" fmla="*/ 5727700 h 5803900"/>
+              <a:gd name="connsiteX11" fmla="*/ 12700 w 8089900"/>
+              <a:gd name="connsiteY11" fmla="*/ 5346700 h 5803900"/>
+              <a:gd name="connsiteX12" fmla="*/ 12700 w 8089900"/>
+              <a:gd name="connsiteY12" fmla="*/ 546100 h 5803900"/>
+              <a:gd name="connsiteX0" fmla="*/ 12700 w 8089901"/>
+              <a:gd name="connsiteY0" fmla="*/ 546100 h 5803900"/>
+              <a:gd name="connsiteX1" fmla="*/ 88900 w 8089901"/>
+              <a:gd name="connsiteY1" fmla="*/ 88900 h 5803900"/>
+              <a:gd name="connsiteX2" fmla="*/ 546100 w 8089901"/>
+              <a:gd name="connsiteY2" fmla="*/ 12701 h 5803900"/>
+              <a:gd name="connsiteX3" fmla="*/ 7556500 w 8089901"/>
+              <a:gd name="connsiteY3" fmla="*/ 12700 h 5803900"/>
+              <a:gd name="connsiteX4" fmla="*/ 7807194 w 8089901"/>
+              <a:gd name="connsiteY4" fmla="*/ 295407 h 5803900"/>
+              <a:gd name="connsiteX5" fmla="*/ 8089900 w 8089901"/>
+              <a:gd name="connsiteY5" fmla="*/ 469900 h 5803900"/>
+              <a:gd name="connsiteX6" fmla="*/ 8089900 w 8089901"/>
+              <a:gd name="connsiteY6" fmla="*/ 4838681 h 5803900"/>
+              <a:gd name="connsiteX7" fmla="*/ 7807194 w 8089901"/>
+              <a:gd name="connsiteY7" fmla="*/ 5521194 h 5803900"/>
+              <a:gd name="connsiteX8" fmla="*/ 7124681 w 8089901"/>
+              <a:gd name="connsiteY8" fmla="*/ 5803900 h 5803900"/>
+              <a:gd name="connsiteX9" fmla="*/ 546100 w 8089901"/>
+              <a:gd name="connsiteY9" fmla="*/ 5803900 h 5803900"/>
+              <a:gd name="connsiteX10" fmla="*/ 88900 w 8089901"/>
+              <a:gd name="connsiteY10" fmla="*/ 5727700 h 5803900"/>
+              <a:gd name="connsiteX11" fmla="*/ 12700 w 8089901"/>
+              <a:gd name="connsiteY11" fmla="*/ 5346700 h 5803900"/>
+              <a:gd name="connsiteX12" fmla="*/ 12700 w 8089901"/>
+              <a:gd name="connsiteY12" fmla="*/ 546100 h 5803900"/>
+              <a:gd name="connsiteX0" fmla="*/ 12700 w 8102600"/>
+              <a:gd name="connsiteY0" fmla="*/ 546100 h 5803900"/>
+              <a:gd name="connsiteX1" fmla="*/ 88900 w 8102600"/>
+              <a:gd name="connsiteY1" fmla="*/ 88900 h 5803900"/>
+              <a:gd name="connsiteX2" fmla="*/ 546100 w 8102600"/>
+              <a:gd name="connsiteY2" fmla="*/ 12701 h 5803900"/>
+              <a:gd name="connsiteX3" fmla="*/ 7556500 w 8102600"/>
+              <a:gd name="connsiteY3" fmla="*/ 12700 h 5803900"/>
+              <a:gd name="connsiteX4" fmla="*/ 8013700 w 8102600"/>
+              <a:gd name="connsiteY4" fmla="*/ 88900 h 5803900"/>
+              <a:gd name="connsiteX5" fmla="*/ 8089900 w 8102600"/>
+              <a:gd name="connsiteY5" fmla="*/ 469900 h 5803900"/>
+              <a:gd name="connsiteX6" fmla="*/ 8089900 w 8102600"/>
+              <a:gd name="connsiteY6" fmla="*/ 4838681 h 5803900"/>
+              <a:gd name="connsiteX7" fmla="*/ 7807194 w 8102600"/>
+              <a:gd name="connsiteY7" fmla="*/ 5521194 h 5803900"/>
+              <a:gd name="connsiteX8" fmla="*/ 7124681 w 8102600"/>
+              <a:gd name="connsiteY8" fmla="*/ 5803900 h 5803900"/>
+              <a:gd name="connsiteX9" fmla="*/ 546100 w 8102600"/>
+              <a:gd name="connsiteY9" fmla="*/ 5803900 h 5803900"/>
+              <a:gd name="connsiteX10" fmla="*/ 88900 w 8102600"/>
+              <a:gd name="connsiteY10" fmla="*/ 5727700 h 5803900"/>
+              <a:gd name="connsiteX11" fmla="*/ 12700 w 8102600"/>
+              <a:gd name="connsiteY11" fmla="*/ 5346700 h 5803900"/>
+              <a:gd name="connsiteX12" fmla="*/ 12700 w 8102600"/>
+              <a:gd name="connsiteY12" fmla="*/ 546100 h 5803900"/>
+              <a:gd name="connsiteX0" fmla="*/ 12700 w 8102600"/>
+              <a:gd name="connsiteY0" fmla="*/ 546100 h 5803900"/>
+              <a:gd name="connsiteX1" fmla="*/ 88900 w 8102600"/>
+              <a:gd name="connsiteY1" fmla="*/ 88900 h 5803900"/>
+              <a:gd name="connsiteX2" fmla="*/ 546100 w 8102600"/>
+              <a:gd name="connsiteY2" fmla="*/ 12701 h 5803900"/>
+              <a:gd name="connsiteX3" fmla="*/ 7556500 w 8102600"/>
+              <a:gd name="connsiteY3" fmla="*/ 12700 h 5803900"/>
+              <a:gd name="connsiteX4" fmla="*/ 8013700 w 8102600"/>
+              <a:gd name="connsiteY4" fmla="*/ 88900 h 5803900"/>
+              <a:gd name="connsiteX5" fmla="*/ 8089899 w 8102600"/>
+              <a:gd name="connsiteY5" fmla="*/ 469900 h 5803900"/>
+              <a:gd name="connsiteX6" fmla="*/ 8089900 w 8102600"/>
+              <a:gd name="connsiteY6" fmla="*/ 4838681 h 5803900"/>
+              <a:gd name="connsiteX7" fmla="*/ 7807194 w 8102600"/>
+              <a:gd name="connsiteY7" fmla="*/ 5521194 h 5803900"/>
+              <a:gd name="connsiteX8" fmla="*/ 7124681 w 8102600"/>
+              <a:gd name="connsiteY8" fmla="*/ 5803900 h 5803900"/>
+              <a:gd name="connsiteX9" fmla="*/ 546100 w 8102600"/>
+              <a:gd name="connsiteY9" fmla="*/ 5803900 h 5803900"/>
+              <a:gd name="connsiteX10" fmla="*/ 88900 w 8102600"/>
+              <a:gd name="connsiteY10" fmla="*/ 5727700 h 5803900"/>
+              <a:gd name="connsiteX11" fmla="*/ 12700 w 8102600"/>
+              <a:gd name="connsiteY11" fmla="*/ 5346700 h 5803900"/>
+              <a:gd name="connsiteX12" fmla="*/ 12700 w 8102600"/>
+              <a:gd name="connsiteY12" fmla="*/ 546100 h 5803900"/>
+              <a:gd name="connsiteX0" fmla="*/ 12700 w 8102599"/>
+              <a:gd name="connsiteY0" fmla="*/ 546100 h 5803900"/>
+              <a:gd name="connsiteX1" fmla="*/ 88900 w 8102599"/>
+              <a:gd name="connsiteY1" fmla="*/ 88900 h 5803900"/>
+              <a:gd name="connsiteX2" fmla="*/ 546100 w 8102599"/>
+              <a:gd name="connsiteY2" fmla="*/ 12701 h 5803900"/>
+              <a:gd name="connsiteX3" fmla="*/ 7556500 w 8102599"/>
+              <a:gd name="connsiteY3" fmla="*/ 12700 h 5803900"/>
+              <a:gd name="connsiteX4" fmla="*/ 8013699 w 8102599"/>
+              <a:gd name="connsiteY4" fmla="*/ 88900 h 5803900"/>
+              <a:gd name="connsiteX5" fmla="*/ 8089899 w 8102599"/>
+              <a:gd name="connsiteY5" fmla="*/ 469900 h 5803900"/>
+              <a:gd name="connsiteX6" fmla="*/ 8089900 w 8102599"/>
+              <a:gd name="connsiteY6" fmla="*/ 4838681 h 5803900"/>
+              <a:gd name="connsiteX7" fmla="*/ 7807194 w 8102599"/>
+              <a:gd name="connsiteY7" fmla="*/ 5521194 h 5803900"/>
+              <a:gd name="connsiteX8" fmla="*/ 7124681 w 8102599"/>
+              <a:gd name="connsiteY8" fmla="*/ 5803900 h 5803900"/>
+              <a:gd name="connsiteX9" fmla="*/ 546100 w 8102599"/>
+              <a:gd name="connsiteY9" fmla="*/ 5803900 h 5803900"/>
+              <a:gd name="connsiteX10" fmla="*/ 88900 w 8102599"/>
+              <a:gd name="connsiteY10" fmla="*/ 5727700 h 5803900"/>
+              <a:gd name="connsiteX11" fmla="*/ 12700 w 8102599"/>
+              <a:gd name="connsiteY11" fmla="*/ 5346700 h 5803900"/>
+              <a:gd name="connsiteX12" fmla="*/ 12700 w 8102599"/>
+              <a:gd name="connsiteY12" fmla="*/ 546100 h 5803900"/>
+              <a:gd name="connsiteX0" fmla="*/ 12700 w 8102599"/>
+              <a:gd name="connsiteY0" fmla="*/ 546100 h 5803900"/>
+              <a:gd name="connsiteX1" fmla="*/ 88900 w 8102599"/>
+              <a:gd name="connsiteY1" fmla="*/ 88900 h 5803900"/>
+              <a:gd name="connsiteX2" fmla="*/ 546100 w 8102599"/>
+              <a:gd name="connsiteY2" fmla="*/ 12701 h 5803900"/>
+              <a:gd name="connsiteX3" fmla="*/ 7556500 w 8102599"/>
+              <a:gd name="connsiteY3" fmla="*/ 12700 h 5803900"/>
+              <a:gd name="connsiteX4" fmla="*/ 8013699 w 8102599"/>
+              <a:gd name="connsiteY4" fmla="*/ 88900 h 5803900"/>
+              <a:gd name="connsiteX5" fmla="*/ 8089899 w 8102599"/>
+              <a:gd name="connsiteY5" fmla="*/ 469900 h 5803900"/>
+              <a:gd name="connsiteX6" fmla="*/ 8089900 w 8102599"/>
+              <a:gd name="connsiteY6" fmla="*/ 5346700 h 5803900"/>
+              <a:gd name="connsiteX7" fmla="*/ 7807194 w 8102599"/>
+              <a:gd name="connsiteY7" fmla="*/ 5521194 h 5803900"/>
+              <a:gd name="connsiteX8" fmla="*/ 7124681 w 8102599"/>
+              <a:gd name="connsiteY8" fmla="*/ 5803900 h 5803900"/>
+              <a:gd name="connsiteX9" fmla="*/ 546100 w 8102599"/>
+              <a:gd name="connsiteY9" fmla="*/ 5803900 h 5803900"/>
+              <a:gd name="connsiteX10" fmla="*/ 88900 w 8102599"/>
+              <a:gd name="connsiteY10" fmla="*/ 5727700 h 5803900"/>
+              <a:gd name="connsiteX11" fmla="*/ 12700 w 8102599"/>
+              <a:gd name="connsiteY11" fmla="*/ 5346700 h 5803900"/>
+              <a:gd name="connsiteX12" fmla="*/ 12700 w 8102599"/>
+              <a:gd name="connsiteY12" fmla="*/ 546100 h 5803900"/>
+              <a:gd name="connsiteX0" fmla="*/ 12700 w 8102599"/>
+              <a:gd name="connsiteY0" fmla="*/ 546100 h 5803900"/>
+              <a:gd name="connsiteX1" fmla="*/ 88900 w 8102599"/>
+              <a:gd name="connsiteY1" fmla="*/ 88900 h 5803900"/>
+              <a:gd name="connsiteX2" fmla="*/ 546100 w 8102599"/>
+              <a:gd name="connsiteY2" fmla="*/ 12701 h 5803900"/>
+              <a:gd name="connsiteX3" fmla="*/ 7556500 w 8102599"/>
+              <a:gd name="connsiteY3" fmla="*/ 12700 h 5803900"/>
+              <a:gd name="connsiteX4" fmla="*/ 8013699 w 8102599"/>
+              <a:gd name="connsiteY4" fmla="*/ 88900 h 5803900"/>
+              <a:gd name="connsiteX5" fmla="*/ 8089899 w 8102599"/>
+              <a:gd name="connsiteY5" fmla="*/ 469900 h 5803900"/>
+              <a:gd name="connsiteX6" fmla="*/ 8089900 w 8102599"/>
+              <a:gd name="connsiteY6" fmla="*/ 5346700 h 5803900"/>
+              <a:gd name="connsiteX7" fmla="*/ 7807194 w 8102599"/>
+              <a:gd name="connsiteY7" fmla="*/ 5521194 h 5803900"/>
+              <a:gd name="connsiteX8" fmla="*/ 7632700 w 8102599"/>
+              <a:gd name="connsiteY8" fmla="*/ 5803900 h 5803900"/>
+              <a:gd name="connsiteX9" fmla="*/ 546100 w 8102599"/>
+              <a:gd name="connsiteY9" fmla="*/ 5803900 h 5803900"/>
+              <a:gd name="connsiteX10" fmla="*/ 88900 w 8102599"/>
+              <a:gd name="connsiteY10" fmla="*/ 5727700 h 5803900"/>
+              <a:gd name="connsiteX11" fmla="*/ 12700 w 8102599"/>
+              <a:gd name="connsiteY11" fmla="*/ 5346700 h 5803900"/>
+              <a:gd name="connsiteX12" fmla="*/ 12700 w 8102599"/>
+              <a:gd name="connsiteY12" fmla="*/ 546100 h 5803900"/>
+              <a:gd name="connsiteX0" fmla="*/ 12700 w 8102599"/>
+              <a:gd name="connsiteY0" fmla="*/ 546100 h 5803900"/>
+              <a:gd name="connsiteX1" fmla="*/ 88900 w 8102599"/>
+              <a:gd name="connsiteY1" fmla="*/ 88900 h 5803900"/>
+              <a:gd name="connsiteX2" fmla="*/ 546100 w 8102599"/>
+              <a:gd name="connsiteY2" fmla="*/ 12701 h 5803900"/>
+              <a:gd name="connsiteX3" fmla="*/ 7556500 w 8102599"/>
+              <a:gd name="connsiteY3" fmla="*/ 12700 h 5803900"/>
+              <a:gd name="connsiteX4" fmla="*/ 8013699 w 8102599"/>
+              <a:gd name="connsiteY4" fmla="*/ 88900 h 5803900"/>
+              <a:gd name="connsiteX5" fmla="*/ 8089899 w 8102599"/>
+              <a:gd name="connsiteY5" fmla="*/ 469900 h 5803900"/>
+              <a:gd name="connsiteX6" fmla="*/ 8089900 w 8102599"/>
+              <a:gd name="connsiteY6" fmla="*/ 5346700 h 5803900"/>
+              <a:gd name="connsiteX7" fmla="*/ 8013700 w 8102599"/>
+              <a:gd name="connsiteY7" fmla="*/ 5727700 h 5803900"/>
+              <a:gd name="connsiteX8" fmla="*/ 7632700 w 8102599"/>
+              <a:gd name="connsiteY8" fmla="*/ 5803900 h 5803900"/>
+              <a:gd name="connsiteX9" fmla="*/ 546100 w 8102599"/>
+              <a:gd name="connsiteY9" fmla="*/ 5803900 h 5803900"/>
+              <a:gd name="connsiteX10" fmla="*/ 88900 w 8102599"/>
+              <a:gd name="connsiteY10" fmla="*/ 5727700 h 5803900"/>
+              <a:gd name="connsiteX11" fmla="*/ 12700 w 8102599"/>
+              <a:gd name="connsiteY11" fmla="*/ 5346700 h 5803900"/>
+              <a:gd name="connsiteX12" fmla="*/ 12700 w 8102599"/>
+              <a:gd name="connsiteY12" fmla="*/ 546100 h 5803900"/>
+            </a:gdLst>
+            <a:ahLst/>
+            <a:cxnLst>
+              <a:cxn ang="0">
+                <a:pos x="connsiteX0" y="connsiteY0"/>
+              </a:cxn>
+              <a:cxn ang="0">
+                <a:pos x="connsiteX1" y="connsiteY1"/>
+              </a:cxn>
+              <a:cxn ang="0">
+                <a:pos x="connsiteX2" y="connsiteY2"/>
+              </a:cxn>
+              <a:cxn ang="0">
+                <a:pos x="connsiteX3" y="connsiteY3"/>
+              </a:cxn>
+              <a:cxn ang="0">
+                <a:pos x="connsiteX4" y="connsiteY4"/>
+              </a:cxn>
+              <a:cxn ang="0">
+                <a:pos x="connsiteX5" y="connsiteY5"/>
+              </a:cxn>
+              <a:cxn ang="0">
+                <a:pos x="connsiteX6" y="connsiteY6"/>
+              </a:cxn>
+              <a:cxn ang="0">
+                <a:pos x="connsiteX7" y="connsiteY7"/>
+              </a:cxn>
+              <a:cxn ang="0">
+                <a:pos x="connsiteX8" y="connsiteY8"/>
+              </a:cxn>
+              <a:cxn ang="0">
+                <a:pos x="connsiteX9" y="connsiteY9"/>
+              </a:cxn>
+              <a:cxn ang="0">
+                <a:pos x="connsiteX10" y="connsiteY10"/>
+              </a:cxn>
+              <a:cxn ang="0">
+                <a:pos x="connsiteX11" y="connsiteY11"/>
+              </a:cxn>
+              <a:cxn ang="0">
+                <a:pos x="connsiteX12" y="connsiteY12"/>
+              </a:cxn>
+            </a:cxnLst>
+            <a:rect l="l" t="t" r="r" b="b"/>
+            <a:pathLst>
+              <a:path w="8102599" h="5803900">
+                <a:moveTo>
+                  <a:pt x="12700" y="546100"/>
+                </a:moveTo>
+                <a:cubicBezTo>
+                  <a:pt x="12700" y="290108"/>
+                  <a:pt x="0" y="177800"/>
+                  <a:pt x="88900" y="88900"/>
+                </a:cubicBezTo>
+                <a:cubicBezTo>
+                  <a:pt x="177800" y="0"/>
+                  <a:pt x="290107" y="12700"/>
+                  <a:pt x="546100" y="12701"/>
+                </a:cubicBezTo>
+                <a:lnTo>
+                  <a:pt x="7556500" y="12700"/>
+                </a:lnTo>
+                <a:cubicBezTo>
+                  <a:pt x="7812492" y="12700"/>
+                  <a:pt x="7924799" y="12700"/>
+                  <a:pt x="8013699" y="88900"/>
+                </a:cubicBezTo>
+                <a:cubicBezTo>
+                  <a:pt x="8102599" y="165100"/>
+                  <a:pt x="8089900" y="213907"/>
+                  <a:pt x="8089899" y="469900"/>
+                </a:cubicBezTo>
+                <a:cubicBezTo>
+                  <a:pt x="8089899" y="1926160"/>
+                  <a:pt x="8089900" y="3890440"/>
+                  <a:pt x="8089900" y="5346700"/>
+                </a:cubicBezTo>
+                <a:cubicBezTo>
+                  <a:pt x="8089900" y="5602692"/>
+                  <a:pt x="8089900" y="5651500"/>
+                  <a:pt x="8013700" y="5727700"/>
+                </a:cubicBezTo>
+                <a:cubicBezTo>
+                  <a:pt x="7937500" y="5803900"/>
+                  <a:pt x="7888692" y="5803900"/>
+                  <a:pt x="7632700" y="5803900"/>
+                </a:cubicBezTo>
+                <a:lnTo>
+                  <a:pt x="546100" y="5803900"/>
+                </a:lnTo>
+                <a:cubicBezTo>
+                  <a:pt x="290108" y="5803900"/>
+                  <a:pt x="177800" y="5803900"/>
+                  <a:pt x="88900" y="5727700"/>
+                </a:cubicBezTo>
+                <a:cubicBezTo>
+                  <a:pt x="0" y="5651500"/>
+                  <a:pt x="12700" y="5602692"/>
+                  <a:pt x="12700" y="5346700"/>
+                </a:cubicBezTo>
+                <a:lnTo>
+                  <a:pt x="12700" y="546100"/>
+                </a:lnTo>
+                <a:close/>
+              </a:path>
+            </a:pathLst>
+          </a:custGeom>
+          <a:gradFill>
+            <a:gsLst>
+              <a:gs pos="0">
+                <a:schemeClr val="bg1">
+                  <a:lumMod val="50000"/>
+                </a:schemeClr>
+              </a:gs>
+              <a:gs pos="39999">
+                <a:schemeClr val="bg1">
+                  <a:lumMod val="65000"/>
+                </a:schemeClr>
+              </a:gs>
+              <a:gs pos="70000">
+                <a:schemeClr val="bg1">
+                  <a:lumMod val="50000"/>
+                  <a:alpha val="73000"/>
+                </a:schemeClr>
+              </a:gs>
+            </a:gsLst>
+            <a:lin ang="5400000" scaled="0"/>
+          </a:gradFill>
+          <a:ln>
+            <a:solidFill>
+              <a:schemeClr val="bg1">
+                <a:lumMod val="75000"/>
+              </a:schemeClr>
+            </a:solidFill>
+          </a:ln>
+        </p:spPr>
+        <p:style>
+          <a:lnRef idx="2">
+            <a:schemeClr val="accent1">
+              <a:shade val="50000"/>
+            </a:schemeClr>
+          </a:lnRef>
+          <a:fillRef idx="1">
+            <a:schemeClr val="accent1"/>
+          </a:fillRef>
+          <a:effectRef idx="0">
+            <a:schemeClr val="accent1"/>
+          </a:effectRef>
+          <a:fontRef idx="minor">
+            <a:schemeClr val="lt1"/>
+          </a:fontRef>
+        </p:style>
+        <p:txBody>
+          <a:bodyPr rtlCol="0" anchor="ctr"/>
+          <a:lstStyle/>
+          <a:p>
+            <a:pPr fontAlgn="t"/>
+            <a:endParaRPr lang="es-AR" b="1" dirty="0" smtClean="0"/>
+          </a:p>
+          <a:p>
+            <a:pPr algn="ctr"/>
+            <a:endParaRPr lang="es-AR" dirty="0"/>
+          </a:p>
+        </p:txBody>
+      </p:sp>
+      <p:sp>
+        <p:nvSpPr>
+          <p:cNvPr id="24" name="Rectangle 13"/>
+          <p:cNvSpPr/>
+          <p:nvPr/>
+        </p:nvSpPr>
+        <p:spPr>
+          <a:xfrm>
+            <a:off x="381000" y="1828800"/>
+            <a:ext cx="8458200" cy="1066800"/>
+          </a:xfrm>
+          <a:prstGeom prst="rect">
+            <a:avLst/>
+          </a:prstGeom>
+          <a:noFill/>
+          <a:ln>
+            <a:noFill/>
+          </a:ln>
+        </p:spPr>
+        <p:style>
+          <a:lnRef idx="2">
+            <a:schemeClr val="accent1">
+              <a:shade val="50000"/>
+            </a:schemeClr>
+          </a:lnRef>
+          <a:fillRef idx="1">
+            <a:schemeClr val="accent1"/>
+          </a:fillRef>
+          <a:effectRef idx="0">
+            <a:schemeClr val="accent1"/>
+          </a:effectRef>
+          <a:fontRef idx="minor">
+            <a:schemeClr val="lt1"/>
+          </a:fontRef>
+        </p:style>
+        <p:txBody>
+          <a:bodyPr rtlCol="0" anchor="ctr"/>
+          <a:lstStyle/>
+          <a:p>
+            <a:pPr algn="ctr"/>
+            <a:r>
+              <a:rPr lang="es-AR" sz="4800" b="1" u="sng" dirty="0" smtClean="0"/>
+              <a:t>Mejoras</a:t>
+            </a:r>
+            <a:endParaRPr lang="es-AR" sz="3200" b="1" u="sng" dirty="0" smtClean="0"/>
+          </a:p>
+          <a:p>
+            <a:pPr algn="ctr"/>
+            <a:endParaRPr lang="es-AR" sz="1200" dirty="0"/>
+          </a:p>
+        </p:txBody>
+      </p:sp>
+      <p:grpSp>
+        <p:nvGrpSpPr>
+          <p:cNvPr id="25" name="Group 14"/>
+          <p:cNvGrpSpPr/>
+          <p:nvPr/>
+        </p:nvGrpSpPr>
+        <p:grpSpPr>
+          <a:xfrm>
+            <a:off x="1295400" y="544415"/>
+            <a:ext cx="6553200" cy="903384"/>
+            <a:chOff x="1295400" y="544415"/>
+            <a:chExt cx="6553200" cy="903384"/>
+          </a:xfrm>
+        </p:grpSpPr>
+        <p:sp>
+          <p:nvSpPr>
+            <p:cNvPr id="26" name="Round Same Side Corner Rectangle 15"/>
+            <p:cNvSpPr/>
+            <p:nvPr/>
+          </p:nvSpPr>
+          <p:spPr>
+            <a:xfrm rot="10800000">
+              <a:off x="1295400" y="544415"/>
+              <a:ext cx="6553200" cy="903384"/>
+            </a:xfrm>
+            <a:prstGeom prst="round2SameRect">
+              <a:avLst/>
+            </a:prstGeom>
+          </p:spPr>
+          <p:style>
+            <a:lnRef idx="2">
+              <a:schemeClr val="dk1">
+                <a:shade val="50000"/>
+              </a:schemeClr>
+            </a:lnRef>
+            <a:fillRef idx="1">
+              <a:schemeClr val="dk1"/>
+            </a:fillRef>
+            <a:effectRef idx="0">
+              <a:schemeClr val="dk1"/>
+            </a:effectRef>
+            <a:fontRef idx="minor">
+              <a:schemeClr val="lt1"/>
+            </a:fontRef>
+          </p:style>
+          <p:txBody>
+            <a:bodyPr rtlCol="0" anchor="ctr"/>
+            <a:lstStyle/>
+            <a:p>
+              <a:pPr algn="ctr"/>
+              <a:endParaRPr lang="es-AR" dirty="0"/>
+            </a:p>
+          </p:txBody>
+        </p:sp>
+        <p:pic>
+          <p:nvPicPr>
+            <p:cNvPr id="27" name="Picture 2" descr="E:\U.B.A.Files\Materias\75.45 Taller de Desarrollo de Proyectos I\TP\Trunk\Proyecto\web\site\images\logo.png"/>
+            <p:cNvPicPr>
+              <a:picLocks noChangeAspect="1" noChangeArrowheads="1"/>
+            </p:cNvPicPr>
+            <p:nvPr/>
+          </p:nvPicPr>
+          <p:blipFill>
+            <a:blip r:embed="rId2" cstate="print"/>
+            <a:srcRect/>
+            <a:stretch>
+              <a:fillRect/>
+            </a:stretch>
+          </p:blipFill>
+          <p:spPr bwMode="auto">
+            <a:xfrm>
+              <a:off x="1600200" y="609600"/>
+              <a:ext cx="2640904" cy="762000"/>
+            </a:xfrm>
+            <a:prstGeom prst="rect">
+              <a:avLst/>
+            </a:prstGeom>
+            <a:noFill/>
+          </p:spPr>
+        </p:pic>
+        <p:sp>
+          <p:nvSpPr>
+            <p:cNvPr id="28" name="TextBox 22"/>
+            <p:cNvSpPr txBox="1"/>
+            <p:nvPr/>
+          </p:nvSpPr>
+          <p:spPr>
+            <a:xfrm>
+              <a:off x="4515457" y="685800"/>
+              <a:ext cx="3180743" cy="307777"/>
+            </a:xfrm>
+            <a:prstGeom prst="rect">
+              <a:avLst/>
+            </a:prstGeom>
+            <a:noFill/>
+          </p:spPr>
+          <p:txBody>
+            <a:bodyPr wrap="none" rtlCol="0">
+              <a:spAutoFit/>
+            </a:bodyPr>
+            <a:lstStyle/>
+            <a:p>
+              <a:r>
+                <a:rPr lang="es-AR" sz="1400" dirty="0" smtClean="0">
+                  <a:solidFill>
+                    <a:schemeClr val="bg1">
+                      <a:lumMod val="50000"/>
+                    </a:schemeClr>
+                  </a:solidFill>
+                </a:rPr>
+                <a:t>Centralización y análisis de datos</a:t>
+              </a:r>
+              <a:endParaRPr lang="es-AR" sz="1400" dirty="0">
+                <a:solidFill>
+                  <a:schemeClr val="bg1">
+                    <a:lumMod val="50000"/>
+                  </a:schemeClr>
+                </a:solidFill>
+              </a:endParaRPr>
+            </a:p>
+          </p:txBody>
+        </p:sp>
+      </p:grpSp>
+      <p:sp>
+        <p:nvSpPr>
+          <p:cNvPr id="29" name="28 Rectángulo"/>
+          <p:cNvSpPr/>
+          <p:nvPr/>
+        </p:nvSpPr>
+        <p:spPr>
+          <a:xfrm>
+            <a:off x="685800" y="2895600"/>
+            <a:ext cx="7467600" cy="1815882"/>
+          </a:xfrm>
+          <a:prstGeom prst="rect">
+            <a:avLst/>
+          </a:prstGeom>
+        </p:spPr>
+        <p:txBody>
+          <a:bodyPr wrap="square">
+            <a:spAutoFit/>
+          </a:bodyPr>
+          <a:lstStyle/>
+          <a:p>
+            <a:pPr lvl="0">
+              <a:buFont typeface="Arial" pitchFamily="34" charset="0"/>
+              <a:buChar char="•"/>
+            </a:pPr>
+            <a:r>
+              <a:rPr lang="es-AR" sz="2800" dirty="0" smtClean="0"/>
+              <a:t> Estimación de riesgos mediante Data </a:t>
+            </a:r>
+            <a:r>
+              <a:rPr lang="es-AR" sz="2800" dirty="0" err="1" smtClean="0"/>
+              <a:t>Mining</a:t>
+            </a:r>
+            <a:r>
+              <a:rPr lang="es-AR" sz="2800" dirty="0" smtClean="0"/>
+              <a:t>.</a:t>
+            </a:r>
+          </a:p>
+          <a:p>
+            <a:pPr lvl="0">
+              <a:buFont typeface="Arial" pitchFamily="34" charset="0"/>
+              <a:buChar char="•"/>
+            </a:pPr>
+            <a:r>
+              <a:rPr lang="es-AR" sz="2800" dirty="0" smtClean="0"/>
+              <a:t>Análisis estadístico de los clientes de la empresa.</a:t>
+            </a:r>
+          </a:p>
+          <a:p>
+            <a:pPr lvl="0">
+              <a:buFont typeface="Arial" pitchFamily="34" charset="0"/>
+              <a:buChar char="•"/>
+            </a:pPr>
+            <a:r>
+              <a:rPr lang="es-AR" sz="2800" dirty="0" smtClean="0"/>
+              <a:t>Informe coloquial sobre el comportamiento del individuo y una </a:t>
+            </a:r>
+            <a:r>
+              <a:rPr lang="es-AR" sz="2800" dirty="0" err="1" smtClean="0"/>
+              <a:t>definicion</a:t>
+            </a:r>
+            <a:r>
+              <a:rPr lang="es-AR" sz="2800" dirty="0" smtClean="0"/>
+              <a:t> en cuanto a riesgos.</a:t>
+            </a:r>
+          </a:p>
+        </p:txBody>
+      </p:sp>
+    </p:spTree>
+  </p:cSld>
+  <p:clrMapOvr>
+    <a:masterClrMapping/>
+  </p:clrMapOvr>
 </p:sld>
 </file>
 
@@ -11525,7 +12749,6 @@
               <a:rPr lang="es-AR" sz="5400" b="1" u="sng" dirty="0" smtClean="0"/>
               <a:t>Premisas</a:t>
             </a:r>
-            <a:endParaRPr lang="es-AR" sz="5400" b="1" u="sng" dirty="0" smtClean="0"/>
           </a:p>
           <a:p>
             <a:pPr algn="ctr"/>
@@ -11684,15 +12907,7 @@
             </a:pPr>
             <a:r>
               <a:rPr lang="es-AR" sz="3600" dirty="0" smtClean="0"/>
-              <a:t> </a:t>
-            </a:r>
-            <a:r>
-              <a:rPr lang="es-AR" sz="3600" dirty="0" smtClean="0"/>
-              <a:t>Control de </a:t>
-            </a:r>
-            <a:r>
-              <a:rPr lang="es-AR" sz="3600" dirty="0" smtClean="0"/>
-              <a:t>acceso </a:t>
+              <a:t> Control de acceso </a:t>
             </a:r>
           </a:p>
           <a:p>
@@ -11704,7 +12919,6 @@
               <a:rPr lang="es-AR" sz="3600" dirty="0" smtClean="0"/>
               <a:t> Centralización de datos</a:t>
             </a:r>
-            <a:endParaRPr lang="es-AR" sz="3600" dirty="0" smtClean="0"/>
           </a:p>
           <a:p>
             <a:pPr lvl="0">
@@ -11723,11 +12937,7 @@
             </a:pPr>
             <a:r>
               <a:rPr lang="es-AR" sz="3600" dirty="0" smtClean="0"/>
-              <a:t> </a:t>
-            </a:r>
-            <a:r>
-              <a:rPr lang="es-AR" sz="3600" dirty="0" smtClean="0"/>
-              <a:t>Inmediatez  y masividad de acceso</a:t>
+              <a:t> Inmediatez  y masividad de acceso</a:t>
             </a:r>
           </a:p>
           <a:p>
@@ -12722,7 +13932,6 @@
               <a:rPr lang="es-AR" sz="5400" b="1" u="sng" dirty="0" smtClean="0"/>
               <a:t>Funcionalidades</a:t>
             </a:r>
-            <a:endParaRPr lang="es-AR" sz="5400" b="1" u="sng" dirty="0" smtClean="0"/>
           </a:p>
           <a:p>
             <a:pPr algn="ctr"/>
@@ -12881,11 +14090,7 @@
             </a:pPr>
             <a:r>
               <a:rPr lang="es-AR" sz="2800" dirty="0" smtClean="0"/>
-              <a:t> Integración </a:t>
-            </a:r>
-            <a:r>
-              <a:rPr lang="es-AR" sz="2800" dirty="0" smtClean="0"/>
-              <a:t>de información proveniente de diversas fuentes</a:t>
+              <a:t> Integración de información proveniente de diversas fuentes</a:t>
             </a:r>
           </a:p>
           <a:p>
@@ -13915,7 +15120,7 @@
           <a:p>
             <a:pPr algn="ctr"/>
             <a:r>
-              <a:rPr lang="es-AR" sz="5400" b="1" dirty="0" smtClean="0"/>
+              <a:rPr lang="es-AR" sz="5400" b="1" u="sng" dirty="0" smtClean="0"/>
               <a:t>Casos de uso (I)</a:t>
             </a:r>
           </a:p>
@@ -15884,7 +17089,7 @@
           <a:p>
             <a:pPr algn="ctr"/>
             <a:r>
-              <a:rPr lang="es-AR" sz="5400" b="1" dirty="0" smtClean="0"/>
+              <a:rPr lang="es-AR" sz="5400" b="1" u="sng" dirty="0" smtClean="0"/>
               <a:t>Casos de uso (II)</a:t>
             </a:r>
           </a:p>
@@ -17758,10 +18963,10 @@
           <a:p>
             <a:pPr algn="ctr"/>
             <a:r>
-              <a:rPr lang="es-AR" sz="5400" b="1" dirty="0" smtClean="0"/>
+              <a:rPr lang="es-AR" sz="5400" b="1" u="sng" dirty="0" smtClean="0"/>
               <a:t>Arquitectura</a:t>
             </a:r>
-            <a:endParaRPr lang="es-AR" sz="2000" dirty="0"/>
+            <a:endParaRPr lang="es-AR" sz="2000" u="sng" dirty="0"/>
           </a:p>
         </p:txBody>
       </p:sp>
@@ -19532,10 +20737,10 @@
           <a:p>
             <a:pPr algn="ctr"/>
             <a:r>
-              <a:rPr lang="es-AR" sz="5400" b="1" dirty="0" smtClean="0"/>
+              <a:rPr lang="es-AR" sz="5400" b="1" u="sng" dirty="0" smtClean="0"/>
               <a:t>Diagrama de componentes</a:t>
             </a:r>
-            <a:endParaRPr lang="es-AR" sz="2000" dirty="0"/>
+            <a:endParaRPr lang="es-AR" sz="2000" u="sng" dirty="0"/>
           </a:p>
         </p:txBody>
       </p:sp>
@@ -22476,10 +23681,10 @@
           <a:p>
             <a:pPr algn="ctr"/>
             <a:r>
-              <a:rPr lang="es-AR" sz="4800" b="1" dirty="0" smtClean="0"/>
+              <a:rPr lang="es-AR" sz="4800" b="1" u="sng" dirty="0" smtClean="0"/>
               <a:t>Diagrama de Despliegue</a:t>
             </a:r>
-            <a:endParaRPr lang="es-AR" sz="1200" dirty="0"/>
+            <a:endParaRPr lang="es-AR" sz="1200" u="sng" dirty="0"/>
           </a:p>
         </p:txBody>
       </p:sp>
@@ -25533,14 +26738,14 @@
           <a:p>
             <a:pPr algn="ctr"/>
             <a:r>
-              <a:rPr lang="es-AR" sz="4800" b="1" dirty="0" smtClean="0"/>
+              <a:rPr lang="es-AR" sz="4800" b="1" u="sng" dirty="0" smtClean="0"/>
               <a:t>Tecnologías y </a:t>
             </a:r>
             <a:r>
-              <a:rPr lang="es-AR" sz="4800" b="1" dirty="0" err="1" smtClean="0"/>
+              <a:rPr lang="es-AR" sz="4800" b="1" u="sng" dirty="0" err="1" smtClean="0"/>
               <a:t>Frameworks</a:t>
             </a:r>
-            <a:endParaRPr lang="es-AR" sz="4800" b="1" dirty="0" smtClean="0"/>
+            <a:endParaRPr lang="es-AR" sz="4800" b="1" u="sng" dirty="0" smtClean="0"/>
           </a:p>
           <a:p>
             <a:pPr algn="ctr"/>

</xml_diff>